<commit_message>
Added header and authors
</commit_message>
<xml_diff>
--- a/rbc_bimsb/sab-berlin-2016/poster/BIMSB_SAB2016_poster.pptx
+++ b/rbc_bimsb/sab-berlin-2016/poster/BIMSB_SAB2016_poster.pptx
@@ -288,7 +288,7 @@
           <a:p>
             <a:fld id="{A97E8C45-9899-FE47-B0BE-1CAA5A818520}" type="datetimeFigureOut">
               <a:rPr lang="de-DE" smtClean="0"/>
-              <a:t>07.10.2016</a:t>
+              <a:t>15/11/16</a:t>
             </a:fld>
             <a:endParaRPr lang="en-US"/>
           </a:p>
@@ -458,7 +458,7 @@
           <a:p>
             <a:fld id="{A97E8C45-9899-FE47-B0BE-1CAA5A818520}" type="datetimeFigureOut">
               <a:rPr lang="de-DE" smtClean="0"/>
-              <a:t>07.10.2016</a:t>
+              <a:t>15/11/16</a:t>
             </a:fld>
             <a:endParaRPr lang="en-US"/>
           </a:p>
@@ -638,7 +638,7 @@
           <a:p>
             <a:fld id="{A97E8C45-9899-FE47-B0BE-1CAA5A818520}" type="datetimeFigureOut">
               <a:rPr lang="de-DE" smtClean="0"/>
-              <a:t>07.10.2016</a:t>
+              <a:t>15/11/16</a:t>
             </a:fld>
             <a:endParaRPr lang="en-US"/>
           </a:p>
@@ -808,7 +808,7 @@
           <a:p>
             <a:fld id="{A97E8C45-9899-FE47-B0BE-1CAA5A818520}" type="datetimeFigureOut">
               <a:rPr lang="de-DE" smtClean="0"/>
-              <a:t>07.10.2016</a:t>
+              <a:t>15/11/16</a:t>
             </a:fld>
             <a:endParaRPr lang="en-US"/>
           </a:p>
@@ -1054,7 +1054,7 @@
           <a:p>
             <a:fld id="{A97E8C45-9899-FE47-B0BE-1CAA5A818520}" type="datetimeFigureOut">
               <a:rPr lang="de-DE" smtClean="0"/>
-              <a:t>07.10.2016</a:t>
+              <a:t>15/11/16</a:t>
             </a:fld>
             <a:endParaRPr lang="en-US" dirty="0"/>
           </a:p>
@@ -1350,7 +1350,7 @@
             <a:fld id="{A97E8C45-9899-FE47-B0BE-1CAA5A818520}" type="datetimeFigureOut">
               <a:rPr lang="de-DE" smtClean="0"/>
               <a:pPr/>
-              <a:t>07.10.2016</a:t>
+              <a:t>15/11/16</a:t>
             </a:fld>
             <a:endParaRPr lang="en-US" dirty="0"/>
           </a:p>
@@ -1779,7 +1779,7 @@
           <a:p>
             <a:fld id="{A97E8C45-9899-FE47-B0BE-1CAA5A818520}" type="datetimeFigureOut">
               <a:rPr lang="de-DE" smtClean="0"/>
-              <a:t>07.10.2016</a:t>
+              <a:t>15/11/16</a:t>
             </a:fld>
             <a:endParaRPr lang="en-US"/>
           </a:p>
@@ -1897,7 +1897,7 @@
           <a:p>
             <a:fld id="{A97E8C45-9899-FE47-B0BE-1CAA5A818520}" type="datetimeFigureOut">
               <a:rPr lang="de-DE" smtClean="0"/>
-              <a:t>07.10.2016</a:t>
+              <a:t>15/11/16</a:t>
             </a:fld>
             <a:endParaRPr lang="en-US"/>
           </a:p>
@@ -1992,7 +1992,7 @@
           <a:p>
             <a:fld id="{A97E8C45-9899-FE47-B0BE-1CAA5A818520}" type="datetimeFigureOut">
               <a:rPr lang="de-DE" smtClean="0"/>
-              <a:t>07.10.2016</a:t>
+              <a:t>15/11/16</a:t>
             </a:fld>
             <a:endParaRPr lang="en-US" dirty="0"/>
           </a:p>
@@ -2269,7 +2269,7 @@
           <a:p>
             <a:fld id="{A97E8C45-9899-FE47-B0BE-1CAA5A818520}" type="datetimeFigureOut">
               <a:rPr lang="de-DE" smtClean="0"/>
-              <a:t>07.10.2016</a:t>
+              <a:t>15/11/16</a:t>
             </a:fld>
             <a:endParaRPr lang="en-US"/>
           </a:p>
@@ -2522,7 +2522,7 @@
           <a:p>
             <a:fld id="{A97E8C45-9899-FE47-B0BE-1CAA5A818520}" type="datetimeFigureOut">
               <a:rPr lang="de-DE" smtClean="0"/>
-              <a:t>07.10.2016</a:t>
+              <a:t>15/11/16</a:t>
             </a:fld>
             <a:endParaRPr lang="en-US" dirty="0"/>
           </a:p>
@@ -2738,7 +2738,7 @@
             <a:fld id="{A97E8C45-9899-FE47-B0BE-1CAA5A818520}" type="datetimeFigureOut">
               <a:rPr lang="de-DE" smtClean="0"/>
               <a:pPr/>
-              <a:t>07.10.2016</a:t>
+              <a:t>15/11/16</a:t>
             </a:fld>
             <a:endParaRPr lang="en-US" dirty="0"/>
           </a:p>
@@ -3488,7 +3488,7 @@
         <p:spPr>
           <a:xfrm>
             <a:off x="7326070" y="4389850"/>
-            <a:ext cx="22075921" cy="3748719"/>
+            <a:ext cx="22075921" cy="2511457"/>
           </a:xfrm>
           <a:prstGeom prst="rect">
             <a:avLst/>
@@ -3507,34 +3507,14 @@
               </a:lnSpc>
             </a:pPr>
             <a:r>
-              <a:rPr lang="en-US" sz="7200" b="1" dirty="0" smtClean="0">
+              <a:rPr lang="en-US" sz="7200" b="1" dirty="0">
                 <a:solidFill>
                   <a:schemeClr val="bg1"/>
                 </a:solidFill>
                 <a:latin typeface="Arial"/>
                 <a:cs typeface="Arial"/>
               </a:rPr>
-              <a:t>Bioinformatics Services for Microbial Genome and </a:t>
-            </a:r>
-            <a:r>
-              <a:rPr lang="en-US" sz="7200" b="1" dirty="0">
-                <a:solidFill>
-                  <a:schemeClr val="bg1"/>
-                </a:solidFill>
-                <a:latin typeface="Arial"/>
-                <a:cs typeface="Arial"/>
-              </a:rPr>
-              <a:t>M</a:t>
-            </a:r>
-            <a:r>
-              <a:rPr lang="en-US" sz="7200" b="1" dirty="0" smtClean="0">
-                <a:solidFill>
-                  <a:schemeClr val="bg1"/>
-                </a:solidFill>
-                <a:latin typeface="Arial"/>
-                <a:cs typeface="Arial"/>
-              </a:rPr>
-              <a:t>etagenome Research </a:t>
+              <a:t>RNA Bioinformatics Center:</a:t>
             </a:r>
           </a:p>
           <a:p>
@@ -3544,14 +3524,14 @@
               </a:lnSpc>
             </a:pPr>
             <a:r>
-              <a:rPr lang="en-US" sz="7200" b="1" dirty="0" smtClean="0">
+              <a:rPr lang="en-US" sz="7200" b="1" dirty="0">
                 <a:solidFill>
                   <a:schemeClr val="bg1"/>
                 </a:solidFill>
                 <a:latin typeface="Arial"/>
                 <a:cs typeface="Arial"/>
               </a:rPr>
-              <a:t>at the Center for Biotechnology</a:t>
+              <a:t>The Berlin Institute for Medical Systems Biology</a:t>
             </a:r>
             <a:endParaRPr lang="en-US" sz="7200" b="1" dirty="0">
               <a:solidFill>
@@ -3586,94 +3566,94 @@
           <a:lstStyle/>
           <a:p>
             <a:r>
-              <a:rPr lang="en-US" sz="4000" dirty="0" err="1" smtClean="0">
+              <a:rPr lang="en-US" sz="4000" dirty="0" err="1">
                 <a:solidFill>
                   <a:schemeClr val="bg1"/>
                 </a:solidFill>
                 <a:latin typeface="Arial" panose="020B0604020202020204" pitchFamily="34" charset="0"/>
                 <a:cs typeface="Arial" panose="020B0604020202020204" pitchFamily="34" charset="0"/>
               </a:rPr>
-              <a:t>Firstname</a:t>
-            </a:r>
-            <a:r>
-              <a:rPr lang="en-US" sz="4000" dirty="0" smtClean="0">
+              <a:t>Altuna</a:t>
+            </a:r>
+            <a:r>
+              <a:rPr lang="en-US" sz="4000" dirty="0">
                 <a:solidFill>
                   <a:schemeClr val="bg1"/>
                 </a:solidFill>
                 <a:latin typeface="Arial" panose="020B0604020202020204" pitchFamily="34" charset="0"/>
                 <a:cs typeface="Arial" panose="020B0604020202020204" pitchFamily="34" charset="0"/>
               </a:rPr>
-              <a:t> Name, </a:t>
-            </a:r>
-            <a:r>
-              <a:rPr lang="en-US" sz="4000" dirty="0" err="1" smtClean="0">
+              <a:t> </a:t>
+            </a:r>
+            <a:r>
+              <a:rPr lang="en-US" sz="4000" dirty="0" err="1">
                 <a:solidFill>
                   <a:schemeClr val="bg1"/>
                 </a:solidFill>
                 <a:latin typeface="Arial" panose="020B0604020202020204" pitchFamily="34" charset="0"/>
                 <a:cs typeface="Arial" panose="020B0604020202020204" pitchFamily="34" charset="0"/>
               </a:rPr>
-              <a:t>Firstname</a:t>
-            </a:r>
-            <a:r>
-              <a:rPr lang="en-US" sz="4000" dirty="0" smtClean="0">
+              <a:t>Akalin</a:t>
+            </a:r>
+            <a:r>
+              <a:rPr lang="en-US" sz="4000" dirty="0">
                 <a:solidFill>
                   <a:schemeClr val="bg1"/>
                 </a:solidFill>
                 <a:latin typeface="Arial" panose="020B0604020202020204" pitchFamily="34" charset="0"/>
                 <a:cs typeface="Arial" panose="020B0604020202020204" pitchFamily="34" charset="0"/>
               </a:rPr>
-              <a:t> Name, </a:t>
-            </a:r>
-            <a:r>
-              <a:rPr lang="en-US" sz="4000" dirty="0" err="1" smtClean="0">
+              <a:t>, </a:t>
+            </a:r>
+            <a:r>
+              <a:rPr lang="en-US" sz="4000" dirty="0" err="1">
                 <a:solidFill>
                   <a:schemeClr val="bg1"/>
                 </a:solidFill>
                 <a:latin typeface="Arial" panose="020B0604020202020204" pitchFamily="34" charset="0"/>
                 <a:cs typeface="Arial" panose="020B0604020202020204" pitchFamily="34" charset="0"/>
               </a:rPr>
-              <a:t>Firstname</a:t>
-            </a:r>
-            <a:r>
-              <a:rPr lang="en-US" sz="4000" dirty="0" smtClean="0">
+              <a:t>Uwe</a:t>
+            </a:r>
+            <a:r>
+              <a:rPr lang="en-US" sz="4000" dirty="0">
                 <a:solidFill>
                   <a:schemeClr val="bg1"/>
                 </a:solidFill>
                 <a:latin typeface="Arial" panose="020B0604020202020204" pitchFamily="34" charset="0"/>
                 <a:cs typeface="Arial" panose="020B0604020202020204" pitchFamily="34" charset="0"/>
               </a:rPr>
-              <a:t> Name, </a:t>
-            </a:r>
-            <a:r>
-              <a:rPr lang="en-US" sz="4000" dirty="0" err="1" smtClean="0">
+              <a:t> </a:t>
+            </a:r>
+            <a:r>
+              <a:rPr lang="en-US" sz="4000" dirty="0" err="1">
                 <a:solidFill>
                   <a:schemeClr val="bg1"/>
                 </a:solidFill>
                 <a:latin typeface="Arial" panose="020B0604020202020204" pitchFamily="34" charset="0"/>
                 <a:cs typeface="Arial" panose="020B0604020202020204" pitchFamily="34" charset="0"/>
               </a:rPr>
-              <a:t>Firstname</a:t>
-            </a:r>
-            <a:r>
-              <a:rPr lang="en-US" sz="4000" dirty="0" smtClean="0">
+              <a:t>Ohler</a:t>
+            </a:r>
+            <a:r>
+              <a:rPr lang="en-US" sz="4000" dirty="0">
                 <a:solidFill>
                   <a:schemeClr val="bg1"/>
                 </a:solidFill>
                 <a:latin typeface="Arial" panose="020B0604020202020204" pitchFamily="34" charset="0"/>
                 <a:cs typeface="Arial" panose="020B0604020202020204" pitchFamily="34" charset="0"/>
               </a:rPr>
-              <a:t> Name, </a:t>
-            </a:r>
-            <a:r>
-              <a:rPr lang="en-US" sz="4000" dirty="0" err="1" smtClean="0">
+              <a:t>, </a:t>
+            </a:r>
+            <a:r>
+              <a:rPr lang="en-US" sz="4000" dirty="0" err="1">
                 <a:solidFill>
                   <a:schemeClr val="bg1"/>
                 </a:solidFill>
                 <a:latin typeface="Arial" panose="020B0604020202020204" pitchFamily="34" charset="0"/>
                 <a:cs typeface="Arial" panose="020B0604020202020204" pitchFamily="34" charset="0"/>
               </a:rPr>
-              <a:t>Firstname</a:t>
+              <a:t>Nikolaus</a:t>
             </a:r>
             <a:r>
               <a:rPr lang="en-US" sz="4000" dirty="0">
@@ -3686,34 +3666,44 @@
               <a:t> </a:t>
             </a:r>
             <a:r>
-              <a:rPr lang="en-US" sz="4000" dirty="0" smtClean="0">
+              <a:rPr lang="en-US" sz="4000" dirty="0" err="1">
                 <a:solidFill>
                   <a:schemeClr val="bg1"/>
                 </a:solidFill>
                 <a:latin typeface="Arial" panose="020B0604020202020204" pitchFamily="34" charset="0"/>
                 <a:cs typeface="Arial" panose="020B0604020202020204" pitchFamily="34" charset="0"/>
               </a:rPr>
-              <a:t>Name, </a:t>
-            </a:r>
-            <a:r>
-              <a:rPr lang="en-US" sz="4000" dirty="0" err="1" smtClean="0">
+              <a:t>Rajewsky</a:t>
+            </a:r>
+            <a:r>
+              <a:rPr lang="en-US" sz="4000" dirty="0">
                 <a:solidFill>
                   <a:schemeClr val="bg1"/>
                 </a:solidFill>
                 <a:latin typeface="Arial" panose="020B0604020202020204" pitchFamily="34" charset="0"/>
                 <a:cs typeface="Arial" panose="020B0604020202020204" pitchFamily="34" charset="0"/>
               </a:rPr>
-              <a:t>Firstname</a:t>
-            </a:r>
-            <a:r>
-              <a:rPr lang="en-US" sz="4000" dirty="0" smtClean="0">
+              <a:t>, </a:t>
+            </a:r>
+            <a:r>
+              <a:rPr lang="en-US" sz="4000" dirty="0" err="1">
                 <a:solidFill>
                   <a:schemeClr val="bg1"/>
                 </a:solidFill>
                 <a:latin typeface="Arial" panose="020B0604020202020204" pitchFamily="34" charset="0"/>
                 <a:cs typeface="Arial" panose="020B0604020202020204" pitchFamily="34" charset="0"/>
               </a:rPr>
-              <a:t> Name, </a:t>
+              <a:t>Dilmurat</a:t>
+            </a:r>
+            <a:r>
+              <a:rPr lang="en-US" sz="4000" dirty="0">
+                <a:solidFill>
+                  <a:schemeClr val="bg1"/>
+                </a:solidFill>
+                <a:latin typeface="Arial" panose="020B0604020202020204" pitchFamily="34" charset="0"/>
+                <a:cs typeface="Arial" panose="020B0604020202020204" pitchFamily="34" charset="0"/>
+              </a:rPr>
+              <a:t> Yusuf, Bora </a:t>
             </a:r>
             <a:r>
               <a:rPr lang="en-US" sz="4000" dirty="0" err="1">
@@ -3723,39 +3713,47 @@
                 <a:latin typeface="Arial" panose="020B0604020202020204" pitchFamily="34" charset="0"/>
                 <a:cs typeface="Arial" panose="020B0604020202020204" pitchFamily="34" charset="0"/>
               </a:rPr>
-              <a:t>F</a:t>
-            </a:r>
-            <a:r>
-              <a:rPr lang="en-US" sz="4000" dirty="0" err="1" smtClean="0">
+              <a:t>Uyar</a:t>
+            </a:r>
+            <a:r>
+              <a:rPr lang="en-US" sz="4000" dirty="0">
                 <a:solidFill>
                   <a:schemeClr val="bg1"/>
                 </a:solidFill>
                 <a:latin typeface="Arial" panose="020B0604020202020204" pitchFamily="34" charset="0"/>
                 <a:cs typeface="Arial" panose="020B0604020202020204" pitchFamily="34" charset="0"/>
               </a:rPr>
-              <a:t>irstname</a:t>
-            </a:r>
-            <a:r>
-              <a:rPr lang="en-US" sz="4000" dirty="0" smtClean="0">
+              <a:t>, Ricardo </a:t>
+            </a:r>
+            <a:r>
+              <a:rPr lang="en-US" sz="4000" dirty="0" err="1">
                 <a:solidFill>
                   <a:schemeClr val="bg1"/>
                 </a:solidFill>
                 <a:latin typeface="Arial" panose="020B0604020202020204" pitchFamily="34" charset="0"/>
                 <a:cs typeface="Arial" panose="020B0604020202020204" pitchFamily="34" charset="0"/>
               </a:rPr>
-              <a:t> Name</a:t>
-            </a:r>
-          </a:p>
-          <a:p>
-            <a:r>
-              <a:rPr lang="en-US" sz="4000" dirty="0" smtClean="0">
+              <a:t>Wurmus</a:t>
+            </a:r>
+            <a:r>
+              <a:rPr lang="en-US" sz="4000" dirty="0">
                 <a:solidFill>
                   <a:schemeClr val="bg1"/>
                 </a:solidFill>
                 <a:latin typeface="Arial" panose="020B0604020202020204" pitchFamily="34" charset="0"/>
                 <a:cs typeface="Arial" panose="020B0604020202020204" pitchFamily="34" charset="0"/>
               </a:rPr>
-              <a:t>Center for Biotechnology, Bielefeld University, Germany</a:t>
+              <a:t>, Dan </a:t>
+            </a:r>
+            <a:r>
+              <a:rPr lang="en-US" sz="4000" dirty="0" err="1">
+                <a:solidFill>
+                  <a:schemeClr val="bg1"/>
+                </a:solidFill>
+                <a:latin typeface="Arial" panose="020B0604020202020204" pitchFamily="34" charset="0"/>
+                <a:cs typeface="Arial" panose="020B0604020202020204" pitchFamily="34" charset="0"/>
+              </a:rPr>
+              <a:t>Munteanu</a:t>
             </a:r>
             <a:endParaRPr lang="en-US" sz="4000" dirty="0">
               <a:solidFill>
@@ -3765,6 +3763,45 @@
               <a:cs typeface="Arial" panose="020B0604020202020204" pitchFamily="34" charset="0"/>
             </a:endParaRPr>
           </a:p>
+          <a:p>
+            <a:r>
+              <a:rPr lang="en-US" sz="4000" dirty="0">
+                <a:solidFill>
+                  <a:schemeClr val="bg1"/>
+                </a:solidFill>
+                <a:latin typeface="Arial" panose="020B0604020202020204" pitchFamily="34" charset="0"/>
+                <a:cs typeface="Arial" panose="020B0604020202020204" pitchFamily="34" charset="0"/>
+              </a:rPr>
+              <a:t>The Berlin Institute for Medical Systems Biology, Max-</a:t>
+            </a:r>
+            <a:r>
+              <a:rPr lang="en-US" sz="4000" dirty="0" err="1">
+                <a:solidFill>
+                  <a:schemeClr val="bg1"/>
+                </a:solidFill>
+                <a:latin typeface="Arial" panose="020B0604020202020204" pitchFamily="34" charset="0"/>
+                <a:cs typeface="Arial" panose="020B0604020202020204" pitchFamily="34" charset="0"/>
+              </a:rPr>
+              <a:t>Delbrueck</a:t>
+            </a:r>
+            <a:r>
+              <a:rPr lang="en-US" sz="4000" dirty="0">
+                <a:solidFill>
+                  <a:schemeClr val="bg1"/>
+                </a:solidFill>
+                <a:latin typeface="Arial" panose="020B0604020202020204" pitchFamily="34" charset="0"/>
+                <a:cs typeface="Arial" panose="020B0604020202020204" pitchFamily="34" charset="0"/>
+              </a:rPr>
+              <a:t> Center for Molecular Medicine, Berlin, Germany</a:t>
+            </a:r>
+            <a:endParaRPr lang="en-US" sz="4000" dirty="0">
+              <a:solidFill>
+                <a:schemeClr val="bg1"/>
+              </a:solidFill>
+              <a:latin typeface="Arial" panose="020B0604020202020204" pitchFamily="34" charset="0"/>
+              <a:cs typeface="Arial" panose="020B0604020202020204" pitchFamily="34" charset="0"/>
+            </a:endParaRPr>
+          </a:p>
         </p:txBody>
       </p:sp>
       <p:sp>
@@ -3776,7 +3813,7 @@
         <p:spPr>
           <a:xfrm>
             <a:off x="1214774" y="3934541"/>
-            <a:ext cx="3755996" cy="1631216"/>
+            <a:ext cx="4728514" cy="4708981"/>
           </a:xfrm>
           <a:prstGeom prst="rect">
             <a:avLst/>
@@ -3790,15 +3827,29 @@
           <a:lstStyle/>
           <a:p>
             <a:r>
-              <a:rPr lang="de-DE" sz="10000" b="1" dirty="0" err="1" smtClean="0">
+              <a:rPr lang="de-DE" sz="10000" b="1" dirty="0">
                 <a:solidFill>
                   <a:schemeClr val="bg1"/>
                 </a:solidFill>
                 <a:latin typeface="Arial" panose="020B0604020202020204" pitchFamily="34" charset="0"/>
                 <a:cs typeface="Arial" panose="020B0604020202020204" pitchFamily="34" charset="0"/>
               </a:rPr>
-              <a:t>BiGi</a:t>
-            </a:r>
+              <a:t>RBC:</a:t>
+            </a:r>
+          </a:p>
+          <a:p>
+            <a:r>
+              <a:rPr lang="de-DE" sz="10000" b="1" dirty="0">
+                <a:solidFill>
+                  <a:schemeClr val="bg1"/>
+                </a:solidFill>
+                <a:latin typeface="Arial" panose="020B0604020202020204" pitchFamily="34" charset="0"/>
+                <a:cs typeface="Arial" panose="020B0604020202020204" pitchFamily="34" charset="0"/>
+              </a:rPr>
+              <a:t>BIMSB</a:t>
+            </a:r>
+          </a:p>
+          <a:p>
             <a:endParaRPr lang="de-DE" sz="10000" b="1" dirty="0">
               <a:solidFill>
                 <a:schemeClr val="bg1"/>
@@ -3936,14 +3987,14 @@
           </a:ln>
           <a:effectLst/>
           <a:extLst>
-            <a:ext uri="{909E8E84-426E-40DD-AFC4-6F175D3DCCD1}">
+            <a:ext uri="{909E8E84-426E-40dd-AFC4-6F175D3DCCD1}">
               <a14:hiddenFill xmlns:a14="http://schemas.microsoft.com/office/drawing/2010/main">
                 <a:solidFill>
                   <a:schemeClr val="accent1"/>
                 </a:solidFill>
               </a14:hiddenFill>
             </a:ext>
-            <a:ext uri="{91240B29-F687-4F45-9708-019B960494DF}">
+            <a:ext uri="{91240B29-F687-4f45-9708-019B960494DF}">
               <a14:hiddenLine xmlns:a14="http://schemas.microsoft.com/office/drawing/2010/main" w="9525">
                 <a:solidFill>
                   <a:schemeClr val="tx1"/>
@@ -3953,7 +4004,7 @@
                 <a:tailEnd/>
               </a14:hiddenLine>
             </a:ext>
-            <a:ext uri="{AF507438-7753-43E0-B8FC-AC1667EBCBE1}">
+            <a:ext uri="{AF507438-7753-43e0-B8FC-AC1667EBCBE1}">
               <a14:hiddenEffects xmlns:a14="http://schemas.microsoft.com/office/drawing/2010/main">
                 <a:effectLst>
                   <a:outerShdw dist="35921" dir="2700000" algn="ctr" rotWithShape="0">
@@ -4000,14 +4051,14 @@
           </a:ln>
           <a:effectLst/>
           <a:extLst>
-            <a:ext uri="{909E8E84-426E-40DD-AFC4-6F175D3DCCD1}">
+            <a:ext uri="{909E8E84-426E-40dd-AFC4-6F175D3DCCD1}">
               <a14:hiddenFill xmlns:a14="http://schemas.microsoft.com/office/drawing/2010/main">
                 <a:solidFill>
                   <a:schemeClr val="accent1"/>
                 </a:solidFill>
               </a14:hiddenFill>
             </a:ext>
-            <a:ext uri="{91240B29-F687-4F45-9708-019B960494DF}">
+            <a:ext uri="{91240B29-F687-4f45-9708-019B960494DF}">
               <a14:hiddenLine xmlns:a14="http://schemas.microsoft.com/office/drawing/2010/main" w="9525">
                 <a:solidFill>
                   <a:schemeClr val="tx1"/>
@@ -4017,7 +4068,7 @@
                 <a:tailEnd/>
               </a14:hiddenLine>
             </a:ext>
-            <a:ext uri="{AF507438-7753-43E0-B8FC-AC1667EBCBE1}">
+            <a:ext uri="{AF507438-7753-43e0-B8FC-AC1667EBCBE1}">
               <a14:hiddenEffects xmlns:a14="http://schemas.microsoft.com/office/drawing/2010/main">
                 <a:effectLst>
                   <a:outerShdw dist="35921" dir="2700000" algn="ctr" rotWithShape="0">
@@ -5113,7 +5164,7 @@
   <p:timing>
     <p:tnLst>
       <p:par>
-        <p:cTn id="1" dur="indefinite" restart="never" nodeType="tmRoot"/>
+        <p:cTn xmlns:p14="http://schemas.microsoft.com/office/powerpoint/2010/main" id="1" dur="indefinite" restart="never" nodeType="tmRoot"/>
       </p:par>
     </p:tnLst>
   </p:timing>

</xml_diff>

<commit_message>
added bullet points for each section on the poster
</commit_message>
<xml_diff>
--- a/rbc_bimsb/sab-berlin-2016/poster/BIMSB_SAB2016_poster.pptx
+++ b/rbc_bimsb/sab-berlin-2016/poster/BIMSB_SAB2016_poster.pptx
@@ -288,7 +288,7 @@
           <a:p>
             <a:fld id="{A97E8C45-9899-FE47-B0BE-1CAA5A818520}" type="datetimeFigureOut">
               <a:rPr lang="de-DE" smtClean="0"/>
-              <a:t>15/11/16</a:t>
+              <a:t>16/11/16</a:t>
             </a:fld>
             <a:endParaRPr lang="en-US"/>
           </a:p>
@@ -458,7 +458,7 @@
           <a:p>
             <a:fld id="{A97E8C45-9899-FE47-B0BE-1CAA5A818520}" type="datetimeFigureOut">
               <a:rPr lang="de-DE" smtClean="0"/>
-              <a:t>15/11/16</a:t>
+              <a:t>16/11/16</a:t>
             </a:fld>
             <a:endParaRPr lang="en-US"/>
           </a:p>
@@ -638,7 +638,7 @@
           <a:p>
             <a:fld id="{A97E8C45-9899-FE47-B0BE-1CAA5A818520}" type="datetimeFigureOut">
               <a:rPr lang="de-DE" smtClean="0"/>
-              <a:t>15/11/16</a:t>
+              <a:t>16/11/16</a:t>
             </a:fld>
             <a:endParaRPr lang="en-US"/>
           </a:p>
@@ -808,7 +808,7 @@
           <a:p>
             <a:fld id="{A97E8C45-9899-FE47-B0BE-1CAA5A818520}" type="datetimeFigureOut">
               <a:rPr lang="de-DE" smtClean="0"/>
-              <a:t>15/11/16</a:t>
+              <a:t>16/11/16</a:t>
             </a:fld>
             <a:endParaRPr lang="en-US"/>
           </a:p>
@@ -1054,7 +1054,7 @@
           <a:p>
             <a:fld id="{A97E8C45-9899-FE47-B0BE-1CAA5A818520}" type="datetimeFigureOut">
               <a:rPr lang="de-DE" smtClean="0"/>
-              <a:t>15/11/16</a:t>
+              <a:t>16/11/16</a:t>
             </a:fld>
             <a:endParaRPr lang="en-US" dirty="0"/>
           </a:p>
@@ -1350,7 +1350,7 @@
             <a:fld id="{A97E8C45-9899-FE47-B0BE-1CAA5A818520}" type="datetimeFigureOut">
               <a:rPr lang="de-DE" smtClean="0"/>
               <a:pPr/>
-              <a:t>15/11/16</a:t>
+              <a:t>16/11/16</a:t>
             </a:fld>
             <a:endParaRPr lang="en-US" dirty="0"/>
           </a:p>
@@ -1779,7 +1779,7 @@
           <a:p>
             <a:fld id="{A97E8C45-9899-FE47-B0BE-1CAA5A818520}" type="datetimeFigureOut">
               <a:rPr lang="de-DE" smtClean="0"/>
-              <a:t>15/11/16</a:t>
+              <a:t>16/11/16</a:t>
             </a:fld>
             <a:endParaRPr lang="en-US"/>
           </a:p>
@@ -1897,7 +1897,7 @@
           <a:p>
             <a:fld id="{A97E8C45-9899-FE47-B0BE-1CAA5A818520}" type="datetimeFigureOut">
               <a:rPr lang="de-DE" smtClean="0"/>
-              <a:t>15/11/16</a:t>
+              <a:t>16/11/16</a:t>
             </a:fld>
             <a:endParaRPr lang="en-US"/>
           </a:p>
@@ -1992,7 +1992,7 @@
           <a:p>
             <a:fld id="{A97E8C45-9899-FE47-B0BE-1CAA5A818520}" type="datetimeFigureOut">
               <a:rPr lang="de-DE" smtClean="0"/>
-              <a:t>15/11/16</a:t>
+              <a:t>16/11/16</a:t>
             </a:fld>
             <a:endParaRPr lang="en-US" dirty="0"/>
           </a:p>
@@ -2269,7 +2269,7 @@
           <a:p>
             <a:fld id="{A97E8C45-9899-FE47-B0BE-1CAA5A818520}" type="datetimeFigureOut">
               <a:rPr lang="de-DE" smtClean="0"/>
-              <a:t>15/11/16</a:t>
+              <a:t>16/11/16</a:t>
             </a:fld>
             <a:endParaRPr lang="en-US"/>
           </a:p>
@@ -2522,7 +2522,7 @@
           <a:p>
             <a:fld id="{A97E8C45-9899-FE47-B0BE-1CAA5A818520}" type="datetimeFigureOut">
               <a:rPr lang="de-DE" smtClean="0"/>
-              <a:t>15/11/16</a:t>
+              <a:t>16/11/16</a:t>
             </a:fld>
             <a:endParaRPr lang="en-US" dirty="0"/>
           </a:p>
@@ -2738,7 +2738,7 @@
             <a:fld id="{A97E8C45-9899-FE47-B0BE-1CAA5A818520}" type="datetimeFigureOut">
               <a:rPr lang="de-DE" smtClean="0"/>
               <a:pPr/>
-              <a:t>15/11/16</a:t>
+              <a:t>16/11/16</a:t>
             </a:fld>
             <a:endParaRPr lang="en-US" dirty="0"/>
           </a:p>
@@ -3118,6 +3118,36 @@
           <a:chExt cx="0" cy="0"/>
         </a:xfrm>
       </p:grpSpPr>
+      <p:pic>
+        <p:nvPicPr>
+          <p:cNvPr id="16" name="Bild 15" descr="logo_28185.png"/>
+          <p:cNvPicPr>
+            <a:picLocks noChangeAspect="1"/>
+          </p:cNvPicPr>
+          <p:nvPr/>
+        </p:nvPicPr>
+        <p:blipFill>
+          <a:blip r:embed="rId2">
+            <a:extLst>
+              <a:ext uri="{28A0092B-C50C-407E-A947-70E740481C1C}">
+                <a14:useLocalDpi xmlns:a14="http://schemas.microsoft.com/office/drawing/2010/main" val="0"/>
+              </a:ext>
+            </a:extLst>
+          </a:blip>
+          <a:stretch>
+            <a:fillRect/>
+          </a:stretch>
+        </p:blipFill>
+        <p:spPr>
+          <a:xfrm>
+            <a:off x="21911505" y="533991"/>
+            <a:ext cx="7286637" cy="2645610"/>
+          </a:xfrm>
+          <a:prstGeom prst="rect">
+            <a:avLst/>
+          </a:prstGeom>
+        </p:spPr>
+      </p:pic>
       <p:sp>
         <p:nvSpPr>
           <p:cNvPr id="11" name="Rechteck 10"/>
@@ -3177,7 +3207,7 @@
           <p:nvPr/>
         </p:nvPicPr>
         <p:blipFill>
-          <a:blip r:embed="rId2">
+          <a:blip r:embed="rId3">
             <a:extLst>
               <a:ext uri="{28A0092B-C50C-407E-A947-70E740481C1C}">
                 <a14:useLocalDpi xmlns:a14="http://schemas.microsoft.com/office/drawing/2010/main" val="0"/>
@@ -3206,14 +3236,14 @@
         </p:nvSpPr>
         <p:spPr>
           <a:xfrm>
-            <a:off x="23969615" y="45514641"/>
+            <a:off x="-1" y="44276369"/>
             <a:ext cx="30275213" cy="1800000"/>
           </a:xfrm>
           <a:prstGeom prst="rect">
             <a:avLst/>
           </a:prstGeom>
           <a:blipFill dpi="0" rotWithShape="1">
-            <a:blip r:embed="rId3">
+            <a:blip r:embed="rId4">
               <a:extLst>
                 <a:ext uri="{28A0092B-C50C-407E-A947-70E740481C1C}">
                   <a14:useLocalDpi xmlns:a14="http://schemas.microsoft.com/office/drawing/2010/main" val="0"/>
@@ -3250,7 +3280,7 @@
             <a:pPr algn="ctr"/>
             <a:endParaRPr lang="en-US" dirty="0">
               <a:blipFill dpi="0" rotWithShape="1">
-                <a:blip r:embed="rId3">
+                <a:blip r:embed="rId4">
                   <a:extLst>
                     <a:ext uri="{28A0092B-C50C-407E-A947-70E740481C1C}">
                       <a14:useLocalDpi xmlns:a14="http://schemas.microsoft.com/office/drawing/2010/main" val="0"/>
@@ -3381,7 +3411,7 @@
           <p:nvPr/>
         </p:nvPicPr>
         <p:blipFill>
-          <a:blip r:embed="rId4">
+          <a:blip r:embed="rId5">
             <a:extLst>
               <a:ext uri="{28A0092B-C50C-407E-A947-70E740481C1C}">
                 <a14:useLocalDpi xmlns:a14="http://schemas.microsoft.com/office/drawing/2010/main" val="0"/>
@@ -3533,13 +3563,6 @@
               </a:rPr>
               <a:t>The Berlin Institute for Medical Systems Biology</a:t>
             </a:r>
-            <a:endParaRPr lang="en-US" sz="7200" b="1" dirty="0">
-              <a:solidFill>
-                <a:schemeClr val="bg1"/>
-              </a:solidFill>
-              <a:latin typeface="Arial"/>
-              <a:cs typeface="Arial"/>
-            </a:endParaRPr>
           </a:p>
         </p:txBody>
       </p:sp>
@@ -3794,13 +3817,6 @@
               </a:rPr>
               <a:t> Center for Molecular Medicine, Berlin, Germany</a:t>
             </a:r>
-            <a:endParaRPr lang="en-US" sz="4000" dirty="0">
-              <a:solidFill>
-                <a:schemeClr val="bg1"/>
-              </a:solidFill>
-              <a:latin typeface="Arial" panose="020B0604020202020204" pitchFamily="34" charset="0"/>
-              <a:cs typeface="Arial" panose="020B0604020202020204" pitchFamily="34" charset="0"/>
-            </a:endParaRPr>
           </a:p>
         </p:txBody>
       </p:sp>
@@ -3869,7 +3885,7 @@
           <p:nvPr/>
         </p:nvPicPr>
         <p:blipFill>
-          <a:blip r:embed="rId5">
+          <a:blip r:embed="rId6">
             <a:extLst>
               <a:ext uri="{28A0092B-C50C-407E-A947-70E740481C1C}">
                 <a14:useLocalDpi xmlns:a14="http://schemas.microsoft.com/office/drawing/2010/main" val="0"/>
@@ -3952,134 +3968,6 @@
           </a:p>
         </p:txBody>
       </p:sp>
-      <p:pic>
-        <p:nvPicPr>
-          <p:cNvPr id="1027" name="Picture 3"/>
-          <p:cNvPicPr>
-            <a:picLocks noChangeAspect="1" noChangeArrowheads="1"/>
-          </p:cNvPicPr>
-          <p:nvPr/>
-        </p:nvPicPr>
-        <p:blipFill>
-          <a:blip r:embed="rId6">
-            <a:extLst>
-              <a:ext uri="{28A0092B-C50C-407E-A947-70E740481C1C}">
-                <a14:useLocalDpi xmlns:a14="http://schemas.microsoft.com/office/drawing/2010/main" val="0"/>
-              </a:ext>
-            </a:extLst>
-          </a:blip>
-          <a:srcRect/>
-          <a:stretch>
-            <a:fillRect/>
-          </a:stretch>
-        </p:blipFill>
-        <p:spPr bwMode="auto">
-          <a:xfrm>
-            <a:off x="19132556" y="536405"/>
-            <a:ext cx="4622503" cy="1800000"/>
-          </a:xfrm>
-          <a:prstGeom prst="rect">
-            <a:avLst/>
-          </a:prstGeom>
-          <a:noFill/>
-          <a:ln>
-            <a:noFill/>
-          </a:ln>
-          <a:effectLst/>
-          <a:extLst>
-            <a:ext uri="{909E8E84-426E-40dd-AFC4-6F175D3DCCD1}">
-              <a14:hiddenFill xmlns:a14="http://schemas.microsoft.com/office/drawing/2010/main">
-                <a:solidFill>
-                  <a:schemeClr val="accent1"/>
-                </a:solidFill>
-              </a14:hiddenFill>
-            </a:ext>
-            <a:ext uri="{91240B29-F687-4f45-9708-019B960494DF}">
-              <a14:hiddenLine xmlns:a14="http://schemas.microsoft.com/office/drawing/2010/main" w="9525">
-                <a:solidFill>
-                  <a:schemeClr val="tx1"/>
-                </a:solidFill>
-                <a:miter lim="800000"/>
-                <a:headEnd/>
-                <a:tailEnd/>
-              </a14:hiddenLine>
-            </a:ext>
-            <a:ext uri="{AF507438-7753-43e0-B8FC-AC1667EBCBE1}">
-              <a14:hiddenEffects xmlns:a14="http://schemas.microsoft.com/office/drawing/2010/main">
-                <a:effectLst>
-                  <a:outerShdw dist="35921" dir="2700000" algn="ctr" rotWithShape="0">
-                    <a:schemeClr val="bg2"/>
-                  </a:outerShdw>
-                </a:effectLst>
-              </a14:hiddenEffects>
-            </a:ext>
-          </a:extLst>
-        </p:spPr>
-      </p:pic>
-      <p:pic>
-        <p:nvPicPr>
-          <p:cNvPr id="1028" name="Picture 4"/>
-          <p:cNvPicPr>
-            <a:picLocks noChangeAspect="1" noChangeArrowheads="1"/>
-          </p:cNvPicPr>
-          <p:nvPr/>
-        </p:nvPicPr>
-        <p:blipFill>
-          <a:blip r:embed="rId7">
-            <a:extLst>
-              <a:ext uri="{28A0092B-C50C-407E-A947-70E740481C1C}">
-                <a14:useLocalDpi xmlns:a14="http://schemas.microsoft.com/office/drawing/2010/main" val="0"/>
-              </a:ext>
-            </a:extLst>
-          </a:blip>
-          <a:srcRect/>
-          <a:stretch>
-            <a:fillRect/>
-          </a:stretch>
-        </p:blipFill>
-        <p:spPr bwMode="auto">
-          <a:xfrm>
-            <a:off x="24818048" y="526398"/>
-            <a:ext cx="4675456" cy="1800000"/>
-          </a:xfrm>
-          <a:prstGeom prst="rect">
-            <a:avLst/>
-          </a:prstGeom>
-          <a:noFill/>
-          <a:ln>
-            <a:noFill/>
-          </a:ln>
-          <a:effectLst/>
-          <a:extLst>
-            <a:ext uri="{909E8E84-426E-40dd-AFC4-6F175D3DCCD1}">
-              <a14:hiddenFill xmlns:a14="http://schemas.microsoft.com/office/drawing/2010/main">
-                <a:solidFill>
-                  <a:schemeClr val="accent1"/>
-                </a:solidFill>
-              </a14:hiddenFill>
-            </a:ext>
-            <a:ext uri="{91240B29-F687-4f45-9708-019B960494DF}">
-              <a14:hiddenLine xmlns:a14="http://schemas.microsoft.com/office/drawing/2010/main" w="9525">
-                <a:solidFill>
-                  <a:schemeClr val="tx1"/>
-                </a:solidFill>
-                <a:miter lim="800000"/>
-                <a:headEnd/>
-                <a:tailEnd/>
-              </a14:hiddenLine>
-            </a:ext>
-            <a:ext uri="{AF507438-7753-43e0-B8FC-AC1667EBCBE1}">
-              <a14:hiddenEffects xmlns:a14="http://schemas.microsoft.com/office/drawing/2010/main">
-                <a:effectLst>
-                  <a:outerShdw dist="35921" dir="2700000" algn="ctr" rotWithShape="0">
-                    <a:schemeClr val="bg2"/>
-                  </a:outerShdw>
-                </a:effectLst>
-              </a14:hiddenEffects>
-            </a:ext>
-          </a:extLst>
-        </p:spPr>
-      </p:pic>
       <p:sp>
         <p:nvSpPr>
           <p:cNvPr id="49" name="Textfeld 48"/>
@@ -4199,7 +4087,7 @@
         </p:nvSpPr>
         <p:spPr>
           <a:xfrm>
-            <a:off x="16595246" y="22852322"/>
+            <a:off x="16598142" y="36451407"/>
             <a:ext cx="12600000" cy="1015663"/>
           </a:xfrm>
           <a:prstGeom prst="rect">
@@ -4401,8 +4289,8 @@
         </p:nvSpPr>
         <p:spPr>
           <a:xfrm>
-            <a:off x="1323518" y="26957940"/>
-            <a:ext cx="12105260" cy="3139321"/>
+            <a:off x="1217550" y="24417940"/>
+            <a:ext cx="15668762" cy="11264623"/>
           </a:xfrm>
           <a:prstGeom prst="rect">
             <a:avLst/>
@@ -4476,13 +4364,159 @@
                 <a:latin typeface="Arial" panose="020B0604020202020204" pitchFamily="34" charset="0"/>
                 <a:cs typeface="Arial" panose="020B0604020202020204" pitchFamily="34" charset="0"/>
               </a:rPr>
-              <a:t> 2016 </a:t>
-            </a:r>
+              <a:t> </a:t>
+            </a:r>
+            <a:r>
+              <a:rPr lang="de-DE" sz="6600" dirty="0" smtClean="0">
+                <a:latin typeface="Arial" panose="020B0604020202020204" pitchFamily="34" charset="0"/>
+                <a:cs typeface="Arial" panose="020B0604020202020204" pitchFamily="34" charset="0"/>
+              </a:rPr>
+              <a:t>2016</a:t>
+            </a:r>
+          </a:p>
+          <a:p>
+            <a:pPr marL="857250" indent="-857250">
+              <a:buFontTx/>
+              <a:buChar char="-"/>
+            </a:pPr>
+            <a:r>
+              <a:rPr lang="de-DE" sz="6600" dirty="0" smtClean="0">
+                <a:latin typeface="Arial" panose="020B0604020202020204" pitchFamily="34" charset="0"/>
+                <a:cs typeface="Arial" panose="020B0604020202020204" pitchFamily="34" charset="0"/>
+              </a:rPr>
+              <a:t>RCAS </a:t>
+            </a:r>
+          </a:p>
+          <a:p>
+            <a:pPr marL="857250" indent="-857250">
+              <a:buFontTx/>
+              <a:buChar char="-"/>
+            </a:pPr>
             <a:r>
               <a:rPr lang="de-DE" sz="6600" dirty="0" err="1" smtClean="0">
                 <a:latin typeface="Arial" panose="020B0604020202020204" pitchFamily="34" charset="0"/>
                 <a:cs typeface="Arial" panose="020B0604020202020204" pitchFamily="34" charset="0"/>
               </a:rPr>
+              <a:t>Galaxy</a:t>
+            </a:r>
+            <a:r>
+              <a:rPr lang="de-DE" sz="6600" dirty="0" smtClean="0">
+                <a:latin typeface="Arial" panose="020B0604020202020204" pitchFamily="34" charset="0"/>
+                <a:cs typeface="Arial" panose="020B0604020202020204" pitchFamily="34" charset="0"/>
+              </a:rPr>
+              <a:t> </a:t>
+            </a:r>
+            <a:r>
+              <a:rPr lang="de-DE" sz="6600" dirty="0" err="1" smtClean="0">
+                <a:latin typeface="Arial" panose="020B0604020202020204" pitchFamily="34" charset="0"/>
+                <a:cs typeface="Arial" panose="020B0604020202020204" pitchFamily="34" charset="0"/>
+              </a:rPr>
+              <a:t>tools</a:t>
+            </a:r>
+            <a:endParaRPr lang="de-DE" sz="6600" dirty="0" smtClean="0">
+              <a:latin typeface="Arial" panose="020B0604020202020204" pitchFamily="34" charset="0"/>
+              <a:cs typeface="Arial" panose="020B0604020202020204" pitchFamily="34" charset="0"/>
+            </a:endParaRPr>
+          </a:p>
+          <a:p>
+            <a:pPr marL="857250" indent="-857250">
+              <a:buFontTx/>
+              <a:buChar char="-"/>
+            </a:pPr>
+            <a:r>
+              <a:rPr lang="de-DE" sz="6600" dirty="0" err="1" smtClean="0">
+                <a:latin typeface="Arial" panose="020B0604020202020204" pitchFamily="34" charset="0"/>
+                <a:cs typeface="Arial" panose="020B0604020202020204" pitchFamily="34" charset="0"/>
+              </a:rPr>
+              <a:t>Bioconda</a:t>
+            </a:r>
+            <a:endParaRPr lang="de-DE" sz="6600" dirty="0" smtClean="0">
+              <a:latin typeface="Arial" panose="020B0604020202020204" pitchFamily="34" charset="0"/>
+              <a:cs typeface="Arial" panose="020B0604020202020204" pitchFamily="34" charset="0"/>
+            </a:endParaRPr>
+          </a:p>
+          <a:p>
+            <a:pPr marL="857250" indent="-857250">
+              <a:buFontTx/>
+              <a:buChar char="-"/>
+            </a:pPr>
+            <a:r>
+              <a:rPr lang="de-DE" sz="6600" dirty="0" err="1" smtClean="0">
+                <a:latin typeface="Arial" panose="020B0604020202020204" pitchFamily="34" charset="0"/>
+                <a:cs typeface="Arial" panose="020B0604020202020204" pitchFamily="34" charset="0"/>
+              </a:rPr>
+              <a:t>Guix</a:t>
+            </a:r>
+            <a:r>
+              <a:rPr lang="de-DE" sz="6600" dirty="0" smtClean="0">
+                <a:latin typeface="Arial" panose="020B0604020202020204" pitchFamily="34" charset="0"/>
+                <a:cs typeface="Arial" panose="020B0604020202020204" pitchFamily="34" charset="0"/>
+              </a:rPr>
+              <a:t>  </a:t>
+            </a:r>
+          </a:p>
+          <a:p>
+            <a:pPr marL="857250" indent="-857250">
+              <a:buFontTx/>
+              <a:buChar char="-"/>
+            </a:pPr>
+            <a:r>
+              <a:rPr lang="de-DE" sz="6600" dirty="0" err="1" smtClean="0">
+                <a:latin typeface="Arial" panose="020B0604020202020204" pitchFamily="34" charset="0"/>
+                <a:cs typeface="Arial" panose="020B0604020202020204" pitchFamily="34" charset="0"/>
+              </a:rPr>
+              <a:t>Galaxy</a:t>
+            </a:r>
+            <a:r>
+              <a:rPr lang="de-DE" sz="6600" dirty="0" smtClean="0">
+                <a:latin typeface="Arial" panose="020B0604020202020204" pitchFamily="34" charset="0"/>
+                <a:cs typeface="Arial" panose="020B0604020202020204" pitchFamily="34" charset="0"/>
+              </a:rPr>
+              <a:t> </a:t>
+            </a:r>
+            <a:r>
+              <a:rPr lang="de-DE" sz="6600" dirty="0" err="1" smtClean="0">
+                <a:latin typeface="Arial" panose="020B0604020202020204" pitchFamily="34" charset="0"/>
+                <a:cs typeface="Arial" panose="020B0604020202020204" pitchFamily="34" charset="0"/>
+              </a:rPr>
+              <a:t>training</a:t>
+            </a:r>
+            <a:endParaRPr lang="de-DE" sz="6600" dirty="0" smtClean="0">
+              <a:latin typeface="Arial" panose="020B0604020202020204" pitchFamily="34" charset="0"/>
+              <a:cs typeface="Arial" panose="020B0604020202020204" pitchFamily="34" charset="0"/>
+            </a:endParaRPr>
+          </a:p>
+          <a:p>
+            <a:pPr marL="857250" indent="-857250">
+              <a:buFontTx/>
+              <a:buChar char="-"/>
+            </a:pPr>
+            <a:r>
+              <a:rPr lang="de-DE" sz="6600" dirty="0" smtClean="0">
+                <a:latin typeface="Arial" panose="020B0604020202020204" pitchFamily="34" charset="0"/>
+                <a:cs typeface="Arial" panose="020B0604020202020204" pitchFamily="34" charset="0"/>
+              </a:rPr>
+              <a:t>Set </a:t>
+            </a:r>
+            <a:r>
+              <a:rPr lang="de-DE" sz="6600" dirty="0" err="1" smtClean="0">
+                <a:latin typeface="Arial" panose="020B0604020202020204" pitchFamily="34" charset="0"/>
+                <a:cs typeface="Arial" panose="020B0604020202020204" pitchFamily="34" charset="0"/>
+              </a:rPr>
+              <a:t>up</a:t>
+            </a:r>
+            <a:r>
+              <a:rPr lang="de-DE" sz="6600" dirty="0" smtClean="0">
+                <a:latin typeface="Arial" panose="020B0604020202020204" pitchFamily="34" charset="0"/>
+                <a:cs typeface="Arial" panose="020B0604020202020204" pitchFamily="34" charset="0"/>
+              </a:rPr>
+              <a:t> </a:t>
+            </a:r>
+            <a:r>
+              <a:rPr lang="de-DE" sz="6600" dirty="0" err="1" smtClean="0">
+                <a:latin typeface="Arial" panose="020B0604020202020204" pitchFamily="34" charset="0"/>
+                <a:cs typeface="Arial" panose="020B0604020202020204" pitchFamily="34" charset="0"/>
+              </a:rPr>
               <a:t>and</a:t>
             </a:r>
             <a:r>
@@ -4497,6 +4531,88 @@
                 <a:latin typeface="Arial" panose="020B0604020202020204" pitchFamily="34" charset="0"/>
                 <a:cs typeface="Arial" panose="020B0604020202020204" pitchFamily="34" charset="0"/>
               </a:rPr>
+              <a:t>optimisation</a:t>
+            </a:r>
+            <a:r>
+              <a:rPr lang="de-DE" sz="6600" dirty="0" smtClean="0">
+                <a:latin typeface="Arial" panose="020B0604020202020204" pitchFamily="34" charset="0"/>
+                <a:cs typeface="Arial" panose="020B0604020202020204" pitchFamily="34" charset="0"/>
+              </a:rPr>
+              <a:t> </a:t>
+            </a:r>
+            <a:r>
+              <a:rPr lang="de-DE" sz="6600" dirty="0" err="1" smtClean="0">
+                <a:latin typeface="Arial" panose="020B0604020202020204" pitchFamily="34" charset="0"/>
+                <a:cs typeface="Arial" panose="020B0604020202020204" pitchFamily="34" charset="0"/>
+              </a:rPr>
+              <a:t>of</a:t>
+            </a:r>
+            <a:r>
+              <a:rPr lang="de-DE" sz="6600" dirty="0" smtClean="0">
+                <a:latin typeface="Arial" panose="020B0604020202020204" pitchFamily="34" charset="0"/>
+                <a:cs typeface="Arial" panose="020B0604020202020204" pitchFamily="34" charset="0"/>
+              </a:rPr>
+              <a:t> </a:t>
+            </a:r>
+            <a:r>
+              <a:rPr lang="de-DE" sz="6600" dirty="0" err="1" smtClean="0">
+                <a:latin typeface="Arial" panose="020B0604020202020204" pitchFamily="34" charset="0"/>
+                <a:cs typeface="Arial" panose="020B0604020202020204" pitchFamily="34" charset="0"/>
+              </a:rPr>
+              <a:t>Galaxy</a:t>
+            </a:r>
+            <a:r>
+              <a:rPr lang="de-DE" sz="6600" dirty="0" smtClean="0">
+                <a:latin typeface="Arial" panose="020B0604020202020204" pitchFamily="34" charset="0"/>
+                <a:cs typeface="Arial" panose="020B0604020202020204" pitchFamily="34" charset="0"/>
+              </a:rPr>
+              <a:t> </a:t>
+            </a:r>
+            <a:r>
+              <a:rPr lang="de-DE" sz="6600" dirty="0" err="1" smtClean="0">
+                <a:latin typeface="Arial" panose="020B0604020202020204" pitchFamily="34" charset="0"/>
+                <a:cs typeface="Arial" panose="020B0604020202020204" pitchFamily="34" charset="0"/>
+              </a:rPr>
+              <a:t>production</a:t>
+            </a:r>
+            <a:r>
+              <a:rPr lang="de-DE" sz="6600" dirty="0" smtClean="0">
+                <a:latin typeface="Arial" panose="020B0604020202020204" pitchFamily="34" charset="0"/>
+                <a:cs typeface="Arial" panose="020B0604020202020204" pitchFamily="34" charset="0"/>
+              </a:rPr>
+              <a:t> </a:t>
+            </a:r>
+            <a:r>
+              <a:rPr lang="de-DE" sz="6600" dirty="0" err="1" smtClean="0">
+                <a:latin typeface="Arial" panose="020B0604020202020204" pitchFamily="34" charset="0"/>
+                <a:cs typeface="Arial" panose="020B0604020202020204" pitchFamily="34" charset="0"/>
+              </a:rPr>
+              <a:t>server</a:t>
+            </a:r>
+            <a:endParaRPr lang="de-DE" sz="6600" dirty="0" smtClean="0">
+              <a:latin typeface="Arial" panose="020B0604020202020204" pitchFamily="34" charset="0"/>
+              <a:cs typeface="Arial" panose="020B0604020202020204" pitchFamily="34" charset="0"/>
+            </a:endParaRPr>
+          </a:p>
+          <a:p>
+            <a:endParaRPr lang="de-DE" sz="6600" dirty="0" smtClean="0">
+              <a:latin typeface="Arial" panose="020B0604020202020204" pitchFamily="34" charset="0"/>
+              <a:cs typeface="Arial" panose="020B0604020202020204" pitchFamily="34" charset="0"/>
+            </a:endParaRPr>
+          </a:p>
+          <a:p>
+            <a:r>
+              <a:rPr lang="de-DE" sz="6600" dirty="0" smtClean="0">
+                <a:latin typeface="Arial" panose="020B0604020202020204" pitchFamily="34" charset="0"/>
+                <a:cs typeface="Arial" panose="020B0604020202020204" pitchFamily="34" charset="0"/>
+              </a:rPr>
+              <a:t>Tasks </a:t>
+            </a:r>
+            <a:r>
+              <a:rPr lang="de-DE" sz="6600" dirty="0" err="1" smtClean="0">
+                <a:latin typeface="Arial" panose="020B0604020202020204" pitchFamily="34" charset="0"/>
+                <a:cs typeface="Arial" panose="020B0604020202020204" pitchFamily="34" charset="0"/>
+              </a:rPr>
               <a:t>planned</a:t>
             </a:r>
             <a:r>
@@ -4554,6 +4670,19 @@
                 <a:cs typeface="Arial" panose="020B0604020202020204" pitchFamily="34" charset="0"/>
               </a:rPr>
               <a:t>months</a:t>
+            </a:r>
+            <a:endParaRPr lang="de-DE" sz="6600" dirty="0" smtClean="0">
+              <a:latin typeface="Arial" panose="020B0604020202020204" pitchFamily="34" charset="0"/>
+              <a:cs typeface="Arial" panose="020B0604020202020204" pitchFamily="34" charset="0"/>
+            </a:endParaRPr>
+          </a:p>
+          <a:p>
+            <a:r>
+              <a:rPr lang="de-DE" sz="6600" dirty="0" smtClean="0">
+                <a:latin typeface="Arial" panose="020B0604020202020204" pitchFamily="34" charset="0"/>
+                <a:cs typeface="Arial" panose="020B0604020202020204" pitchFamily="34" charset="0"/>
+              </a:rPr>
+              <a:t>-  </a:t>
             </a:r>
             <a:endParaRPr lang="de-DE" sz="6600" dirty="0">
               <a:latin typeface="Arial" panose="020B0604020202020204" pitchFamily="34" charset="0"/>
@@ -4570,8 +4699,8 @@
         </p:nvSpPr>
         <p:spPr>
           <a:xfrm>
-            <a:off x="1876696" y="38888894"/>
-            <a:ext cx="5834637" cy="1107996"/>
+            <a:off x="1214774" y="37506922"/>
+            <a:ext cx="11955053" cy="4154983"/>
           </a:xfrm>
           <a:prstGeom prst="rect">
             <a:avLst/>
@@ -4589,14 +4718,14 @@
                 <a:latin typeface="Arial" panose="020B0604020202020204" pitchFamily="34" charset="0"/>
                 <a:cs typeface="Arial" panose="020B0604020202020204" pitchFamily="34" charset="0"/>
               </a:rPr>
-              <a:t>(</a:t>
+              <a:t>RCAS - </a:t>
             </a:r>
             <a:r>
               <a:rPr lang="de-DE" sz="6600" dirty="0" err="1" smtClean="0">
                 <a:latin typeface="Arial" panose="020B0604020202020204" pitchFamily="34" charset="0"/>
                 <a:cs typeface="Arial" panose="020B0604020202020204" pitchFamily="34" charset="0"/>
               </a:rPr>
-              <a:t>If</a:t>
+              <a:t>manuscript</a:t>
             </a:r>
             <a:r>
               <a:rPr lang="de-DE" sz="6600" dirty="0" smtClean="0">
@@ -4610,15 +4739,43 @@
                 <a:latin typeface="Arial" panose="020B0604020202020204" pitchFamily="34" charset="0"/>
                 <a:cs typeface="Arial" panose="020B0604020202020204" pitchFamily="34" charset="0"/>
               </a:rPr>
-              <a:t>applicable</a:t>
+              <a:t>submitted</a:t>
+            </a:r>
+            <a:endParaRPr lang="de-DE" sz="6600" dirty="0" smtClean="0">
+              <a:latin typeface="Arial" panose="020B0604020202020204" pitchFamily="34" charset="0"/>
+              <a:cs typeface="Arial" panose="020B0604020202020204" pitchFamily="34" charset="0"/>
+            </a:endParaRPr>
+          </a:p>
+          <a:p>
+            <a:r>
+              <a:rPr lang="de-DE" sz="6600" dirty="0" err="1" smtClean="0">
+                <a:latin typeface="Arial" panose="020B0604020202020204" pitchFamily="34" charset="0"/>
+                <a:cs typeface="Arial" panose="020B0604020202020204" pitchFamily="34" charset="0"/>
+              </a:rPr>
+              <a:t>doRiNA</a:t>
             </a:r>
             <a:r>
               <a:rPr lang="de-DE" sz="6600" dirty="0" smtClean="0">
                 <a:latin typeface="Arial" panose="020B0604020202020204" pitchFamily="34" charset="0"/>
                 <a:cs typeface="Arial" panose="020B0604020202020204" pitchFamily="34" charset="0"/>
               </a:rPr>
-              <a:t>)</a:t>
-            </a:r>
+              <a:t> </a:t>
+            </a:r>
+          </a:p>
+          <a:p>
+            <a:r>
+              <a:rPr lang="de-DE" sz="6600" dirty="0" err="1" smtClean="0">
+                <a:latin typeface="Arial" panose="020B0604020202020204" pitchFamily="34" charset="0"/>
+                <a:cs typeface="Arial" panose="020B0604020202020204" pitchFamily="34" charset="0"/>
+              </a:rPr>
+              <a:t>RiboTaper</a:t>
+            </a:r>
+            <a:endParaRPr lang="de-DE" sz="6600" dirty="0" smtClean="0">
+              <a:latin typeface="Arial" panose="020B0604020202020204" pitchFamily="34" charset="0"/>
+              <a:cs typeface="Arial" panose="020B0604020202020204" pitchFamily="34" charset="0"/>
+            </a:endParaRPr>
+          </a:p>
+          <a:p>
             <a:endParaRPr lang="de-DE" sz="6600" dirty="0">
               <a:latin typeface="Arial" panose="020B0604020202020204" pitchFamily="34" charset="0"/>
               <a:cs typeface="Arial" panose="020B0604020202020204" pitchFamily="34" charset="0"/>
@@ -4634,7 +4791,7 @@
         </p:nvSpPr>
         <p:spPr>
           <a:xfrm>
-            <a:off x="17427389" y="26517545"/>
+            <a:off x="16992280" y="37875007"/>
             <a:ext cx="11349318" cy="3139321"/>
           </a:xfrm>
           <a:prstGeom prst="rect">
@@ -4649,123 +4806,55 @@
           <a:lstStyle/>
           <a:p>
             <a:r>
+              <a:rPr lang="de-DE" sz="6600" dirty="0" err="1" smtClean="0">
+                <a:latin typeface="Arial" panose="020B0604020202020204" pitchFamily="34" charset="0"/>
+                <a:cs typeface="Arial" panose="020B0604020202020204" pitchFamily="34" charset="0"/>
+              </a:rPr>
+              <a:t>Galaxy</a:t>
+            </a:r>
+            <a:r>
               <a:rPr lang="de-DE" sz="6600" dirty="0" smtClean="0">
                 <a:latin typeface="Arial" panose="020B0604020202020204" pitchFamily="34" charset="0"/>
                 <a:cs typeface="Arial" panose="020B0604020202020204" pitchFamily="34" charset="0"/>
               </a:rPr>
-              <a:t>Description </a:t>
+              <a:t> </a:t>
             </a:r>
             <a:r>
               <a:rPr lang="de-DE" sz="6600" dirty="0" err="1" smtClean="0">
                 <a:latin typeface="Arial" panose="020B0604020202020204" pitchFamily="34" charset="0"/>
                 <a:cs typeface="Arial" panose="020B0604020202020204" pitchFamily="34" charset="0"/>
               </a:rPr>
-              <a:t>of</a:t>
-            </a:r>
+              <a:t>courses</a:t>
+            </a:r>
+            <a:endParaRPr lang="de-DE" sz="6600" dirty="0" smtClean="0">
+              <a:latin typeface="Arial" panose="020B0604020202020204" pitchFamily="34" charset="0"/>
+              <a:cs typeface="Arial" panose="020B0604020202020204" pitchFamily="34" charset="0"/>
+            </a:endParaRPr>
+          </a:p>
+          <a:p>
+            <a:pPr marL="857250" indent="-857250">
+              <a:buFontTx/>
+              <a:buChar char="-"/>
+            </a:pPr>
             <a:r>
               <a:rPr lang="de-DE" sz="6600" dirty="0" smtClean="0">
                 <a:latin typeface="Arial" panose="020B0604020202020204" pitchFamily="34" charset="0"/>
                 <a:cs typeface="Arial" panose="020B0604020202020204" pitchFamily="34" charset="0"/>
               </a:rPr>
-              <a:t> de.NBI </a:t>
-            </a:r>
-            <a:r>
-              <a:rPr lang="de-DE" sz="6600" dirty="0" err="1" smtClean="0">
-                <a:latin typeface="Arial" panose="020B0604020202020204" pitchFamily="34" charset="0"/>
-                <a:cs typeface="Arial" panose="020B0604020202020204" pitchFamily="34" charset="0"/>
-              </a:rPr>
-              <a:t>training</a:t>
-            </a:r>
+              <a:t>17-18 May</a:t>
+            </a:r>
+          </a:p>
+          <a:p>
+            <a:pPr marL="857250" indent="-857250">
+              <a:buFontTx/>
+              <a:buChar char="-"/>
+            </a:pPr>
             <a:r>
               <a:rPr lang="de-DE" sz="6600" dirty="0" smtClean="0">
                 <a:latin typeface="Arial" panose="020B0604020202020204" pitchFamily="34" charset="0"/>
                 <a:cs typeface="Arial" panose="020B0604020202020204" pitchFamily="34" charset="0"/>
               </a:rPr>
-              <a:t> </a:t>
-            </a:r>
-            <a:r>
-              <a:rPr lang="de-DE" sz="6600" dirty="0" err="1" smtClean="0">
-                <a:latin typeface="Arial" panose="020B0604020202020204" pitchFamily="34" charset="0"/>
-                <a:cs typeface="Arial" panose="020B0604020202020204" pitchFamily="34" charset="0"/>
-              </a:rPr>
-              <a:t>and</a:t>
-            </a:r>
-            <a:r>
-              <a:rPr lang="de-DE" sz="6600" dirty="0" smtClean="0">
-                <a:latin typeface="Arial" panose="020B0604020202020204" pitchFamily="34" charset="0"/>
-                <a:cs typeface="Arial" panose="020B0604020202020204" pitchFamily="34" charset="0"/>
-              </a:rPr>
-              <a:t> </a:t>
-            </a:r>
-            <a:r>
-              <a:rPr lang="de-DE" sz="6600" dirty="0" err="1" smtClean="0">
-                <a:latin typeface="Arial" panose="020B0604020202020204" pitchFamily="34" charset="0"/>
-                <a:cs typeface="Arial" panose="020B0604020202020204" pitchFamily="34" charset="0"/>
-              </a:rPr>
-              <a:t>education</a:t>
-            </a:r>
-            <a:r>
-              <a:rPr lang="de-DE" sz="6600" dirty="0" smtClean="0">
-                <a:latin typeface="Arial" panose="020B0604020202020204" pitchFamily="34" charset="0"/>
-                <a:cs typeface="Arial" panose="020B0604020202020204" pitchFamily="34" charset="0"/>
-              </a:rPr>
-              <a:t> </a:t>
-            </a:r>
-            <a:r>
-              <a:rPr lang="de-DE" sz="6600" dirty="0" err="1" smtClean="0">
-                <a:latin typeface="Arial" panose="020B0604020202020204" pitchFamily="34" charset="0"/>
-                <a:cs typeface="Arial" panose="020B0604020202020204" pitchFamily="34" charset="0"/>
-              </a:rPr>
-              <a:t>activities</a:t>
-            </a:r>
-            <a:r>
-              <a:rPr lang="de-DE" sz="6600" dirty="0" smtClean="0">
-                <a:latin typeface="Arial" panose="020B0604020202020204" pitchFamily="34" charset="0"/>
-                <a:cs typeface="Arial" panose="020B0604020202020204" pitchFamily="34" charset="0"/>
-              </a:rPr>
-              <a:t> </a:t>
-            </a:r>
-            <a:r>
-              <a:rPr lang="de-DE" sz="6600" dirty="0" err="1" smtClean="0">
-                <a:latin typeface="Arial" panose="020B0604020202020204" pitchFamily="34" charset="0"/>
-                <a:cs typeface="Arial" panose="020B0604020202020204" pitchFamily="34" charset="0"/>
-              </a:rPr>
-              <a:t>offered</a:t>
-            </a:r>
-            <a:r>
-              <a:rPr lang="de-DE" sz="6600" dirty="0" smtClean="0">
-                <a:latin typeface="Arial" panose="020B0604020202020204" pitchFamily="34" charset="0"/>
-                <a:cs typeface="Arial" panose="020B0604020202020204" pitchFamily="34" charset="0"/>
-              </a:rPr>
-              <a:t> </a:t>
-            </a:r>
-            <a:r>
-              <a:rPr lang="de-DE" sz="6600" dirty="0" err="1" smtClean="0">
-                <a:latin typeface="Arial" panose="020B0604020202020204" pitchFamily="34" charset="0"/>
-                <a:cs typeface="Arial" panose="020B0604020202020204" pitchFamily="34" charset="0"/>
-              </a:rPr>
-              <a:t>and</a:t>
-            </a:r>
-            <a:r>
-              <a:rPr lang="de-DE" sz="6600" dirty="0" smtClean="0">
-                <a:latin typeface="Arial" panose="020B0604020202020204" pitchFamily="34" charset="0"/>
-                <a:cs typeface="Arial" panose="020B0604020202020204" pitchFamily="34" charset="0"/>
-              </a:rPr>
-              <a:t> </a:t>
-            </a:r>
-            <a:r>
-              <a:rPr lang="de-DE" sz="6600" dirty="0" err="1" smtClean="0">
-                <a:latin typeface="Arial" panose="020B0604020202020204" pitchFamily="34" charset="0"/>
-                <a:cs typeface="Arial" panose="020B0604020202020204" pitchFamily="34" charset="0"/>
-              </a:rPr>
-              <a:t>carried</a:t>
-            </a:r>
-            <a:r>
-              <a:rPr lang="de-DE" sz="6600" dirty="0" smtClean="0">
-                <a:latin typeface="Arial" panose="020B0604020202020204" pitchFamily="34" charset="0"/>
-                <a:cs typeface="Arial" panose="020B0604020202020204" pitchFamily="34" charset="0"/>
-              </a:rPr>
-              <a:t> out</a:t>
+              <a:t>17-18 August</a:t>
             </a:r>
             <a:endParaRPr lang="de-DE" sz="6600" dirty="0">
               <a:latin typeface="Arial" panose="020B0604020202020204" pitchFamily="34" charset="0"/>
@@ -4783,11 +4872,11 @@
           <p:nvPr/>
         </p:nvPicPr>
         <p:blipFill>
-          <a:blip r:embed="rId8">
+          <a:blip r:embed="rId7">
             <a:extLst>
               <a:ext uri="{BEBA8EAE-BF5A-486C-A8C5-ECC9F3942E4B}">
                 <a14:imgProps xmlns:a14="http://schemas.microsoft.com/office/drawing/2010/main">
-                  <a14:imgLayer r:embed="rId9">
+                  <a14:imgLayer r:embed="rId8">
                     <a14:imgEffect>
                       <a14:brightnessContrast contrast="-2000"/>
                     </a14:imgEffect>
@@ -4898,8 +4987,8 @@
         </p:nvSpPr>
         <p:spPr>
           <a:xfrm>
-            <a:off x="17260065" y="14686862"/>
-            <a:ext cx="11938077" cy="3139321"/>
+            <a:off x="1634509" y="11547067"/>
+            <a:ext cx="12598019" cy="5170646"/>
           </a:xfrm>
           <a:prstGeom prst="rect">
             <a:avLst/>
@@ -4913,118 +5002,101 @@
           <a:lstStyle/>
           <a:p>
             <a:r>
-              <a:rPr lang="de-DE" sz="6600" dirty="0" smtClean="0">
-                <a:latin typeface="Arial" panose="020B0604020202020204" pitchFamily="34" charset="0"/>
-                <a:cs typeface="Arial" panose="020B0604020202020204" pitchFamily="34" charset="0"/>
-              </a:rPr>
-              <a:t>Description </a:t>
-            </a:r>
-            <a:r>
-              <a:rPr lang="de-DE" sz="6600" dirty="0" err="1" smtClean="0">
-                <a:latin typeface="Arial" panose="020B0604020202020204" pitchFamily="34" charset="0"/>
-                <a:cs typeface="Arial" panose="020B0604020202020204" pitchFamily="34" charset="0"/>
-              </a:rPr>
-              <a:t>of</a:t>
-            </a:r>
-            <a:r>
-              <a:rPr lang="de-DE" sz="6600" dirty="0" smtClean="0">
-                <a:latin typeface="Arial" panose="020B0604020202020204" pitchFamily="34" charset="0"/>
-                <a:cs typeface="Arial" panose="020B0604020202020204" pitchFamily="34" charset="0"/>
-              </a:rPr>
-              <a:t> de.NBI </a:t>
-            </a:r>
-            <a:r>
-              <a:rPr lang="de-DE" sz="6600" dirty="0" err="1" smtClean="0">
-                <a:latin typeface="Arial" panose="020B0604020202020204" pitchFamily="34" charset="0"/>
-                <a:cs typeface="Arial" panose="020B0604020202020204" pitchFamily="34" charset="0"/>
+              <a:rPr lang="en-US" sz="6600" dirty="0" smtClean="0">
+                <a:latin typeface="Arial"/>
+                <a:cs typeface="Arial"/>
+              </a:rPr>
+              <a:t>We offer </a:t>
+            </a:r>
+            <a:r>
+              <a:rPr lang="en-US" sz="6600" b="1" dirty="0">
+                <a:latin typeface="Arial"/>
+                <a:cs typeface="Arial"/>
+              </a:rPr>
+              <a:t>tools</a:t>
+            </a:r>
+            <a:r>
+              <a:rPr lang="en-US" sz="6600" dirty="0">
+                <a:latin typeface="Arial"/>
+                <a:cs typeface="Arial"/>
+              </a:rPr>
+              <a:t>, </a:t>
+            </a:r>
+            <a:r>
+              <a:rPr lang="en-US" sz="6600" b="1" dirty="0">
+                <a:latin typeface="Arial"/>
+                <a:cs typeface="Arial"/>
               </a:rPr>
               <a:t>services</a:t>
             </a:r>
             <a:r>
-              <a:rPr lang="de-DE" sz="6600" dirty="0" smtClean="0">
-                <a:latin typeface="Arial" panose="020B0604020202020204" pitchFamily="34" charset="0"/>
-                <a:cs typeface="Arial" panose="020B0604020202020204" pitchFamily="34" charset="0"/>
-              </a:rPr>
-              <a:t> </a:t>
-            </a:r>
-            <a:r>
-              <a:rPr lang="de-DE" sz="6600" dirty="0" err="1" smtClean="0">
-                <a:latin typeface="Arial" panose="020B0604020202020204" pitchFamily="34" charset="0"/>
-                <a:cs typeface="Arial" panose="020B0604020202020204" pitchFamily="34" charset="0"/>
-              </a:rPr>
-              <a:t>offered</a:t>
-            </a:r>
-            <a:r>
-              <a:rPr lang="de-DE" sz="6600" dirty="0" smtClean="0">
-                <a:latin typeface="Arial" panose="020B0604020202020204" pitchFamily="34" charset="0"/>
-                <a:cs typeface="Arial" panose="020B0604020202020204" pitchFamily="34" charset="0"/>
-              </a:rPr>
-              <a:t> </a:t>
-            </a:r>
-            <a:r>
-              <a:rPr lang="de-DE" sz="6600" dirty="0" err="1" smtClean="0">
-                <a:latin typeface="Arial" panose="020B0604020202020204" pitchFamily="34" charset="0"/>
-                <a:cs typeface="Arial" panose="020B0604020202020204" pitchFamily="34" charset="0"/>
-              </a:rPr>
-              <a:t>and</a:t>
-            </a:r>
-            <a:r>
-              <a:rPr lang="de-DE" sz="6600" dirty="0" smtClean="0">
-                <a:latin typeface="Arial" panose="020B0604020202020204" pitchFamily="34" charset="0"/>
-                <a:cs typeface="Arial" panose="020B0604020202020204" pitchFamily="34" charset="0"/>
-              </a:rPr>
-              <a:t> </a:t>
-            </a:r>
-            <a:r>
-              <a:rPr lang="de-DE" sz="6600" dirty="0" err="1" smtClean="0">
-                <a:latin typeface="Arial" panose="020B0604020202020204" pitchFamily="34" charset="0"/>
-                <a:cs typeface="Arial" panose="020B0604020202020204" pitchFamily="34" charset="0"/>
-              </a:rPr>
-              <a:t>carried</a:t>
-            </a:r>
-            <a:r>
-              <a:rPr lang="de-DE" sz="6600" dirty="0" smtClean="0">
-                <a:latin typeface="Arial" panose="020B0604020202020204" pitchFamily="34" charset="0"/>
-                <a:cs typeface="Arial" panose="020B0604020202020204" pitchFamily="34" charset="0"/>
-              </a:rPr>
-              <a:t> out </a:t>
-            </a:r>
-            <a:r>
-              <a:rPr lang="de-DE" sz="6600" dirty="0" err="1" smtClean="0">
-                <a:latin typeface="Arial" panose="020B0604020202020204" pitchFamily="34" charset="0"/>
-                <a:cs typeface="Arial" panose="020B0604020202020204" pitchFamily="34" charset="0"/>
-              </a:rPr>
-              <a:t>by</a:t>
-            </a:r>
-            <a:r>
-              <a:rPr lang="de-DE" sz="6600" dirty="0" smtClean="0">
-                <a:latin typeface="Arial" panose="020B0604020202020204" pitchFamily="34" charset="0"/>
-                <a:cs typeface="Arial" panose="020B0604020202020204" pitchFamily="34" charset="0"/>
-              </a:rPr>
-              <a:t> </a:t>
-            </a:r>
-            <a:r>
-              <a:rPr lang="de-DE" sz="6600" dirty="0" err="1" smtClean="0">
-                <a:latin typeface="Arial" panose="020B0604020202020204" pitchFamily="34" charset="0"/>
-                <a:cs typeface="Arial" panose="020B0604020202020204" pitchFamily="34" charset="0"/>
-              </a:rPr>
-              <a:t>the</a:t>
-            </a:r>
-            <a:r>
-              <a:rPr lang="de-DE" sz="6600" dirty="0" smtClean="0">
-                <a:latin typeface="Arial" panose="020B0604020202020204" pitchFamily="34" charset="0"/>
-                <a:cs typeface="Arial" panose="020B0604020202020204" pitchFamily="34" charset="0"/>
-              </a:rPr>
-              <a:t> </a:t>
-            </a:r>
-            <a:r>
-              <a:rPr lang="de-DE" sz="6600" dirty="0" err="1" smtClean="0">
-                <a:latin typeface="Arial" panose="020B0604020202020204" pitchFamily="34" charset="0"/>
-                <a:cs typeface="Arial" panose="020B0604020202020204" pitchFamily="34" charset="0"/>
-              </a:rPr>
-              <a:t>project</a:t>
-            </a:r>
-            <a:endParaRPr lang="de-DE" sz="6600" dirty="0">
+              <a:rPr lang="en-US" sz="6600" dirty="0">
+                <a:latin typeface="Arial"/>
+                <a:cs typeface="Arial"/>
+              </a:rPr>
+              <a:t> and </a:t>
+            </a:r>
+            <a:r>
+              <a:rPr lang="en-US" sz="6600" b="1" dirty="0">
+                <a:latin typeface="Arial"/>
+                <a:cs typeface="Arial"/>
+              </a:rPr>
+              <a:t>training</a:t>
+            </a:r>
+            <a:r>
+              <a:rPr lang="en-US" sz="6600" dirty="0">
+                <a:latin typeface="Arial"/>
+                <a:cs typeface="Arial"/>
+              </a:rPr>
+              <a:t> for the analysis of </a:t>
+            </a:r>
+            <a:endParaRPr lang="en-US" sz="6600" dirty="0" smtClean="0">
+              <a:latin typeface="Arial"/>
+              <a:cs typeface="Arial"/>
+            </a:endParaRPr>
+          </a:p>
+          <a:p>
+            <a:r>
+              <a:rPr lang="en-US" sz="6600" dirty="0" smtClean="0">
+                <a:latin typeface="Arial"/>
+                <a:cs typeface="Arial"/>
+              </a:rPr>
+              <a:t>RNA</a:t>
+            </a:r>
+            <a:r>
+              <a:rPr lang="en-US" sz="6600" dirty="0">
+                <a:latin typeface="Arial"/>
+                <a:cs typeface="Arial"/>
+              </a:rPr>
+              <a:t>-binding proteins and </a:t>
+            </a:r>
+            <a:endParaRPr lang="en-US" sz="6600" dirty="0" smtClean="0">
+              <a:latin typeface="Arial"/>
+              <a:cs typeface="Arial"/>
+            </a:endParaRPr>
+          </a:p>
+          <a:p>
+            <a:r>
+              <a:rPr lang="en-US" sz="6600" dirty="0" smtClean="0">
+                <a:latin typeface="Arial"/>
+                <a:cs typeface="Arial"/>
+              </a:rPr>
+              <a:t>post</a:t>
+            </a:r>
+            <a:r>
+              <a:rPr lang="en-US" sz="6600" dirty="0">
+                <a:latin typeface="Arial"/>
+                <a:cs typeface="Arial"/>
+              </a:rPr>
+              <a:t>-transcriptional regulation</a:t>
+            </a:r>
+          </a:p>
+          <a:p>
+            <a:pPr marL="857250" indent="-857250">
+              <a:buFontTx/>
+              <a:buChar char="-"/>
+            </a:pPr>
+            <a:endParaRPr lang="de-DE" sz="6600" dirty="0" smtClean="0">
               <a:latin typeface="Arial" panose="020B0604020202020204" pitchFamily="34" charset="0"/>
               <a:cs typeface="Arial" panose="020B0604020202020204" pitchFamily="34" charset="0"/>
             </a:endParaRPr>
@@ -5040,7 +5112,7 @@
           <p:nvPr/>
         </p:nvPicPr>
         <p:blipFill>
-          <a:blip r:embed="rId10">
+          <a:blip r:embed="rId9">
             <a:extLst>
               <a:ext uri="{28A0092B-C50C-407E-A947-70E740481C1C}">
                 <a14:useLocalDpi xmlns:a14="http://schemas.microsoft.com/office/drawing/2010/main" val="0"/>
@@ -5053,7 +5125,7 @@
         </p:blipFill>
         <p:spPr>
           <a:xfrm>
-            <a:off x="1230716" y="533991"/>
+            <a:off x="1235333" y="533991"/>
             <a:ext cx="8207261" cy="2160000"/>
           </a:xfrm>
           <a:prstGeom prst="rect">
@@ -5070,7 +5142,7 @@
           <p:nvPr/>
         </p:nvPicPr>
         <p:blipFill>
-          <a:blip r:embed="rId11">
+          <a:blip r:embed="rId10">
             <a:extLst>
               <a:ext uri="{28A0092B-C50C-407E-A947-70E740481C1C}">
                 <a14:useLocalDpi xmlns:a14="http://schemas.microsoft.com/office/drawing/2010/main" val="0"/>
@@ -5100,7 +5172,7 @@
           <p:nvPr/>
         </p:nvPicPr>
         <p:blipFill>
-          <a:blip r:embed="rId12">
+          <a:blip r:embed="rId11">
             <a:extLst>
               <a:ext uri="{28A0092B-C50C-407E-A947-70E740481C1C}">
                 <a14:useLocalDpi xmlns:a14="http://schemas.microsoft.com/office/drawing/2010/main" val="0"/>
@@ -5113,7 +5185,7 @@
         </p:blipFill>
         <p:spPr>
           <a:xfrm>
-            <a:off x="1843311" y="13010462"/>
+            <a:off x="1755789" y="15617476"/>
             <a:ext cx="10058400" cy="7112694"/>
           </a:xfrm>
           <a:prstGeom prst="rect">
@@ -5123,14 +5195,14 @@
       </p:pic>
       <p:sp>
         <p:nvSpPr>
-          <p:cNvPr id="17" name="Textfeld 16"/>
+          <p:cNvPr id="35" name="Textfeld 34"/>
           <p:cNvSpPr txBox="1"/>
           <p:nvPr/>
         </p:nvSpPr>
         <p:spPr>
           <a:xfrm>
-            <a:off x="1876696" y="11963400"/>
-            <a:ext cx="3114571" cy="1107996"/>
+            <a:off x="16595246" y="11699467"/>
+            <a:ext cx="12598019" cy="21421245"/>
           </a:xfrm>
           <a:prstGeom prst="rect">
             <a:avLst/>
@@ -5138,16 +5210,99 @@
           <a:noFill/>
         </p:spPr>
         <p:txBody>
-          <a:bodyPr wrap="none" rtlCol="0">
+          <a:bodyPr wrap="square" rtlCol="0">
             <a:spAutoFit/>
           </a:bodyPr>
           <a:lstStyle/>
           <a:p>
-            <a:r>
-              <a:rPr lang="de-DE" sz="6600" dirty="0" smtClean="0"/>
-              <a:t>Hinweis:</a:t>
-            </a:r>
-            <a:endParaRPr lang="en-US" dirty="0"/>
+            <a:pPr lvl="0"/>
+            <a:r>
+              <a:rPr lang="en-US" sz="6600" b="1" dirty="0" err="1"/>
+              <a:t>DoRiNA</a:t>
+            </a:r>
+            <a:r>
+              <a:rPr lang="en-US" sz="6600" b="1" dirty="0"/>
+              <a:t> database</a:t>
+            </a:r>
+            <a:r>
+              <a:rPr lang="en-US" sz="6600" dirty="0"/>
+              <a:t> – Database for RNA-binding protein binding sites and </a:t>
+            </a:r>
+            <a:r>
+              <a:rPr lang="en-US" sz="6600" dirty="0" err="1"/>
+              <a:t>miRNA</a:t>
+            </a:r>
+            <a:r>
+              <a:rPr lang="en-US" sz="6600" dirty="0"/>
+              <a:t> binding sites from various resources including our in-house tool PicTar2</a:t>
+            </a:r>
+          </a:p>
+          <a:p>
+            <a:pPr lvl="0"/>
+            <a:r>
+              <a:rPr lang="en-US" sz="6600" b="1" dirty="0" err="1"/>
+              <a:t>RiboTaper</a:t>
+            </a:r>
+            <a:r>
+              <a:rPr lang="en-US" sz="6600" dirty="0"/>
+              <a:t> – A toolbox for analysis of Ribosome profiling data</a:t>
+            </a:r>
+          </a:p>
+          <a:p>
+            <a:pPr lvl="0"/>
+            <a:r>
+              <a:rPr lang="en-US" sz="6600" b="1" dirty="0"/>
+              <a:t>RCAS</a:t>
+            </a:r>
+            <a:r>
+              <a:rPr lang="en-US" sz="6600" dirty="0"/>
+              <a:t> – A pipeline for annotation of RNA-specific features such as RNA-modification sites and RBP binding sites.</a:t>
+            </a:r>
+          </a:p>
+          <a:p>
+            <a:pPr lvl="0"/>
+            <a:r>
+              <a:rPr lang="en-US" sz="6600" b="1" dirty="0" err="1"/>
+              <a:t>microMummie</a:t>
+            </a:r>
+            <a:r>
+              <a:rPr lang="en-US" sz="6600" dirty="0"/>
+              <a:t> – MicroRNA target site identification by integrating sequence and binding information</a:t>
+            </a:r>
+          </a:p>
+          <a:p>
+            <a:pPr lvl="0"/>
+            <a:r>
+              <a:rPr lang="en-US" sz="6600" b="1" dirty="0" err="1"/>
+              <a:t>PARalyzer</a:t>
+            </a:r>
+            <a:r>
+              <a:rPr lang="en-US" sz="6600" dirty="0"/>
+              <a:t> - definition of RNA binding sites from PAR-CLIP short-read sequence data</a:t>
+            </a:r>
+          </a:p>
+          <a:p>
+            <a:pPr lvl="0"/>
+            <a:r>
+              <a:rPr lang="en-GB" sz="6600" b="1" dirty="0"/>
+              <a:t>Local Galaxy server </a:t>
+            </a:r>
+            <a:r>
+              <a:rPr lang="en-GB" sz="6600" dirty="0"/>
+              <a:t>– aimed for </a:t>
+            </a:r>
+            <a:r>
+              <a:rPr lang="en-GB" sz="6600" dirty="0" err="1"/>
+              <a:t>wetlab</a:t>
+            </a:r>
+            <a:r>
+              <a:rPr lang="en-GB" sz="6600" dirty="0"/>
+              <a:t> researchers being able to run bioinformatics tools and analysis pipelines developed for</a:t>
+            </a:r>
+            <a:r>
+              <a:rPr lang="en-US" sz="6600" dirty="0"/>
+              <a:t>. </a:t>
+            </a:r>
           </a:p>
         </p:txBody>
       </p:sp>

</xml_diff>

<commit_message>
updated poster: progress report section
</commit_message>
<xml_diff>
--- a/rbc_bimsb/sab-berlin-2016/poster/BIMSB_SAB2016_poster.pptx
+++ b/rbc_bimsb/sab-berlin-2016/poster/BIMSB_SAB2016_poster.pptx
@@ -288,7 +288,7 @@
           <a:p>
             <a:fld id="{A97E8C45-9899-FE47-B0BE-1CAA5A818520}" type="datetimeFigureOut">
               <a:rPr lang="de-DE" smtClean="0"/>
-              <a:t>16/11/16</a:t>
+              <a:t>22/11/16</a:t>
             </a:fld>
             <a:endParaRPr lang="en-US"/>
           </a:p>
@@ -458,7 +458,7 @@
           <a:p>
             <a:fld id="{A97E8C45-9899-FE47-B0BE-1CAA5A818520}" type="datetimeFigureOut">
               <a:rPr lang="de-DE" smtClean="0"/>
-              <a:t>16/11/16</a:t>
+              <a:t>22/11/16</a:t>
             </a:fld>
             <a:endParaRPr lang="en-US"/>
           </a:p>
@@ -638,7 +638,7 @@
           <a:p>
             <a:fld id="{A97E8C45-9899-FE47-B0BE-1CAA5A818520}" type="datetimeFigureOut">
               <a:rPr lang="de-DE" smtClean="0"/>
-              <a:t>16/11/16</a:t>
+              <a:t>22/11/16</a:t>
             </a:fld>
             <a:endParaRPr lang="en-US"/>
           </a:p>
@@ -808,7 +808,7 @@
           <a:p>
             <a:fld id="{A97E8C45-9899-FE47-B0BE-1CAA5A818520}" type="datetimeFigureOut">
               <a:rPr lang="de-DE" smtClean="0"/>
-              <a:t>16/11/16</a:t>
+              <a:t>22/11/16</a:t>
             </a:fld>
             <a:endParaRPr lang="en-US"/>
           </a:p>
@@ -1054,7 +1054,7 @@
           <a:p>
             <a:fld id="{A97E8C45-9899-FE47-B0BE-1CAA5A818520}" type="datetimeFigureOut">
               <a:rPr lang="de-DE" smtClean="0"/>
-              <a:t>16/11/16</a:t>
+              <a:t>22/11/16</a:t>
             </a:fld>
             <a:endParaRPr lang="en-US" dirty="0"/>
           </a:p>
@@ -1350,7 +1350,7 @@
             <a:fld id="{A97E8C45-9899-FE47-B0BE-1CAA5A818520}" type="datetimeFigureOut">
               <a:rPr lang="de-DE" smtClean="0"/>
               <a:pPr/>
-              <a:t>16/11/16</a:t>
+              <a:t>22/11/16</a:t>
             </a:fld>
             <a:endParaRPr lang="en-US" dirty="0"/>
           </a:p>
@@ -1779,7 +1779,7 @@
           <a:p>
             <a:fld id="{A97E8C45-9899-FE47-B0BE-1CAA5A818520}" type="datetimeFigureOut">
               <a:rPr lang="de-DE" smtClean="0"/>
-              <a:t>16/11/16</a:t>
+              <a:t>22/11/16</a:t>
             </a:fld>
             <a:endParaRPr lang="en-US"/>
           </a:p>
@@ -1897,7 +1897,7 @@
           <a:p>
             <a:fld id="{A97E8C45-9899-FE47-B0BE-1CAA5A818520}" type="datetimeFigureOut">
               <a:rPr lang="de-DE" smtClean="0"/>
-              <a:t>16/11/16</a:t>
+              <a:t>22/11/16</a:t>
             </a:fld>
             <a:endParaRPr lang="en-US"/>
           </a:p>
@@ -1992,7 +1992,7 @@
           <a:p>
             <a:fld id="{A97E8C45-9899-FE47-B0BE-1CAA5A818520}" type="datetimeFigureOut">
               <a:rPr lang="de-DE" smtClean="0"/>
-              <a:t>16/11/16</a:t>
+              <a:t>22/11/16</a:t>
             </a:fld>
             <a:endParaRPr lang="en-US" dirty="0"/>
           </a:p>
@@ -2269,7 +2269,7 @@
           <a:p>
             <a:fld id="{A97E8C45-9899-FE47-B0BE-1CAA5A818520}" type="datetimeFigureOut">
               <a:rPr lang="de-DE" smtClean="0"/>
-              <a:t>16/11/16</a:t>
+              <a:t>22/11/16</a:t>
             </a:fld>
             <a:endParaRPr lang="en-US"/>
           </a:p>
@@ -2522,7 +2522,7 @@
           <a:p>
             <a:fld id="{A97E8C45-9899-FE47-B0BE-1CAA5A818520}" type="datetimeFigureOut">
               <a:rPr lang="de-DE" smtClean="0"/>
-              <a:t>16/11/16</a:t>
+              <a:t>22/11/16</a:t>
             </a:fld>
             <a:endParaRPr lang="en-US" dirty="0"/>
           </a:p>
@@ -2738,7 +2738,7 @@
             <a:fld id="{A97E8C45-9899-FE47-B0BE-1CAA5A818520}" type="datetimeFigureOut">
               <a:rPr lang="de-DE" smtClean="0"/>
               <a:pPr/>
-              <a:t>16/11/16</a:t>
+              <a:t>22/11/16</a:t>
             </a:fld>
             <a:endParaRPr lang="en-US" dirty="0"/>
           </a:p>
@@ -4181,7 +4181,7 @@
         </p:nvSpPr>
         <p:spPr>
           <a:xfrm>
-            <a:off x="1235333" y="22830219"/>
+            <a:off x="1214774" y="15972092"/>
             <a:ext cx="12600000" cy="1015663"/>
           </a:xfrm>
           <a:prstGeom prst="rect">
@@ -4245,7 +4245,7 @@
         </p:nvSpPr>
         <p:spPr>
           <a:xfrm>
-            <a:off x="1231748" y="36491259"/>
+            <a:off x="1214774" y="37367175"/>
             <a:ext cx="12600000" cy="1015663"/>
           </a:xfrm>
           <a:prstGeom prst="rect">
@@ -4289,8 +4289,8 @@
         </p:nvSpPr>
         <p:spPr>
           <a:xfrm>
-            <a:off x="1217550" y="24417940"/>
-            <a:ext cx="15668762" cy="11264623"/>
+            <a:off x="1217550" y="17432263"/>
+            <a:ext cx="14165383" cy="15327271"/>
           </a:xfrm>
           <a:prstGeom prst="rect">
             <a:avLst/>
@@ -4304,74 +4304,53 @@
           <a:lstStyle/>
           <a:p>
             <a:r>
-              <a:rPr lang="de-DE" sz="6600" dirty="0" smtClean="0">
-                <a:latin typeface="Arial" panose="020B0604020202020204" pitchFamily="34" charset="0"/>
-                <a:cs typeface="Arial" panose="020B0604020202020204" pitchFamily="34" charset="0"/>
-              </a:rPr>
-              <a:t>Tasks </a:t>
-            </a:r>
-            <a:r>
-              <a:rPr lang="de-DE" sz="6600" dirty="0" err="1" smtClean="0">
-                <a:latin typeface="Arial" panose="020B0604020202020204" pitchFamily="34" charset="0"/>
-                <a:cs typeface="Arial" panose="020B0604020202020204" pitchFamily="34" charset="0"/>
-              </a:rPr>
-              <a:t>performed</a:t>
-            </a:r>
-            <a:r>
-              <a:rPr lang="de-DE" sz="6600" dirty="0" smtClean="0">
+              <a:rPr lang="de-DE" sz="6600" b="1" u="sng" dirty="0" smtClean="0">
+                <a:latin typeface="Arial" panose="020B0604020202020204" pitchFamily="34" charset="0"/>
+                <a:cs typeface="Arial" panose="020B0604020202020204" pitchFamily="34" charset="0"/>
+              </a:rPr>
+              <a:t>Progress </a:t>
+            </a:r>
+            <a:r>
+              <a:rPr lang="de-DE" sz="6600" b="1" u="sng" dirty="0" err="1" smtClean="0">
+                <a:latin typeface="Arial" panose="020B0604020202020204" pitchFamily="34" charset="0"/>
+                <a:cs typeface="Arial" panose="020B0604020202020204" pitchFamily="34" charset="0"/>
+              </a:rPr>
+              <a:t>up</a:t>
+            </a:r>
+            <a:r>
+              <a:rPr lang="de-DE" sz="6600" b="1" u="sng" dirty="0" smtClean="0">
                 <a:latin typeface="Arial" panose="020B0604020202020204" pitchFamily="34" charset="0"/>
                 <a:cs typeface="Arial" panose="020B0604020202020204" pitchFamily="34" charset="0"/>
               </a:rPr>
               <a:t> </a:t>
             </a:r>
             <a:r>
-              <a:rPr lang="de-DE" sz="6600" dirty="0" err="1" smtClean="0">
-                <a:latin typeface="Arial" panose="020B0604020202020204" pitchFamily="34" charset="0"/>
-                <a:cs typeface="Arial" panose="020B0604020202020204" pitchFamily="34" charset="0"/>
-              </a:rPr>
-              <a:t>up</a:t>
-            </a:r>
-            <a:r>
-              <a:rPr lang="de-DE" sz="6600" dirty="0" smtClean="0">
+              <a:rPr lang="de-DE" sz="6600" b="1" u="sng" dirty="0" err="1" smtClean="0">
+                <a:latin typeface="Arial" panose="020B0604020202020204" pitchFamily="34" charset="0"/>
+                <a:cs typeface="Arial" panose="020B0604020202020204" pitchFamily="34" charset="0"/>
+              </a:rPr>
+              <a:t>to</a:t>
+            </a:r>
+            <a:r>
+              <a:rPr lang="de-DE" sz="6600" b="1" u="sng" dirty="0" smtClean="0">
                 <a:latin typeface="Arial" panose="020B0604020202020204" pitchFamily="34" charset="0"/>
                 <a:cs typeface="Arial" panose="020B0604020202020204" pitchFamily="34" charset="0"/>
               </a:rPr>
               <a:t> </a:t>
             </a:r>
             <a:r>
-              <a:rPr lang="de-DE" sz="6600" dirty="0" err="1" smtClean="0">
-                <a:latin typeface="Arial" panose="020B0604020202020204" pitchFamily="34" charset="0"/>
-                <a:cs typeface="Arial" panose="020B0604020202020204" pitchFamily="34" charset="0"/>
-              </a:rPr>
-              <a:t>to</a:t>
-            </a:r>
-            <a:r>
-              <a:rPr lang="de-DE" sz="6600" dirty="0" smtClean="0">
-                <a:latin typeface="Arial" panose="020B0604020202020204" pitchFamily="34" charset="0"/>
-                <a:cs typeface="Arial" panose="020B0604020202020204" pitchFamily="34" charset="0"/>
-              </a:rPr>
-              <a:t> </a:t>
-            </a:r>
-            <a:r>
-              <a:rPr lang="de-DE" sz="6600" dirty="0" err="1" smtClean="0">
+              <a:rPr lang="de-DE" sz="6600" b="1" u="sng" dirty="0" err="1" smtClean="0">
                 <a:latin typeface="Arial" panose="020B0604020202020204" pitchFamily="34" charset="0"/>
                 <a:cs typeface="Arial" panose="020B0604020202020204" pitchFamily="34" charset="0"/>
               </a:rPr>
               <a:t>October</a:t>
             </a:r>
             <a:r>
-              <a:rPr lang="de-DE" sz="6600" dirty="0" smtClean="0">
-                <a:latin typeface="Arial" panose="020B0604020202020204" pitchFamily="34" charset="0"/>
-                <a:cs typeface="Arial" panose="020B0604020202020204" pitchFamily="34" charset="0"/>
-              </a:rPr>
-              <a:t> </a:t>
-            </a:r>
-            <a:r>
-              <a:rPr lang="de-DE" sz="6600" dirty="0" smtClean="0">
-                <a:latin typeface="Arial" panose="020B0604020202020204" pitchFamily="34" charset="0"/>
-                <a:cs typeface="Arial" panose="020B0604020202020204" pitchFamily="34" charset="0"/>
-              </a:rPr>
-              <a:t>2016</a:t>
+              <a:rPr lang="de-DE" sz="6600" b="1" u="sng" dirty="0" smtClean="0">
+                <a:latin typeface="Arial" panose="020B0604020202020204" pitchFamily="34" charset="0"/>
+                <a:cs typeface="Arial" panose="020B0604020202020204" pitchFamily="34" charset="0"/>
+              </a:rPr>
+              <a:t> 2016</a:t>
             </a:r>
           </a:p>
           <a:p>
@@ -4380,12 +4359,325 @@
               <a:buChar char="-"/>
             </a:pPr>
             <a:r>
-              <a:rPr lang="de-DE" sz="6600" dirty="0" smtClean="0">
-                <a:latin typeface="Arial" panose="020B0604020202020204" pitchFamily="34" charset="0"/>
-                <a:cs typeface="Arial" panose="020B0604020202020204" pitchFamily="34" charset="0"/>
-              </a:rPr>
-              <a:t>RCAS </a:t>
-            </a:r>
+              <a:rPr lang="de-DE" sz="4800" b="1" dirty="0" err="1" smtClean="0">
+                <a:latin typeface="Arial" panose="020B0604020202020204" pitchFamily="34" charset="0"/>
+                <a:cs typeface="Arial" panose="020B0604020202020204" pitchFamily="34" charset="0"/>
+              </a:rPr>
+              <a:t>Galaxy</a:t>
+            </a:r>
+            <a:r>
+              <a:rPr lang="de-DE" sz="4800" b="1" dirty="0" smtClean="0">
+                <a:latin typeface="Arial" panose="020B0604020202020204" pitchFamily="34" charset="0"/>
+                <a:cs typeface="Arial" panose="020B0604020202020204" pitchFamily="34" charset="0"/>
+              </a:rPr>
+              <a:t> Server</a:t>
+            </a:r>
+            <a:endParaRPr lang="de-DE" sz="4800" b="1" dirty="0">
+              <a:latin typeface="Arial" panose="020B0604020202020204" pitchFamily="34" charset="0"/>
+              <a:cs typeface="Arial" panose="020B0604020202020204" pitchFamily="34" charset="0"/>
+            </a:endParaRPr>
+          </a:p>
+          <a:p>
+            <a:pPr marL="2945420" lvl="1" indent="-857250">
+              <a:buFontTx/>
+              <a:buChar char="-"/>
+            </a:pPr>
+            <a:r>
+              <a:rPr lang="de-DE" sz="4000" dirty="0" err="1" smtClean="0">
+                <a:latin typeface="Arial" panose="020B0604020202020204" pitchFamily="34" charset="0"/>
+                <a:cs typeface="Arial" panose="020B0604020202020204" pitchFamily="34" charset="0"/>
+              </a:rPr>
+              <a:t>Offered</a:t>
+            </a:r>
+            <a:r>
+              <a:rPr lang="de-DE" sz="4000" dirty="0" smtClean="0">
+                <a:latin typeface="Arial" panose="020B0604020202020204" pitchFamily="34" charset="0"/>
+                <a:cs typeface="Arial" panose="020B0604020202020204" pitchFamily="34" charset="0"/>
+              </a:rPr>
+              <a:t> </a:t>
+            </a:r>
+            <a:r>
+              <a:rPr lang="de-DE" sz="4000" dirty="0" err="1" smtClean="0">
+                <a:latin typeface="Arial" panose="020B0604020202020204" pitchFamily="34" charset="0"/>
+                <a:cs typeface="Arial" panose="020B0604020202020204" pitchFamily="34" charset="0"/>
+              </a:rPr>
+              <a:t>two</a:t>
+            </a:r>
+            <a:r>
+              <a:rPr lang="de-DE" sz="4000" dirty="0" smtClean="0">
+                <a:latin typeface="Arial" panose="020B0604020202020204" pitchFamily="34" charset="0"/>
+                <a:cs typeface="Arial" panose="020B0604020202020204" pitchFamily="34" charset="0"/>
+              </a:rPr>
+              <a:t> </a:t>
+            </a:r>
+            <a:r>
+              <a:rPr lang="de-DE" sz="4000" dirty="0" err="1" smtClean="0">
+                <a:latin typeface="Arial" panose="020B0604020202020204" pitchFamily="34" charset="0"/>
+                <a:cs typeface="Arial" panose="020B0604020202020204" pitchFamily="34" charset="0"/>
+              </a:rPr>
+              <a:t>courses</a:t>
+            </a:r>
+            <a:r>
+              <a:rPr lang="de-DE" sz="4000" dirty="0" smtClean="0">
+                <a:latin typeface="Arial" panose="020B0604020202020204" pitchFamily="34" charset="0"/>
+                <a:cs typeface="Arial" panose="020B0604020202020204" pitchFamily="34" charset="0"/>
+              </a:rPr>
+              <a:t> on RNA-</a:t>
+            </a:r>
+            <a:r>
+              <a:rPr lang="de-DE" sz="4000" dirty="0" err="1" smtClean="0">
+                <a:latin typeface="Arial" panose="020B0604020202020204" pitchFamily="34" charset="0"/>
+                <a:cs typeface="Arial" panose="020B0604020202020204" pitchFamily="34" charset="0"/>
+              </a:rPr>
+              <a:t>Seq</a:t>
+            </a:r>
+            <a:r>
+              <a:rPr lang="de-DE" sz="4000" dirty="0" smtClean="0">
+                <a:latin typeface="Arial" panose="020B0604020202020204" pitchFamily="34" charset="0"/>
+                <a:cs typeface="Arial" panose="020B0604020202020204" pitchFamily="34" charset="0"/>
+              </a:rPr>
+              <a:t> </a:t>
+            </a:r>
+            <a:r>
+              <a:rPr lang="de-DE" sz="4000" dirty="0" err="1" smtClean="0">
+                <a:latin typeface="Arial" panose="020B0604020202020204" pitchFamily="34" charset="0"/>
+                <a:cs typeface="Arial" panose="020B0604020202020204" pitchFamily="34" charset="0"/>
+              </a:rPr>
+              <a:t>analysis</a:t>
+            </a:r>
+            <a:endParaRPr lang="de-DE" sz="4000" dirty="0" smtClean="0">
+              <a:latin typeface="Arial" panose="020B0604020202020204" pitchFamily="34" charset="0"/>
+              <a:cs typeface="Arial" panose="020B0604020202020204" pitchFamily="34" charset="0"/>
+            </a:endParaRPr>
+          </a:p>
+          <a:p>
+            <a:pPr marL="2945420" lvl="1" indent="-857250">
+              <a:buFontTx/>
+              <a:buChar char="-"/>
+            </a:pPr>
+            <a:r>
+              <a:rPr lang="de-DE" sz="4000" dirty="0" smtClean="0">
+                <a:latin typeface="Arial" panose="020B0604020202020204" pitchFamily="34" charset="0"/>
+                <a:cs typeface="Arial" panose="020B0604020202020204" pitchFamily="34" charset="0"/>
+              </a:rPr>
+              <a:t>Integrated </a:t>
+            </a:r>
+            <a:r>
+              <a:rPr lang="de-DE" sz="4000" dirty="0" err="1" smtClean="0">
+                <a:latin typeface="Arial" panose="020B0604020202020204" pitchFamily="34" charset="0"/>
+                <a:cs typeface="Arial" panose="020B0604020202020204" pitchFamily="34" charset="0"/>
+              </a:rPr>
+              <a:t>public</a:t>
+            </a:r>
+            <a:r>
+              <a:rPr lang="de-DE" sz="4000" dirty="0" smtClean="0">
+                <a:latin typeface="Arial" panose="020B0604020202020204" pitchFamily="34" charset="0"/>
+                <a:cs typeface="Arial" panose="020B0604020202020204" pitchFamily="34" charset="0"/>
+              </a:rPr>
+              <a:t>/in-house </a:t>
+            </a:r>
+            <a:r>
+              <a:rPr lang="de-DE" sz="4000" dirty="0" err="1" smtClean="0">
+                <a:latin typeface="Arial" panose="020B0604020202020204" pitchFamily="34" charset="0"/>
+                <a:cs typeface="Arial" panose="020B0604020202020204" pitchFamily="34" charset="0"/>
+              </a:rPr>
+              <a:t>tools</a:t>
+            </a:r>
+            <a:r>
+              <a:rPr lang="de-DE" sz="4000" dirty="0" smtClean="0">
+                <a:latin typeface="Arial" panose="020B0604020202020204" pitchFamily="34" charset="0"/>
+                <a:cs typeface="Arial" panose="020B0604020202020204" pitchFamily="34" charset="0"/>
+              </a:rPr>
+              <a:t> </a:t>
+            </a:r>
+            <a:r>
+              <a:rPr lang="de-DE" sz="4000" dirty="0" err="1" smtClean="0">
+                <a:latin typeface="Arial" panose="020B0604020202020204" pitchFamily="34" charset="0"/>
+                <a:cs typeface="Arial" panose="020B0604020202020204" pitchFamily="34" charset="0"/>
+              </a:rPr>
+              <a:t>based</a:t>
+            </a:r>
+            <a:r>
+              <a:rPr lang="de-DE" sz="4000" dirty="0" smtClean="0">
+                <a:latin typeface="Arial" panose="020B0604020202020204" pitchFamily="34" charset="0"/>
+                <a:cs typeface="Arial" panose="020B0604020202020204" pitchFamily="34" charset="0"/>
+              </a:rPr>
+              <a:t> on user-</a:t>
+            </a:r>
+            <a:r>
+              <a:rPr lang="de-DE" sz="4000" dirty="0" err="1" smtClean="0">
+                <a:latin typeface="Arial" panose="020B0604020202020204" pitchFamily="34" charset="0"/>
+                <a:cs typeface="Arial" panose="020B0604020202020204" pitchFamily="34" charset="0"/>
+              </a:rPr>
+              <a:t>demand</a:t>
+            </a:r>
+            <a:endParaRPr lang="de-DE" sz="4000" dirty="0" smtClean="0">
+              <a:latin typeface="Arial" panose="020B0604020202020204" pitchFamily="34" charset="0"/>
+              <a:cs typeface="Arial" panose="020B0604020202020204" pitchFamily="34" charset="0"/>
+            </a:endParaRPr>
+          </a:p>
+          <a:p>
+            <a:pPr marL="2945420" lvl="1" indent="-857250">
+              <a:buFontTx/>
+              <a:buChar char="-"/>
+            </a:pPr>
+            <a:r>
+              <a:rPr lang="de-DE" sz="4000" dirty="0" err="1" smtClean="0">
+                <a:latin typeface="Arial" panose="020B0604020202020204" pitchFamily="34" charset="0"/>
+                <a:cs typeface="Arial" panose="020B0604020202020204" pitchFamily="34" charset="0"/>
+              </a:rPr>
+              <a:t>Developed</a:t>
+            </a:r>
+            <a:r>
+              <a:rPr lang="de-DE" sz="4000" dirty="0" smtClean="0">
+                <a:latin typeface="Arial" panose="020B0604020202020204" pitchFamily="34" charset="0"/>
+                <a:cs typeface="Arial" panose="020B0604020202020204" pitchFamily="34" charset="0"/>
+              </a:rPr>
+              <a:t> </a:t>
+            </a:r>
+            <a:r>
+              <a:rPr lang="de-DE" sz="4000" dirty="0" err="1" smtClean="0">
+                <a:latin typeface="Arial" panose="020B0604020202020204" pitchFamily="34" charset="0"/>
+                <a:cs typeface="Arial" panose="020B0604020202020204" pitchFamily="34" charset="0"/>
+              </a:rPr>
+              <a:t>workflows</a:t>
+            </a:r>
+            <a:r>
+              <a:rPr lang="de-DE" sz="4000" dirty="0" smtClean="0">
+                <a:latin typeface="Arial" panose="020B0604020202020204" pitchFamily="34" charset="0"/>
+                <a:cs typeface="Arial" panose="020B0604020202020204" pitchFamily="34" charset="0"/>
+              </a:rPr>
+              <a:t> </a:t>
+            </a:r>
+            <a:r>
+              <a:rPr lang="de-DE" sz="4000" dirty="0" err="1" smtClean="0">
+                <a:latin typeface="Arial" panose="020B0604020202020204" pitchFamily="34" charset="0"/>
+                <a:cs typeface="Arial" panose="020B0604020202020204" pitchFamily="34" charset="0"/>
+              </a:rPr>
+              <a:t>and</a:t>
+            </a:r>
+            <a:r>
+              <a:rPr lang="de-DE" sz="4000" dirty="0" smtClean="0">
+                <a:latin typeface="Arial" panose="020B0604020202020204" pitchFamily="34" charset="0"/>
+                <a:cs typeface="Arial" panose="020B0604020202020204" pitchFamily="34" charset="0"/>
+              </a:rPr>
+              <a:t> </a:t>
+            </a:r>
+            <a:r>
+              <a:rPr lang="de-DE" sz="4000" dirty="0" err="1" smtClean="0">
+                <a:latin typeface="Arial" panose="020B0604020202020204" pitchFamily="34" charset="0"/>
+                <a:cs typeface="Arial" panose="020B0604020202020204" pitchFamily="34" charset="0"/>
+              </a:rPr>
+              <a:t>tested</a:t>
+            </a:r>
+            <a:r>
+              <a:rPr lang="de-DE" sz="4000" dirty="0" smtClean="0">
+                <a:latin typeface="Arial" panose="020B0604020202020204" pitchFamily="34" charset="0"/>
+                <a:cs typeface="Arial" panose="020B0604020202020204" pitchFamily="34" charset="0"/>
+              </a:rPr>
+              <a:t> </a:t>
+            </a:r>
+            <a:r>
+              <a:rPr lang="de-DE" sz="4000" dirty="0" err="1" smtClean="0">
+                <a:latin typeface="Arial" panose="020B0604020202020204" pitchFamily="34" charset="0"/>
+                <a:cs typeface="Arial" panose="020B0604020202020204" pitchFamily="34" charset="0"/>
+              </a:rPr>
+              <a:t>tools</a:t>
+            </a:r>
+            <a:r>
+              <a:rPr lang="de-DE" sz="4000" dirty="0" smtClean="0">
+                <a:latin typeface="Arial" panose="020B0604020202020204" pitchFamily="34" charset="0"/>
+                <a:cs typeface="Arial" panose="020B0604020202020204" pitchFamily="34" charset="0"/>
+              </a:rPr>
+              <a:t> </a:t>
+            </a:r>
+            <a:r>
+              <a:rPr lang="de-DE" sz="4000" dirty="0" err="1" smtClean="0">
+                <a:latin typeface="Arial" panose="020B0604020202020204" pitchFamily="34" charset="0"/>
+                <a:cs typeface="Arial" panose="020B0604020202020204" pitchFamily="34" charset="0"/>
+              </a:rPr>
+              <a:t>for</a:t>
+            </a:r>
+            <a:r>
+              <a:rPr lang="de-DE" sz="4000" dirty="0" smtClean="0">
+                <a:latin typeface="Arial" panose="020B0604020202020204" pitchFamily="34" charset="0"/>
+                <a:cs typeface="Arial" panose="020B0604020202020204" pitchFamily="34" charset="0"/>
+              </a:rPr>
+              <a:t> </a:t>
+            </a:r>
+            <a:r>
+              <a:rPr lang="de-DE" sz="4000" dirty="0" err="1" smtClean="0">
+                <a:latin typeface="Arial" panose="020B0604020202020204" pitchFamily="34" charset="0"/>
+                <a:cs typeface="Arial" panose="020B0604020202020204" pitchFamily="34" charset="0"/>
+              </a:rPr>
+              <a:t>users</a:t>
+            </a:r>
+            <a:endParaRPr lang="de-DE" sz="4000" dirty="0" smtClean="0">
+              <a:latin typeface="Arial" panose="020B0604020202020204" pitchFamily="34" charset="0"/>
+              <a:cs typeface="Arial" panose="020B0604020202020204" pitchFamily="34" charset="0"/>
+            </a:endParaRPr>
+          </a:p>
+          <a:p>
+            <a:pPr marL="2945420" lvl="1" indent="-857250">
+              <a:buFontTx/>
+              <a:buChar char="-"/>
+            </a:pPr>
+            <a:r>
+              <a:rPr lang="de-DE" sz="4000" dirty="0">
+                <a:latin typeface="Arial" panose="020B0604020202020204" pitchFamily="34" charset="0"/>
+                <a:cs typeface="Arial" panose="020B0604020202020204" pitchFamily="34" charset="0"/>
+              </a:rPr>
+              <a:t>Switched </a:t>
+            </a:r>
+            <a:r>
+              <a:rPr lang="de-DE" sz="4000" dirty="0" err="1">
+                <a:latin typeface="Arial" panose="020B0604020202020204" pitchFamily="34" charset="0"/>
+                <a:cs typeface="Arial" panose="020B0604020202020204" pitchFamily="34" charset="0"/>
+              </a:rPr>
+              <a:t>to</a:t>
+            </a:r>
+            <a:r>
+              <a:rPr lang="de-DE" sz="4000" dirty="0">
+                <a:latin typeface="Arial" panose="020B0604020202020204" pitchFamily="34" charset="0"/>
+                <a:cs typeface="Arial" panose="020B0604020202020204" pitchFamily="34" charset="0"/>
+              </a:rPr>
+              <a:t> </a:t>
+            </a:r>
+            <a:r>
+              <a:rPr lang="de-DE" sz="4000" dirty="0" err="1">
+                <a:latin typeface="Arial" panose="020B0604020202020204" pitchFamily="34" charset="0"/>
+                <a:cs typeface="Arial" panose="020B0604020202020204" pitchFamily="34" charset="0"/>
+              </a:rPr>
+              <a:t>production</a:t>
+            </a:r>
+            <a:r>
+              <a:rPr lang="de-DE" sz="4000" dirty="0">
+                <a:latin typeface="Arial" panose="020B0604020202020204" pitchFamily="34" charset="0"/>
+                <a:cs typeface="Arial" panose="020B0604020202020204" pitchFamily="34" charset="0"/>
+              </a:rPr>
+              <a:t> </a:t>
+            </a:r>
+            <a:r>
+              <a:rPr lang="de-DE" sz="4000" dirty="0" err="1" smtClean="0">
+                <a:latin typeface="Arial" panose="020B0604020202020204" pitchFamily="34" charset="0"/>
+                <a:cs typeface="Arial" panose="020B0604020202020204" pitchFamily="34" charset="0"/>
+              </a:rPr>
+              <a:t>server</a:t>
+            </a:r>
+            <a:endParaRPr lang="de-DE" sz="4000" dirty="0">
+              <a:latin typeface="Arial" panose="020B0604020202020204" pitchFamily="34" charset="0"/>
+              <a:cs typeface="Arial" panose="020B0604020202020204" pitchFamily="34" charset="0"/>
+            </a:endParaRPr>
+          </a:p>
+          <a:p>
+            <a:pPr marL="2945420" lvl="1" indent="-857250">
+              <a:buFontTx/>
+              <a:buChar char="-"/>
+            </a:pPr>
+            <a:endParaRPr lang="de-DE" sz="6600" dirty="0">
+              <a:latin typeface="Arial" panose="020B0604020202020204" pitchFamily="34" charset="0"/>
+              <a:cs typeface="Arial" panose="020B0604020202020204" pitchFamily="34" charset="0"/>
+            </a:endParaRPr>
           </a:p>
           <a:p>
             <a:pPr marL="857250" indent="-857250">
@@ -4393,27 +4685,428 @@
               <a:buChar char="-"/>
             </a:pPr>
             <a:r>
-              <a:rPr lang="de-DE" sz="6600" dirty="0" err="1" smtClean="0">
+              <a:rPr lang="de-DE" sz="4800" b="1" dirty="0" smtClean="0">
+                <a:latin typeface="Arial" panose="020B0604020202020204" pitchFamily="34" charset="0"/>
+                <a:cs typeface="Arial" panose="020B0604020202020204" pitchFamily="34" charset="0"/>
+              </a:rPr>
+              <a:t>RCAS (RNA </a:t>
+            </a:r>
+            <a:r>
+              <a:rPr lang="de-DE" sz="4800" b="1" dirty="0" err="1" smtClean="0">
+                <a:latin typeface="Arial" panose="020B0604020202020204" pitchFamily="34" charset="0"/>
+                <a:cs typeface="Arial" panose="020B0604020202020204" pitchFamily="34" charset="0"/>
+              </a:rPr>
+              <a:t>Centric</a:t>
+            </a:r>
+            <a:r>
+              <a:rPr lang="de-DE" sz="4800" b="1" dirty="0" smtClean="0">
+                <a:latin typeface="Arial" panose="020B0604020202020204" pitchFamily="34" charset="0"/>
+                <a:cs typeface="Arial" panose="020B0604020202020204" pitchFamily="34" charset="0"/>
+              </a:rPr>
+              <a:t> Annotation System)</a:t>
+            </a:r>
+          </a:p>
+          <a:p>
+            <a:pPr marL="2945420" lvl="1" indent="-857250">
+              <a:buFontTx/>
+              <a:buChar char="-"/>
+            </a:pPr>
+            <a:r>
+              <a:rPr lang="de-DE" sz="4000" dirty="0" err="1" smtClean="0">
+                <a:latin typeface="Arial" panose="020B0604020202020204" pitchFamily="34" charset="0"/>
+                <a:cs typeface="Arial" panose="020B0604020202020204" pitchFamily="34" charset="0"/>
+              </a:rPr>
+              <a:t>Developed</a:t>
+            </a:r>
+            <a:r>
+              <a:rPr lang="de-DE" sz="4000" dirty="0" smtClean="0">
+                <a:latin typeface="Arial" panose="020B0604020202020204" pitchFamily="34" charset="0"/>
+                <a:cs typeface="Arial" panose="020B0604020202020204" pitchFamily="34" charset="0"/>
+              </a:rPr>
+              <a:t> an R/</a:t>
+            </a:r>
+            <a:r>
+              <a:rPr lang="de-DE" sz="4000" dirty="0" err="1" smtClean="0">
+                <a:latin typeface="Arial" panose="020B0604020202020204" pitchFamily="34" charset="0"/>
+                <a:cs typeface="Arial" panose="020B0604020202020204" pitchFamily="34" charset="0"/>
+              </a:rPr>
+              <a:t>Bioconductor</a:t>
+            </a:r>
+            <a:r>
+              <a:rPr lang="de-DE" sz="4000" dirty="0" smtClean="0">
+                <a:latin typeface="Arial" panose="020B0604020202020204" pitchFamily="34" charset="0"/>
+                <a:cs typeface="Arial" panose="020B0604020202020204" pitchFamily="34" charset="0"/>
+              </a:rPr>
+              <a:t> </a:t>
+            </a:r>
+            <a:r>
+              <a:rPr lang="de-DE" sz="4000" dirty="0" err="1" smtClean="0">
+                <a:latin typeface="Arial" panose="020B0604020202020204" pitchFamily="34" charset="0"/>
+                <a:cs typeface="Arial" panose="020B0604020202020204" pitchFamily="34" charset="0"/>
+              </a:rPr>
+              <a:t>package</a:t>
+            </a:r>
+            <a:r>
+              <a:rPr lang="de-DE" sz="4000" dirty="0" smtClean="0">
+                <a:latin typeface="Arial" panose="020B0604020202020204" pitchFamily="34" charset="0"/>
+                <a:cs typeface="Arial" panose="020B0604020202020204" pitchFamily="34" charset="0"/>
+              </a:rPr>
+              <a:t> </a:t>
+            </a:r>
+            <a:r>
+              <a:rPr lang="de-DE" sz="4000" dirty="0" err="1" smtClean="0">
+                <a:latin typeface="Arial" panose="020B0604020202020204" pitchFamily="34" charset="0"/>
+                <a:cs typeface="Arial" panose="020B0604020202020204" pitchFamily="34" charset="0"/>
+              </a:rPr>
+              <a:t>for</a:t>
+            </a:r>
+            <a:r>
+              <a:rPr lang="de-DE" sz="4000" dirty="0" smtClean="0">
+                <a:latin typeface="Arial" panose="020B0604020202020204" pitchFamily="34" charset="0"/>
+                <a:cs typeface="Arial" panose="020B0604020202020204" pitchFamily="34" charset="0"/>
+              </a:rPr>
+              <a:t> </a:t>
+            </a:r>
+            <a:r>
+              <a:rPr lang="de-DE" sz="4000" dirty="0" err="1" smtClean="0">
+                <a:latin typeface="Arial" panose="020B0604020202020204" pitchFamily="34" charset="0"/>
+                <a:cs typeface="Arial" panose="020B0604020202020204" pitchFamily="34" charset="0"/>
+              </a:rPr>
+              <a:t>systematic</a:t>
+            </a:r>
+            <a:r>
+              <a:rPr lang="de-DE" sz="4000" dirty="0" smtClean="0">
+                <a:latin typeface="Arial" panose="020B0604020202020204" pitchFamily="34" charset="0"/>
+                <a:cs typeface="Arial" panose="020B0604020202020204" pitchFamily="34" charset="0"/>
+              </a:rPr>
+              <a:t> </a:t>
+            </a:r>
+            <a:r>
+              <a:rPr lang="de-DE" sz="4000" dirty="0" err="1" smtClean="0">
+                <a:latin typeface="Arial" panose="020B0604020202020204" pitchFamily="34" charset="0"/>
+                <a:cs typeface="Arial" panose="020B0604020202020204" pitchFamily="34" charset="0"/>
+              </a:rPr>
+              <a:t>annotation</a:t>
+            </a:r>
+            <a:r>
+              <a:rPr lang="de-DE" sz="4000" dirty="0" smtClean="0">
+                <a:latin typeface="Arial" panose="020B0604020202020204" pitchFamily="34" charset="0"/>
+                <a:cs typeface="Arial" panose="020B0604020202020204" pitchFamily="34" charset="0"/>
+              </a:rPr>
+              <a:t> </a:t>
+            </a:r>
+            <a:r>
+              <a:rPr lang="de-DE" sz="4000" dirty="0" err="1" smtClean="0">
+                <a:latin typeface="Arial" panose="020B0604020202020204" pitchFamily="34" charset="0"/>
+                <a:cs typeface="Arial" panose="020B0604020202020204" pitchFamily="34" charset="0"/>
+              </a:rPr>
+              <a:t>of</a:t>
+            </a:r>
+            <a:r>
+              <a:rPr lang="de-DE" sz="4000" dirty="0" smtClean="0">
+                <a:latin typeface="Arial" panose="020B0604020202020204" pitchFamily="34" charset="0"/>
+                <a:cs typeface="Arial" panose="020B0604020202020204" pitchFamily="34" charset="0"/>
+              </a:rPr>
+              <a:t> </a:t>
+            </a:r>
+            <a:r>
+              <a:rPr lang="de-DE" sz="4000" dirty="0" err="1" smtClean="0">
+                <a:latin typeface="Arial" panose="020B0604020202020204" pitchFamily="34" charset="0"/>
+                <a:cs typeface="Arial" panose="020B0604020202020204" pitchFamily="34" charset="0"/>
+              </a:rPr>
+              <a:t>regions</a:t>
+            </a:r>
+            <a:r>
+              <a:rPr lang="de-DE" sz="4000" dirty="0" smtClean="0">
+                <a:latin typeface="Arial" panose="020B0604020202020204" pitchFamily="34" charset="0"/>
+                <a:cs typeface="Arial" panose="020B0604020202020204" pitchFamily="34" charset="0"/>
+              </a:rPr>
+              <a:t> </a:t>
+            </a:r>
+            <a:r>
+              <a:rPr lang="de-DE" sz="4000" dirty="0" err="1" smtClean="0">
+                <a:latin typeface="Arial" panose="020B0604020202020204" pitchFamily="34" charset="0"/>
+                <a:cs typeface="Arial" panose="020B0604020202020204" pitchFamily="34" charset="0"/>
+              </a:rPr>
+              <a:t>of</a:t>
+            </a:r>
+            <a:r>
+              <a:rPr lang="de-DE" sz="4000" dirty="0" smtClean="0">
+                <a:latin typeface="Arial" panose="020B0604020202020204" pitchFamily="34" charset="0"/>
+                <a:cs typeface="Arial" panose="020B0604020202020204" pitchFamily="34" charset="0"/>
+              </a:rPr>
+              <a:t> </a:t>
+            </a:r>
+            <a:r>
+              <a:rPr lang="de-DE" sz="4000" dirty="0" err="1" smtClean="0">
+                <a:latin typeface="Arial" panose="020B0604020202020204" pitchFamily="34" charset="0"/>
+                <a:cs typeface="Arial" panose="020B0604020202020204" pitchFamily="34" charset="0"/>
+              </a:rPr>
+              <a:t>interest</a:t>
+            </a:r>
+            <a:r>
+              <a:rPr lang="de-DE" sz="4000" dirty="0" smtClean="0">
+                <a:latin typeface="Arial" panose="020B0604020202020204" pitchFamily="34" charset="0"/>
+                <a:cs typeface="Arial" panose="020B0604020202020204" pitchFamily="34" charset="0"/>
+              </a:rPr>
+              <a:t> </a:t>
+            </a:r>
+            <a:r>
+              <a:rPr lang="de-DE" sz="4000" dirty="0" err="1" smtClean="0">
+                <a:latin typeface="Arial" panose="020B0604020202020204" pitchFamily="34" charset="0"/>
+                <a:cs typeface="Arial" panose="020B0604020202020204" pitchFamily="34" charset="0"/>
+              </a:rPr>
+              <a:t>from</a:t>
+            </a:r>
+            <a:r>
+              <a:rPr lang="de-DE" sz="4000" dirty="0" smtClean="0">
+                <a:latin typeface="Arial" panose="020B0604020202020204" pitchFamily="34" charset="0"/>
+                <a:cs typeface="Arial" panose="020B0604020202020204" pitchFamily="34" charset="0"/>
+              </a:rPr>
+              <a:t> RNA-</a:t>
+            </a:r>
+            <a:r>
+              <a:rPr lang="de-DE" sz="4000" dirty="0" err="1" smtClean="0">
+                <a:latin typeface="Arial" panose="020B0604020202020204" pitchFamily="34" charset="0"/>
+                <a:cs typeface="Arial" panose="020B0604020202020204" pitchFamily="34" charset="0"/>
+              </a:rPr>
+              <a:t>based</a:t>
+            </a:r>
+            <a:r>
+              <a:rPr lang="de-DE" sz="4000" dirty="0" smtClean="0">
+                <a:latin typeface="Arial" panose="020B0604020202020204" pitchFamily="34" charset="0"/>
+                <a:cs typeface="Arial" panose="020B0604020202020204" pitchFamily="34" charset="0"/>
+              </a:rPr>
+              <a:t> </a:t>
+            </a:r>
+            <a:r>
+              <a:rPr lang="de-DE" sz="4000" dirty="0" err="1" smtClean="0">
+                <a:latin typeface="Arial" panose="020B0604020202020204" pitchFamily="34" charset="0"/>
+                <a:cs typeface="Arial" panose="020B0604020202020204" pitchFamily="34" charset="0"/>
+              </a:rPr>
+              <a:t>omics</a:t>
+            </a:r>
+            <a:r>
+              <a:rPr lang="de-DE" sz="4000" dirty="0" smtClean="0">
+                <a:latin typeface="Arial" panose="020B0604020202020204" pitchFamily="34" charset="0"/>
+                <a:cs typeface="Arial" panose="020B0604020202020204" pitchFamily="34" charset="0"/>
+              </a:rPr>
+              <a:t> </a:t>
+            </a:r>
+            <a:r>
+              <a:rPr lang="de-DE" sz="4000" dirty="0" err="1" smtClean="0">
+                <a:latin typeface="Arial" panose="020B0604020202020204" pitchFamily="34" charset="0"/>
+                <a:cs typeface="Arial" panose="020B0604020202020204" pitchFamily="34" charset="0"/>
+              </a:rPr>
+              <a:t>datasets</a:t>
+            </a:r>
+            <a:endParaRPr lang="de-DE" sz="4000" dirty="0" smtClean="0">
+              <a:latin typeface="Arial" panose="020B0604020202020204" pitchFamily="34" charset="0"/>
+              <a:cs typeface="Arial" panose="020B0604020202020204" pitchFamily="34" charset="0"/>
+            </a:endParaRPr>
+          </a:p>
+          <a:p>
+            <a:pPr marL="2945420" lvl="1" indent="-857250">
+              <a:buFontTx/>
+              <a:buChar char="-"/>
+            </a:pPr>
+            <a:r>
+              <a:rPr lang="de-DE" sz="4000" dirty="0" err="1" smtClean="0">
+                <a:latin typeface="Arial" panose="020B0604020202020204" pitchFamily="34" charset="0"/>
+                <a:cs typeface="Arial" panose="020B0604020202020204" pitchFamily="34" charset="0"/>
+              </a:rPr>
+              <a:t>Available</a:t>
+            </a:r>
+            <a:r>
+              <a:rPr lang="de-DE" sz="4000" dirty="0" smtClean="0">
+                <a:latin typeface="Arial" panose="020B0604020202020204" pitchFamily="34" charset="0"/>
+                <a:cs typeface="Arial" panose="020B0604020202020204" pitchFamily="34" charset="0"/>
+              </a:rPr>
+              <a:t> in </a:t>
+            </a:r>
+            <a:r>
+              <a:rPr lang="de-DE" sz="4000" dirty="0" err="1" smtClean="0">
                 <a:latin typeface="Arial" panose="020B0604020202020204" pitchFamily="34" charset="0"/>
                 <a:cs typeface="Arial" panose="020B0604020202020204" pitchFamily="34" charset="0"/>
               </a:rPr>
               <a:t>Galaxy</a:t>
             </a:r>
             <a:r>
-              <a:rPr lang="de-DE" sz="6600" dirty="0" smtClean="0">
+              <a:rPr lang="de-DE" sz="4000" dirty="0" smtClean="0">
+                <a:latin typeface="Arial" panose="020B0604020202020204" pitchFamily="34" charset="0"/>
+                <a:cs typeface="Arial" panose="020B0604020202020204" pitchFamily="34" charset="0"/>
+              </a:rPr>
+              <a:t>, </a:t>
+            </a:r>
+            <a:r>
+              <a:rPr lang="de-DE" sz="4000" dirty="0" err="1" smtClean="0">
+                <a:latin typeface="Arial" panose="020B0604020202020204" pitchFamily="34" charset="0"/>
+                <a:cs typeface="Arial" panose="020B0604020202020204" pitchFamily="34" charset="0"/>
+              </a:rPr>
+              <a:t>Bioconda</a:t>
+            </a:r>
+            <a:r>
+              <a:rPr lang="de-DE" sz="4000" dirty="0" smtClean="0">
+                <a:latin typeface="Arial" panose="020B0604020202020204" pitchFamily="34" charset="0"/>
+                <a:cs typeface="Arial" panose="020B0604020202020204" pitchFamily="34" charset="0"/>
+              </a:rPr>
+              <a:t>, Docker, </a:t>
+            </a:r>
+            <a:r>
+              <a:rPr lang="de-DE" sz="4000" dirty="0" err="1" smtClean="0">
+                <a:latin typeface="Arial" panose="020B0604020202020204" pitchFamily="34" charset="0"/>
+                <a:cs typeface="Arial" panose="020B0604020202020204" pitchFamily="34" charset="0"/>
+              </a:rPr>
+              <a:t>Guix</a:t>
+            </a:r>
+            <a:endParaRPr lang="de-DE" sz="4000" dirty="0" smtClean="0">
+              <a:latin typeface="Arial" panose="020B0604020202020204" pitchFamily="34" charset="0"/>
+              <a:cs typeface="Arial" panose="020B0604020202020204" pitchFamily="34" charset="0"/>
+            </a:endParaRPr>
+          </a:p>
+          <a:p>
+            <a:pPr marL="2945420" lvl="1" indent="-857250">
+              <a:buFontTx/>
+              <a:buChar char="-"/>
+            </a:pPr>
+            <a:r>
+              <a:rPr lang="de-DE" sz="4000" dirty="0" err="1" smtClean="0">
+                <a:latin typeface="Arial" panose="020B0604020202020204" pitchFamily="34" charset="0"/>
+                <a:cs typeface="Arial" panose="020B0604020202020204" pitchFamily="34" charset="0"/>
+              </a:rPr>
+              <a:t>Available</a:t>
+            </a:r>
+            <a:r>
+              <a:rPr lang="de-DE" sz="4000" dirty="0" smtClean="0">
                 <a:latin typeface="Arial" panose="020B0604020202020204" pitchFamily="34" charset="0"/>
                 <a:cs typeface="Arial" panose="020B0604020202020204" pitchFamily="34" charset="0"/>
               </a:rPr>
               <a:t> </a:t>
             </a:r>
             <a:r>
-              <a:rPr lang="de-DE" sz="6600" dirty="0" err="1" smtClean="0">
-                <a:latin typeface="Arial" panose="020B0604020202020204" pitchFamily="34" charset="0"/>
-                <a:cs typeface="Arial" panose="020B0604020202020204" pitchFamily="34" charset="0"/>
-              </a:rPr>
-              <a:t>tools</a:t>
-            </a:r>
-            <a:endParaRPr lang="de-DE" sz="6600" dirty="0" smtClean="0">
+              <a:rPr lang="de-DE" sz="4000" dirty="0" err="1" smtClean="0">
+                <a:latin typeface="Arial" panose="020B0604020202020204" pitchFamily="34" charset="0"/>
+                <a:cs typeface="Arial" panose="020B0604020202020204" pitchFamily="34" charset="0"/>
+              </a:rPr>
+              <a:t>as</a:t>
+            </a:r>
+            <a:r>
+              <a:rPr lang="de-DE" sz="4000" dirty="0" smtClean="0">
+                <a:latin typeface="Arial" panose="020B0604020202020204" pitchFamily="34" charset="0"/>
+                <a:cs typeface="Arial" panose="020B0604020202020204" pitchFamily="34" charset="0"/>
+              </a:rPr>
+              <a:t> a web-service </a:t>
+            </a:r>
+          </a:p>
+          <a:p>
+            <a:pPr lvl="1"/>
+            <a:r>
+              <a:rPr lang="de-DE" sz="4000" dirty="0">
+                <a:latin typeface="Arial" panose="020B0604020202020204" pitchFamily="34" charset="0"/>
+                <a:cs typeface="Arial" panose="020B0604020202020204" pitchFamily="34" charset="0"/>
+              </a:rPr>
+              <a:t>	</a:t>
+            </a:r>
+            <a:r>
+              <a:rPr lang="de-DE" sz="4000" dirty="0" smtClean="0">
+                <a:latin typeface="Arial" panose="020B0604020202020204" pitchFamily="34" charset="0"/>
+                <a:cs typeface="Arial" panose="020B0604020202020204" pitchFamily="34" charset="0"/>
+              </a:rPr>
+              <a:t>     </a:t>
+            </a:r>
+            <a:r>
+              <a:rPr lang="de-DE" sz="4000" dirty="0">
+                <a:latin typeface="Arial" panose="020B0604020202020204" pitchFamily="34" charset="0"/>
+                <a:cs typeface="Arial" panose="020B0604020202020204" pitchFamily="34" charset="0"/>
+              </a:rPr>
+              <a:t> </a:t>
+            </a:r>
+            <a:r>
+              <a:rPr lang="de-DE" sz="4000" dirty="0">
+                <a:latin typeface="Arial" panose="020B0604020202020204" pitchFamily="34" charset="0"/>
+                <a:cs typeface="Arial" panose="020B0604020202020204" pitchFamily="34" charset="0"/>
+                <a:hlinkClick r:id="rId7"/>
+              </a:rPr>
+              <a:t>http://rcas.mdc-berlin.de</a:t>
+            </a:r>
+            <a:r>
+              <a:rPr lang="de-DE" sz="4000" dirty="0" smtClean="0">
+                <a:latin typeface="Arial" panose="020B0604020202020204" pitchFamily="34" charset="0"/>
+                <a:cs typeface="Arial" panose="020B0604020202020204" pitchFamily="34" charset="0"/>
+                <a:hlinkClick r:id="rId7"/>
+              </a:rPr>
+              <a:t>/</a:t>
+            </a:r>
+            <a:endParaRPr lang="de-DE" sz="4000" dirty="0" smtClean="0">
+              <a:latin typeface="Arial" panose="020B0604020202020204" pitchFamily="34" charset="0"/>
+              <a:cs typeface="Arial" panose="020B0604020202020204" pitchFamily="34" charset="0"/>
+            </a:endParaRPr>
+          </a:p>
+          <a:p>
+            <a:pPr lvl="1"/>
+            <a:endParaRPr lang="de-DE" sz="4000" dirty="0">
+              <a:latin typeface="Arial" panose="020B0604020202020204" pitchFamily="34" charset="0"/>
+              <a:cs typeface="Arial" panose="020B0604020202020204" pitchFamily="34" charset="0"/>
+            </a:endParaRPr>
+          </a:p>
+          <a:p>
+            <a:r>
+              <a:rPr lang="de-DE" sz="6600" b="1" u="sng" dirty="0" smtClean="0">
+                <a:latin typeface="Arial" panose="020B0604020202020204" pitchFamily="34" charset="0"/>
+                <a:cs typeface="Arial" panose="020B0604020202020204" pitchFamily="34" charset="0"/>
+              </a:rPr>
+              <a:t>Tasks </a:t>
+            </a:r>
+            <a:r>
+              <a:rPr lang="de-DE" sz="6600" b="1" u="sng" dirty="0" err="1" smtClean="0">
+                <a:latin typeface="Arial" panose="020B0604020202020204" pitchFamily="34" charset="0"/>
+                <a:cs typeface="Arial" panose="020B0604020202020204" pitchFamily="34" charset="0"/>
+              </a:rPr>
+              <a:t>planned</a:t>
+            </a:r>
+            <a:r>
+              <a:rPr lang="de-DE" sz="6600" b="1" u="sng" dirty="0" smtClean="0">
+                <a:latin typeface="Arial" panose="020B0604020202020204" pitchFamily="34" charset="0"/>
+                <a:cs typeface="Arial" panose="020B0604020202020204" pitchFamily="34" charset="0"/>
+              </a:rPr>
+              <a:t> </a:t>
+            </a:r>
+            <a:r>
+              <a:rPr lang="de-DE" sz="6600" b="1" u="sng" dirty="0" err="1" smtClean="0">
+                <a:latin typeface="Arial" panose="020B0604020202020204" pitchFamily="34" charset="0"/>
+                <a:cs typeface="Arial" panose="020B0604020202020204" pitchFamily="34" charset="0"/>
+              </a:rPr>
+              <a:t>for</a:t>
+            </a:r>
+            <a:r>
+              <a:rPr lang="de-DE" sz="6600" b="1" u="sng" dirty="0" smtClean="0">
+                <a:latin typeface="Arial" panose="020B0604020202020204" pitchFamily="34" charset="0"/>
+                <a:cs typeface="Arial" panose="020B0604020202020204" pitchFamily="34" charset="0"/>
+              </a:rPr>
+              <a:t> </a:t>
+            </a:r>
+            <a:r>
+              <a:rPr lang="de-DE" sz="6600" b="1" u="sng" dirty="0" err="1" smtClean="0">
+                <a:latin typeface="Arial" panose="020B0604020202020204" pitchFamily="34" charset="0"/>
+                <a:cs typeface="Arial" panose="020B0604020202020204" pitchFamily="34" charset="0"/>
+              </a:rPr>
+              <a:t>next</a:t>
+            </a:r>
+            <a:r>
+              <a:rPr lang="de-DE" sz="6600" b="1" u="sng" dirty="0" smtClean="0">
+                <a:latin typeface="Arial" panose="020B0604020202020204" pitchFamily="34" charset="0"/>
+                <a:cs typeface="Arial" panose="020B0604020202020204" pitchFamily="34" charset="0"/>
+              </a:rPr>
+              <a:t> </a:t>
+            </a:r>
+            <a:r>
+              <a:rPr lang="de-DE" sz="6600" b="1" u="sng" dirty="0" err="1" smtClean="0">
+                <a:latin typeface="Arial" panose="020B0604020202020204" pitchFamily="34" charset="0"/>
+                <a:cs typeface="Arial" panose="020B0604020202020204" pitchFamily="34" charset="0"/>
+              </a:rPr>
+              <a:t>year</a:t>
+            </a:r>
+            <a:endParaRPr lang="de-DE" sz="6600" b="1" u="sng" dirty="0" smtClean="0">
               <a:latin typeface="Arial" panose="020B0604020202020204" pitchFamily="34" charset="0"/>
               <a:cs typeface="Arial" panose="020B0604020202020204" pitchFamily="34" charset="0"/>
             </a:endParaRPr>
@@ -4424,13 +5117,107 @@
               <a:buChar char="-"/>
             </a:pPr>
             <a:r>
-              <a:rPr lang="de-DE" sz="6600" dirty="0" err="1" smtClean="0">
-                <a:latin typeface="Arial" panose="020B0604020202020204" pitchFamily="34" charset="0"/>
-                <a:cs typeface="Arial" panose="020B0604020202020204" pitchFamily="34" charset="0"/>
-              </a:rPr>
-              <a:t>Bioconda</a:t>
-            </a:r>
-            <a:endParaRPr lang="de-DE" sz="6600" dirty="0" smtClean="0">
+              <a:rPr lang="de-DE" sz="4800" b="1" dirty="0" smtClean="0">
+                <a:latin typeface="Arial" panose="020B0604020202020204" pitchFamily="34" charset="0"/>
+                <a:cs typeface="Arial" panose="020B0604020202020204" pitchFamily="34" charset="0"/>
+              </a:rPr>
+              <a:t>U</a:t>
+            </a:r>
+            <a:r>
+              <a:rPr lang="de-DE" sz="4800" b="1" dirty="0" smtClean="0">
+                <a:latin typeface="Arial" panose="020B0604020202020204" pitchFamily="34" charset="0"/>
+                <a:cs typeface="Arial" panose="020B0604020202020204" pitchFamily="34" charset="0"/>
+              </a:rPr>
+              <a:t>pdate </a:t>
+            </a:r>
+            <a:r>
+              <a:rPr lang="de-DE" sz="4800" b="1" dirty="0" err="1" smtClean="0">
+                <a:latin typeface="Arial" panose="020B0604020202020204" pitchFamily="34" charset="0"/>
+                <a:cs typeface="Arial" panose="020B0604020202020204" pitchFamily="34" charset="0"/>
+              </a:rPr>
+              <a:t>the</a:t>
+            </a:r>
+            <a:r>
+              <a:rPr lang="de-DE" sz="4800" b="1" dirty="0" smtClean="0">
+                <a:latin typeface="Arial" panose="020B0604020202020204" pitchFamily="34" charset="0"/>
+                <a:cs typeface="Arial" panose="020B0604020202020204" pitchFamily="34" charset="0"/>
+              </a:rPr>
+              <a:t> </a:t>
+            </a:r>
+            <a:r>
+              <a:rPr lang="de-DE" sz="4800" b="1" dirty="0" err="1" smtClean="0">
+                <a:latin typeface="Arial" panose="020B0604020202020204" pitchFamily="34" charset="0"/>
+                <a:cs typeface="Arial" panose="020B0604020202020204" pitchFamily="34" charset="0"/>
+              </a:rPr>
+              <a:t>doRiNA</a:t>
+            </a:r>
+            <a:r>
+              <a:rPr lang="de-DE" sz="4800" b="1" dirty="0" smtClean="0">
+                <a:latin typeface="Arial" panose="020B0604020202020204" pitchFamily="34" charset="0"/>
+                <a:cs typeface="Arial" panose="020B0604020202020204" pitchFamily="34" charset="0"/>
+              </a:rPr>
+              <a:t> </a:t>
+            </a:r>
+            <a:r>
+              <a:rPr lang="de-DE" sz="4800" b="1" dirty="0" err="1" smtClean="0">
+                <a:latin typeface="Arial" panose="020B0604020202020204" pitchFamily="34" charset="0"/>
+                <a:cs typeface="Arial" panose="020B0604020202020204" pitchFamily="34" charset="0"/>
+              </a:rPr>
+              <a:t>database</a:t>
+            </a:r>
+            <a:endParaRPr lang="de-DE" sz="4800" b="1" dirty="0" smtClean="0">
+              <a:latin typeface="Arial" panose="020B0604020202020204" pitchFamily="34" charset="0"/>
+              <a:cs typeface="Arial" panose="020B0604020202020204" pitchFamily="34" charset="0"/>
+            </a:endParaRPr>
+          </a:p>
+          <a:p>
+            <a:pPr marL="2945420" lvl="1" indent="-857250">
+              <a:buFontTx/>
+              <a:buChar char="-"/>
+            </a:pPr>
+            <a:r>
+              <a:rPr lang="de-DE" sz="4000" dirty="0" smtClean="0">
+                <a:latin typeface="Arial" panose="020B0604020202020204" pitchFamily="34" charset="0"/>
+                <a:cs typeface="Arial" panose="020B0604020202020204" pitchFamily="34" charset="0"/>
+              </a:rPr>
+              <a:t>More </a:t>
+            </a:r>
+            <a:r>
+              <a:rPr lang="de-DE" sz="4000" dirty="0" err="1" smtClean="0">
+                <a:latin typeface="Arial" panose="020B0604020202020204" pitchFamily="34" charset="0"/>
+                <a:cs typeface="Arial" panose="020B0604020202020204" pitchFamily="34" charset="0"/>
+              </a:rPr>
+              <a:t>content</a:t>
+            </a:r>
+            <a:r>
+              <a:rPr lang="de-DE" sz="4000" dirty="0" smtClean="0">
+                <a:latin typeface="Arial" panose="020B0604020202020204" pitchFamily="34" charset="0"/>
+                <a:cs typeface="Arial" panose="020B0604020202020204" pitchFamily="34" charset="0"/>
+              </a:rPr>
+              <a:t> </a:t>
+            </a:r>
+            <a:r>
+              <a:rPr lang="de-DE" sz="4000" dirty="0" err="1" smtClean="0">
+                <a:latin typeface="Arial" panose="020B0604020202020204" pitchFamily="34" charset="0"/>
+                <a:cs typeface="Arial" panose="020B0604020202020204" pitchFamily="34" charset="0"/>
+              </a:rPr>
+              <a:t>and</a:t>
+            </a:r>
+            <a:r>
+              <a:rPr lang="de-DE" sz="4000" dirty="0" smtClean="0">
+                <a:latin typeface="Arial" panose="020B0604020202020204" pitchFamily="34" charset="0"/>
+                <a:cs typeface="Arial" panose="020B0604020202020204" pitchFamily="34" charset="0"/>
+              </a:rPr>
+              <a:t> </a:t>
+            </a:r>
+            <a:r>
+              <a:rPr lang="de-DE" sz="4000" dirty="0" err="1" smtClean="0">
+                <a:latin typeface="Arial" panose="020B0604020202020204" pitchFamily="34" charset="0"/>
+                <a:cs typeface="Arial" panose="020B0604020202020204" pitchFamily="34" charset="0"/>
+              </a:rPr>
+              <a:t>functionality</a:t>
+            </a:r>
+            <a:endParaRPr lang="de-DE" sz="4000" dirty="0" smtClean="0">
               <a:latin typeface="Arial" panose="020B0604020202020204" pitchFamily="34" charset="0"/>
               <a:cs typeface="Arial" panose="020B0604020202020204" pitchFamily="34" charset="0"/>
             </a:endParaRPr>
@@ -4441,254 +5228,121 @@
               <a:buChar char="-"/>
             </a:pPr>
             <a:r>
-              <a:rPr lang="de-DE" sz="6600" dirty="0" err="1" smtClean="0">
-                <a:latin typeface="Arial" panose="020B0604020202020204" pitchFamily="34" charset="0"/>
-                <a:cs typeface="Arial" panose="020B0604020202020204" pitchFamily="34" charset="0"/>
-              </a:rPr>
-              <a:t>Guix</a:t>
-            </a:r>
-            <a:r>
-              <a:rPr lang="de-DE" sz="6600" dirty="0" smtClean="0">
-                <a:latin typeface="Arial" panose="020B0604020202020204" pitchFamily="34" charset="0"/>
-                <a:cs typeface="Arial" panose="020B0604020202020204" pitchFamily="34" charset="0"/>
-              </a:rPr>
-              <a:t>  </a:t>
-            </a:r>
-          </a:p>
-          <a:p>
-            <a:pPr marL="857250" indent="-857250">
+              <a:rPr lang="de-DE" sz="4800" b="1" dirty="0" err="1" smtClean="0">
+                <a:latin typeface="Arial" panose="020B0604020202020204" pitchFamily="34" charset="0"/>
+                <a:cs typeface="Arial" panose="020B0604020202020204" pitchFamily="34" charset="0"/>
+              </a:rPr>
+              <a:t>Offer</a:t>
+            </a:r>
+            <a:r>
+              <a:rPr lang="de-DE" sz="4800" b="1" dirty="0" smtClean="0">
+                <a:latin typeface="Arial" panose="020B0604020202020204" pitchFamily="34" charset="0"/>
+                <a:cs typeface="Arial" panose="020B0604020202020204" pitchFamily="34" charset="0"/>
+              </a:rPr>
+              <a:t> </a:t>
+            </a:r>
+            <a:r>
+              <a:rPr lang="de-DE" sz="4800" b="1" dirty="0" err="1" smtClean="0">
+                <a:latin typeface="Arial" panose="020B0604020202020204" pitchFamily="34" charset="0"/>
+                <a:cs typeface="Arial" panose="020B0604020202020204" pitchFamily="34" charset="0"/>
+              </a:rPr>
+              <a:t>more</a:t>
+            </a:r>
+            <a:r>
+              <a:rPr lang="de-DE" sz="4800" b="1" dirty="0" smtClean="0">
+                <a:latin typeface="Arial" panose="020B0604020202020204" pitchFamily="34" charset="0"/>
+                <a:cs typeface="Arial" panose="020B0604020202020204" pitchFamily="34" charset="0"/>
+              </a:rPr>
+              <a:t> </a:t>
+            </a:r>
+            <a:r>
+              <a:rPr lang="de-DE" sz="4800" b="1" dirty="0" err="1" smtClean="0">
+                <a:latin typeface="Arial" panose="020B0604020202020204" pitchFamily="34" charset="0"/>
+                <a:cs typeface="Arial" panose="020B0604020202020204" pitchFamily="34" charset="0"/>
+              </a:rPr>
+              <a:t>training</a:t>
+            </a:r>
+            <a:r>
+              <a:rPr lang="de-DE" sz="4800" b="1" dirty="0" smtClean="0">
+                <a:latin typeface="Arial" panose="020B0604020202020204" pitchFamily="34" charset="0"/>
+                <a:cs typeface="Arial" panose="020B0604020202020204" pitchFamily="34" charset="0"/>
+              </a:rPr>
+              <a:t> on </a:t>
+            </a:r>
+            <a:r>
+              <a:rPr lang="de-DE" sz="4800" b="1" dirty="0" err="1" smtClean="0">
+                <a:latin typeface="Arial" panose="020B0604020202020204" pitchFamily="34" charset="0"/>
+                <a:cs typeface="Arial" panose="020B0604020202020204" pitchFamily="34" charset="0"/>
+              </a:rPr>
+              <a:t>Galaxy</a:t>
+            </a:r>
+            <a:endParaRPr lang="de-DE" sz="4800" b="1" dirty="0" smtClean="0">
+              <a:latin typeface="Arial" panose="020B0604020202020204" pitchFamily="34" charset="0"/>
+              <a:cs typeface="Arial" panose="020B0604020202020204" pitchFamily="34" charset="0"/>
+            </a:endParaRPr>
+          </a:p>
+          <a:p>
+            <a:pPr marL="2945420" lvl="1" indent="-857250">
               <a:buFontTx/>
               <a:buChar char="-"/>
             </a:pPr>
             <a:r>
-              <a:rPr lang="de-DE" sz="6600" dirty="0" err="1" smtClean="0">
-                <a:latin typeface="Arial" panose="020B0604020202020204" pitchFamily="34" charset="0"/>
-                <a:cs typeface="Arial" panose="020B0604020202020204" pitchFamily="34" charset="0"/>
-              </a:rPr>
-              <a:t>Galaxy</a:t>
-            </a:r>
-            <a:r>
-              <a:rPr lang="de-DE" sz="6600" dirty="0" smtClean="0">
+              <a:rPr lang="de-DE" sz="4000" dirty="0" smtClean="0">
+                <a:latin typeface="Arial" panose="020B0604020202020204" pitchFamily="34" charset="0"/>
+                <a:cs typeface="Arial" panose="020B0604020202020204" pitchFamily="34" charset="0"/>
+              </a:rPr>
+              <a:t>Chip-</a:t>
+            </a:r>
+            <a:r>
+              <a:rPr lang="de-DE" sz="4000" dirty="0" err="1" smtClean="0">
+                <a:latin typeface="Arial" panose="020B0604020202020204" pitchFamily="34" charset="0"/>
+                <a:cs typeface="Arial" panose="020B0604020202020204" pitchFamily="34" charset="0"/>
+              </a:rPr>
+              <a:t>Seq</a:t>
+            </a:r>
+            <a:r>
+              <a:rPr lang="de-DE" sz="4000" dirty="0" smtClean="0">
                 <a:latin typeface="Arial" panose="020B0604020202020204" pitchFamily="34" charset="0"/>
                 <a:cs typeface="Arial" panose="020B0604020202020204" pitchFamily="34" charset="0"/>
               </a:rPr>
               <a:t> </a:t>
             </a:r>
             <a:r>
-              <a:rPr lang="de-DE" sz="6600" dirty="0" err="1" smtClean="0">
-                <a:latin typeface="Arial" panose="020B0604020202020204" pitchFamily="34" charset="0"/>
-                <a:cs typeface="Arial" panose="020B0604020202020204" pitchFamily="34" charset="0"/>
-              </a:rPr>
-              <a:t>training</a:t>
-            </a:r>
-            <a:endParaRPr lang="de-DE" sz="6600" dirty="0" smtClean="0">
+              <a:rPr lang="de-DE" sz="4000" dirty="0" err="1" smtClean="0">
+                <a:latin typeface="Arial" panose="020B0604020202020204" pitchFamily="34" charset="0"/>
+                <a:cs typeface="Arial" panose="020B0604020202020204" pitchFamily="34" charset="0"/>
+              </a:rPr>
+              <a:t>analysis</a:t>
+            </a:r>
+            <a:endParaRPr lang="de-DE" sz="4000" dirty="0" smtClean="0">
               <a:latin typeface="Arial" panose="020B0604020202020204" pitchFamily="34" charset="0"/>
               <a:cs typeface="Arial" panose="020B0604020202020204" pitchFamily="34" charset="0"/>
             </a:endParaRPr>
           </a:p>
           <a:p>
-            <a:pPr marL="857250" indent="-857250">
+            <a:pPr marL="2945420" lvl="1" indent="-857250">
               <a:buFontTx/>
               <a:buChar char="-"/>
             </a:pPr>
             <a:r>
-              <a:rPr lang="de-DE" sz="6600" dirty="0" smtClean="0">
-                <a:latin typeface="Arial" panose="020B0604020202020204" pitchFamily="34" charset="0"/>
-                <a:cs typeface="Arial" panose="020B0604020202020204" pitchFamily="34" charset="0"/>
-              </a:rPr>
-              <a:t>Set </a:t>
-            </a:r>
-            <a:r>
-              <a:rPr lang="de-DE" sz="6600" dirty="0" err="1" smtClean="0">
-                <a:latin typeface="Arial" panose="020B0604020202020204" pitchFamily="34" charset="0"/>
-                <a:cs typeface="Arial" panose="020B0604020202020204" pitchFamily="34" charset="0"/>
-              </a:rPr>
-              <a:t>up</a:t>
-            </a:r>
-            <a:r>
-              <a:rPr lang="de-DE" sz="6600" dirty="0" smtClean="0">
-                <a:latin typeface="Arial" panose="020B0604020202020204" pitchFamily="34" charset="0"/>
-                <a:cs typeface="Arial" panose="020B0604020202020204" pitchFamily="34" charset="0"/>
-              </a:rPr>
-              <a:t> </a:t>
-            </a:r>
-            <a:r>
-              <a:rPr lang="de-DE" sz="6600" dirty="0" err="1" smtClean="0">
-                <a:latin typeface="Arial" panose="020B0604020202020204" pitchFamily="34" charset="0"/>
-                <a:cs typeface="Arial" panose="020B0604020202020204" pitchFamily="34" charset="0"/>
-              </a:rPr>
-              <a:t>and</a:t>
-            </a:r>
-            <a:r>
-              <a:rPr lang="de-DE" sz="6600" dirty="0" smtClean="0">
-                <a:latin typeface="Arial" panose="020B0604020202020204" pitchFamily="34" charset="0"/>
-                <a:cs typeface="Arial" panose="020B0604020202020204" pitchFamily="34" charset="0"/>
-              </a:rPr>
-              <a:t> </a:t>
-            </a:r>
-            <a:r>
-              <a:rPr lang="de-DE" sz="6600" dirty="0" err="1" smtClean="0">
-                <a:latin typeface="Arial" panose="020B0604020202020204" pitchFamily="34" charset="0"/>
-                <a:cs typeface="Arial" panose="020B0604020202020204" pitchFamily="34" charset="0"/>
-              </a:rPr>
-              <a:t>optimisation</a:t>
-            </a:r>
-            <a:r>
-              <a:rPr lang="de-DE" sz="6600" dirty="0" smtClean="0">
-                <a:latin typeface="Arial" panose="020B0604020202020204" pitchFamily="34" charset="0"/>
-                <a:cs typeface="Arial" panose="020B0604020202020204" pitchFamily="34" charset="0"/>
-              </a:rPr>
-              <a:t> </a:t>
-            </a:r>
-            <a:r>
-              <a:rPr lang="de-DE" sz="6600" dirty="0" err="1" smtClean="0">
-                <a:latin typeface="Arial" panose="020B0604020202020204" pitchFamily="34" charset="0"/>
-                <a:cs typeface="Arial" panose="020B0604020202020204" pitchFamily="34" charset="0"/>
-              </a:rPr>
-              <a:t>of</a:t>
-            </a:r>
-            <a:r>
-              <a:rPr lang="de-DE" sz="6600" dirty="0" smtClean="0">
-                <a:latin typeface="Arial" panose="020B0604020202020204" pitchFamily="34" charset="0"/>
-                <a:cs typeface="Arial" panose="020B0604020202020204" pitchFamily="34" charset="0"/>
-              </a:rPr>
-              <a:t> </a:t>
-            </a:r>
-            <a:r>
-              <a:rPr lang="de-DE" sz="6600" dirty="0" err="1" smtClean="0">
-                <a:latin typeface="Arial" panose="020B0604020202020204" pitchFamily="34" charset="0"/>
-                <a:cs typeface="Arial" panose="020B0604020202020204" pitchFamily="34" charset="0"/>
-              </a:rPr>
-              <a:t>Galaxy</a:t>
-            </a:r>
-            <a:r>
-              <a:rPr lang="de-DE" sz="6600" dirty="0" smtClean="0">
-                <a:latin typeface="Arial" panose="020B0604020202020204" pitchFamily="34" charset="0"/>
-                <a:cs typeface="Arial" panose="020B0604020202020204" pitchFamily="34" charset="0"/>
-              </a:rPr>
-              <a:t> </a:t>
-            </a:r>
-            <a:r>
-              <a:rPr lang="de-DE" sz="6600" dirty="0" err="1" smtClean="0">
-                <a:latin typeface="Arial" panose="020B0604020202020204" pitchFamily="34" charset="0"/>
-                <a:cs typeface="Arial" panose="020B0604020202020204" pitchFamily="34" charset="0"/>
-              </a:rPr>
-              <a:t>production</a:t>
-            </a:r>
-            <a:r>
-              <a:rPr lang="de-DE" sz="6600" dirty="0" smtClean="0">
-                <a:latin typeface="Arial" panose="020B0604020202020204" pitchFamily="34" charset="0"/>
-                <a:cs typeface="Arial" panose="020B0604020202020204" pitchFamily="34" charset="0"/>
-              </a:rPr>
-              <a:t> </a:t>
-            </a:r>
-            <a:r>
-              <a:rPr lang="de-DE" sz="6600" dirty="0" err="1" smtClean="0">
-                <a:latin typeface="Arial" panose="020B0604020202020204" pitchFamily="34" charset="0"/>
-                <a:cs typeface="Arial" panose="020B0604020202020204" pitchFamily="34" charset="0"/>
-              </a:rPr>
-              <a:t>server</a:t>
-            </a:r>
-            <a:endParaRPr lang="de-DE" sz="6600" dirty="0" smtClean="0">
+              <a:rPr lang="de-DE" sz="4000" dirty="0" smtClean="0">
+                <a:latin typeface="Arial" panose="020B0604020202020204" pitchFamily="34" charset="0"/>
+                <a:cs typeface="Arial" panose="020B0604020202020204" pitchFamily="34" charset="0"/>
+              </a:rPr>
+              <a:t>Variant </a:t>
+            </a:r>
+            <a:r>
+              <a:rPr lang="de-DE" sz="4000" dirty="0" err="1" smtClean="0">
+                <a:latin typeface="Arial" panose="020B0604020202020204" pitchFamily="34" charset="0"/>
+                <a:cs typeface="Arial" panose="020B0604020202020204" pitchFamily="34" charset="0"/>
+              </a:rPr>
+              <a:t>analysis</a:t>
+            </a:r>
+            <a:endParaRPr lang="de-DE" sz="4000" dirty="0" smtClean="0">
               <a:latin typeface="Arial" panose="020B0604020202020204" pitchFamily="34" charset="0"/>
               <a:cs typeface="Arial" panose="020B0604020202020204" pitchFamily="34" charset="0"/>
             </a:endParaRPr>
           </a:p>
-          <a:p>
-            <a:endParaRPr lang="de-DE" sz="6600" dirty="0" smtClean="0">
-              <a:latin typeface="Arial" panose="020B0604020202020204" pitchFamily="34" charset="0"/>
-              <a:cs typeface="Arial" panose="020B0604020202020204" pitchFamily="34" charset="0"/>
-            </a:endParaRPr>
-          </a:p>
-          <a:p>
-            <a:r>
-              <a:rPr lang="de-DE" sz="6600" dirty="0" smtClean="0">
-                <a:latin typeface="Arial" panose="020B0604020202020204" pitchFamily="34" charset="0"/>
-                <a:cs typeface="Arial" panose="020B0604020202020204" pitchFamily="34" charset="0"/>
-              </a:rPr>
-              <a:t>Tasks </a:t>
-            </a:r>
-            <a:r>
-              <a:rPr lang="de-DE" sz="6600" dirty="0" err="1" smtClean="0">
-                <a:latin typeface="Arial" panose="020B0604020202020204" pitchFamily="34" charset="0"/>
-                <a:cs typeface="Arial" panose="020B0604020202020204" pitchFamily="34" charset="0"/>
-              </a:rPr>
-              <a:t>planned</a:t>
-            </a:r>
-            <a:r>
-              <a:rPr lang="de-DE" sz="6600" dirty="0" smtClean="0">
-                <a:latin typeface="Arial" panose="020B0604020202020204" pitchFamily="34" charset="0"/>
-                <a:cs typeface="Arial" panose="020B0604020202020204" pitchFamily="34" charset="0"/>
-              </a:rPr>
-              <a:t> </a:t>
-            </a:r>
-            <a:r>
-              <a:rPr lang="de-DE" sz="6600" dirty="0" err="1" smtClean="0">
-                <a:latin typeface="Arial" panose="020B0604020202020204" pitchFamily="34" charset="0"/>
-                <a:cs typeface="Arial" panose="020B0604020202020204" pitchFamily="34" charset="0"/>
-              </a:rPr>
-              <a:t>for</a:t>
-            </a:r>
-            <a:r>
-              <a:rPr lang="de-DE" sz="6600" dirty="0" smtClean="0">
-                <a:latin typeface="Arial" panose="020B0604020202020204" pitchFamily="34" charset="0"/>
-                <a:cs typeface="Arial" panose="020B0604020202020204" pitchFamily="34" charset="0"/>
-              </a:rPr>
-              <a:t> </a:t>
-            </a:r>
-            <a:r>
-              <a:rPr lang="de-DE" sz="6600" dirty="0" err="1" smtClean="0">
-                <a:latin typeface="Arial" panose="020B0604020202020204" pitchFamily="34" charset="0"/>
-                <a:cs typeface="Arial" panose="020B0604020202020204" pitchFamily="34" charset="0"/>
-              </a:rPr>
-              <a:t>the</a:t>
-            </a:r>
-            <a:r>
-              <a:rPr lang="de-DE" sz="6600" dirty="0" smtClean="0">
-                <a:latin typeface="Arial" panose="020B0604020202020204" pitchFamily="34" charset="0"/>
-                <a:cs typeface="Arial" panose="020B0604020202020204" pitchFamily="34" charset="0"/>
-              </a:rPr>
-              <a:t> </a:t>
-            </a:r>
-            <a:r>
-              <a:rPr lang="de-DE" sz="6600" dirty="0" err="1" smtClean="0">
-                <a:latin typeface="Arial" panose="020B0604020202020204" pitchFamily="34" charset="0"/>
-                <a:cs typeface="Arial" panose="020B0604020202020204" pitchFamily="34" charset="0"/>
-              </a:rPr>
-              <a:t>next</a:t>
-            </a:r>
-            <a:r>
-              <a:rPr lang="de-DE" sz="6600" dirty="0" smtClean="0">
-                <a:latin typeface="Arial" panose="020B0604020202020204" pitchFamily="34" charset="0"/>
-                <a:cs typeface="Arial" panose="020B0604020202020204" pitchFamily="34" charset="0"/>
-              </a:rPr>
-              <a:t> 12 </a:t>
-            </a:r>
-            <a:r>
-              <a:rPr lang="de-DE" sz="6600" dirty="0" err="1" smtClean="0">
-                <a:latin typeface="Arial" panose="020B0604020202020204" pitchFamily="34" charset="0"/>
-                <a:cs typeface="Arial" panose="020B0604020202020204" pitchFamily="34" charset="0"/>
-              </a:rPr>
-              <a:t>months</a:t>
-            </a:r>
-            <a:endParaRPr lang="de-DE" sz="6600" dirty="0" smtClean="0">
-              <a:latin typeface="Arial" panose="020B0604020202020204" pitchFamily="34" charset="0"/>
-              <a:cs typeface="Arial" panose="020B0604020202020204" pitchFamily="34" charset="0"/>
-            </a:endParaRPr>
-          </a:p>
-          <a:p>
-            <a:r>
-              <a:rPr lang="de-DE" sz="6600" dirty="0" smtClean="0">
-                <a:latin typeface="Arial" panose="020B0604020202020204" pitchFamily="34" charset="0"/>
-                <a:cs typeface="Arial" panose="020B0604020202020204" pitchFamily="34" charset="0"/>
-              </a:rPr>
-              <a:t>-  </a:t>
-            </a:r>
-            <a:endParaRPr lang="de-DE" sz="6600" dirty="0">
-              <a:latin typeface="Arial" panose="020B0604020202020204" pitchFamily="34" charset="0"/>
-              <a:cs typeface="Arial" panose="020B0604020202020204" pitchFamily="34" charset="0"/>
-            </a:endParaRPr>
-          </a:p>
         </p:txBody>
       </p:sp>
       <p:sp>
@@ -4699,8 +5353,8 @@
         </p:nvSpPr>
         <p:spPr>
           <a:xfrm>
-            <a:off x="1214774" y="37506922"/>
-            <a:ext cx="11955053" cy="4154983"/>
+            <a:off x="1153544" y="38483743"/>
+            <a:ext cx="11955053" cy="3323987"/>
           </a:xfrm>
           <a:prstGeom prst="rect">
             <a:avLst/>
@@ -4714,48 +5368,48 @@
           <a:lstStyle/>
           <a:p>
             <a:r>
-              <a:rPr lang="de-DE" sz="6600" dirty="0" smtClean="0">
+              <a:rPr lang="de-DE" sz="4800" dirty="0" smtClean="0">
                 <a:latin typeface="Arial" panose="020B0604020202020204" pitchFamily="34" charset="0"/>
                 <a:cs typeface="Arial" panose="020B0604020202020204" pitchFamily="34" charset="0"/>
               </a:rPr>
               <a:t>RCAS - </a:t>
             </a:r>
             <a:r>
-              <a:rPr lang="de-DE" sz="6600" dirty="0" err="1" smtClean="0">
+              <a:rPr lang="de-DE" sz="4800" dirty="0" err="1" smtClean="0">
                 <a:latin typeface="Arial" panose="020B0604020202020204" pitchFamily="34" charset="0"/>
                 <a:cs typeface="Arial" panose="020B0604020202020204" pitchFamily="34" charset="0"/>
               </a:rPr>
               <a:t>manuscript</a:t>
             </a:r>
             <a:r>
-              <a:rPr lang="de-DE" sz="6600" dirty="0" smtClean="0">
+              <a:rPr lang="de-DE" sz="4800" dirty="0" smtClean="0">
                 <a:latin typeface="Arial" panose="020B0604020202020204" pitchFamily="34" charset="0"/>
                 <a:cs typeface="Arial" panose="020B0604020202020204" pitchFamily="34" charset="0"/>
               </a:rPr>
               <a:t> </a:t>
             </a:r>
             <a:r>
-              <a:rPr lang="de-DE" sz="6600" dirty="0" err="1" smtClean="0">
+              <a:rPr lang="de-DE" sz="4800" dirty="0" err="1" smtClean="0">
                 <a:latin typeface="Arial" panose="020B0604020202020204" pitchFamily="34" charset="0"/>
                 <a:cs typeface="Arial" panose="020B0604020202020204" pitchFamily="34" charset="0"/>
               </a:rPr>
               <a:t>submitted</a:t>
             </a:r>
-            <a:endParaRPr lang="de-DE" sz="6600" dirty="0" smtClean="0">
+            <a:endParaRPr lang="de-DE" sz="4800" dirty="0" smtClean="0">
               <a:latin typeface="Arial" panose="020B0604020202020204" pitchFamily="34" charset="0"/>
               <a:cs typeface="Arial" panose="020B0604020202020204" pitchFamily="34" charset="0"/>
             </a:endParaRPr>
           </a:p>
           <a:p>
             <a:r>
-              <a:rPr lang="de-DE" sz="6600" dirty="0" err="1" smtClean="0">
+              <a:rPr lang="de-DE" sz="4800" dirty="0" err="1" smtClean="0">
                 <a:latin typeface="Arial" panose="020B0604020202020204" pitchFamily="34" charset="0"/>
                 <a:cs typeface="Arial" panose="020B0604020202020204" pitchFamily="34" charset="0"/>
               </a:rPr>
               <a:t>doRiNA</a:t>
             </a:r>
             <a:r>
-              <a:rPr lang="de-DE" sz="6600" dirty="0" smtClean="0">
+              <a:rPr lang="de-DE" sz="4800" dirty="0" smtClean="0">
                 <a:latin typeface="Arial" panose="020B0604020202020204" pitchFamily="34" charset="0"/>
                 <a:cs typeface="Arial" panose="020B0604020202020204" pitchFamily="34" charset="0"/>
               </a:rPr>
@@ -4764,13 +5418,13 @@
           </a:p>
           <a:p>
             <a:r>
-              <a:rPr lang="de-DE" sz="6600" dirty="0" err="1" smtClean="0">
+              <a:rPr lang="de-DE" sz="4800" dirty="0" err="1" smtClean="0">
                 <a:latin typeface="Arial" panose="020B0604020202020204" pitchFamily="34" charset="0"/>
                 <a:cs typeface="Arial" panose="020B0604020202020204" pitchFamily="34" charset="0"/>
               </a:rPr>
               <a:t>RiboTaper</a:t>
             </a:r>
-            <a:endParaRPr lang="de-DE" sz="6600" dirty="0" smtClean="0">
+            <a:endParaRPr lang="de-DE" sz="4800" dirty="0" smtClean="0">
               <a:latin typeface="Arial" panose="020B0604020202020204" pitchFamily="34" charset="0"/>
               <a:cs typeface="Arial" panose="020B0604020202020204" pitchFamily="34" charset="0"/>
             </a:endParaRPr>
@@ -4872,11 +5526,11 @@
           <p:nvPr/>
         </p:nvPicPr>
         <p:blipFill>
-          <a:blip r:embed="rId7">
+          <a:blip r:embed="rId8">
             <a:extLst>
               <a:ext uri="{BEBA8EAE-BF5A-486C-A8C5-ECC9F3942E4B}">
                 <a14:imgProps xmlns:a14="http://schemas.microsoft.com/office/drawing/2010/main">
-                  <a14:imgLayer r:embed="rId8">
+                  <a14:imgLayer r:embed="rId9">
                     <a14:imgEffect>
                       <a14:brightnessContrast contrast="-2000"/>
                     </a14:imgEffect>
@@ -5009,46 +5663,11 @@
               <a:t>We offer </a:t>
             </a:r>
             <a:r>
-              <a:rPr lang="en-US" sz="6600" b="1" dirty="0">
-                <a:latin typeface="Arial"/>
-                <a:cs typeface="Arial"/>
-              </a:rPr>
-              <a:t>tools</a:t>
-            </a:r>
-            <a:r>
               <a:rPr lang="en-US" sz="6600" dirty="0">
                 <a:latin typeface="Arial"/>
                 <a:cs typeface="Arial"/>
               </a:rPr>
-              <a:t>, </a:t>
-            </a:r>
-            <a:r>
-              <a:rPr lang="en-US" sz="6600" b="1" dirty="0">
-                <a:latin typeface="Arial"/>
-                <a:cs typeface="Arial"/>
-              </a:rPr>
-              <a:t>services</a:t>
-            </a:r>
-            <a:r>
-              <a:rPr lang="en-US" sz="6600" dirty="0">
-                <a:latin typeface="Arial"/>
-                <a:cs typeface="Arial"/>
-              </a:rPr>
-              <a:t> and </a:t>
-            </a:r>
-            <a:r>
-              <a:rPr lang="en-US" sz="6600" b="1" dirty="0">
-                <a:latin typeface="Arial"/>
-                <a:cs typeface="Arial"/>
-              </a:rPr>
-              <a:t>training</a:t>
-            </a:r>
-            <a:r>
-              <a:rPr lang="en-US" sz="6600" dirty="0">
-                <a:latin typeface="Arial"/>
-                <a:cs typeface="Arial"/>
-              </a:rPr>
-              <a:t> for the analysis of </a:t>
+              <a:t>tools, services and training for the analysis of </a:t>
             </a:r>
             <a:endParaRPr lang="en-US" sz="6600" dirty="0" smtClean="0">
               <a:latin typeface="Arial"/>
@@ -5057,18 +5676,25 @@
           </a:p>
           <a:p>
             <a:r>
-              <a:rPr lang="en-US" sz="6600" dirty="0" smtClean="0">
+              <a:rPr lang="en-US" sz="6600" b="1" dirty="0" smtClean="0">
                 <a:latin typeface="Arial"/>
                 <a:cs typeface="Arial"/>
               </a:rPr>
               <a:t>RNA</a:t>
+            </a:r>
+            <a:r>
+              <a:rPr lang="en-US" sz="6600" b="1" dirty="0">
+                <a:latin typeface="Arial"/>
+                <a:cs typeface="Arial"/>
+              </a:rPr>
+              <a:t>-binding proteins </a:t>
             </a:r>
             <a:r>
               <a:rPr lang="en-US" sz="6600" dirty="0">
                 <a:latin typeface="Arial"/>
                 <a:cs typeface="Arial"/>
               </a:rPr>
-              <a:t>-binding proteins and </a:t>
+              <a:t>and </a:t>
             </a:r>
             <a:endParaRPr lang="en-US" sz="6600" dirty="0" smtClean="0">
               <a:latin typeface="Arial"/>
@@ -5077,14 +5703,14 @@
           </a:p>
           <a:p>
             <a:r>
-              <a:rPr lang="en-US" sz="6600" dirty="0" smtClean="0">
+              <a:rPr lang="en-US" sz="6600" b="1" dirty="0" smtClean="0">
                 <a:latin typeface="Arial"/>
                 <a:cs typeface="Arial"/>
               </a:rPr>
               <a:t>post</a:t>
             </a:r>
             <a:r>
-              <a:rPr lang="en-US" sz="6600" dirty="0">
+              <a:rPr lang="en-US" sz="6600" b="1" dirty="0">
                 <a:latin typeface="Arial"/>
                 <a:cs typeface="Arial"/>
               </a:rPr>
@@ -5112,7 +5738,7 @@
           <p:nvPr/>
         </p:nvPicPr>
         <p:blipFill>
-          <a:blip r:embed="rId9">
+          <a:blip r:embed="rId10">
             <a:extLst>
               <a:ext uri="{28A0092B-C50C-407E-A947-70E740481C1C}">
                 <a14:useLocalDpi xmlns:a14="http://schemas.microsoft.com/office/drawing/2010/main" val="0"/>
@@ -5142,7 +5768,7 @@
           <p:nvPr/>
         </p:nvPicPr>
         <p:blipFill>
-          <a:blip r:embed="rId10">
+          <a:blip r:embed="rId11">
             <a:extLst>
               <a:ext uri="{28A0092B-C50C-407E-A947-70E740481C1C}">
                 <a14:useLocalDpi xmlns:a14="http://schemas.microsoft.com/office/drawing/2010/main" val="0"/>
@@ -5163,149 +5789,6 @@
           </a:prstGeom>
         </p:spPr>
       </p:pic>
-      <p:pic>
-        <p:nvPicPr>
-          <p:cNvPr id="10" name="Grafik 9"/>
-          <p:cNvPicPr>
-            <a:picLocks noChangeAspect="1"/>
-          </p:cNvPicPr>
-          <p:nvPr/>
-        </p:nvPicPr>
-        <p:blipFill>
-          <a:blip r:embed="rId11">
-            <a:extLst>
-              <a:ext uri="{28A0092B-C50C-407E-A947-70E740481C1C}">
-                <a14:useLocalDpi xmlns:a14="http://schemas.microsoft.com/office/drawing/2010/main" val="0"/>
-              </a:ext>
-            </a:extLst>
-          </a:blip>
-          <a:stretch>
-            <a:fillRect/>
-          </a:stretch>
-        </p:blipFill>
-        <p:spPr>
-          <a:xfrm>
-            <a:off x="1755789" y="15617476"/>
-            <a:ext cx="10058400" cy="7112694"/>
-          </a:xfrm>
-          <a:prstGeom prst="rect">
-            <a:avLst/>
-          </a:prstGeom>
-        </p:spPr>
-      </p:pic>
-      <p:sp>
-        <p:nvSpPr>
-          <p:cNvPr id="35" name="Textfeld 34"/>
-          <p:cNvSpPr txBox="1"/>
-          <p:nvPr/>
-        </p:nvSpPr>
-        <p:spPr>
-          <a:xfrm>
-            <a:off x="16595246" y="11699467"/>
-            <a:ext cx="12598019" cy="21421245"/>
-          </a:xfrm>
-          <a:prstGeom prst="rect">
-            <a:avLst/>
-          </a:prstGeom>
-          <a:noFill/>
-        </p:spPr>
-        <p:txBody>
-          <a:bodyPr wrap="square" rtlCol="0">
-            <a:spAutoFit/>
-          </a:bodyPr>
-          <a:lstStyle/>
-          <a:p>
-            <a:pPr lvl="0"/>
-            <a:r>
-              <a:rPr lang="en-US" sz="6600" b="1" dirty="0" err="1"/>
-              <a:t>DoRiNA</a:t>
-            </a:r>
-            <a:r>
-              <a:rPr lang="en-US" sz="6600" b="1" dirty="0"/>
-              <a:t> database</a:t>
-            </a:r>
-            <a:r>
-              <a:rPr lang="en-US" sz="6600" dirty="0"/>
-              <a:t> – Database for RNA-binding protein binding sites and </a:t>
-            </a:r>
-            <a:r>
-              <a:rPr lang="en-US" sz="6600" dirty="0" err="1"/>
-              <a:t>miRNA</a:t>
-            </a:r>
-            <a:r>
-              <a:rPr lang="en-US" sz="6600" dirty="0"/>
-              <a:t> binding sites from various resources including our in-house tool PicTar2</a:t>
-            </a:r>
-          </a:p>
-          <a:p>
-            <a:pPr lvl="0"/>
-            <a:r>
-              <a:rPr lang="en-US" sz="6600" b="1" dirty="0" err="1"/>
-              <a:t>RiboTaper</a:t>
-            </a:r>
-            <a:r>
-              <a:rPr lang="en-US" sz="6600" dirty="0"/>
-              <a:t> – A toolbox for analysis of Ribosome profiling data</a:t>
-            </a:r>
-          </a:p>
-          <a:p>
-            <a:pPr lvl="0"/>
-            <a:r>
-              <a:rPr lang="en-US" sz="6600" b="1" dirty="0"/>
-              <a:t>RCAS</a:t>
-            </a:r>
-            <a:r>
-              <a:rPr lang="en-US" sz="6600" dirty="0"/>
-              <a:t> – A pipeline for annotation of RNA-specific features such as RNA-modification sites and RBP binding sites.</a:t>
-            </a:r>
-          </a:p>
-          <a:p>
-            <a:pPr lvl="0"/>
-            <a:r>
-              <a:rPr lang="en-US" sz="6600" b="1" dirty="0" err="1"/>
-              <a:t>microMummie</a:t>
-            </a:r>
-            <a:r>
-              <a:rPr lang="en-US" sz="6600" dirty="0"/>
-              <a:t> – MicroRNA target site identification by integrating sequence and binding information</a:t>
-            </a:r>
-          </a:p>
-          <a:p>
-            <a:pPr lvl="0"/>
-            <a:r>
-              <a:rPr lang="en-US" sz="6600" b="1" dirty="0" err="1"/>
-              <a:t>PARalyzer</a:t>
-            </a:r>
-            <a:r>
-              <a:rPr lang="en-US" sz="6600" dirty="0"/>
-              <a:t> - definition of RNA binding sites from PAR-CLIP short-read sequence data</a:t>
-            </a:r>
-          </a:p>
-          <a:p>
-            <a:pPr lvl="0"/>
-            <a:r>
-              <a:rPr lang="en-GB" sz="6600" b="1" dirty="0"/>
-              <a:t>Local Galaxy server </a:t>
-            </a:r>
-            <a:r>
-              <a:rPr lang="en-GB" sz="6600" dirty="0"/>
-              <a:t>– aimed for </a:t>
-            </a:r>
-            <a:r>
-              <a:rPr lang="en-GB" sz="6600" dirty="0" err="1"/>
-              <a:t>wetlab</a:t>
-            </a:r>
-            <a:r>
-              <a:rPr lang="en-GB" sz="6600" dirty="0"/>
-              <a:t> researchers being able to run bioinformatics tools and analysis pipelines developed for</a:t>
-            </a:r>
-            <a:r>
-              <a:rPr lang="en-US" sz="6600" dirty="0"/>
-              <a:t>. </a:t>
-            </a:r>
-          </a:p>
-        </p:txBody>
-      </p:sp>
     </p:spTree>
     <p:extLst>
       <p:ext uri="{BB962C8B-B14F-4D97-AF65-F5344CB8AC3E}">

</xml_diff>

<commit_message>
updated poster: training and education
</commit_message>
<xml_diff>
--- a/rbc_bimsb/sab-berlin-2016/poster/BIMSB_SAB2016_poster.pptx
+++ b/rbc_bimsb/sab-berlin-2016/poster/BIMSB_SAB2016_poster.pptx
@@ -3120,6 +3120,36 @@
       </p:grpSpPr>
       <p:pic>
         <p:nvPicPr>
+          <p:cNvPr id="19" name="Bild 18" descr="GalaxyUserCount.png"/>
+          <p:cNvPicPr>
+            <a:picLocks noChangeAspect="1"/>
+          </p:cNvPicPr>
+          <p:nvPr/>
+        </p:nvPicPr>
+        <p:blipFill>
+          <a:blip r:embed="rId2">
+            <a:extLst>
+              <a:ext uri="{28A0092B-C50C-407E-A947-70E740481C1C}">
+                <a14:useLocalDpi xmlns:a14="http://schemas.microsoft.com/office/drawing/2010/main" val="0"/>
+              </a:ext>
+            </a:extLst>
+          </a:blip>
+          <a:stretch>
+            <a:fillRect/>
+          </a:stretch>
+        </p:blipFill>
+        <p:spPr>
+          <a:xfrm>
+            <a:off x="17420761" y="30978319"/>
+            <a:ext cx="12274722" cy="9638650"/>
+          </a:xfrm>
+          <a:prstGeom prst="rect">
+            <a:avLst/>
+          </a:prstGeom>
+        </p:spPr>
+      </p:pic>
+      <p:pic>
+        <p:nvPicPr>
           <p:cNvPr id="16" name="Bild 15" descr="logo_28185.png"/>
           <p:cNvPicPr>
             <a:picLocks noChangeAspect="1"/>
@@ -3127,7 +3157,7 @@
           <p:nvPr/>
         </p:nvPicPr>
         <p:blipFill>
-          <a:blip r:embed="rId2">
+          <a:blip r:embed="rId3">
             <a:extLst>
               <a:ext uri="{28A0092B-C50C-407E-A947-70E740481C1C}">
                 <a14:useLocalDpi xmlns:a14="http://schemas.microsoft.com/office/drawing/2010/main" val="0"/>
@@ -3207,7 +3237,7 @@
           <p:nvPr/>
         </p:nvPicPr>
         <p:blipFill>
-          <a:blip r:embed="rId3">
+          <a:blip r:embed="rId4">
             <a:extLst>
               <a:ext uri="{28A0092B-C50C-407E-A947-70E740481C1C}">
                 <a14:useLocalDpi xmlns:a14="http://schemas.microsoft.com/office/drawing/2010/main" val="0"/>
@@ -3243,7 +3273,7 @@
             <a:avLst/>
           </a:prstGeom>
           <a:blipFill dpi="0" rotWithShape="1">
-            <a:blip r:embed="rId4">
+            <a:blip r:embed="rId5">
               <a:extLst>
                 <a:ext uri="{28A0092B-C50C-407E-A947-70E740481C1C}">
                   <a14:useLocalDpi xmlns:a14="http://schemas.microsoft.com/office/drawing/2010/main" val="0"/>
@@ -3280,7 +3310,7 @@
             <a:pPr algn="ctr"/>
             <a:endParaRPr lang="en-US" dirty="0">
               <a:blipFill dpi="0" rotWithShape="1">
-                <a:blip r:embed="rId4">
+                <a:blip r:embed="rId5">
                   <a:extLst>
                     <a:ext uri="{28A0092B-C50C-407E-A947-70E740481C1C}">
                       <a14:useLocalDpi xmlns:a14="http://schemas.microsoft.com/office/drawing/2010/main" val="0"/>
@@ -3411,7 +3441,7 @@
           <p:nvPr/>
         </p:nvPicPr>
         <p:blipFill>
-          <a:blip r:embed="rId5">
+          <a:blip r:embed="rId6">
             <a:extLst>
               <a:ext uri="{28A0092B-C50C-407E-A947-70E740481C1C}">
                 <a14:useLocalDpi xmlns:a14="http://schemas.microsoft.com/office/drawing/2010/main" val="0"/>
@@ -3885,7 +3915,7 @@
           <p:nvPr/>
         </p:nvPicPr>
         <p:blipFill>
-          <a:blip r:embed="rId6">
+          <a:blip r:embed="rId7">
             <a:extLst>
               <a:ext uri="{28A0092B-C50C-407E-A947-70E740481C1C}">
                 <a14:useLocalDpi xmlns:a14="http://schemas.microsoft.com/office/drawing/2010/main" val="0"/>
@@ -4087,7 +4117,7 @@
         </p:nvSpPr>
         <p:spPr>
           <a:xfrm>
-            <a:off x="16598142" y="36451407"/>
+            <a:off x="16904337" y="23116160"/>
             <a:ext cx="12600000" cy="1015663"/>
           </a:xfrm>
           <a:prstGeom prst="rect">
@@ -4181,7 +4211,7 @@
         </p:nvSpPr>
         <p:spPr>
           <a:xfrm>
-            <a:off x="1214774" y="15972092"/>
+            <a:off x="1235333" y="16194346"/>
             <a:ext cx="12600000" cy="1015663"/>
           </a:xfrm>
           <a:prstGeom prst="rect">
@@ -5025,7 +5055,7 @@
               <a:rPr lang="de-DE" sz="4000" dirty="0">
                 <a:latin typeface="Arial" panose="020B0604020202020204" pitchFamily="34" charset="0"/>
                 <a:cs typeface="Arial" panose="020B0604020202020204" pitchFamily="34" charset="0"/>
-                <a:hlinkClick r:id="rId7"/>
+                <a:hlinkClick r:id="rId8"/>
               </a:rPr>
               <a:t>http://rcas.mdc-berlin.de</a:t>
             </a:r>
@@ -5033,7 +5063,7 @@
               <a:rPr lang="de-DE" sz="4000" dirty="0" smtClean="0">
                 <a:latin typeface="Arial" panose="020B0604020202020204" pitchFamily="34" charset="0"/>
                 <a:cs typeface="Arial" panose="020B0604020202020204" pitchFamily="34" charset="0"/>
-                <a:hlinkClick r:id="rId7"/>
+                <a:hlinkClick r:id="rId8"/>
               </a:rPr>
               <a:t>/</a:t>
             </a:r>
@@ -5437,86 +5467,6 @@
           </a:p>
         </p:txBody>
       </p:sp>
-      <p:sp>
-        <p:nvSpPr>
-          <p:cNvPr id="3" name="Textfeld 2"/>
-          <p:cNvSpPr txBox="1"/>
-          <p:nvPr/>
-        </p:nvSpPr>
-        <p:spPr>
-          <a:xfrm>
-            <a:off x="16992280" y="37875007"/>
-            <a:ext cx="11349318" cy="3139321"/>
-          </a:xfrm>
-          <a:prstGeom prst="rect">
-            <a:avLst/>
-          </a:prstGeom>
-          <a:noFill/>
-        </p:spPr>
-        <p:txBody>
-          <a:bodyPr wrap="square" rtlCol="0">
-            <a:spAutoFit/>
-          </a:bodyPr>
-          <a:lstStyle/>
-          <a:p>
-            <a:r>
-              <a:rPr lang="de-DE" sz="6600" dirty="0" err="1" smtClean="0">
-                <a:latin typeface="Arial" panose="020B0604020202020204" pitchFamily="34" charset="0"/>
-                <a:cs typeface="Arial" panose="020B0604020202020204" pitchFamily="34" charset="0"/>
-              </a:rPr>
-              <a:t>Galaxy</a:t>
-            </a:r>
-            <a:r>
-              <a:rPr lang="de-DE" sz="6600" dirty="0" smtClean="0">
-                <a:latin typeface="Arial" panose="020B0604020202020204" pitchFamily="34" charset="0"/>
-                <a:cs typeface="Arial" panose="020B0604020202020204" pitchFamily="34" charset="0"/>
-              </a:rPr>
-              <a:t> </a:t>
-            </a:r>
-            <a:r>
-              <a:rPr lang="de-DE" sz="6600" dirty="0" err="1" smtClean="0">
-                <a:latin typeface="Arial" panose="020B0604020202020204" pitchFamily="34" charset="0"/>
-                <a:cs typeface="Arial" panose="020B0604020202020204" pitchFamily="34" charset="0"/>
-              </a:rPr>
-              <a:t>courses</a:t>
-            </a:r>
-            <a:endParaRPr lang="de-DE" sz="6600" dirty="0" smtClean="0">
-              <a:latin typeface="Arial" panose="020B0604020202020204" pitchFamily="34" charset="0"/>
-              <a:cs typeface="Arial" panose="020B0604020202020204" pitchFamily="34" charset="0"/>
-            </a:endParaRPr>
-          </a:p>
-          <a:p>
-            <a:pPr marL="857250" indent="-857250">
-              <a:buFontTx/>
-              <a:buChar char="-"/>
-            </a:pPr>
-            <a:r>
-              <a:rPr lang="de-DE" sz="6600" dirty="0" smtClean="0">
-                <a:latin typeface="Arial" panose="020B0604020202020204" pitchFamily="34" charset="0"/>
-                <a:cs typeface="Arial" panose="020B0604020202020204" pitchFamily="34" charset="0"/>
-              </a:rPr>
-              <a:t>17-18 May</a:t>
-            </a:r>
-          </a:p>
-          <a:p>
-            <a:pPr marL="857250" indent="-857250">
-              <a:buFontTx/>
-              <a:buChar char="-"/>
-            </a:pPr>
-            <a:r>
-              <a:rPr lang="de-DE" sz="6600" dirty="0" smtClean="0">
-                <a:latin typeface="Arial" panose="020B0604020202020204" pitchFamily="34" charset="0"/>
-                <a:cs typeface="Arial" panose="020B0604020202020204" pitchFamily="34" charset="0"/>
-              </a:rPr>
-              <a:t>17-18 August</a:t>
-            </a:r>
-            <a:endParaRPr lang="de-DE" sz="6600" dirty="0">
-              <a:latin typeface="Arial" panose="020B0604020202020204" pitchFamily="34" charset="0"/>
-              <a:cs typeface="Arial" panose="020B0604020202020204" pitchFamily="34" charset="0"/>
-            </a:endParaRPr>
-          </a:p>
-        </p:txBody>
-      </p:sp>
       <p:pic>
         <p:nvPicPr>
           <p:cNvPr id="7" name="Grafik 6"/>
@@ -5526,11 +5476,11 @@
           <p:nvPr/>
         </p:nvPicPr>
         <p:blipFill>
-          <a:blip r:embed="rId8">
+          <a:blip r:embed="rId9">
             <a:extLst>
               <a:ext uri="{BEBA8EAE-BF5A-486C-A8C5-ECC9F3942E4B}">
                 <a14:imgProps xmlns:a14="http://schemas.microsoft.com/office/drawing/2010/main">
-                  <a14:imgLayer r:embed="rId9">
+                  <a14:imgLayer r:embed="rId10">
                     <a14:imgEffect>
                       <a14:brightnessContrast contrast="-2000"/>
                     </a14:imgEffect>
@@ -5642,7 +5592,7 @@
         <p:spPr>
           <a:xfrm>
             <a:off x="1634509" y="11547067"/>
-            <a:ext cx="12598019" cy="5170646"/>
+            <a:ext cx="12598019" cy="4154983"/>
           </a:xfrm>
           <a:prstGeom prst="rect">
             <a:avLst/>
@@ -5714,17 +5664,18 @@
                 <a:latin typeface="Arial"/>
                 <a:cs typeface="Arial"/>
               </a:rPr>
-              <a:t>-transcriptional regulation</a:t>
-            </a:r>
-          </a:p>
-          <a:p>
-            <a:pPr marL="857250" indent="-857250">
-              <a:buFontTx/>
-              <a:buChar char="-"/>
-            </a:pPr>
-            <a:endParaRPr lang="de-DE" sz="6600" dirty="0" smtClean="0">
-              <a:latin typeface="Arial" panose="020B0604020202020204" pitchFamily="34" charset="0"/>
-              <a:cs typeface="Arial" panose="020B0604020202020204" pitchFamily="34" charset="0"/>
+              <a:t>-transcriptional </a:t>
+            </a:r>
+            <a:r>
+              <a:rPr lang="en-US" sz="6600" b="1" dirty="0" smtClean="0">
+                <a:latin typeface="Arial"/>
+                <a:cs typeface="Arial"/>
+              </a:rPr>
+              <a:t>regulation</a:t>
+            </a:r>
+            <a:endParaRPr lang="en-US" sz="6600" b="1" dirty="0">
+              <a:latin typeface="Arial"/>
+              <a:cs typeface="Arial"/>
             </a:endParaRPr>
           </a:p>
         </p:txBody>
@@ -5738,7 +5689,7 @@
           <p:nvPr/>
         </p:nvPicPr>
         <p:blipFill>
-          <a:blip r:embed="rId10">
+          <a:blip r:embed="rId11">
             <a:extLst>
               <a:ext uri="{28A0092B-C50C-407E-A947-70E740481C1C}">
                 <a14:useLocalDpi xmlns:a14="http://schemas.microsoft.com/office/drawing/2010/main" val="0"/>
@@ -5768,7 +5719,7 @@
           <p:nvPr/>
         </p:nvPicPr>
         <p:blipFill>
-          <a:blip r:embed="rId11">
+          <a:blip r:embed="rId12">
             <a:extLst>
               <a:ext uri="{28A0092B-C50C-407E-A947-70E740481C1C}">
                 <a14:useLocalDpi xmlns:a14="http://schemas.microsoft.com/office/drawing/2010/main" val="0"/>
@@ -5789,6 +5740,750 @@
           </a:prstGeom>
         </p:spPr>
       </p:pic>
+      <p:sp>
+        <p:nvSpPr>
+          <p:cNvPr id="31" name="Shape 101"/>
+          <p:cNvSpPr txBox="1"/>
+          <p:nvPr/>
+        </p:nvSpPr>
+        <p:spPr>
+          <a:xfrm>
+            <a:off x="16598141" y="11547066"/>
+            <a:ext cx="11343323" cy="1565927"/>
+          </a:xfrm>
+          <a:prstGeom prst="rect">
+            <a:avLst/>
+          </a:prstGeom>
+          <a:noFill/>
+          <a:ln>
+            <a:noFill/>
+          </a:ln>
+        </p:spPr>
+        <p:txBody>
+          <a:bodyPr lIns="91425" tIns="45700" rIns="91425" bIns="45700" anchor="t" anchorCtr="0">
+            <a:noAutofit/>
+          </a:bodyPr>
+          <a:lstStyle/>
+          <a:p>
+            <a:pPr marL="0" marR="0" lvl="0" indent="0" algn="l" rtl="0">
+              <a:spcBef>
+                <a:spcPts val="0"/>
+              </a:spcBef>
+              <a:buSzPct val="25000"/>
+              <a:buNone/>
+            </a:pPr>
+            <a:r>
+              <a:rPr lang="en-US" sz="6600" b="1" dirty="0" smtClean="0">
+                <a:solidFill>
+                  <a:schemeClr val="dk1"/>
+                </a:solidFill>
+                <a:latin typeface="Arial"/>
+                <a:ea typeface="Calibri"/>
+                <a:cs typeface="Arial"/>
+                <a:sym typeface="Calibri"/>
+              </a:rPr>
+              <a:t>Local Galaxy Server</a:t>
+            </a:r>
+            <a:endParaRPr lang="en-US" sz="6600" b="1" dirty="0">
+              <a:solidFill>
+                <a:schemeClr val="dk1"/>
+              </a:solidFill>
+              <a:latin typeface="Arial"/>
+              <a:ea typeface="Calibri"/>
+              <a:cs typeface="Arial"/>
+              <a:sym typeface="Calibri"/>
+            </a:endParaRPr>
+          </a:p>
+        </p:txBody>
+      </p:sp>
+      <p:pic>
+        <p:nvPicPr>
+          <p:cNvPr id="17" name="Bild 16" descr="galaxyLogo360.png"/>
+          <p:cNvPicPr>
+            <a:picLocks noChangeAspect="1"/>
+          </p:cNvPicPr>
+          <p:nvPr/>
+        </p:nvPicPr>
+        <p:blipFill>
+          <a:blip r:embed="rId13">
+            <a:extLst>
+              <a:ext uri="{28A0092B-C50C-407E-A947-70E740481C1C}">
+                <a14:useLocalDpi xmlns:a14="http://schemas.microsoft.com/office/drawing/2010/main" val="0"/>
+              </a:ext>
+            </a:extLst>
+          </a:blip>
+          <a:stretch>
+            <a:fillRect/>
+          </a:stretch>
+        </p:blipFill>
+        <p:spPr>
+          <a:xfrm>
+            <a:off x="24932337" y="11547066"/>
+            <a:ext cx="4572000" cy="1270000"/>
+          </a:xfrm>
+          <a:prstGeom prst="rect">
+            <a:avLst/>
+          </a:prstGeom>
+        </p:spPr>
+      </p:pic>
+      <p:pic>
+        <p:nvPicPr>
+          <p:cNvPr id="38" name="Shape 113" descr="20160817_152109.jpg"/>
+          <p:cNvPicPr>
+            <a:picLocks/>
+          </p:cNvPicPr>
+          <p:nvPr/>
+        </p:nvPicPr>
+        <p:blipFill>
+          <a:blip r:embed="rId14">
+            <a:alphaModFix/>
+          </a:blip>
+          <a:stretch>
+            <a:fillRect/>
+          </a:stretch>
+        </p:blipFill>
+        <p:spPr>
+          <a:xfrm>
+            <a:off x="23682452" y="24771007"/>
+            <a:ext cx="6003505" cy="4376033"/>
+          </a:xfrm>
+          <a:prstGeom prst="rect">
+            <a:avLst/>
+          </a:prstGeom>
+          <a:noFill/>
+          <a:ln>
+            <a:noFill/>
+          </a:ln>
+        </p:spPr>
+      </p:pic>
+      <p:sp>
+        <p:nvSpPr>
+          <p:cNvPr id="20" name="Rechteck 19"/>
+          <p:cNvSpPr/>
+          <p:nvPr/>
+        </p:nvSpPr>
+        <p:spPr>
+          <a:xfrm>
+            <a:off x="16904337" y="25025012"/>
+            <a:ext cx="6245574" cy="3785652"/>
+          </a:xfrm>
+          <a:prstGeom prst="rect">
+            <a:avLst/>
+          </a:prstGeom>
+        </p:spPr>
+        <p:txBody>
+          <a:bodyPr wrap="square">
+            <a:spAutoFit/>
+          </a:bodyPr>
+          <a:lstStyle/>
+          <a:p>
+            <a:pPr lvl="0">
+              <a:buSzPct val="25000"/>
+            </a:pPr>
+            <a:r>
+              <a:rPr lang="en-US" sz="6000" dirty="0">
+                <a:solidFill>
+                  <a:schemeClr val="dk1"/>
+                </a:solidFill>
+                <a:latin typeface="Arial"/>
+                <a:ea typeface="Calibri"/>
+                <a:cs typeface="Arial"/>
+                <a:sym typeface="Calibri"/>
+              </a:rPr>
+              <a:t>Offered </a:t>
+            </a:r>
+            <a:r>
+              <a:rPr lang="en-US" sz="6000" b="1" dirty="0">
+                <a:solidFill>
+                  <a:schemeClr val="dk1"/>
+                </a:solidFill>
+                <a:latin typeface="Arial"/>
+                <a:ea typeface="Calibri"/>
+                <a:cs typeface="Arial"/>
+                <a:sym typeface="Calibri"/>
+              </a:rPr>
+              <a:t>two</a:t>
+            </a:r>
+            <a:r>
+              <a:rPr lang="en-US" sz="6000" dirty="0">
+                <a:solidFill>
+                  <a:schemeClr val="dk1"/>
+                </a:solidFill>
+                <a:latin typeface="Arial"/>
+                <a:ea typeface="Calibri"/>
+                <a:cs typeface="Arial"/>
+                <a:sym typeface="Calibri"/>
+              </a:rPr>
+              <a:t> </a:t>
+            </a:r>
+            <a:r>
+              <a:rPr lang="en-US" sz="6000" b="1" dirty="0">
+                <a:solidFill>
+                  <a:schemeClr val="dk1"/>
+                </a:solidFill>
+                <a:latin typeface="Arial"/>
+                <a:ea typeface="Calibri"/>
+                <a:cs typeface="Arial"/>
+                <a:sym typeface="Calibri"/>
+              </a:rPr>
+              <a:t>workshops</a:t>
+            </a:r>
+            <a:r>
+              <a:rPr lang="en-US" sz="6000" dirty="0">
+                <a:solidFill>
+                  <a:schemeClr val="dk1"/>
+                </a:solidFill>
+                <a:latin typeface="Arial"/>
+                <a:ea typeface="Calibri"/>
+                <a:cs typeface="Arial"/>
+                <a:sym typeface="Calibri"/>
+              </a:rPr>
+              <a:t> for </a:t>
+            </a:r>
+            <a:endParaRPr lang="en-US" sz="6000" dirty="0" smtClean="0">
+              <a:solidFill>
+                <a:schemeClr val="dk1"/>
+              </a:solidFill>
+              <a:latin typeface="Arial"/>
+              <a:ea typeface="Calibri"/>
+              <a:cs typeface="Arial"/>
+              <a:sym typeface="Calibri"/>
+            </a:endParaRPr>
+          </a:p>
+          <a:p>
+            <a:pPr lvl="0">
+              <a:buSzPct val="25000"/>
+            </a:pPr>
+            <a:r>
+              <a:rPr lang="en-US" sz="6000" dirty="0" smtClean="0">
+                <a:solidFill>
+                  <a:schemeClr val="dk1"/>
+                </a:solidFill>
+                <a:latin typeface="Arial"/>
+                <a:ea typeface="Calibri"/>
+                <a:cs typeface="Arial"/>
+                <a:sym typeface="Calibri"/>
+              </a:rPr>
+              <a:t>RNA</a:t>
+            </a:r>
+            <a:r>
+              <a:rPr lang="en-US" sz="6000" dirty="0">
+                <a:solidFill>
+                  <a:schemeClr val="dk1"/>
+                </a:solidFill>
+                <a:latin typeface="Arial"/>
+                <a:ea typeface="Calibri"/>
+                <a:cs typeface="Arial"/>
+                <a:sym typeface="Calibri"/>
+              </a:rPr>
+              <a:t>-</a:t>
+            </a:r>
+            <a:r>
+              <a:rPr lang="en-US" sz="6000" dirty="0" err="1">
+                <a:solidFill>
+                  <a:schemeClr val="dk1"/>
+                </a:solidFill>
+                <a:latin typeface="Arial"/>
+                <a:ea typeface="Calibri"/>
+                <a:cs typeface="Arial"/>
+                <a:sym typeface="Calibri"/>
+              </a:rPr>
+              <a:t>seq</a:t>
+            </a:r>
+            <a:r>
+              <a:rPr lang="en-US" sz="6000" dirty="0">
+                <a:solidFill>
+                  <a:schemeClr val="dk1"/>
+                </a:solidFill>
+                <a:latin typeface="Arial"/>
+                <a:ea typeface="Calibri"/>
+                <a:cs typeface="Arial"/>
+                <a:sym typeface="Calibri"/>
+              </a:rPr>
+              <a:t> analysis using </a:t>
+            </a:r>
+            <a:r>
+              <a:rPr lang="en-US" sz="6000" b="1" dirty="0">
+                <a:solidFill>
+                  <a:schemeClr val="dk1"/>
+                </a:solidFill>
+                <a:latin typeface="Arial"/>
+                <a:ea typeface="Calibri"/>
+                <a:cs typeface="Arial"/>
+                <a:sym typeface="Calibri"/>
+              </a:rPr>
+              <a:t>Galaxy </a:t>
+            </a:r>
+            <a:endParaRPr lang="en-US" sz="6000" b="1" dirty="0">
+              <a:solidFill>
+                <a:schemeClr val="dk1"/>
+              </a:solidFill>
+              <a:latin typeface="Arial"/>
+              <a:ea typeface="Calibri"/>
+              <a:cs typeface="Arial"/>
+              <a:sym typeface="Calibri"/>
+            </a:endParaRPr>
+          </a:p>
+        </p:txBody>
+      </p:sp>
+      <p:sp>
+        <p:nvSpPr>
+          <p:cNvPr id="21" name="Rechteck 20"/>
+          <p:cNvSpPr/>
+          <p:nvPr/>
+        </p:nvSpPr>
+        <p:spPr>
+          <a:xfrm>
+            <a:off x="17175650" y="29923385"/>
+            <a:ext cx="12022492" cy="1107996"/>
+          </a:xfrm>
+          <a:prstGeom prst="rect">
+            <a:avLst/>
+          </a:prstGeom>
+        </p:spPr>
+        <p:txBody>
+          <a:bodyPr wrap="none">
+            <a:spAutoFit/>
+          </a:bodyPr>
+          <a:lstStyle/>
+          <a:p>
+            <a:pPr lvl="0">
+              <a:buSzPct val="25000"/>
+            </a:pPr>
+            <a:r>
+              <a:rPr lang="en-US" sz="6600" b="1" dirty="0">
+                <a:solidFill>
+                  <a:schemeClr val="dk1"/>
+                </a:solidFill>
+                <a:latin typeface="Arial"/>
+                <a:ea typeface="Calibri"/>
+                <a:cs typeface="Arial"/>
+                <a:sym typeface="Calibri"/>
+              </a:rPr>
+              <a:t>We have a growing user base</a:t>
+            </a:r>
+            <a:endParaRPr lang="en-US" sz="6600" b="1" dirty="0">
+              <a:solidFill>
+                <a:schemeClr val="dk1"/>
+              </a:solidFill>
+              <a:latin typeface="Arial"/>
+              <a:ea typeface="Calibri"/>
+              <a:cs typeface="Arial"/>
+              <a:sym typeface="Calibri"/>
+            </a:endParaRPr>
+          </a:p>
+        </p:txBody>
+      </p:sp>
+      <p:cxnSp>
+        <p:nvCxnSpPr>
+          <p:cNvPr id="23" name="Gerade Verbindung 22"/>
+          <p:cNvCxnSpPr/>
+          <p:nvPr/>
+        </p:nvCxnSpPr>
+        <p:spPr>
+          <a:xfrm flipV="1">
+            <a:off x="23825200" y="35128201"/>
+            <a:ext cx="337817" cy="1612899"/>
+          </a:xfrm>
+          <a:prstGeom prst="line">
+            <a:avLst/>
+          </a:prstGeom>
+          <a:ln w="57150" cmpd="sng">
+            <a:solidFill>
+              <a:schemeClr val="tx2"/>
+            </a:solidFill>
+          </a:ln>
+        </p:spPr>
+        <p:style>
+          <a:lnRef idx="2">
+            <a:schemeClr val="accent1"/>
+          </a:lnRef>
+          <a:fillRef idx="0">
+            <a:schemeClr val="accent1"/>
+          </a:fillRef>
+          <a:effectRef idx="1">
+            <a:schemeClr val="accent1"/>
+          </a:effectRef>
+          <a:fontRef idx="minor">
+            <a:schemeClr val="tx1"/>
+          </a:fontRef>
+        </p:style>
+      </p:cxnSp>
+      <p:cxnSp>
+        <p:nvCxnSpPr>
+          <p:cNvPr id="45" name="Gerade Verbindung 44"/>
+          <p:cNvCxnSpPr/>
+          <p:nvPr/>
+        </p:nvCxnSpPr>
+        <p:spPr>
+          <a:xfrm flipV="1">
+            <a:off x="25044400" y="32759534"/>
+            <a:ext cx="337817" cy="1612900"/>
+          </a:xfrm>
+          <a:prstGeom prst="line">
+            <a:avLst/>
+          </a:prstGeom>
+          <a:ln w="57150" cmpd="sng">
+            <a:solidFill>
+              <a:schemeClr val="tx2"/>
+            </a:solidFill>
+          </a:ln>
+        </p:spPr>
+        <p:style>
+          <a:lnRef idx="2">
+            <a:schemeClr val="accent1"/>
+          </a:lnRef>
+          <a:fillRef idx="0">
+            <a:schemeClr val="accent1"/>
+          </a:fillRef>
+          <a:effectRef idx="1">
+            <a:schemeClr val="accent1"/>
+          </a:effectRef>
+          <a:fontRef idx="minor">
+            <a:schemeClr val="tx1"/>
+          </a:fontRef>
+        </p:style>
+      </p:cxnSp>
+      <p:cxnSp>
+        <p:nvCxnSpPr>
+          <p:cNvPr id="51" name="Gerade Verbindung mit Pfeil 50"/>
+          <p:cNvCxnSpPr>
+            <a:stCxn id="46" idx="3"/>
+          </p:cNvCxnSpPr>
+          <p:nvPr/>
+        </p:nvCxnSpPr>
+        <p:spPr>
+          <a:xfrm>
+            <a:off x="24707850" y="33340826"/>
+            <a:ext cx="450850" cy="257202"/>
+          </a:xfrm>
+          <a:prstGeom prst="straightConnector1">
+            <a:avLst/>
+          </a:prstGeom>
+          <a:ln w="38100" cmpd="sng">
+            <a:solidFill>
+              <a:srgbClr val="1F497D"/>
+            </a:solidFill>
+            <a:tailEnd type="arrow"/>
+          </a:ln>
+        </p:spPr>
+        <p:style>
+          <a:lnRef idx="2">
+            <a:schemeClr val="accent1"/>
+          </a:lnRef>
+          <a:fillRef idx="0">
+            <a:schemeClr val="accent1"/>
+          </a:fillRef>
+          <a:effectRef idx="1">
+            <a:schemeClr val="accent1"/>
+          </a:effectRef>
+          <a:fontRef idx="minor">
+            <a:schemeClr val="tx1"/>
+          </a:fontRef>
+        </p:style>
+      </p:cxnSp>
+      <p:sp>
+        <p:nvSpPr>
+          <p:cNvPr id="46" name="Textfeld 45"/>
+          <p:cNvSpPr txBox="1"/>
+          <p:nvPr/>
+        </p:nvSpPr>
+        <p:spPr>
+          <a:xfrm>
+            <a:off x="22942550" y="32740662"/>
+            <a:ext cx="1765300" cy="1200328"/>
+          </a:xfrm>
+          <a:prstGeom prst="rect">
+            <a:avLst/>
+          </a:prstGeom>
+          <a:noFill/>
+          <a:ln w="19050" cmpd="sng">
+            <a:solidFill>
+              <a:srgbClr val="1F497D"/>
+            </a:solidFill>
+          </a:ln>
+        </p:spPr>
+        <p:txBody>
+          <a:bodyPr wrap="square" rtlCol="0">
+            <a:spAutoFit/>
+            <a:scene3d>
+              <a:camera prst="orthographicFront"/>
+              <a:lightRig rig="soft" dir="tl">
+                <a:rot lat="0" lon="0" rev="0"/>
+              </a:lightRig>
+            </a:scene3d>
+            <a:sp3d contourW="25400" prstMaterial="matte">
+              <a:bevelT w="25400" h="55880" prst="artDeco"/>
+              <a:contourClr>
+                <a:schemeClr val="accent2">
+                  <a:tint val="20000"/>
+                </a:schemeClr>
+              </a:contourClr>
+            </a:sp3d>
+          </a:bodyPr>
+          <a:lstStyle/>
+          <a:p>
+            <a:r>
+              <a:rPr lang="de-DE" sz="2400" b="1" spc="50" dirty="0" smtClean="0">
+                <a:ln w="11430"/>
+                <a:solidFill>
+                  <a:schemeClr val="tx2"/>
+                </a:solidFill>
+                <a:effectLst>
+                  <a:outerShdw blurRad="76200" dist="50800" dir="5400000" algn="tl" rotWithShape="0">
+                    <a:srgbClr val="000000">
+                      <a:alpha val="65000"/>
+                    </a:srgbClr>
+                  </a:outerShdw>
+                </a:effectLst>
+                <a:latin typeface="Arial"/>
+                <a:cs typeface="Arial"/>
+              </a:rPr>
+              <a:t>Second </a:t>
+            </a:r>
+          </a:p>
+          <a:p>
+            <a:r>
+              <a:rPr lang="de-DE" sz="2400" b="1" spc="50" dirty="0" err="1" smtClean="0">
+                <a:ln w="11430"/>
+                <a:solidFill>
+                  <a:schemeClr val="tx2"/>
+                </a:solidFill>
+                <a:effectLst>
+                  <a:outerShdw blurRad="76200" dist="50800" dir="5400000" algn="tl" rotWithShape="0">
+                    <a:srgbClr val="000000">
+                      <a:alpha val="65000"/>
+                    </a:srgbClr>
+                  </a:outerShdw>
+                </a:effectLst>
+                <a:latin typeface="Arial"/>
+                <a:cs typeface="Arial"/>
+              </a:rPr>
+              <a:t>Galaxy</a:t>
+            </a:r>
+            <a:endParaRPr lang="de-DE" sz="2400" b="1" spc="50" dirty="0" smtClean="0">
+              <a:ln w="11430"/>
+              <a:solidFill>
+                <a:schemeClr val="tx2"/>
+              </a:solidFill>
+              <a:effectLst>
+                <a:outerShdw blurRad="76200" dist="50800" dir="5400000" algn="tl" rotWithShape="0">
+                  <a:srgbClr val="000000">
+                    <a:alpha val="65000"/>
+                  </a:srgbClr>
+                </a:outerShdw>
+              </a:effectLst>
+              <a:latin typeface="Arial"/>
+              <a:cs typeface="Arial"/>
+            </a:endParaRPr>
+          </a:p>
+          <a:p>
+            <a:r>
+              <a:rPr lang="de-DE" sz="2400" b="1" spc="50" dirty="0" smtClean="0">
+                <a:ln w="11430"/>
+                <a:solidFill>
+                  <a:schemeClr val="tx2"/>
+                </a:solidFill>
+                <a:effectLst>
+                  <a:outerShdw blurRad="76200" dist="50800" dir="5400000" algn="tl" rotWithShape="0">
+                    <a:srgbClr val="000000">
+                      <a:alpha val="65000"/>
+                    </a:srgbClr>
+                  </a:outerShdw>
+                </a:effectLst>
+                <a:latin typeface="Arial"/>
+                <a:cs typeface="Arial"/>
+              </a:rPr>
+              <a:t>Workshop</a:t>
+            </a:r>
+            <a:endParaRPr lang="de-DE" sz="2400" b="1" spc="50" dirty="0">
+              <a:ln w="11430"/>
+              <a:solidFill>
+                <a:schemeClr val="tx2"/>
+              </a:solidFill>
+              <a:effectLst>
+                <a:outerShdw blurRad="76200" dist="50800" dir="5400000" algn="tl" rotWithShape="0">
+                  <a:srgbClr val="000000">
+                    <a:alpha val="65000"/>
+                  </a:srgbClr>
+                </a:outerShdw>
+              </a:effectLst>
+              <a:latin typeface="Arial"/>
+              <a:cs typeface="Arial"/>
+            </a:endParaRPr>
+          </a:p>
+        </p:txBody>
+      </p:sp>
+      <p:cxnSp>
+        <p:nvCxnSpPr>
+          <p:cNvPr id="56" name="Gerade Verbindung mit Pfeil 55"/>
+          <p:cNvCxnSpPr>
+            <a:stCxn id="57" idx="3"/>
+          </p:cNvCxnSpPr>
+          <p:nvPr/>
+        </p:nvCxnSpPr>
+        <p:spPr>
+          <a:xfrm>
+            <a:off x="23462280" y="35728365"/>
+            <a:ext cx="451820" cy="276135"/>
+          </a:xfrm>
+          <a:prstGeom prst="straightConnector1">
+            <a:avLst/>
+          </a:prstGeom>
+          <a:ln w="38100" cmpd="sng">
+            <a:solidFill>
+              <a:srgbClr val="1F497D"/>
+            </a:solidFill>
+            <a:tailEnd type="arrow"/>
+          </a:ln>
+        </p:spPr>
+        <p:style>
+          <a:lnRef idx="2">
+            <a:schemeClr val="accent1"/>
+          </a:lnRef>
+          <a:fillRef idx="0">
+            <a:schemeClr val="accent1"/>
+          </a:fillRef>
+          <a:effectRef idx="1">
+            <a:schemeClr val="accent1"/>
+          </a:effectRef>
+          <a:fontRef idx="minor">
+            <a:schemeClr val="tx1"/>
+          </a:fontRef>
+        </p:style>
+      </p:cxnSp>
+      <p:sp>
+        <p:nvSpPr>
+          <p:cNvPr id="57" name="Textfeld 56"/>
+          <p:cNvSpPr txBox="1"/>
+          <p:nvPr/>
+        </p:nvSpPr>
+        <p:spPr>
+          <a:xfrm>
+            <a:off x="21696980" y="35128201"/>
+            <a:ext cx="1765300" cy="1200328"/>
+          </a:xfrm>
+          <a:prstGeom prst="rect">
+            <a:avLst/>
+          </a:prstGeom>
+          <a:noFill/>
+          <a:ln w="19050" cmpd="sng">
+            <a:solidFill>
+              <a:srgbClr val="1F497D"/>
+            </a:solidFill>
+          </a:ln>
+        </p:spPr>
+        <p:txBody>
+          <a:bodyPr wrap="square" rtlCol="0">
+            <a:spAutoFit/>
+            <a:scene3d>
+              <a:camera prst="orthographicFront"/>
+              <a:lightRig rig="soft" dir="tl">
+                <a:rot lat="0" lon="0" rev="0"/>
+              </a:lightRig>
+            </a:scene3d>
+            <a:sp3d contourW="25400" prstMaterial="matte">
+              <a:bevelT w="25400" h="55880" prst="artDeco"/>
+              <a:contourClr>
+                <a:schemeClr val="accent2">
+                  <a:tint val="20000"/>
+                </a:schemeClr>
+              </a:contourClr>
+            </a:sp3d>
+          </a:bodyPr>
+          <a:lstStyle/>
+          <a:p>
+            <a:r>
+              <a:rPr lang="de-DE" sz="2400" b="1" spc="50" dirty="0" smtClean="0">
+                <a:ln w="11430"/>
+                <a:solidFill>
+                  <a:schemeClr val="tx2"/>
+                </a:solidFill>
+                <a:effectLst>
+                  <a:outerShdw blurRad="76200" dist="50800" dir="5400000" algn="tl" rotWithShape="0">
+                    <a:srgbClr val="000000">
+                      <a:alpha val="65000"/>
+                    </a:srgbClr>
+                  </a:outerShdw>
+                </a:effectLst>
+                <a:latin typeface="Arial"/>
+                <a:cs typeface="Arial"/>
+              </a:rPr>
+              <a:t>First</a:t>
+            </a:r>
+          </a:p>
+          <a:p>
+            <a:r>
+              <a:rPr lang="de-DE" sz="2400" b="1" spc="50" dirty="0" err="1" smtClean="0">
+                <a:ln w="11430"/>
+                <a:solidFill>
+                  <a:schemeClr val="tx2"/>
+                </a:solidFill>
+                <a:effectLst>
+                  <a:outerShdw blurRad="76200" dist="50800" dir="5400000" algn="tl" rotWithShape="0">
+                    <a:srgbClr val="000000">
+                      <a:alpha val="65000"/>
+                    </a:srgbClr>
+                  </a:outerShdw>
+                </a:effectLst>
+                <a:latin typeface="Arial"/>
+                <a:cs typeface="Arial"/>
+              </a:rPr>
+              <a:t>Galaxy</a:t>
+            </a:r>
+            <a:endParaRPr lang="de-DE" sz="2400" b="1" spc="50" dirty="0" smtClean="0">
+              <a:ln w="11430"/>
+              <a:solidFill>
+                <a:schemeClr val="tx2"/>
+              </a:solidFill>
+              <a:effectLst>
+                <a:outerShdw blurRad="76200" dist="50800" dir="5400000" algn="tl" rotWithShape="0">
+                  <a:srgbClr val="000000">
+                    <a:alpha val="65000"/>
+                  </a:srgbClr>
+                </a:outerShdw>
+              </a:effectLst>
+              <a:latin typeface="Arial"/>
+              <a:cs typeface="Arial"/>
+            </a:endParaRPr>
+          </a:p>
+          <a:p>
+            <a:r>
+              <a:rPr lang="de-DE" sz="2400" b="1" spc="50" dirty="0" smtClean="0">
+                <a:ln w="11430"/>
+                <a:solidFill>
+                  <a:schemeClr val="tx2"/>
+                </a:solidFill>
+                <a:effectLst>
+                  <a:outerShdw blurRad="76200" dist="50800" dir="5400000" algn="tl" rotWithShape="0">
+                    <a:srgbClr val="000000">
+                      <a:alpha val="65000"/>
+                    </a:srgbClr>
+                  </a:outerShdw>
+                </a:effectLst>
+                <a:latin typeface="Arial"/>
+                <a:cs typeface="Arial"/>
+              </a:rPr>
+              <a:t>Workshop</a:t>
+            </a:r>
+            <a:endParaRPr lang="de-DE" sz="2400" b="1" spc="50" dirty="0">
+              <a:ln w="11430"/>
+              <a:solidFill>
+                <a:schemeClr val="tx2"/>
+              </a:solidFill>
+              <a:effectLst>
+                <a:outerShdw blurRad="76200" dist="50800" dir="5400000" algn="tl" rotWithShape="0">
+                  <a:srgbClr val="000000">
+                    <a:alpha val="65000"/>
+                  </a:srgbClr>
+                </a:outerShdw>
+              </a:effectLst>
+              <a:latin typeface="Arial"/>
+              <a:cs typeface="Arial"/>
+            </a:endParaRPr>
+          </a:p>
+        </p:txBody>
+      </p:sp>
     </p:spTree>
     <p:extLst>
       <p:ext uri="{BB962C8B-B14F-4D97-AF65-F5344CB8AC3E}">

</xml_diff>

<commit_message>
updated poster: publications and services sections
</commit_message>
<xml_diff>
--- a/rbc_bimsb/sab-berlin-2016/poster/BIMSB_SAB2016_poster.pptx
+++ b/rbc_bimsb/sab-berlin-2016/poster/BIMSB_SAB2016_poster.pptx
@@ -3140,7 +3140,7 @@
         </p:blipFill>
         <p:spPr>
           <a:xfrm>
-            <a:off x="17420761" y="30978319"/>
+            <a:off x="17776739" y="31574059"/>
             <a:ext cx="12274722" cy="9638650"/>
           </a:xfrm>
           <a:prstGeom prst="rect">
@@ -3260,74 +3260,6 @@
       </p:pic>
       <p:sp>
         <p:nvSpPr>
-          <p:cNvPr id="14" name="Rechteck 13"/>
-          <p:cNvSpPr/>
-          <p:nvPr/>
-        </p:nvSpPr>
-        <p:spPr>
-          <a:xfrm>
-            <a:off x="-1" y="44276369"/>
-            <a:ext cx="30275213" cy="1800000"/>
-          </a:xfrm>
-          <a:prstGeom prst="rect">
-            <a:avLst/>
-          </a:prstGeom>
-          <a:blipFill dpi="0" rotWithShape="1">
-            <a:blip r:embed="rId5">
-              <a:extLst>
-                <a:ext uri="{28A0092B-C50C-407E-A947-70E740481C1C}">
-                  <a14:useLocalDpi xmlns:a14="http://schemas.microsoft.com/office/drawing/2010/main" val="0"/>
-                </a:ext>
-              </a:extLst>
-            </a:blip>
-            <a:srcRect/>
-            <a:stretch>
-              <a:fillRect/>
-            </a:stretch>
-          </a:blipFill>
-          <a:ln>
-            <a:noFill/>
-          </a:ln>
-        </p:spPr>
-        <p:style>
-          <a:lnRef idx="1">
-            <a:schemeClr val="accent1"/>
-          </a:lnRef>
-          <a:fillRef idx="3">
-            <a:schemeClr val="accent1"/>
-          </a:fillRef>
-          <a:effectRef idx="2">
-            <a:schemeClr val="accent1"/>
-          </a:effectRef>
-          <a:fontRef idx="minor">
-            <a:schemeClr val="lt1"/>
-          </a:fontRef>
-        </p:style>
-        <p:txBody>
-          <a:bodyPr rtlCol="0" anchor="ctr"/>
-          <a:lstStyle/>
-          <a:p>
-            <a:pPr algn="ctr"/>
-            <a:endParaRPr lang="en-US" dirty="0">
-              <a:blipFill dpi="0" rotWithShape="1">
-                <a:blip r:embed="rId5">
-                  <a:extLst>
-                    <a:ext uri="{28A0092B-C50C-407E-A947-70E740481C1C}">
-                      <a14:useLocalDpi xmlns:a14="http://schemas.microsoft.com/office/drawing/2010/main" val="0"/>
-                    </a:ext>
-                  </a:extLst>
-                </a:blip>
-                <a:srcRect/>
-                <a:stretch>
-                  <a:fillRect/>
-                </a:stretch>
-              </a:blipFill>
-            </a:endParaRPr>
-          </a:p>
-        </p:txBody>
-      </p:sp>
-      <p:sp>
-        <p:nvSpPr>
           <p:cNvPr id="24" name="Textfeld 23"/>
           <p:cNvSpPr txBox="1"/>
           <p:nvPr/>
@@ -3441,7 +3373,7 @@
           <p:nvPr/>
         </p:nvPicPr>
         <p:blipFill>
-          <a:blip r:embed="rId6">
+          <a:blip r:embed="rId5">
             <a:extLst>
               <a:ext uri="{28A0092B-C50C-407E-A947-70E740481C1C}">
                 <a14:useLocalDpi xmlns:a14="http://schemas.microsoft.com/office/drawing/2010/main" val="0"/>
@@ -3915,7 +3847,7 @@
           <p:nvPr/>
         </p:nvPicPr>
         <p:blipFill>
-          <a:blip r:embed="rId7">
+          <a:blip r:embed="rId6">
             <a:extLst>
               <a:ext uri="{28A0092B-C50C-407E-A947-70E740481C1C}">
                 <a14:useLocalDpi xmlns:a14="http://schemas.microsoft.com/office/drawing/2010/main" val="0"/>
@@ -4117,7 +4049,7 @@
         </p:nvSpPr>
         <p:spPr>
           <a:xfrm>
-            <a:off x="16904337" y="23116160"/>
+            <a:off x="16642550" y="25152859"/>
             <a:ext cx="12600000" cy="1015663"/>
           </a:xfrm>
           <a:prstGeom prst="rect">
@@ -4134,6 +4066,16 @@
           <a:lstStyle/>
           <a:p>
             <a:r>
+              <a:rPr lang="de-DE" sz="6000" b="1" dirty="0" err="1" smtClean="0">
+                <a:solidFill>
+                  <a:schemeClr val="bg1"/>
+                </a:solidFill>
+                <a:latin typeface="Arial" panose="020B0604020202020204" pitchFamily="34" charset="0"/>
+                <a:cs typeface="Arial" panose="020B0604020202020204" pitchFamily="34" charset="0"/>
+              </a:rPr>
+              <a:t>de.NBI</a:t>
+            </a:r>
+            <a:r>
               <a:rPr lang="de-DE" sz="6000" b="1" dirty="0" smtClean="0">
                 <a:solidFill>
                   <a:schemeClr val="bg1"/>
@@ -4141,7 +4083,7 @@
                 <a:latin typeface="Arial" panose="020B0604020202020204" pitchFamily="34" charset="0"/>
                 <a:cs typeface="Arial" panose="020B0604020202020204" pitchFamily="34" charset="0"/>
               </a:rPr>
-              <a:t>de. NBI </a:t>
+              <a:t> </a:t>
             </a:r>
             <a:r>
               <a:rPr lang="de-DE" sz="6000" b="1" dirty="0" err="1" smtClean="0">
@@ -4275,7 +4217,7 @@
         </p:nvSpPr>
         <p:spPr>
           <a:xfrm>
-            <a:off x="1214774" y="37367175"/>
+            <a:off x="1214774" y="37875006"/>
             <a:ext cx="12600000" cy="1015663"/>
           </a:xfrm>
           <a:prstGeom prst="rect">
@@ -5055,7 +4997,7 @@
               <a:rPr lang="de-DE" sz="4000" dirty="0">
                 <a:latin typeface="Arial" panose="020B0604020202020204" pitchFamily="34" charset="0"/>
                 <a:cs typeface="Arial" panose="020B0604020202020204" pitchFamily="34" charset="0"/>
-                <a:hlinkClick r:id="rId8"/>
+                <a:hlinkClick r:id="rId7"/>
               </a:rPr>
               <a:t>http://rcas.mdc-berlin.de</a:t>
             </a:r>
@@ -5063,7 +5005,7 @@
               <a:rPr lang="de-DE" sz="4000" dirty="0" smtClean="0">
                 <a:latin typeface="Arial" panose="020B0604020202020204" pitchFamily="34" charset="0"/>
                 <a:cs typeface="Arial" panose="020B0604020202020204" pitchFamily="34" charset="0"/>
-                <a:hlinkClick r:id="rId8"/>
+                <a:hlinkClick r:id="rId7"/>
               </a:rPr>
               <a:t>/</a:t>
             </a:r>
@@ -5383,8 +5325,8 @@
         </p:nvSpPr>
         <p:spPr>
           <a:xfrm>
-            <a:off x="1153544" y="38483743"/>
-            <a:ext cx="11955053" cy="3323987"/>
+            <a:off x="1109136" y="39059788"/>
+            <a:ext cx="15489006" cy="1938992"/>
           </a:xfrm>
           <a:prstGeom prst="rect">
             <a:avLst/>
@@ -5398,69 +5340,223 @@
           <a:lstStyle/>
           <a:p>
             <a:r>
-              <a:rPr lang="de-DE" sz="4800" dirty="0" smtClean="0">
-                <a:latin typeface="Arial" panose="020B0604020202020204" pitchFamily="34" charset="0"/>
-                <a:cs typeface="Arial" panose="020B0604020202020204" pitchFamily="34" charset="0"/>
-              </a:rPr>
-              <a:t>RCAS - </a:t>
-            </a:r>
-            <a:r>
-              <a:rPr lang="de-DE" sz="4800" dirty="0" err="1" smtClean="0">
-                <a:latin typeface="Arial" panose="020B0604020202020204" pitchFamily="34" charset="0"/>
-                <a:cs typeface="Arial" panose="020B0604020202020204" pitchFamily="34" charset="0"/>
-              </a:rPr>
-              <a:t>manuscript</a:t>
-            </a:r>
-            <a:r>
-              <a:rPr lang="de-DE" sz="4800" dirty="0" smtClean="0">
+              <a:rPr lang="de-DE" sz="4000" dirty="0">
+                <a:latin typeface="Arial" panose="020B0604020202020204" pitchFamily="34" charset="0"/>
+                <a:cs typeface="Arial" panose="020B0604020202020204" pitchFamily="34" charset="0"/>
+              </a:rPr>
+              <a:t>Uyar B, Yusuf D, </a:t>
+            </a:r>
+            <a:r>
+              <a:rPr lang="de-DE" sz="4000" dirty="0" err="1">
+                <a:latin typeface="Arial" panose="020B0604020202020204" pitchFamily="34" charset="0"/>
+                <a:cs typeface="Arial" panose="020B0604020202020204" pitchFamily="34" charset="0"/>
+              </a:rPr>
+              <a:t>Wurmus</a:t>
+            </a:r>
+            <a:r>
+              <a:rPr lang="de-DE" sz="4000" dirty="0">
+                <a:latin typeface="Arial" panose="020B0604020202020204" pitchFamily="34" charset="0"/>
+                <a:cs typeface="Arial" panose="020B0604020202020204" pitchFamily="34" charset="0"/>
+              </a:rPr>
+              <a:t> R, </a:t>
+            </a:r>
+            <a:r>
+              <a:rPr lang="de-DE" sz="4000" dirty="0" err="1">
+                <a:latin typeface="Arial" panose="020B0604020202020204" pitchFamily="34" charset="0"/>
+                <a:cs typeface="Arial" panose="020B0604020202020204" pitchFamily="34" charset="0"/>
+              </a:rPr>
+              <a:t>Rajewsky</a:t>
+            </a:r>
+            <a:r>
+              <a:rPr lang="de-DE" sz="4000" dirty="0">
+                <a:latin typeface="Arial" panose="020B0604020202020204" pitchFamily="34" charset="0"/>
+                <a:cs typeface="Arial" panose="020B0604020202020204" pitchFamily="34" charset="0"/>
+              </a:rPr>
+              <a:t> N, </a:t>
+            </a:r>
+            <a:r>
+              <a:rPr lang="de-DE" sz="4000" dirty="0" err="1">
+                <a:latin typeface="Arial" panose="020B0604020202020204" pitchFamily="34" charset="0"/>
+                <a:cs typeface="Arial" panose="020B0604020202020204" pitchFamily="34" charset="0"/>
+              </a:rPr>
+              <a:t>Ohler</a:t>
+            </a:r>
+            <a:r>
+              <a:rPr lang="de-DE" sz="4000" dirty="0">
+                <a:latin typeface="Arial" panose="020B0604020202020204" pitchFamily="34" charset="0"/>
+                <a:cs typeface="Arial" panose="020B0604020202020204" pitchFamily="34" charset="0"/>
+              </a:rPr>
+              <a:t> U, </a:t>
+            </a:r>
+            <a:r>
+              <a:rPr lang="de-DE" sz="4000" dirty="0" err="1">
+                <a:latin typeface="Arial" panose="020B0604020202020204" pitchFamily="34" charset="0"/>
+                <a:cs typeface="Arial" panose="020B0604020202020204" pitchFamily="34" charset="0"/>
+              </a:rPr>
+              <a:t>Akalin</a:t>
+            </a:r>
+            <a:r>
+              <a:rPr lang="de-DE" sz="4000" dirty="0">
+                <a:latin typeface="Arial" panose="020B0604020202020204" pitchFamily="34" charset="0"/>
+                <a:cs typeface="Arial" panose="020B0604020202020204" pitchFamily="34" charset="0"/>
+              </a:rPr>
+              <a:t> A. </a:t>
+            </a:r>
+            <a:r>
+              <a:rPr lang="de-DE" sz="4000" i="1" dirty="0">
+                <a:latin typeface="Arial" panose="020B0604020202020204" pitchFamily="34" charset="0"/>
+                <a:cs typeface="Arial" panose="020B0604020202020204" pitchFamily="34" charset="0"/>
+              </a:rPr>
+              <a:t>RCAS: an RNA </a:t>
+            </a:r>
+            <a:r>
+              <a:rPr lang="de-DE" sz="4000" i="1" dirty="0" err="1">
+                <a:latin typeface="Arial" panose="020B0604020202020204" pitchFamily="34" charset="0"/>
+                <a:cs typeface="Arial" panose="020B0604020202020204" pitchFamily="34" charset="0"/>
+              </a:rPr>
+              <a:t>Centric</a:t>
+            </a:r>
+            <a:r>
+              <a:rPr lang="de-DE" sz="4000" i="1" dirty="0">
+                <a:latin typeface="Arial" panose="020B0604020202020204" pitchFamily="34" charset="0"/>
+                <a:cs typeface="Arial" panose="020B0604020202020204" pitchFamily="34" charset="0"/>
+              </a:rPr>
+              <a:t> Annotation System </a:t>
+            </a:r>
+            <a:r>
+              <a:rPr lang="de-DE" sz="4000" i="1" dirty="0" err="1">
+                <a:latin typeface="Arial" panose="020B0604020202020204" pitchFamily="34" charset="0"/>
+                <a:cs typeface="Arial" panose="020B0604020202020204" pitchFamily="34" charset="0"/>
+              </a:rPr>
+              <a:t>for</a:t>
+            </a:r>
+            <a:r>
+              <a:rPr lang="de-DE" sz="4000" i="1" dirty="0">
                 <a:latin typeface="Arial" panose="020B0604020202020204" pitchFamily="34" charset="0"/>
                 <a:cs typeface="Arial" panose="020B0604020202020204" pitchFamily="34" charset="0"/>
               </a:rPr>
               <a:t> </a:t>
             </a:r>
             <a:r>
-              <a:rPr lang="de-DE" sz="4800" dirty="0" err="1" smtClean="0">
-                <a:latin typeface="Arial" panose="020B0604020202020204" pitchFamily="34" charset="0"/>
-                <a:cs typeface="Arial" panose="020B0604020202020204" pitchFamily="34" charset="0"/>
-              </a:rPr>
-              <a:t>submitted</a:t>
-            </a:r>
-            <a:endParaRPr lang="de-DE" sz="4800" dirty="0" smtClean="0">
-              <a:latin typeface="Arial" panose="020B0604020202020204" pitchFamily="34" charset="0"/>
-              <a:cs typeface="Arial" panose="020B0604020202020204" pitchFamily="34" charset="0"/>
-            </a:endParaRPr>
-          </a:p>
-          <a:p>
-            <a:r>
-              <a:rPr lang="de-DE" sz="4800" dirty="0" err="1" smtClean="0">
-                <a:latin typeface="Arial" panose="020B0604020202020204" pitchFamily="34" charset="0"/>
-                <a:cs typeface="Arial" panose="020B0604020202020204" pitchFamily="34" charset="0"/>
-              </a:rPr>
-              <a:t>doRiNA</a:t>
-            </a:r>
-            <a:r>
-              <a:rPr lang="de-DE" sz="4800" dirty="0" smtClean="0">
+              <a:rPr lang="de-DE" sz="4000" i="1" dirty="0" err="1">
+                <a:latin typeface="Arial" panose="020B0604020202020204" pitchFamily="34" charset="0"/>
+                <a:cs typeface="Arial" panose="020B0604020202020204" pitchFamily="34" charset="0"/>
+              </a:rPr>
+              <a:t>Transcriptome-wide</a:t>
+            </a:r>
+            <a:r>
+              <a:rPr lang="de-DE" sz="4000" i="1" dirty="0">
                 <a:latin typeface="Arial" panose="020B0604020202020204" pitchFamily="34" charset="0"/>
                 <a:cs typeface="Arial" panose="020B0604020202020204" pitchFamily="34" charset="0"/>
               </a:rPr>
               <a:t> </a:t>
             </a:r>
-          </a:p>
-          <a:p>
-            <a:r>
-              <a:rPr lang="de-DE" sz="4800" dirty="0" err="1" smtClean="0">
-                <a:latin typeface="Arial" panose="020B0604020202020204" pitchFamily="34" charset="0"/>
-                <a:cs typeface="Arial" panose="020B0604020202020204" pitchFamily="34" charset="0"/>
-              </a:rPr>
-              <a:t>RiboTaper</a:t>
-            </a:r>
-            <a:endParaRPr lang="de-DE" sz="4800" dirty="0" smtClean="0">
-              <a:latin typeface="Arial" panose="020B0604020202020204" pitchFamily="34" charset="0"/>
-              <a:cs typeface="Arial" panose="020B0604020202020204" pitchFamily="34" charset="0"/>
-            </a:endParaRPr>
-          </a:p>
-          <a:p>
-            <a:endParaRPr lang="de-DE" sz="6600" dirty="0">
+            <a:r>
+              <a:rPr lang="de-DE" sz="4000" i="1" dirty="0" err="1">
+                <a:latin typeface="Arial" panose="020B0604020202020204" pitchFamily="34" charset="0"/>
+                <a:cs typeface="Arial" panose="020B0604020202020204" pitchFamily="34" charset="0"/>
+              </a:rPr>
+              <a:t>Regions</a:t>
+            </a:r>
+            <a:r>
+              <a:rPr lang="de-DE" sz="4000" i="1" dirty="0">
+                <a:latin typeface="Arial" panose="020B0604020202020204" pitchFamily="34" charset="0"/>
+                <a:cs typeface="Arial" panose="020B0604020202020204" pitchFamily="34" charset="0"/>
+              </a:rPr>
+              <a:t> </a:t>
+            </a:r>
+            <a:r>
+              <a:rPr lang="de-DE" sz="4000" i="1" dirty="0" err="1">
+                <a:latin typeface="Arial" panose="020B0604020202020204" pitchFamily="34" charset="0"/>
+                <a:cs typeface="Arial" panose="020B0604020202020204" pitchFamily="34" charset="0"/>
+              </a:rPr>
+              <a:t>of</a:t>
+            </a:r>
+            <a:r>
+              <a:rPr lang="de-DE" sz="4000" i="1" dirty="0">
+                <a:latin typeface="Arial" panose="020B0604020202020204" pitchFamily="34" charset="0"/>
+                <a:cs typeface="Arial" panose="020B0604020202020204" pitchFamily="34" charset="0"/>
+              </a:rPr>
+              <a:t> Interest.</a:t>
+            </a:r>
+            <a:r>
+              <a:rPr lang="de-DE" sz="4000" dirty="0">
+                <a:latin typeface="Arial" panose="020B0604020202020204" pitchFamily="34" charset="0"/>
+                <a:cs typeface="Arial" panose="020B0604020202020204" pitchFamily="34" charset="0"/>
+              </a:rPr>
+              <a:t> </a:t>
+            </a:r>
+            <a:r>
+              <a:rPr lang="de-DE" sz="4000" dirty="0" smtClean="0">
+                <a:latin typeface="Arial" panose="020B0604020202020204" pitchFamily="34" charset="0"/>
+                <a:cs typeface="Arial" panose="020B0604020202020204" pitchFamily="34" charset="0"/>
+              </a:rPr>
+              <a:t>(</a:t>
+            </a:r>
+            <a:r>
+              <a:rPr lang="de-DE" sz="4000" dirty="0" err="1" smtClean="0">
+                <a:latin typeface="Arial" panose="020B0604020202020204" pitchFamily="34" charset="0"/>
+                <a:cs typeface="Arial" panose="020B0604020202020204" pitchFamily="34" charset="0"/>
+              </a:rPr>
+              <a:t>Submitted</a:t>
+            </a:r>
+            <a:r>
+              <a:rPr lang="de-DE" sz="4000" dirty="0" smtClean="0">
+                <a:latin typeface="Arial" panose="020B0604020202020204" pitchFamily="34" charset="0"/>
+                <a:cs typeface="Arial" panose="020B0604020202020204" pitchFamily="34" charset="0"/>
+              </a:rPr>
+              <a:t> </a:t>
+            </a:r>
+            <a:r>
+              <a:rPr lang="de-DE" sz="4000" dirty="0" err="1" smtClean="0">
+                <a:latin typeface="Arial" panose="020B0604020202020204" pitchFamily="34" charset="0"/>
+                <a:cs typeface="Arial" panose="020B0604020202020204" pitchFamily="34" charset="0"/>
+              </a:rPr>
+              <a:t>to</a:t>
+            </a:r>
+            <a:r>
+              <a:rPr lang="de-DE" sz="4000" dirty="0" smtClean="0">
+                <a:latin typeface="Arial" panose="020B0604020202020204" pitchFamily="34" charset="0"/>
+                <a:cs typeface="Arial" panose="020B0604020202020204" pitchFamily="34" charset="0"/>
+              </a:rPr>
+              <a:t> </a:t>
+            </a:r>
+            <a:r>
+              <a:rPr lang="de-DE" sz="4000" dirty="0" err="1" smtClean="0">
+                <a:latin typeface="Arial" panose="020B0604020202020204" pitchFamily="34" charset="0"/>
+                <a:cs typeface="Arial" panose="020B0604020202020204" pitchFamily="34" charset="0"/>
+              </a:rPr>
+              <a:t>Nucleic</a:t>
+            </a:r>
+            <a:r>
+              <a:rPr lang="de-DE" sz="4000" dirty="0" smtClean="0">
+                <a:latin typeface="Arial" panose="020B0604020202020204" pitchFamily="34" charset="0"/>
+                <a:cs typeface="Arial" panose="020B0604020202020204" pitchFamily="34" charset="0"/>
+              </a:rPr>
+              <a:t> </a:t>
+            </a:r>
+            <a:r>
+              <a:rPr lang="de-DE" sz="4000" dirty="0" err="1">
+                <a:latin typeface="Arial" panose="020B0604020202020204" pitchFamily="34" charset="0"/>
+                <a:cs typeface="Arial" panose="020B0604020202020204" pitchFamily="34" charset="0"/>
+              </a:rPr>
+              <a:t>Acids</a:t>
+            </a:r>
+            <a:r>
+              <a:rPr lang="de-DE" sz="4000" dirty="0">
+                <a:latin typeface="Arial" panose="020B0604020202020204" pitchFamily="34" charset="0"/>
+                <a:cs typeface="Arial" panose="020B0604020202020204" pitchFamily="34" charset="0"/>
+              </a:rPr>
+              <a:t> </a:t>
+            </a:r>
+            <a:r>
+              <a:rPr lang="de-DE" sz="4000" dirty="0" smtClean="0">
+                <a:latin typeface="Arial" panose="020B0604020202020204" pitchFamily="34" charset="0"/>
+                <a:cs typeface="Arial" panose="020B0604020202020204" pitchFamily="34" charset="0"/>
+              </a:rPr>
+              <a:t>Research)</a:t>
+            </a:r>
+            <a:endParaRPr lang="de-DE" sz="4000" dirty="0">
               <a:latin typeface="Arial" panose="020B0604020202020204" pitchFamily="34" charset="0"/>
               <a:cs typeface="Arial" panose="020B0604020202020204" pitchFamily="34" charset="0"/>
             </a:endParaRPr>
@@ -5476,11 +5572,11 @@
           <p:nvPr/>
         </p:nvPicPr>
         <p:blipFill>
-          <a:blip r:embed="rId9">
+          <a:blip r:embed="rId8">
             <a:extLst>
               <a:ext uri="{BEBA8EAE-BF5A-486C-A8C5-ECC9F3942E4B}">
                 <a14:imgProps xmlns:a14="http://schemas.microsoft.com/office/drawing/2010/main">
-                  <a14:imgLayer r:embed="rId10">
+                  <a14:imgLayer r:embed="rId9">
                     <a14:imgEffect>
                       <a14:brightnessContrast contrast="-2000"/>
                     </a14:imgEffect>
@@ -5689,7 +5785,7 @@
           <p:nvPr/>
         </p:nvPicPr>
         <p:blipFill>
-          <a:blip r:embed="rId11">
+          <a:blip r:embed="rId10">
             <a:extLst>
               <a:ext uri="{28A0092B-C50C-407E-A947-70E740481C1C}">
                 <a14:useLocalDpi xmlns:a14="http://schemas.microsoft.com/office/drawing/2010/main" val="0"/>
@@ -5719,7 +5815,7 @@
           <p:nvPr/>
         </p:nvPicPr>
         <p:blipFill>
-          <a:blip r:embed="rId12">
+          <a:blip r:embed="rId11">
             <a:extLst>
               <a:ext uri="{28A0092B-C50C-407E-A947-70E740481C1C}">
                 <a14:useLocalDpi xmlns:a14="http://schemas.microsoft.com/office/drawing/2010/main" val="0"/>
@@ -5748,8 +5844,8 @@
         </p:nvSpPr>
         <p:spPr>
           <a:xfrm>
-            <a:off x="16598141" y="11547066"/>
-            <a:ext cx="11343323" cy="1565927"/>
+            <a:off x="16642550" y="11381040"/>
+            <a:ext cx="9719342" cy="3188069"/>
           </a:xfrm>
           <a:prstGeom prst="rect">
             <a:avLst/>
@@ -5773,7 +5869,7 @@
               <a:buNone/>
             </a:pPr>
             <a:r>
-              <a:rPr lang="en-US" sz="6600" b="1" dirty="0" smtClean="0">
+              <a:rPr lang="en-US" sz="4800" b="1" dirty="0" smtClean="0">
                 <a:solidFill>
                   <a:schemeClr val="dk1"/>
                 </a:solidFill>
@@ -5784,7 +5880,82 @@
               </a:rPr>
               <a:t>Local Galaxy Server</a:t>
             </a:r>
-            <a:endParaRPr lang="en-US" sz="6600" b="1" dirty="0">
+          </a:p>
+          <a:p>
+            <a:pPr marL="685800" indent="-685800">
+              <a:buSzPct val="25000"/>
+              <a:buFont typeface="Wingdings" charset="2"/>
+              <a:buChar char="u"/>
+            </a:pPr>
+            <a:r>
+              <a:rPr lang="en-US" sz="4800" dirty="0">
+                <a:solidFill>
+                  <a:schemeClr val="dk1"/>
+                </a:solidFill>
+                <a:latin typeface="Arial"/>
+                <a:ea typeface="Calibri"/>
+                <a:cs typeface="Arial"/>
+                <a:sym typeface="Calibri"/>
+              </a:rPr>
+              <a:t>User </a:t>
+            </a:r>
+            <a:r>
+              <a:rPr lang="en-US" sz="4800" dirty="0" smtClean="0">
+                <a:solidFill>
+                  <a:schemeClr val="dk1"/>
+                </a:solidFill>
+                <a:latin typeface="Arial"/>
+                <a:ea typeface="Calibri"/>
+                <a:cs typeface="Arial"/>
+                <a:sym typeface="Calibri"/>
+              </a:rPr>
+              <a:t>support</a:t>
+            </a:r>
+          </a:p>
+          <a:p>
+            <a:pPr marL="685800" marR="0" lvl="0" indent="-685800" algn="l" rtl="0">
+              <a:spcBef>
+                <a:spcPts val="0"/>
+              </a:spcBef>
+              <a:buSzPct val="25000"/>
+              <a:buFont typeface="Wingdings" charset="2"/>
+              <a:buChar char="u"/>
+            </a:pPr>
+            <a:r>
+              <a:rPr lang="en-US" sz="4800" dirty="0" smtClean="0">
+                <a:solidFill>
+                  <a:schemeClr val="dk1"/>
+                </a:solidFill>
+                <a:latin typeface="Arial"/>
+                <a:ea typeface="Calibri"/>
+                <a:cs typeface="Arial"/>
+                <a:sym typeface="Calibri"/>
+              </a:rPr>
+              <a:t>Tool/workflow development</a:t>
+            </a:r>
+          </a:p>
+          <a:p>
+            <a:pPr marL="685800" marR="0" lvl="0" indent="-685800" algn="l" rtl="0">
+              <a:spcBef>
+                <a:spcPts val="0"/>
+              </a:spcBef>
+              <a:buSzPct val="25000"/>
+              <a:buFont typeface="Wingdings" charset="2"/>
+              <a:buChar char="u"/>
+            </a:pPr>
+            <a:r>
+              <a:rPr lang="en-US" sz="4800" dirty="0" smtClean="0">
+                <a:solidFill>
+                  <a:schemeClr val="dk1"/>
+                </a:solidFill>
+                <a:latin typeface="Arial"/>
+                <a:ea typeface="Calibri"/>
+                <a:cs typeface="Arial"/>
+                <a:sym typeface="Calibri"/>
+              </a:rPr>
+              <a:t>Server Maintenance </a:t>
+            </a:r>
+            <a:endParaRPr lang="en-US" sz="4800" dirty="0">
               <a:solidFill>
                 <a:schemeClr val="dk1"/>
               </a:solidFill>
@@ -5796,36 +5967,6 @@
           </a:p>
         </p:txBody>
       </p:sp>
-      <p:pic>
-        <p:nvPicPr>
-          <p:cNvPr id="17" name="Bild 16" descr="galaxyLogo360.png"/>
-          <p:cNvPicPr>
-            <a:picLocks noChangeAspect="1"/>
-          </p:cNvPicPr>
-          <p:nvPr/>
-        </p:nvPicPr>
-        <p:blipFill>
-          <a:blip r:embed="rId13">
-            <a:extLst>
-              <a:ext uri="{28A0092B-C50C-407E-A947-70E740481C1C}">
-                <a14:useLocalDpi xmlns:a14="http://schemas.microsoft.com/office/drawing/2010/main" val="0"/>
-              </a:ext>
-            </a:extLst>
-          </a:blip>
-          <a:stretch>
-            <a:fillRect/>
-          </a:stretch>
-        </p:blipFill>
-        <p:spPr>
-          <a:xfrm>
-            <a:off x="24932337" y="11547066"/>
-            <a:ext cx="4572000" cy="1270000"/>
-          </a:xfrm>
-          <a:prstGeom prst="rect">
-            <a:avLst/>
-          </a:prstGeom>
-        </p:spPr>
-      </p:pic>
       <p:pic>
         <p:nvPicPr>
           <p:cNvPr id="38" name="Shape 113" descr="20160817_152109.jpg"/>
@@ -5835,7 +5976,7 @@
           <p:nvPr/>
         </p:nvPicPr>
         <p:blipFill>
-          <a:blip r:embed="rId14">
+          <a:blip r:embed="rId12">
             <a:alphaModFix/>
           </a:blip>
           <a:stretch>
@@ -5844,7 +5985,7 @@
         </p:blipFill>
         <p:spPr>
           <a:xfrm>
-            <a:off x="23682452" y="24771007"/>
+            <a:off x="23739908" y="26260632"/>
             <a:ext cx="6003505" cy="4376033"/>
           </a:xfrm>
           <a:prstGeom prst="rect">
@@ -5864,7 +6005,7 @@
         </p:nvSpPr>
         <p:spPr>
           <a:xfrm>
-            <a:off x="16904337" y="25025012"/>
+            <a:off x="16992280" y="26324866"/>
             <a:ext cx="6245574" cy="3785652"/>
           </a:xfrm>
           <a:prstGeom prst="rect">
@@ -6034,15 +6175,15 @@
         </p:nvSpPr>
         <p:spPr>
           <a:xfrm>
-            <a:off x="17175650" y="29923385"/>
-            <a:ext cx="12022492" cy="1107996"/>
+            <a:off x="16912498" y="30769676"/>
+            <a:ext cx="13099563" cy="830997"/>
           </a:xfrm>
           <a:prstGeom prst="rect">
             <a:avLst/>
           </a:prstGeom>
         </p:spPr>
         <p:txBody>
-          <a:bodyPr wrap="none">
+          <a:bodyPr wrap="square">
             <a:spAutoFit/>
           </a:bodyPr>
           <a:lstStyle/>
@@ -6051,7 +6192,7 @@
               <a:buSzPct val="25000"/>
             </a:pPr>
             <a:r>
-              <a:rPr lang="en-US" sz="6600" b="1" dirty="0">
+              <a:rPr lang="en-US" sz="4800" dirty="0">
                 <a:solidFill>
                   <a:schemeClr val="dk1"/>
                 </a:solidFill>
@@ -6060,9 +6201,57 @@
                 <a:cs typeface="Arial"/>
                 <a:sym typeface="Calibri"/>
               </a:rPr>
-              <a:t>We have a growing user base</a:t>
-            </a:r>
-            <a:endParaRPr lang="en-US" sz="6600" b="1" dirty="0">
+              <a:t>We have a </a:t>
+            </a:r>
+            <a:r>
+              <a:rPr lang="en-US" sz="4800" b="1" dirty="0">
+                <a:solidFill>
+                  <a:schemeClr val="dk1"/>
+                </a:solidFill>
+                <a:latin typeface="Arial"/>
+                <a:ea typeface="Calibri"/>
+                <a:cs typeface="Arial"/>
+                <a:sym typeface="Calibri"/>
+              </a:rPr>
+              <a:t>growing</a:t>
+            </a:r>
+            <a:r>
+              <a:rPr lang="en-US" sz="4800" dirty="0">
+                <a:solidFill>
+                  <a:schemeClr val="dk1"/>
+                </a:solidFill>
+                <a:latin typeface="Arial"/>
+                <a:ea typeface="Calibri"/>
+                <a:cs typeface="Arial"/>
+                <a:sym typeface="Calibri"/>
+              </a:rPr>
+              <a:t> </a:t>
+            </a:r>
+            <a:r>
+              <a:rPr lang="en-US" sz="4800" dirty="0" smtClean="0">
+                <a:solidFill>
+                  <a:schemeClr val="dk1"/>
+                </a:solidFill>
+                <a:latin typeface="Arial"/>
+                <a:ea typeface="Calibri"/>
+                <a:cs typeface="Arial"/>
+                <a:sym typeface="Calibri"/>
+              </a:rPr>
+              <a:t>number of </a:t>
+            </a:r>
+            <a:r>
+              <a:rPr lang="en-US" sz="4800" b="1" dirty="0" smtClean="0">
+                <a:solidFill>
+                  <a:schemeClr val="dk1"/>
+                </a:solidFill>
+                <a:latin typeface="Arial"/>
+                <a:ea typeface="Calibri"/>
+                <a:cs typeface="Arial"/>
+                <a:sym typeface="Calibri"/>
+              </a:rPr>
+              <a:t>Galaxy users</a:t>
+            </a:r>
+            <a:endParaRPr lang="en-US" sz="4800" b="1" dirty="0">
               <a:solidFill>
                 <a:schemeClr val="dk1"/>
               </a:solidFill>
@@ -6484,6 +6673,564 @@
           </a:p>
         </p:txBody>
       </p:sp>
+      <p:pic>
+        <p:nvPicPr>
+          <p:cNvPr id="76" name="Bild 75" descr="galaxyLogo360.png"/>
+          <p:cNvPicPr>
+            <a:picLocks noChangeAspect="1"/>
+          </p:cNvPicPr>
+          <p:nvPr/>
+        </p:nvPicPr>
+        <p:blipFill>
+          <a:blip r:embed="rId13">
+            <a:extLst>
+              <a:ext uri="{28A0092B-C50C-407E-A947-70E740481C1C}">
+                <a14:useLocalDpi xmlns:a14="http://schemas.microsoft.com/office/drawing/2010/main" val="0"/>
+              </a:ext>
+            </a:extLst>
+          </a:blip>
+          <a:stretch>
+            <a:fillRect/>
+          </a:stretch>
+        </p:blipFill>
+        <p:spPr>
+          <a:xfrm>
+            <a:off x="25709243" y="12308812"/>
+            <a:ext cx="3624568" cy="1006825"/>
+          </a:xfrm>
+          <a:prstGeom prst="rect">
+            <a:avLst/>
+          </a:prstGeom>
+        </p:spPr>
+      </p:pic>
+      <p:sp>
+        <p:nvSpPr>
+          <p:cNvPr id="77" name="Shape 101"/>
+          <p:cNvSpPr txBox="1"/>
+          <p:nvPr/>
+        </p:nvSpPr>
+        <p:spPr>
+          <a:xfrm>
+            <a:off x="16602791" y="14569109"/>
+            <a:ext cx="13612530" cy="8633148"/>
+          </a:xfrm>
+          <a:prstGeom prst="rect">
+            <a:avLst/>
+          </a:prstGeom>
+          <a:noFill/>
+          <a:ln>
+            <a:noFill/>
+          </a:ln>
+        </p:spPr>
+        <p:txBody>
+          <a:bodyPr lIns="91425" tIns="45700" rIns="91425" bIns="45700" anchor="t" anchorCtr="0">
+            <a:noAutofit/>
+          </a:bodyPr>
+          <a:lstStyle/>
+          <a:p>
+            <a:pPr>
+              <a:lnSpc>
+                <a:spcPct val="120000"/>
+              </a:lnSpc>
+              <a:buSzPct val="25000"/>
+            </a:pPr>
+            <a:r>
+              <a:rPr lang="en-US" sz="4800" b="1" dirty="0" smtClean="0">
+                <a:solidFill>
+                  <a:schemeClr val="dk1"/>
+                </a:solidFill>
+                <a:latin typeface="Arial"/>
+                <a:ea typeface="Calibri"/>
+                <a:cs typeface="Arial"/>
+                <a:sym typeface="Calibri"/>
+              </a:rPr>
+              <a:t>Tools and Databases </a:t>
+            </a:r>
+          </a:p>
+          <a:p>
+            <a:pPr marL="685800" indent="-685800">
+              <a:lnSpc>
+                <a:spcPct val="120000"/>
+              </a:lnSpc>
+              <a:buSzPct val="25000"/>
+              <a:buFont typeface="Wingdings" charset="2"/>
+              <a:buChar char="u"/>
+            </a:pPr>
+            <a:r>
+              <a:rPr lang="en-US" sz="4800" b="1" dirty="0" smtClean="0">
+                <a:solidFill>
+                  <a:schemeClr val="dk1"/>
+                </a:solidFill>
+                <a:latin typeface="Arial"/>
+                <a:ea typeface="Calibri"/>
+                <a:cs typeface="Arial"/>
+                <a:sym typeface="Calibri"/>
+              </a:rPr>
+              <a:t>RCAS: </a:t>
+            </a:r>
+            <a:r>
+              <a:rPr lang="en-US" sz="4800" dirty="0" smtClean="0">
+                <a:solidFill>
+                  <a:schemeClr val="dk1"/>
+                </a:solidFill>
+                <a:latin typeface="Arial"/>
+                <a:ea typeface="Calibri"/>
+                <a:cs typeface="Arial"/>
+                <a:sym typeface="Calibri"/>
+              </a:rPr>
+              <a:t>RNA</a:t>
+            </a:r>
+            <a:r>
+              <a:rPr lang="en-US" sz="4800" dirty="0">
+                <a:solidFill>
+                  <a:schemeClr val="dk1"/>
+                </a:solidFill>
+                <a:latin typeface="Arial"/>
+                <a:ea typeface="Calibri"/>
+                <a:cs typeface="Arial"/>
+                <a:sym typeface="Calibri"/>
+              </a:rPr>
+              <a:t>-centric annotation </a:t>
+            </a:r>
+            <a:r>
+              <a:rPr lang="en-US" sz="4800" dirty="0" smtClean="0">
+                <a:solidFill>
+                  <a:schemeClr val="dk1"/>
+                </a:solidFill>
+                <a:latin typeface="Arial"/>
+                <a:ea typeface="Calibri"/>
+                <a:cs typeface="Arial"/>
+                <a:sym typeface="Calibri"/>
+              </a:rPr>
+              <a:t>system</a:t>
+            </a:r>
+          </a:p>
+          <a:p>
+            <a:pPr marL="685800" lvl="0" indent="-685800">
+              <a:lnSpc>
+                <a:spcPct val="120000"/>
+              </a:lnSpc>
+              <a:buSzPct val="25000"/>
+              <a:buFont typeface="Wingdings" charset="2"/>
+              <a:buChar char="u"/>
+            </a:pPr>
+            <a:r>
+              <a:rPr lang="en-US" sz="4800" b="1" dirty="0" err="1" smtClean="0">
+                <a:solidFill>
+                  <a:schemeClr val="dk1"/>
+                </a:solidFill>
+                <a:latin typeface="Arial"/>
+                <a:ea typeface="Calibri"/>
+                <a:cs typeface="Arial"/>
+                <a:sym typeface="Calibri"/>
+              </a:rPr>
+              <a:t>doRiNA</a:t>
+            </a:r>
+            <a:r>
+              <a:rPr lang="en-US" sz="4800" b="1" dirty="0" smtClean="0">
+                <a:solidFill>
+                  <a:schemeClr val="dk1"/>
+                </a:solidFill>
+                <a:latin typeface="Arial"/>
+                <a:ea typeface="Calibri"/>
+                <a:cs typeface="Arial"/>
+                <a:sym typeface="Calibri"/>
+              </a:rPr>
+              <a:t>:</a:t>
+            </a:r>
+            <a:r>
+              <a:rPr lang="en-US" sz="4800" dirty="0" smtClean="0">
+                <a:solidFill>
+                  <a:schemeClr val="dk1"/>
+                </a:solidFill>
+                <a:latin typeface="Arial"/>
+                <a:ea typeface="Calibri"/>
+                <a:cs typeface="Arial"/>
+                <a:sym typeface="Calibri"/>
+              </a:rPr>
+              <a:t> Database </a:t>
+            </a:r>
+            <a:r>
+              <a:rPr lang="en-US" sz="4800" dirty="0">
+                <a:solidFill>
+                  <a:schemeClr val="dk1"/>
+                </a:solidFill>
+                <a:latin typeface="Arial"/>
+                <a:ea typeface="Calibri"/>
+                <a:cs typeface="Arial"/>
+                <a:sym typeface="Calibri"/>
+              </a:rPr>
+              <a:t>for binding sites of RNA-binding proteins and </a:t>
+            </a:r>
+            <a:r>
+              <a:rPr lang="en-US" sz="4800" dirty="0" err="1" smtClean="0">
+                <a:solidFill>
+                  <a:schemeClr val="dk1"/>
+                </a:solidFill>
+                <a:latin typeface="Arial"/>
+                <a:ea typeface="Calibri"/>
+                <a:cs typeface="Arial"/>
+                <a:sym typeface="Calibri"/>
+              </a:rPr>
+              <a:t>miRNAs</a:t>
+            </a:r>
+            <a:endParaRPr lang="en-US" sz="4800" dirty="0" smtClean="0">
+              <a:solidFill>
+                <a:schemeClr val="dk1"/>
+              </a:solidFill>
+              <a:latin typeface="Arial"/>
+              <a:ea typeface="Calibri"/>
+              <a:cs typeface="Arial"/>
+              <a:sym typeface="Calibri"/>
+            </a:endParaRPr>
+          </a:p>
+          <a:p>
+            <a:pPr marL="685800" indent="-685800">
+              <a:lnSpc>
+                <a:spcPct val="120000"/>
+              </a:lnSpc>
+              <a:buSzPct val="25000"/>
+              <a:buFont typeface="Wingdings" charset="2"/>
+              <a:buChar char="u"/>
+            </a:pPr>
+            <a:r>
+              <a:rPr lang="en-US" sz="4800" b="1" dirty="0" err="1" smtClean="0">
+                <a:solidFill>
+                  <a:schemeClr val="dk1"/>
+                </a:solidFill>
+                <a:latin typeface="Arial"/>
+                <a:ea typeface="Calibri"/>
+                <a:cs typeface="Arial"/>
+                <a:sym typeface="Calibri"/>
+              </a:rPr>
+              <a:t>RiboTaper</a:t>
+            </a:r>
+            <a:r>
+              <a:rPr lang="en-US" sz="4800" b="1" dirty="0" smtClean="0">
+                <a:solidFill>
+                  <a:schemeClr val="dk1"/>
+                </a:solidFill>
+                <a:latin typeface="Arial"/>
+                <a:ea typeface="Calibri"/>
+                <a:cs typeface="Arial"/>
+                <a:sym typeface="Calibri"/>
+              </a:rPr>
+              <a:t>:</a:t>
+            </a:r>
+            <a:r>
+              <a:rPr lang="en-US" sz="4800" dirty="0" smtClean="0">
+                <a:solidFill>
+                  <a:schemeClr val="dk1"/>
+                </a:solidFill>
+                <a:latin typeface="Arial"/>
+                <a:ea typeface="Calibri"/>
+                <a:cs typeface="Arial"/>
+                <a:sym typeface="Calibri"/>
+              </a:rPr>
+              <a:t> </a:t>
+            </a:r>
+            <a:r>
+              <a:rPr lang="en-US" sz="4800" dirty="0">
+                <a:solidFill>
+                  <a:schemeClr val="dk1"/>
+                </a:solidFill>
+                <a:latin typeface="Arial"/>
+                <a:ea typeface="Calibri"/>
+                <a:cs typeface="Arial"/>
+                <a:sym typeface="Calibri"/>
+              </a:rPr>
+              <a:t>A toolbox for analysis of Ribosome profiling data</a:t>
+            </a:r>
+          </a:p>
+          <a:p>
+            <a:pPr marL="685800" indent="-685800">
+              <a:lnSpc>
+                <a:spcPct val="120000"/>
+              </a:lnSpc>
+              <a:buSzPct val="25000"/>
+              <a:buFont typeface="Wingdings" charset="2"/>
+              <a:buChar char="u"/>
+            </a:pPr>
+            <a:r>
+              <a:rPr lang="en-US" sz="4800" b="1" dirty="0" err="1" smtClean="0">
+                <a:solidFill>
+                  <a:schemeClr val="dk1"/>
+                </a:solidFill>
+                <a:latin typeface="Arial"/>
+                <a:ea typeface="Calibri"/>
+                <a:cs typeface="Arial"/>
+                <a:sym typeface="Calibri"/>
+              </a:rPr>
+              <a:t>microMummie</a:t>
+            </a:r>
+            <a:r>
+              <a:rPr lang="en-US" sz="4800" b="1" dirty="0" smtClean="0">
+                <a:solidFill>
+                  <a:schemeClr val="dk1"/>
+                </a:solidFill>
+                <a:latin typeface="Arial"/>
+                <a:ea typeface="Calibri"/>
+                <a:cs typeface="Arial"/>
+                <a:sym typeface="Calibri"/>
+              </a:rPr>
+              <a:t>:</a:t>
+            </a:r>
+            <a:r>
+              <a:rPr lang="en-US" sz="4800" dirty="0" smtClean="0">
+                <a:solidFill>
+                  <a:schemeClr val="dk1"/>
+                </a:solidFill>
+                <a:latin typeface="Arial"/>
+                <a:ea typeface="Calibri"/>
+                <a:cs typeface="Arial"/>
+                <a:sym typeface="Calibri"/>
+              </a:rPr>
+              <a:t> </a:t>
+            </a:r>
+            <a:r>
+              <a:rPr lang="en-US" sz="4800" dirty="0">
+                <a:solidFill>
+                  <a:schemeClr val="dk1"/>
+                </a:solidFill>
+                <a:latin typeface="Arial"/>
+                <a:ea typeface="Calibri"/>
+                <a:cs typeface="Arial"/>
+                <a:sym typeface="Calibri"/>
+              </a:rPr>
+              <a:t>MicroRNA target site identification tool</a:t>
+            </a:r>
+          </a:p>
+          <a:p>
+            <a:pPr marL="685800" indent="-685800">
+              <a:lnSpc>
+                <a:spcPct val="120000"/>
+              </a:lnSpc>
+              <a:buSzPct val="25000"/>
+              <a:buFont typeface="Wingdings" charset="2"/>
+              <a:buChar char="u"/>
+            </a:pPr>
+            <a:r>
+              <a:rPr lang="en-US" sz="4800" b="1" dirty="0" err="1" smtClean="0">
+                <a:solidFill>
+                  <a:schemeClr val="dk1"/>
+                </a:solidFill>
+                <a:latin typeface="Arial"/>
+                <a:ea typeface="Calibri"/>
+                <a:cs typeface="Arial"/>
+                <a:sym typeface="Calibri"/>
+              </a:rPr>
+              <a:t>PARalyzer</a:t>
+            </a:r>
+            <a:r>
+              <a:rPr lang="en-US" sz="4800" b="1" dirty="0" smtClean="0">
+                <a:solidFill>
+                  <a:schemeClr val="dk1"/>
+                </a:solidFill>
+                <a:latin typeface="Arial"/>
+                <a:ea typeface="Calibri"/>
+                <a:cs typeface="Arial"/>
+                <a:sym typeface="Calibri"/>
+              </a:rPr>
+              <a:t>:</a:t>
+            </a:r>
+            <a:r>
+              <a:rPr lang="en-US" sz="4800" dirty="0" smtClean="0">
+                <a:solidFill>
+                  <a:schemeClr val="dk1"/>
+                </a:solidFill>
+                <a:latin typeface="Arial"/>
+                <a:ea typeface="Calibri"/>
+                <a:cs typeface="Arial"/>
+                <a:sym typeface="Calibri"/>
+              </a:rPr>
+              <a:t> </a:t>
+            </a:r>
+            <a:r>
+              <a:rPr lang="en-US" sz="4800" dirty="0">
+                <a:solidFill>
+                  <a:schemeClr val="dk1"/>
+                </a:solidFill>
+                <a:latin typeface="Arial"/>
+                <a:ea typeface="Calibri"/>
+                <a:cs typeface="Arial"/>
+                <a:sym typeface="Calibri"/>
+              </a:rPr>
+              <a:t>RNA binding site detection from PAR-CLIP </a:t>
+            </a:r>
+            <a:r>
+              <a:rPr lang="en-US" sz="4800" dirty="0" smtClean="0">
+                <a:solidFill>
+                  <a:schemeClr val="dk1"/>
+                </a:solidFill>
+                <a:latin typeface="Arial"/>
+                <a:ea typeface="Calibri"/>
+                <a:cs typeface="Arial"/>
+                <a:sym typeface="Calibri"/>
+              </a:rPr>
+              <a:t>dataset</a:t>
+            </a:r>
+            <a:endParaRPr lang="en-US" sz="4800" b="1" dirty="0" smtClean="0">
+              <a:solidFill>
+                <a:schemeClr val="dk1"/>
+              </a:solidFill>
+              <a:latin typeface="Arial"/>
+              <a:ea typeface="Calibri"/>
+              <a:cs typeface="Arial"/>
+              <a:sym typeface="Calibri"/>
+            </a:endParaRPr>
+          </a:p>
+        </p:txBody>
+      </p:sp>
+      <p:pic>
+        <p:nvPicPr>
+          <p:cNvPr id="78" name="Bild 77" descr="bioconductor_logo_rgb.jpg"/>
+          <p:cNvPicPr>
+            <a:picLocks noChangeAspect="1"/>
+          </p:cNvPicPr>
+          <p:nvPr/>
+        </p:nvPicPr>
+        <p:blipFill>
+          <a:blip r:embed="rId14">
+            <a:extLst>
+              <a:ext uri="{28A0092B-C50C-407E-A947-70E740481C1C}">
+                <a14:useLocalDpi xmlns:a14="http://schemas.microsoft.com/office/drawing/2010/main" val="0"/>
+              </a:ext>
+            </a:extLst>
+          </a:blip>
+          <a:stretch>
+            <a:fillRect/>
+          </a:stretch>
+        </p:blipFill>
+        <p:spPr>
+          <a:xfrm>
+            <a:off x="16598142" y="23654910"/>
+            <a:ext cx="3050882" cy="878400"/>
+          </a:xfrm>
+          <a:prstGeom prst="rect">
+            <a:avLst/>
+          </a:prstGeom>
+        </p:spPr>
+      </p:pic>
+      <p:pic>
+        <p:nvPicPr>
+          <p:cNvPr id="80" name="Bild 79" descr="webservicelogo.jpg"/>
+          <p:cNvPicPr>
+            <a:picLocks noChangeAspect="1"/>
+          </p:cNvPicPr>
+          <p:nvPr/>
+        </p:nvPicPr>
+        <p:blipFill>
+          <a:blip r:embed="rId15">
+            <a:extLst>
+              <a:ext uri="{28A0092B-C50C-407E-A947-70E740481C1C}">
+                <a14:useLocalDpi xmlns:a14="http://schemas.microsoft.com/office/drawing/2010/main" val="0"/>
+              </a:ext>
+            </a:extLst>
+          </a:blip>
+          <a:stretch>
+            <a:fillRect/>
+          </a:stretch>
+        </p:blipFill>
+        <p:spPr>
+          <a:xfrm>
+            <a:off x="20169205" y="23377718"/>
+            <a:ext cx="1527775" cy="1523561"/>
+          </a:xfrm>
+          <a:prstGeom prst="rect">
+            <a:avLst/>
+          </a:prstGeom>
+        </p:spPr>
+      </p:pic>
+      <p:pic>
+        <p:nvPicPr>
+          <p:cNvPr id="83" name="Bild 82" descr="conda_RGB.png"/>
+          <p:cNvPicPr>
+            <a:picLocks noChangeAspect="1"/>
+          </p:cNvPicPr>
+          <p:nvPr/>
+        </p:nvPicPr>
+        <p:blipFill>
+          <a:blip r:embed="rId16">
+            <a:extLst>
+              <a:ext uri="{28A0092B-C50C-407E-A947-70E740481C1C}">
+                <a14:useLocalDpi xmlns:a14="http://schemas.microsoft.com/office/drawing/2010/main" val="0"/>
+              </a:ext>
+            </a:extLst>
+          </a:blip>
+          <a:stretch>
+            <a:fillRect/>
+          </a:stretch>
+        </p:blipFill>
+        <p:spPr>
+          <a:xfrm>
+            <a:off x="21696980" y="23654910"/>
+            <a:ext cx="3007431" cy="1209238"/>
+          </a:xfrm>
+          <a:prstGeom prst="rect">
+            <a:avLst/>
+          </a:prstGeom>
+        </p:spPr>
+      </p:pic>
+      <p:pic>
+        <p:nvPicPr>
+          <p:cNvPr id="84" name="Bild 83" descr="docker-logo_wo_font.png"/>
+          <p:cNvPicPr>
+            <a:picLocks noChangeAspect="1"/>
+          </p:cNvPicPr>
+          <p:nvPr/>
+        </p:nvPicPr>
+        <p:blipFill>
+          <a:blip r:embed="rId17">
+            <a:extLst>
+              <a:ext uri="{28A0092B-C50C-407E-A947-70E740481C1C}">
+                <a14:useLocalDpi xmlns:a14="http://schemas.microsoft.com/office/drawing/2010/main" val="0"/>
+              </a:ext>
+            </a:extLst>
+          </a:blip>
+          <a:stretch>
+            <a:fillRect/>
+          </a:stretch>
+        </p:blipFill>
+        <p:spPr>
+          <a:xfrm>
+            <a:off x="27956884" y="23486875"/>
+            <a:ext cx="1979754" cy="1166234"/>
+          </a:xfrm>
+          <a:prstGeom prst="rect">
+            <a:avLst/>
+          </a:prstGeom>
+        </p:spPr>
+      </p:pic>
+      <p:pic>
+        <p:nvPicPr>
+          <p:cNvPr id="85" name="Bild 84" descr="guixlogo.png"/>
+          <p:cNvPicPr>
+            <a:picLocks noChangeAspect="1"/>
+          </p:cNvPicPr>
+          <p:nvPr/>
+        </p:nvPicPr>
+        <p:blipFill>
+          <a:blip r:embed="rId18">
+            <a:extLst>
+              <a:ext uri="{28A0092B-C50C-407E-A947-70E740481C1C}">
+                <a14:useLocalDpi xmlns:a14="http://schemas.microsoft.com/office/drawing/2010/main" val="0"/>
+              </a:ext>
+            </a:extLst>
+          </a:blip>
+          <a:stretch>
+            <a:fillRect/>
+          </a:stretch>
+        </p:blipFill>
+        <p:spPr>
+          <a:xfrm>
+            <a:off x="25051977" y="23847113"/>
+            <a:ext cx="2619830" cy="796428"/>
+          </a:xfrm>
+          <a:prstGeom prst="rect">
+            <a:avLst/>
+          </a:prstGeom>
+        </p:spPr>
+      </p:pic>
     </p:spTree>
     <p:extLst>
       <p:ext uri="{BB962C8B-B14F-4D97-AF65-F5344CB8AC3E}">

</xml_diff>

<commit_message>
updated poster: updated docker image
</commit_message>
<xml_diff>
--- a/rbc_bimsb/sab-berlin-2016/poster/BIMSB_SAB2016_poster.pptx
+++ b/rbc_bimsb/sab-berlin-2016/poster/BIMSB_SAB2016_poster.pptx
@@ -7173,7 +7173,7 @@
       </p:pic>
       <p:pic>
         <p:nvPicPr>
-          <p:cNvPr id="84" name="Bild 83" descr="docker-logo_wo_font.png"/>
+          <p:cNvPr id="85" name="Bild 84" descr="guixlogo.png"/>
           <p:cNvPicPr>
             <a:picLocks noChangeAspect="1"/>
           </p:cNvPicPr>
@@ -7193,8 +7193,8 @@
         </p:blipFill>
         <p:spPr>
           <a:xfrm>
-            <a:off x="27956884" y="23486875"/>
-            <a:ext cx="1979754" cy="1166234"/>
+            <a:off x="25051977" y="23847113"/>
+            <a:ext cx="2619830" cy="796428"/>
           </a:xfrm>
           <a:prstGeom prst="rect">
             <a:avLst/>
@@ -7203,7 +7203,7 @@
       </p:pic>
       <p:pic>
         <p:nvPicPr>
-          <p:cNvPr id="85" name="Bild 84" descr="guixlogo.png"/>
+          <p:cNvPr id="86" name="Bild 85" descr="docker-logo.png"/>
           <p:cNvPicPr>
             <a:picLocks noChangeAspect="1"/>
           </p:cNvPicPr>
@@ -7223,8 +7223,8 @@
         </p:blipFill>
         <p:spPr>
           <a:xfrm>
-            <a:off x="25051977" y="23847113"/>
-            <a:ext cx="2619830" cy="796428"/>
+            <a:off x="27716647" y="22981843"/>
+            <a:ext cx="2319560" cy="1919436"/>
           </a:xfrm>
           <a:prstGeom prst="rect">
             <a:avLst/>

</xml_diff>

<commit_message>
updated poster: added more tasks for the next year plans
</commit_message>
<xml_diff>
--- a/rbc_bimsb/sab-berlin-2016/poster/BIMSB_SAB2016_poster.pptx
+++ b/rbc_bimsb/sab-berlin-2016/poster/BIMSB_SAB2016_poster.pptx
@@ -4262,7 +4262,7 @@
         <p:spPr>
           <a:xfrm>
             <a:off x="1217550" y="17432263"/>
-            <a:ext cx="14165383" cy="15327271"/>
+            <a:ext cx="14165383" cy="18651258"/>
           </a:xfrm>
           <a:prstGeom prst="rect">
             <a:avLst/>
@@ -5089,53 +5089,53 @@
               <a:buChar char="-"/>
             </a:pPr>
             <a:r>
+              <a:rPr lang="de-DE" sz="4800" b="1" dirty="0" err="1" smtClean="0">
+                <a:latin typeface="Arial" panose="020B0604020202020204" pitchFamily="34" charset="0"/>
+                <a:cs typeface="Arial" panose="020B0604020202020204" pitchFamily="34" charset="0"/>
+              </a:rPr>
+              <a:t>Offer</a:t>
+            </a:r>
+            <a:r>
               <a:rPr lang="de-DE" sz="4800" b="1" dirty="0" smtClean="0">
                 <a:latin typeface="Arial" panose="020B0604020202020204" pitchFamily="34" charset="0"/>
                 <a:cs typeface="Arial" panose="020B0604020202020204" pitchFamily="34" charset="0"/>
               </a:rPr>
-              <a:t>U</a:t>
+              <a:t> </a:t>
+            </a:r>
+            <a:r>
+              <a:rPr lang="de-DE" sz="4800" b="1" dirty="0" err="1" smtClean="0">
+                <a:latin typeface="Arial" panose="020B0604020202020204" pitchFamily="34" charset="0"/>
+                <a:cs typeface="Arial" panose="020B0604020202020204" pitchFamily="34" charset="0"/>
+              </a:rPr>
+              <a:t>more</a:t>
             </a:r>
             <a:r>
               <a:rPr lang="de-DE" sz="4800" b="1" dirty="0" smtClean="0">
                 <a:latin typeface="Arial" panose="020B0604020202020204" pitchFamily="34" charset="0"/>
                 <a:cs typeface="Arial" panose="020B0604020202020204" pitchFamily="34" charset="0"/>
               </a:rPr>
-              <a:t>pdate </a:t>
+              <a:t> </a:t>
             </a:r>
             <a:r>
               <a:rPr lang="de-DE" sz="4800" b="1" dirty="0" err="1" smtClean="0">
                 <a:latin typeface="Arial" panose="020B0604020202020204" pitchFamily="34" charset="0"/>
                 <a:cs typeface="Arial" panose="020B0604020202020204" pitchFamily="34" charset="0"/>
               </a:rPr>
-              <a:t>the</a:t>
+              <a:t>training</a:t>
             </a:r>
             <a:r>
               <a:rPr lang="de-DE" sz="4800" b="1" dirty="0" smtClean="0">
                 <a:latin typeface="Arial" panose="020B0604020202020204" pitchFamily="34" charset="0"/>
                 <a:cs typeface="Arial" panose="020B0604020202020204" pitchFamily="34" charset="0"/>
               </a:rPr>
-              <a:t> </a:t>
+              <a:t> on </a:t>
             </a:r>
             <a:r>
               <a:rPr lang="de-DE" sz="4800" b="1" dirty="0" err="1" smtClean="0">
                 <a:latin typeface="Arial" panose="020B0604020202020204" pitchFamily="34" charset="0"/>
                 <a:cs typeface="Arial" panose="020B0604020202020204" pitchFamily="34" charset="0"/>
               </a:rPr>
-              <a:t>doRiNA</a:t>
-            </a:r>
-            <a:r>
-              <a:rPr lang="de-DE" sz="4800" b="1" dirty="0" smtClean="0">
-                <a:latin typeface="Arial" panose="020B0604020202020204" pitchFamily="34" charset="0"/>
-                <a:cs typeface="Arial" panose="020B0604020202020204" pitchFamily="34" charset="0"/>
-              </a:rPr>
-              <a:t> </a:t>
-            </a:r>
-            <a:r>
-              <a:rPr lang="de-DE" sz="4800" b="1" dirty="0" err="1" smtClean="0">
-                <a:latin typeface="Arial" panose="020B0604020202020204" pitchFamily="34" charset="0"/>
-                <a:cs typeface="Arial" panose="020B0604020202020204" pitchFamily="34" charset="0"/>
-              </a:rPr>
-              <a:t>database</a:t>
+              <a:t>Galaxy</a:t>
             </a:r>
             <a:endParaRPr lang="de-DE" sz="4800" b="1" dirty="0" smtClean="0">
               <a:latin typeface="Arial" panose="020B0604020202020204" pitchFamily="34" charset="0"/>
@@ -5152,14 +5152,14 @@
                 <a:latin typeface="Arial" panose="020B0604020202020204" pitchFamily="34" charset="0"/>
                 <a:cs typeface="Arial" panose="020B0604020202020204" pitchFamily="34" charset="0"/>
               </a:rPr>
-              <a:t>More </a:t>
+              <a:t>Chip-</a:t>
             </a:r>
             <a:r>
               <a:rPr lang="de-DE" sz="4000" dirty="0" err="1" smtClean="0">
                 <a:latin typeface="Arial" panose="020B0604020202020204" pitchFamily="34" charset="0"/>
                 <a:cs typeface="Arial" panose="020B0604020202020204" pitchFamily="34" charset="0"/>
               </a:rPr>
-              <a:t>content</a:t>
+              <a:t>Seq</a:t>
             </a:r>
             <a:r>
               <a:rPr lang="de-DE" sz="4000" dirty="0" smtClean="0">
@@ -5173,21 +5173,7 @@
                 <a:latin typeface="Arial" panose="020B0604020202020204" pitchFamily="34" charset="0"/>
                 <a:cs typeface="Arial" panose="020B0604020202020204" pitchFamily="34" charset="0"/>
               </a:rPr>
-              <a:t>and</a:t>
-            </a:r>
-            <a:r>
-              <a:rPr lang="de-DE" sz="4000" dirty="0" smtClean="0">
-                <a:latin typeface="Arial" panose="020B0604020202020204" pitchFamily="34" charset="0"/>
-                <a:cs typeface="Arial" panose="020B0604020202020204" pitchFamily="34" charset="0"/>
-              </a:rPr>
-              <a:t> </a:t>
-            </a:r>
-            <a:r>
-              <a:rPr lang="de-DE" sz="4000" dirty="0" err="1" smtClean="0">
-                <a:latin typeface="Arial" panose="020B0604020202020204" pitchFamily="34" charset="0"/>
-                <a:cs typeface="Arial" panose="020B0604020202020204" pitchFamily="34" charset="0"/>
-              </a:rPr>
-              <a:t>functionality</a:t>
+              <a:t>analysis</a:t>
             </a:r>
             <a:endParaRPr lang="de-DE" sz="4000" dirty="0" smtClean="0">
               <a:latin typeface="Arial" panose="020B0604020202020204" pitchFamily="34" charset="0"/>
@@ -5195,6 +5181,30 @@
             </a:endParaRPr>
           </a:p>
           <a:p>
+            <a:pPr marL="2945420" lvl="1" indent="-857250">
+              <a:buFontTx/>
+              <a:buChar char="-"/>
+            </a:pPr>
+            <a:r>
+              <a:rPr lang="de-DE" sz="4000" dirty="0" smtClean="0">
+                <a:latin typeface="Arial" panose="020B0604020202020204" pitchFamily="34" charset="0"/>
+                <a:cs typeface="Arial" panose="020B0604020202020204" pitchFamily="34" charset="0"/>
+              </a:rPr>
+              <a:t>Variant </a:t>
+            </a:r>
+            <a:r>
+              <a:rPr lang="de-DE" sz="4000" dirty="0" err="1" smtClean="0">
+                <a:latin typeface="Arial" panose="020B0604020202020204" pitchFamily="34" charset="0"/>
+                <a:cs typeface="Arial" panose="020B0604020202020204" pitchFamily="34" charset="0"/>
+              </a:rPr>
+              <a:t>analysis</a:t>
+            </a:r>
+            <a:endParaRPr lang="de-DE" sz="4000" dirty="0" smtClean="0">
+              <a:latin typeface="Arial" panose="020B0604020202020204" pitchFamily="34" charset="0"/>
+              <a:cs typeface="Arial" panose="020B0604020202020204" pitchFamily="34" charset="0"/>
+            </a:endParaRPr>
+          </a:p>
+          <a:p>
             <a:pPr marL="857250" indent="-857250">
               <a:buFontTx/>
               <a:buChar char="-"/>
@@ -5204,7 +5214,7 @@
                 <a:latin typeface="Arial" panose="020B0604020202020204" pitchFamily="34" charset="0"/>
                 <a:cs typeface="Arial" panose="020B0604020202020204" pitchFamily="34" charset="0"/>
               </a:rPr>
-              <a:t>Offer</a:t>
+              <a:t>Integrate</a:t>
             </a:r>
             <a:r>
               <a:rPr lang="de-DE" sz="4800" b="1" dirty="0" smtClean="0">
@@ -5225,6 +5235,20 @@
                 <a:latin typeface="Arial" panose="020B0604020202020204" pitchFamily="34" charset="0"/>
                 <a:cs typeface="Arial" panose="020B0604020202020204" pitchFamily="34" charset="0"/>
               </a:rPr>
+              <a:t> in-house </a:t>
+            </a:r>
+            <a:r>
+              <a:rPr lang="de-DE" sz="4800" b="1" dirty="0" err="1" smtClean="0">
+                <a:latin typeface="Arial" panose="020B0604020202020204" pitchFamily="34" charset="0"/>
+                <a:cs typeface="Arial" panose="020B0604020202020204" pitchFamily="34" charset="0"/>
+              </a:rPr>
+              <a:t>tools</a:t>
+            </a:r>
+            <a:r>
+              <a:rPr lang="de-DE" sz="4800" b="1" dirty="0" smtClean="0">
+                <a:latin typeface="Arial" panose="020B0604020202020204" pitchFamily="34" charset="0"/>
+                <a:cs typeface="Arial" panose="020B0604020202020204" pitchFamily="34" charset="0"/>
+              </a:rPr>
               <a:t> </a:t>
             </a:r>
             <a:r>
@@ -5232,14 +5256,14 @@
                 <a:latin typeface="Arial" panose="020B0604020202020204" pitchFamily="34" charset="0"/>
                 <a:cs typeface="Arial" panose="020B0604020202020204" pitchFamily="34" charset="0"/>
               </a:rPr>
-              <a:t>training</a:t>
+              <a:t>to</a:t>
             </a:r>
             <a:r>
               <a:rPr lang="de-DE" sz="4800" b="1" dirty="0" smtClean="0">
                 <a:latin typeface="Arial" panose="020B0604020202020204" pitchFamily="34" charset="0"/>
                 <a:cs typeface="Arial" panose="020B0604020202020204" pitchFamily="34" charset="0"/>
               </a:rPr>
-              <a:t> on </a:t>
+              <a:t> </a:t>
             </a:r>
             <a:r>
               <a:rPr lang="de-DE" sz="4800" b="1" dirty="0" err="1" smtClean="0">
@@ -5247,6 +5271,20 @@
                 <a:cs typeface="Arial" panose="020B0604020202020204" pitchFamily="34" charset="0"/>
               </a:rPr>
               <a:t>Galaxy</a:t>
+            </a:r>
+            <a:r>
+              <a:rPr lang="de-DE" sz="4800" b="1" dirty="0" smtClean="0">
+                <a:latin typeface="Arial" panose="020B0604020202020204" pitchFamily="34" charset="0"/>
+                <a:cs typeface="Arial" panose="020B0604020202020204" pitchFamily="34" charset="0"/>
+              </a:rPr>
+              <a:t> </a:t>
+            </a:r>
+            <a:r>
+              <a:rPr lang="de-DE" sz="4800" b="1" dirty="0" err="1" smtClean="0">
+                <a:latin typeface="Arial" panose="020B0604020202020204" pitchFamily="34" charset="0"/>
+                <a:cs typeface="Arial" panose="020B0604020202020204" pitchFamily="34" charset="0"/>
+              </a:rPr>
+              <a:t>server</a:t>
             </a:r>
             <a:endParaRPr lang="de-DE" sz="4800" b="1" dirty="0" smtClean="0">
               <a:latin typeface="Arial" panose="020B0604020202020204" pitchFamily="34" charset="0"/>
@@ -5259,24 +5297,45 @@
               <a:buChar char="-"/>
             </a:pPr>
             <a:r>
+              <a:rPr lang="de-DE" sz="4000" dirty="0" err="1" smtClean="0">
+                <a:latin typeface="Arial" panose="020B0604020202020204" pitchFamily="34" charset="0"/>
+                <a:cs typeface="Arial" panose="020B0604020202020204" pitchFamily="34" charset="0"/>
+              </a:rPr>
+              <a:t>PIPmir</a:t>
+            </a:r>
+            <a:r>
               <a:rPr lang="de-DE" sz="4000" dirty="0" smtClean="0">
                 <a:latin typeface="Arial" panose="020B0604020202020204" pitchFamily="34" charset="0"/>
                 <a:cs typeface="Arial" panose="020B0604020202020204" pitchFamily="34" charset="0"/>
               </a:rPr>
-              <a:t>Chip-</a:t>
+              <a:t> (Pipeline </a:t>
             </a:r>
             <a:r>
               <a:rPr lang="de-DE" sz="4000" dirty="0" err="1" smtClean="0">
                 <a:latin typeface="Arial" panose="020B0604020202020204" pitchFamily="34" charset="0"/>
                 <a:cs typeface="Arial" panose="020B0604020202020204" pitchFamily="34" charset="0"/>
               </a:rPr>
-              <a:t>Seq</a:t>
+              <a:t>for</a:t>
             </a:r>
             <a:r>
               <a:rPr lang="de-DE" sz="4000" dirty="0" smtClean="0">
                 <a:latin typeface="Arial" panose="020B0604020202020204" pitchFamily="34" charset="0"/>
                 <a:cs typeface="Arial" panose="020B0604020202020204" pitchFamily="34" charset="0"/>
               </a:rPr>
+              <a:t> plant </a:t>
+            </a:r>
+            <a:r>
+              <a:rPr lang="de-DE" sz="4000" dirty="0" err="1" smtClean="0">
+                <a:latin typeface="Arial" panose="020B0604020202020204" pitchFamily="34" charset="0"/>
+                <a:cs typeface="Arial" panose="020B0604020202020204" pitchFamily="34" charset="0"/>
+              </a:rPr>
+              <a:t>miRNA</a:t>
+            </a:r>
+            <a:r>
+              <a:rPr lang="de-DE" sz="4000" dirty="0" smtClean="0">
+                <a:latin typeface="Arial" panose="020B0604020202020204" pitchFamily="34" charset="0"/>
+                <a:cs typeface="Arial" panose="020B0604020202020204" pitchFamily="34" charset="0"/>
+              </a:rPr>
               <a:t> </a:t>
             </a:r>
             <a:r>
@@ -5284,12 +5343,15 @@
                 <a:latin typeface="Arial" panose="020B0604020202020204" pitchFamily="34" charset="0"/>
                 <a:cs typeface="Arial" panose="020B0604020202020204" pitchFamily="34" charset="0"/>
               </a:rPr>
-              <a:t>analysis</a:t>
-            </a:r>
-            <a:endParaRPr lang="de-DE" sz="4000" dirty="0" smtClean="0">
-              <a:latin typeface="Arial" panose="020B0604020202020204" pitchFamily="34" charset="0"/>
-              <a:cs typeface="Arial" panose="020B0604020202020204" pitchFamily="34" charset="0"/>
-            </a:endParaRPr>
+              <a:t>identification</a:t>
+            </a:r>
+            <a:r>
+              <a:rPr lang="de-DE" sz="4000" dirty="0" smtClean="0">
+                <a:latin typeface="Arial" panose="020B0604020202020204" pitchFamily="34" charset="0"/>
+                <a:cs typeface="Arial" panose="020B0604020202020204" pitchFamily="34" charset="0"/>
+              </a:rPr>
+              <a:t>)</a:t>
+            </a:r>
           </a:p>
           <a:p>
             <a:pPr marL="2945420" lvl="1" indent="-857250">
@@ -5297,11 +5359,18 @@
               <a:buChar char="-"/>
             </a:pPr>
             <a:r>
+              <a:rPr lang="de-DE" sz="4000" dirty="0" err="1" smtClean="0">
+                <a:latin typeface="Arial" panose="020B0604020202020204" pitchFamily="34" charset="0"/>
+                <a:cs typeface="Arial" panose="020B0604020202020204" pitchFamily="34" charset="0"/>
+              </a:rPr>
+              <a:t>PARalyzer</a:t>
+            </a:r>
+            <a:r>
               <a:rPr lang="de-DE" sz="4000" dirty="0" smtClean="0">
                 <a:latin typeface="Arial" panose="020B0604020202020204" pitchFamily="34" charset="0"/>
                 <a:cs typeface="Arial" panose="020B0604020202020204" pitchFamily="34" charset="0"/>
               </a:rPr>
-              <a:t>Variant </a:t>
+              <a:t> (PAR-CLIP </a:t>
             </a:r>
             <a:r>
               <a:rPr lang="de-DE" sz="4000" dirty="0" err="1" smtClean="0">
@@ -5310,6 +5379,137 @@
               </a:rPr>
               <a:t>analysis</a:t>
             </a:r>
+            <a:r>
+              <a:rPr lang="de-DE" sz="4000" dirty="0" smtClean="0">
+                <a:latin typeface="Arial" panose="020B0604020202020204" pitchFamily="34" charset="0"/>
+                <a:cs typeface="Arial" panose="020B0604020202020204" pitchFamily="34" charset="0"/>
+              </a:rPr>
+              <a:t> </a:t>
+            </a:r>
+            <a:r>
+              <a:rPr lang="de-DE" sz="4000" dirty="0" err="1" smtClean="0">
+                <a:latin typeface="Arial" panose="020B0604020202020204" pitchFamily="34" charset="0"/>
+                <a:cs typeface="Arial" panose="020B0604020202020204" pitchFamily="34" charset="0"/>
+              </a:rPr>
+              <a:t>pipeline</a:t>
+            </a:r>
+            <a:r>
+              <a:rPr lang="de-DE" sz="4000" dirty="0" smtClean="0">
+                <a:latin typeface="Arial" panose="020B0604020202020204" pitchFamily="34" charset="0"/>
+                <a:cs typeface="Arial" panose="020B0604020202020204" pitchFamily="34" charset="0"/>
+              </a:rPr>
+              <a:t>)</a:t>
+            </a:r>
+          </a:p>
+          <a:p>
+            <a:pPr marL="857250" indent="-857250">
+              <a:buFontTx/>
+              <a:buChar char="-"/>
+            </a:pPr>
+            <a:r>
+              <a:rPr lang="de-DE" sz="4800" b="1" dirty="0">
+                <a:latin typeface="Arial" panose="020B0604020202020204" pitchFamily="34" charset="0"/>
+                <a:cs typeface="Arial" panose="020B0604020202020204" pitchFamily="34" charset="0"/>
+              </a:rPr>
+              <a:t>Update </a:t>
+            </a:r>
+            <a:r>
+              <a:rPr lang="de-DE" sz="4800" b="1" dirty="0" err="1">
+                <a:latin typeface="Arial" panose="020B0604020202020204" pitchFamily="34" charset="0"/>
+                <a:cs typeface="Arial" panose="020B0604020202020204" pitchFamily="34" charset="0"/>
+              </a:rPr>
+              <a:t>the</a:t>
+            </a:r>
+            <a:r>
+              <a:rPr lang="de-DE" sz="4800" b="1" dirty="0">
+                <a:latin typeface="Arial" panose="020B0604020202020204" pitchFamily="34" charset="0"/>
+                <a:cs typeface="Arial" panose="020B0604020202020204" pitchFamily="34" charset="0"/>
+              </a:rPr>
+              <a:t> </a:t>
+            </a:r>
+            <a:r>
+              <a:rPr lang="de-DE" sz="4800" b="1" dirty="0" err="1">
+                <a:latin typeface="Arial" panose="020B0604020202020204" pitchFamily="34" charset="0"/>
+                <a:cs typeface="Arial" panose="020B0604020202020204" pitchFamily="34" charset="0"/>
+              </a:rPr>
+              <a:t>doRiNA</a:t>
+            </a:r>
+            <a:r>
+              <a:rPr lang="de-DE" sz="4800" b="1" dirty="0">
+                <a:latin typeface="Arial" panose="020B0604020202020204" pitchFamily="34" charset="0"/>
+                <a:cs typeface="Arial" panose="020B0604020202020204" pitchFamily="34" charset="0"/>
+              </a:rPr>
+              <a:t> </a:t>
+            </a:r>
+            <a:r>
+              <a:rPr lang="de-DE" sz="4800" b="1" dirty="0" err="1">
+                <a:latin typeface="Arial" panose="020B0604020202020204" pitchFamily="34" charset="0"/>
+                <a:cs typeface="Arial" panose="020B0604020202020204" pitchFamily="34" charset="0"/>
+              </a:rPr>
+              <a:t>database</a:t>
+            </a:r>
+            <a:endParaRPr lang="de-DE" sz="4800" b="1" dirty="0">
+              <a:latin typeface="Arial" panose="020B0604020202020204" pitchFamily="34" charset="0"/>
+              <a:cs typeface="Arial" panose="020B0604020202020204" pitchFamily="34" charset="0"/>
+            </a:endParaRPr>
+          </a:p>
+          <a:p>
+            <a:pPr marL="2945420" lvl="1" indent="-857250">
+              <a:buFontTx/>
+              <a:buChar char="-"/>
+            </a:pPr>
+            <a:r>
+              <a:rPr lang="de-DE" sz="4000" dirty="0">
+                <a:latin typeface="Arial" panose="020B0604020202020204" pitchFamily="34" charset="0"/>
+                <a:cs typeface="Arial" panose="020B0604020202020204" pitchFamily="34" charset="0"/>
+              </a:rPr>
+              <a:t>More </a:t>
+            </a:r>
+            <a:r>
+              <a:rPr lang="de-DE" sz="4000" dirty="0" err="1">
+                <a:latin typeface="Arial" panose="020B0604020202020204" pitchFamily="34" charset="0"/>
+                <a:cs typeface="Arial" panose="020B0604020202020204" pitchFamily="34" charset="0"/>
+              </a:rPr>
+              <a:t>content</a:t>
+            </a:r>
+            <a:r>
+              <a:rPr lang="de-DE" sz="4000" dirty="0">
+                <a:latin typeface="Arial" panose="020B0604020202020204" pitchFamily="34" charset="0"/>
+                <a:cs typeface="Arial" panose="020B0604020202020204" pitchFamily="34" charset="0"/>
+              </a:rPr>
+              <a:t> </a:t>
+            </a:r>
+            <a:r>
+              <a:rPr lang="de-DE" sz="4000" dirty="0" err="1">
+                <a:latin typeface="Arial" panose="020B0604020202020204" pitchFamily="34" charset="0"/>
+                <a:cs typeface="Arial" panose="020B0604020202020204" pitchFamily="34" charset="0"/>
+              </a:rPr>
+              <a:t>and</a:t>
+            </a:r>
+            <a:r>
+              <a:rPr lang="de-DE" sz="4000" dirty="0">
+                <a:latin typeface="Arial" panose="020B0604020202020204" pitchFamily="34" charset="0"/>
+                <a:cs typeface="Arial" panose="020B0604020202020204" pitchFamily="34" charset="0"/>
+              </a:rPr>
+              <a:t> </a:t>
+            </a:r>
+            <a:r>
+              <a:rPr lang="de-DE" sz="4000" dirty="0" err="1">
+                <a:latin typeface="Arial" panose="020B0604020202020204" pitchFamily="34" charset="0"/>
+                <a:cs typeface="Arial" panose="020B0604020202020204" pitchFamily="34" charset="0"/>
+              </a:rPr>
+              <a:t>functionality</a:t>
+            </a:r>
+            <a:endParaRPr lang="de-DE" sz="4000">
+              <a:latin typeface="Arial" panose="020B0604020202020204" pitchFamily="34" charset="0"/>
+              <a:cs typeface="Arial" panose="020B0604020202020204" pitchFamily="34" charset="0"/>
+            </a:endParaRPr>
+          </a:p>
+          <a:p>
+            <a:pPr marL="857250" indent="-857250">
+              <a:buFontTx/>
+              <a:buChar char="-"/>
+            </a:pPr>
             <a:endParaRPr lang="de-DE" sz="4000" dirty="0" smtClean="0">
               <a:latin typeface="Arial" panose="020B0604020202020204" pitchFamily="34" charset="0"/>
               <a:cs typeface="Arial" panose="020B0604020202020204" pitchFamily="34" charset="0"/>
@@ -6155,15 +6355,6 @@
               </a:rPr>
               <a:t>Galaxy </a:t>
             </a:r>
-            <a:endParaRPr lang="en-US" sz="6000" b="1" dirty="0">
-              <a:solidFill>
-                <a:schemeClr val="dk1"/>
-              </a:solidFill>
-              <a:latin typeface="Arial"/>
-              <a:ea typeface="Calibri"/>
-              <a:cs typeface="Arial"/>
-              <a:sym typeface="Calibri"/>
-            </a:endParaRPr>
           </a:p>
         </p:txBody>
       </p:sp>

</xml_diff>

<commit_message>
updated poster: changed author order
</commit_message>
<xml_diff>
--- a/rbc_bimsb/sab-berlin-2016/poster/BIMSB_SAB2016_poster.pptx
+++ b/rbc_bimsb/sab-berlin-2016/poster/BIMSB_SAB2016_poster.pptx
@@ -3558,10 +3558,90 @@
                 <a:latin typeface="Arial" panose="020B0604020202020204" pitchFamily="34" charset="0"/>
                 <a:cs typeface="Arial" panose="020B0604020202020204" pitchFamily="34" charset="0"/>
               </a:rPr>
+              <a:t>Uwe</a:t>
+            </a:r>
+            <a:r>
+              <a:rPr lang="en-US" sz="4000" dirty="0">
+                <a:solidFill>
+                  <a:schemeClr val="bg1"/>
+                </a:solidFill>
+                <a:latin typeface="Arial" panose="020B0604020202020204" pitchFamily="34" charset="0"/>
+                <a:cs typeface="Arial" panose="020B0604020202020204" pitchFamily="34" charset="0"/>
+              </a:rPr>
+              <a:t> </a:t>
+            </a:r>
+            <a:r>
+              <a:rPr lang="en-US" sz="4000" dirty="0" err="1">
+                <a:solidFill>
+                  <a:schemeClr val="bg1"/>
+                </a:solidFill>
+                <a:latin typeface="Arial" panose="020B0604020202020204" pitchFamily="34" charset="0"/>
+                <a:cs typeface="Arial" panose="020B0604020202020204" pitchFamily="34" charset="0"/>
+              </a:rPr>
+              <a:t>Ohler</a:t>
+            </a:r>
+            <a:r>
+              <a:rPr lang="en-US" sz="4000" dirty="0">
+                <a:solidFill>
+                  <a:schemeClr val="bg1"/>
+                </a:solidFill>
+                <a:latin typeface="Arial" panose="020B0604020202020204" pitchFamily="34" charset="0"/>
+                <a:cs typeface="Arial" panose="020B0604020202020204" pitchFamily="34" charset="0"/>
+              </a:rPr>
+              <a:t>, </a:t>
+            </a:r>
+            <a:r>
+              <a:rPr lang="en-US" sz="4000" dirty="0" err="1">
+                <a:solidFill>
+                  <a:schemeClr val="bg1"/>
+                </a:solidFill>
+                <a:latin typeface="Arial" panose="020B0604020202020204" pitchFamily="34" charset="0"/>
+                <a:cs typeface="Arial" panose="020B0604020202020204" pitchFamily="34" charset="0"/>
+              </a:rPr>
+              <a:t>Nikolaus</a:t>
+            </a:r>
+            <a:r>
+              <a:rPr lang="en-US" sz="4000" dirty="0">
+                <a:solidFill>
+                  <a:schemeClr val="bg1"/>
+                </a:solidFill>
+                <a:latin typeface="Arial" panose="020B0604020202020204" pitchFamily="34" charset="0"/>
+                <a:cs typeface="Arial" panose="020B0604020202020204" pitchFamily="34" charset="0"/>
+              </a:rPr>
+              <a:t> </a:t>
+            </a:r>
+            <a:r>
+              <a:rPr lang="en-US" sz="4000" dirty="0" err="1" smtClean="0">
+                <a:solidFill>
+                  <a:schemeClr val="bg1"/>
+                </a:solidFill>
+                <a:latin typeface="Arial" panose="020B0604020202020204" pitchFamily="34" charset="0"/>
+                <a:cs typeface="Arial" panose="020B0604020202020204" pitchFamily="34" charset="0"/>
+              </a:rPr>
+              <a:t>Rajewsky</a:t>
+            </a:r>
+            <a:r>
+              <a:rPr lang="en-US" sz="4000" dirty="0" smtClean="0">
+                <a:solidFill>
+                  <a:schemeClr val="bg1"/>
+                </a:solidFill>
+                <a:latin typeface="Arial" panose="020B0604020202020204" pitchFamily="34" charset="0"/>
+                <a:cs typeface="Arial" panose="020B0604020202020204" pitchFamily="34" charset="0"/>
+              </a:rPr>
+              <a:t>, </a:t>
+            </a:r>
+            <a:r>
+              <a:rPr lang="en-US" sz="4000" dirty="0" err="1" smtClean="0">
+                <a:solidFill>
+                  <a:schemeClr val="bg1"/>
+                </a:solidFill>
+                <a:latin typeface="Arial" panose="020B0604020202020204" pitchFamily="34" charset="0"/>
+                <a:cs typeface="Arial" panose="020B0604020202020204" pitchFamily="34" charset="0"/>
+              </a:rPr>
               <a:t>Altuna</a:t>
             </a:r>
             <a:r>
-              <a:rPr lang="en-US" sz="4000" dirty="0">
+              <a:rPr lang="en-US" sz="4000" dirty="0" smtClean="0">
                 <a:solidFill>
                   <a:schemeClr val="bg1"/>
                 </a:solidFill>
@@ -3581,7 +3661,7 @@
               <a:t>Akalin</a:t>
             </a:r>
             <a:r>
-              <a:rPr lang="en-US" sz="4000" dirty="0">
+              <a:rPr lang="en-US" sz="4000" dirty="0" smtClean="0">
                 <a:solidFill>
                   <a:schemeClr val="bg1"/>
                 </a:solidFill>
@@ -3591,154 +3671,113 @@
               <a:t>, </a:t>
             </a:r>
             <a:r>
-              <a:rPr lang="en-US" sz="4000" dirty="0" err="1">
+              <a:rPr lang="en-US" sz="4000" dirty="0" err="1" smtClean="0">
                 <a:solidFill>
                   <a:schemeClr val="bg1"/>
                 </a:solidFill>
                 <a:latin typeface="Arial" panose="020B0604020202020204" pitchFamily="34" charset="0"/>
                 <a:cs typeface="Arial" panose="020B0604020202020204" pitchFamily="34" charset="0"/>
               </a:rPr>
-              <a:t>Uwe</a:t>
-            </a:r>
-            <a:r>
-              <a:rPr lang="en-US" sz="4000" dirty="0">
+              <a:t>Dilmurat</a:t>
+            </a:r>
+            <a:r>
+              <a:rPr lang="en-US" sz="4000" dirty="0" smtClean="0">
                 <a:solidFill>
                   <a:schemeClr val="bg1"/>
                 </a:solidFill>
                 <a:latin typeface="Arial" panose="020B0604020202020204" pitchFamily="34" charset="0"/>
                 <a:cs typeface="Arial" panose="020B0604020202020204" pitchFamily="34" charset="0"/>
               </a:rPr>
-              <a:t> </a:t>
-            </a:r>
-            <a:r>
-              <a:rPr lang="en-US" sz="4000" dirty="0" err="1">
+              <a:t> Yusuf, Bora </a:t>
+            </a:r>
+            <a:r>
+              <a:rPr lang="en-US" sz="4000" dirty="0" err="1" smtClean="0">
                 <a:solidFill>
                   <a:schemeClr val="bg1"/>
                 </a:solidFill>
                 <a:latin typeface="Arial" panose="020B0604020202020204" pitchFamily="34" charset="0"/>
                 <a:cs typeface="Arial" panose="020B0604020202020204" pitchFamily="34" charset="0"/>
               </a:rPr>
-              <a:t>Ohler</a:t>
-            </a:r>
-            <a:r>
-              <a:rPr lang="en-US" sz="4000" dirty="0">
+              <a:t>Uyar</a:t>
+            </a:r>
+            <a:r>
+              <a:rPr lang="en-US" sz="4000" dirty="0" smtClean="0">
                 <a:solidFill>
                   <a:schemeClr val="bg1"/>
                 </a:solidFill>
                 <a:latin typeface="Arial" panose="020B0604020202020204" pitchFamily="34" charset="0"/>
                 <a:cs typeface="Arial" panose="020B0604020202020204" pitchFamily="34" charset="0"/>
               </a:rPr>
-              <a:t>, </a:t>
-            </a:r>
-            <a:r>
-              <a:rPr lang="en-US" sz="4000" dirty="0" err="1">
+              <a:t>, Ricardo </a:t>
+            </a:r>
+            <a:r>
+              <a:rPr lang="en-US" sz="4000" dirty="0" err="1" smtClean="0">
                 <a:solidFill>
                   <a:schemeClr val="bg1"/>
                 </a:solidFill>
                 <a:latin typeface="Arial" panose="020B0604020202020204" pitchFamily="34" charset="0"/>
                 <a:cs typeface="Arial" panose="020B0604020202020204" pitchFamily="34" charset="0"/>
               </a:rPr>
-              <a:t>Nikolaus</a:t>
-            </a:r>
-            <a:r>
-              <a:rPr lang="en-US" sz="4000" dirty="0">
+              <a:t>Wurmus</a:t>
+            </a:r>
+            <a:r>
+              <a:rPr lang="en-US" sz="4000" dirty="0" smtClean="0">
                 <a:solidFill>
                   <a:schemeClr val="bg1"/>
                 </a:solidFill>
                 <a:latin typeface="Arial" panose="020B0604020202020204" pitchFamily="34" charset="0"/>
                 <a:cs typeface="Arial" panose="020B0604020202020204" pitchFamily="34" charset="0"/>
               </a:rPr>
-              <a:t> </a:t>
-            </a:r>
-            <a:r>
-              <a:rPr lang="en-US" sz="4000" dirty="0" err="1">
+              <a:t>, Dan </a:t>
+            </a:r>
+            <a:r>
+              <a:rPr lang="en-US" sz="4000" dirty="0" err="1" smtClean="0">
                 <a:solidFill>
                   <a:schemeClr val="bg1"/>
                 </a:solidFill>
                 <a:latin typeface="Arial" panose="020B0604020202020204" pitchFamily="34" charset="0"/>
                 <a:cs typeface="Arial" panose="020B0604020202020204" pitchFamily="34" charset="0"/>
               </a:rPr>
-              <a:t>Rajewsky</a:t>
-            </a:r>
-            <a:r>
-              <a:rPr lang="en-US" sz="4000" dirty="0">
+              <a:t>Munteanu</a:t>
+            </a:r>
+            <a:endParaRPr lang="en-US" sz="4000" dirty="0" smtClean="0">
+              <a:solidFill>
+                <a:schemeClr val="bg1"/>
+              </a:solidFill>
+              <a:latin typeface="Arial" panose="020B0604020202020204" pitchFamily="34" charset="0"/>
+              <a:cs typeface="Arial" panose="020B0604020202020204" pitchFamily="34" charset="0"/>
+            </a:endParaRPr>
+          </a:p>
+          <a:p>
+            <a:r>
+              <a:rPr lang="en-US" sz="4000" dirty="0" smtClean="0">
                 <a:solidFill>
                   <a:schemeClr val="bg1"/>
                 </a:solidFill>
                 <a:latin typeface="Arial" panose="020B0604020202020204" pitchFamily="34" charset="0"/>
                 <a:cs typeface="Arial" panose="020B0604020202020204" pitchFamily="34" charset="0"/>
               </a:rPr>
-              <a:t>, </a:t>
-            </a:r>
-            <a:r>
-              <a:rPr lang="en-US" sz="4000" dirty="0" err="1">
+              <a:t>The Berlin Institute for Medical Systems Biology, Max-</a:t>
+            </a:r>
+            <a:r>
+              <a:rPr lang="en-US" sz="4000" dirty="0" err="1" smtClean="0">
                 <a:solidFill>
                   <a:schemeClr val="bg1"/>
                 </a:solidFill>
                 <a:latin typeface="Arial" panose="020B0604020202020204" pitchFamily="34" charset="0"/>
                 <a:cs typeface="Arial" panose="020B0604020202020204" pitchFamily="34" charset="0"/>
               </a:rPr>
-              <a:t>Dilmurat</a:t>
-            </a:r>
-            <a:r>
-              <a:rPr lang="en-US" sz="4000" dirty="0">
+              <a:t>Delbrueck</a:t>
+            </a:r>
+            <a:r>
+              <a:rPr lang="en-US" sz="4000" dirty="0" smtClean="0">
                 <a:solidFill>
                   <a:schemeClr val="bg1"/>
                 </a:solidFill>
                 <a:latin typeface="Arial" panose="020B0604020202020204" pitchFamily="34" charset="0"/>
                 <a:cs typeface="Arial" panose="020B0604020202020204" pitchFamily="34" charset="0"/>
               </a:rPr>
-              <a:t> Yusuf, Bora </a:t>
-            </a:r>
-            <a:r>
-              <a:rPr lang="en-US" sz="4000" dirty="0" err="1">
-                <a:solidFill>
-                  <a:schemeClr val="bg1"/>
-                </a:solidFill>
-                <a:latin typeface="Arial" panose="020B0604020202020204" pitchFamily="34" charset="0"/>
-                <a:cs typeface="Arial" panose="020B0604020202020204" pitchFamily="34" charset="0"/>
-              </a:rPr>
-              <a:t>Uyar</a:t>
-            </a:r>
-            <a:r>
-              <a:rPr lang="en-US" sz="4000" dirty="0">
-                <a:solidFill>
-                  <a:schemeClr val="bg1"/>
-                </a:solidFill>
-                <a:latin typeface="Arial" panose="020B0604020202020204" pitchFamily="34" charset="0"/>
-                <a:cs typeface="Arial" panose="020B0604020202020204" pitchFamily="34" charset="0"/>
-              </a:rPr>
-              <a:t>, Ricardo </a:t>
-            </a:r>
-            <a:r>
-              <a:rPr lang="en-US" sz="4000" dirty="0" err="1">
-                <a:solidFill>
-                  <a:schemeClr val="bg1"/>
-                </a:solidFill>
-                <a:latin typeface="Arial" panose="020B0604020202020204" pitchFamily="34" charset="0"/>
-                <a:cs typeface="Arial" panose="020B0604020202020204" pitchFamily="34" charset="0"/>
-              </a:rPr>
-              <a:t>Wurmus</a:t>
-            </a:r>
-            <a:r>
-              <a:rPr lang="en-US" sz="4000" dirty="0">
-                <a:solidFill>
-                  <a:schemeClr val="bg1"/>
-                </a:solidFill>
-                <a:latin typeface="Arial" panose="020B0604020202020204" pitchFamily="34" charset="0"/>
-                <a:cs typeface="Arial" panose="020B0604020202020204" pitchFamily="34" charset="0"/>
-              </a:rPr>
-              <a:t>, Dan </a:t>
-            </a:r>
-            <a:r>
-              <a:rPr lang="en-US" sz="4000" dirty="0" err="1">
-                <a:solidFill>
-                  <a:schemeClr val="bg1"/>
-                </a:solidFill>
-                <a:latin typeface="Arial" panose="020B0604020202020204" pitchFamily="34" charset="0"/>
-                <a:cs typeface="Arial" panose="020B0604020202020204" pitchFamily="34" charset="0"/>
-              </a:rPr>
-              <a:t>Munteanu</a:t>
+              <a:t> Center for Molecular Medicine, Berlin, Germany</a:t>
             </a:r>
             <a:endParaRPr lang="en-US" sz="4000" dirty="0">
               <a:solidFill>
@@ -3748,38 +3787,6 @@
               <a:cs typeface="Arial" panose="020B0604020202020204" pitchFamily="34" charset="0"/>
             </a:endParaRPr>
           </a:p>
-          <a:p>
-            <a:r>
-              <a:rPr lang="en-US" sz="4000" dirty="0">
-                <a:solidFill>
-                  <a:schemeClr val="bg1"/>
-                </a:solidFill>
-                <a:latin typeface="Arial" panose="020B0604020202020204" pitchFamily="34" charset="0"/>
-                <a:cs typeface="Arial" panose="020B0604020202020204" pitchFamily="34" charset="0"/>
-              </a:rPr>
-              <a:t>The Berlin Institute for Medical Systems Biology, Max-</a:t>
-            </a:r>
-            <a:r>
-              <a:rPr lang="en-US" sz="4000" dirty="0" err="1">
-                <a:solidFill>
-                  <a:schemeClr val="bg1"/>
-                </a:solidFill>
-                <a:latin typeface="Arial" panose="020B0604020202020204" pitchFamily="34" charset="0"/>
-                <a:cs typeface="Arial" panose="020B0604020202020204" pitchFamily="34" charset="0"/>
-              </a:rPr>
-              <a:t>Delbrueck</a:t>
-            </a:r>
-            <a:r>
-              <a:rPr lang="en-US" sz="4000" dirty="0">
-                <a:solidFill>
-                  <a:schemeClr val="bg1"/>
-                </a:solidFill>
-                <a:latin typeface="Arial" panose="020B0604020202020204" pitchFamily="34" charset="0"/>
-                <a:cs typeface="Arial" panose="020B0604020202020204" pitchFamily="34" charset="0"/>
-              </a:rPr>
-              <a:t> Center for Molecular Medicine, Berlin, Germany</a:t>
-            </a:r>
-          </a:p>
         </p:txBody>
       </p:sp>
       <p:sp>
@@ -3791,7 +3798,7 @@
         <p:spPr>
           <a:xfrm>
             <a:off x="1214774" y="3934541"/>
-            <a:ext cx="4728514" cy="4708981"/>
+            <a:ext cx="4728514" cy="3170099"/>
           </a:xfrm>
           <a:prstGeom prst="rect">
             <a:avLst/>
@@ -3817,7 +3824,7 @@
           </a:p>
           <a:p>
             <a:r>
-              <a:rPr lang="de-DE" sz="10000" b="1" dirty="0">
+              <a:rPr lang="de-DE" sz="10000" b="1" dirty="0" smtClean="0">
                 <a:solidFill>
                   <a:schemeClr val="bg1"/>
                 </a:solidFill>
@@ -3826,8 +3833,6 @@
               </a:rPr>
               <a:t>BIMSB</a:t>
             </a:r>
-          </a:p>
-          <a:p>
             <a:endParaRPr lang="de-DE" sz="10000" b="1" dirty="0">
               <a:solidFill>
                 <a:schemeClr val="bg1"/>
@@ -5500,7 +5505,7 @@
               </a:rPr>
               <a:t>functionality</a:t>
             </a:r>
-            <a:endParaRPr lang="de-DE" sz="4000">
+            <a:endParaRPr lang="de-DE" sz="4000" dirty="0">
               <a:latin typeface="Arial" panose="020B0604020202020204" pitchFamily="34" charset="0"/>
               <a:cs typeface="Arial" panose="020B0604020202020204" pitchFamily="34" charset="0"/>
             </a:endParaRPr>

</xml_diff>

<commit_message>
updated poster: fixed figure displacement
</commit_message>
<xml_diff>
--- a/rbc_bimsb/sab-berlin-2016/poster/BIMSB_SAB2016_poster.pptx
+++ b/rbc_bimsb/sab-berlin-2016/poster/BIMSB_SAB2016_poster.pptx
@@ -3118,36 +3118,461 @@
           <a:chExt cx="0" cy="0"/>
         </a:xfrm>
       </p:grpSpPr>
-      <p:pic>
-        <p:nvPicPr>
-          <p:cNvPr id="19" name="Bild 18" descr="GalaxyUserCount.png"/>
-          <p:cNvPicPr>
-            <a:picLocks noChangeAspect="1"/>
-          </p:cNvPicPr>
+      <p:grpSp>
+        <p:nvGrpSpPr>
+          <p:cNvPr id="3" name="Gruppierung 2"/>
+          <p:cNvGrpSpPr/>
           <p:nvPr/>
-        </p:nvPicPr>
-        <p:blipFill>
-          <a:blip r:embed="rId2">
-            <a:extLst>
-              <a:ext uri="{28A0092B-C50C-407E-A947-70E740481C1C}">
-                <a14:useLocalDpi xmlns:a14="http://schemas.microsoft.com/office/drawing/2010/main" val="0"/>
-              </a:ext>
-            </a:extLst>
-          </a:blip>
-          <a:stretch>
-            <a:fillRect/>
-          </a:stretch>
-        </p:blipFill>
-        <p:spPr>
+        </p:nvGrpSpPr>
+        <p:grpSpPr>
           <a:xfrm>
             <a:off x="17776739" y="31574059"/>
             <a:ext cx="12274722" cy="9638650"/>
+            <a:chOff x="17776739" y="31574059"/>
+            <a:chExt cx="12274722" cy="9638650"/>
           </a:xfrm>
-          <a:prstGeom prst="rect">
-            <a:avLst/>
-          </a:prstGeom>
-        </p:spPr>
-      </p:pic>
+        </p:grpSpPr>
+        <p:pic>
+          <p:nvPicPr>
+            <p:cNvPr id="19" name="Bild 18" descr="GalaxyUserCount.png"/>
+            <p:cNvPicPr>
+              <a:picLocks noChangeAspect="1"/>
+            </p:cNvPicPr>
+            <p:nvPr/>
+          </p:nvPicPr>
+          <p:blipFill>
+            <a:blip r:embed="rId2">
+              <a:extLst>
+                <a:ext uri="{28A0092B-C50C-407E-A947-70E740481C1C}">
+                  <a14:useLocalDpi xmlns:a14="http://schemas.microsoft.com/office/drawing/2010/main" val="0"/>
+                </a:ext>
+              </a:extLst>
+            </a:blip>
+            <a:stretch>
+              <a:fillRect/>
+            </a:stretch>
+          </p:blipFill>
+          <p:spPr>
+            <a:xfrm>
+              <a:off x="17776739" y="31574059"/>
+              <a:ext cx="12274722" cy="9638650"/>
+            </a:xfrm>
+            <a:prstGeom prst="rect">
+              <a:avLst/>
+            </a:prstGeom>
+          </p:spPr>
+        </p:pic>
+        <p:cxnSp>
+          <p:nvCxnSpPr>
+            <p:cNvPr id="23" name="Gerade Verbindung 22"/>
+            <p:cNvCxnSpPr/>
+            <p:nvPr/>
+          </p:nvCxnSpPr>
+          <p:spPr>
+            <a:xfrm flipV="1">
+              <a:off x="24188120" y="35734894"/>
+              <a:ext cx="337817" cy="1612899"/>
+            </a:xfrm>
+            <a:prstGeom prst="line">
+              <a:avLst/>
+            </a:prstGeom>
+            <a:ln w="57150" cmpd="sng">
+              <a:solidFill>
+                <a:schemeClr val="tx2"/>
+              </a:solidFill>
+            </a:ln>
+          </p:spPr>
+          <p:style>
+            <a:lnRef idx="2">
+              <a:schemeClr val="accent1"/>
+            </a:lnRef>
+            <a:fillRef idx="0">
+              <a:schemeClr val="accent1"/>
+            </a:fillRef>
+            <a:effectRef idx="1">
+              <a:schemeClr val="accent1"/>
+            </a:effectRef>
+            <a:fontRef idx="minor">
+              <a:schemeClr val="tx1"/>
+            </a:fontRef>
+          </p:style>
+        </p:cxnSp>
+        <p:cxnSp>
+          <p:nvCxnSpPr>
+            <p:cNvPr id="45" name="Gerade Verbindung 44"/>
+            <p:cNvCxnSpPr/>
+            <p:nvPr/>
+          </p:nvCxnSpPr>
+          <p:spPr>
+            <a:xfrm flipV="1">
+              <a:off x="25431748" y="33366288"/>
+              <a:ext cx="337817" cy="1612900"/>
+            </a:xfrm>
+            <a:prstGeom prst="line">
+              <a:avLst/>
+            </a:prstGeom>
+            <a:ln w="57150" cmpd="sng">
+              <a:solidFill>
+                <a:schemeClr val="tx2"/>
+              </a:solidFill>
+            </a:ln>
+          </p:spPr>
+          <p:style>
+            <a:lnRef idx="2">
+              <a:schemeClr val="accent1"/>
+            </a:lnRef>
+            <a:fillRef idx="0">
+              <a:schemeClr val="accent1"/>
+            </a:fillRef>
+            <a:effectRef idx="1">
+              <a:schemeClr val="accent1"/>
+            </a:effectRef>
+            <a:fontRef idx="minor">
+              <a:schemeClr val="tx1"/>
+            </a:fontRef>
+          </p:style>
+        </p:cxnSp>
+        <p:cxnSp>
+          <p:nvCxnSpPr>
+            <p:cNvPr id="51" name="Gerade Verbindung mit Pfeil 50"/>
+            <p:cNvCxnSpPr>
+              <a:stCxn id="46" idx="3"/>
+            </p:cNvCxnSpPr>
+            <p:nvPr/>
+          </p:nvCxnSpPr>
+          <p:spPr>
+            <a:xfrm>
+              <a:off x="25095198" y="33947580"/>
+              <a:ext cx="450850" cy="257202"/>
+            </a:xfrm>
+            <a:prstGeom prst="straightConnector1">
+              <a:avLst/>
+            </a:prstGeom>
+            <a:ln w="38100" cmpd="sng">
+              <a:solidFill>
+                <a:srgbClr val="1F497D"/>
+              </a:solidFill>
+              <a:tailEnd type="arrow"/>
+            </a:ln>
+          </p:spPr>
+          <p:style>
+            <a:lnRef idx="2">
+              <a:schemeClr val="accent1"/>
+            </a:lnRef>
+            <a:fillRef idx="0">
+              <a:schemeClr val="accent1"/>
+            </a:fillRef>
+            <a:effectRef idx="1">
+              <a:schemeClr val="accent1"/>
+            </a:effectRef>
+            <a:fontRef idx="minor">
+              <a:schemeClr val="tx1"/>
+            </a:fontRef>
+          </p:style>
+        </p:cxnSp>
+        <p:sp>
+          <p:nvSpPr>
+            <p:cNvPr id="46" name="Textfeld 45"/>
+            <p:cNvSpPr txBox="1"/>
+            <p:nvPr/>
+          </p:nvSpPr>
+          <p:spPr>
+            <a:xfrm>
+              <a:off x="23329898" y="33347416"/>
+              <a:ext cx="1765300" cy="1200328"/>
+            </a:xfrm>
+            <a:prstGeom prst="rect">
+              <a:avLst/>
+            </a:prstGeom>
+            <a:noFill/>
+            <a:ln w="19050" cmpd="sng">
+              <a:solidFill>
+                <a:srgbClr val="1F497D"/>
+              </a:solidFill>
+            </a:ln>
+          </p:spPr>
+          <p:txBody>
+            <a:bodyPr wrap="square" rtlCol="0">
+              <a:spAutoFit/>
+              <a:scene3d>
+                <a:camera prst="orthographicFront"/>
+                <a:lightRig rig="soft" dir="tl">
+                  <a:rot lat="0" lon="0" rev="0"/>
+                </a:lightRig>
+              </a:scene3d>
+              <a:sp3d contourW="25400" prstMaterial="matte">
+                <a:bevelT w="25400" h="55880" prst="artDeco"/>
+                <a:contourClr>
+                  <a:schemeClr val="accent2">
+                    <a:tint val="20000"/>
+                  </a:schemeClr>
+                </a:contourClr>
+              </a:sp3d>
+            </a:bodyPr>
+            <a:lstStyle/>
+            <a:p>
+              <a:r>
+                <a:rPr lang="de-DE" sz="2400" b="1" spc="50" dirty="0" smtClean="0">
+                  <a:ln w="11430"/>
+                  <a:solidFill>
+                    <a:schemeClr val="tx2"/>
+                  </a:solidFill>
+                  <a:effectLst>
+                    <a:outerShdw blurRad="76200" dist="50800" dir="5400000" algn="tl" rotWithShape="0">
+                      <a:srgbClr val="000000">
+                        <a:alpha val="65000"/>
+                      </a:srgbClr>
+                    </a:outerShdw>
+                  </a:effectLst>
+                  <a:latin typeface="Arial"/>
+                  <a:cs typeface="Arial"/>
+                </a:rPr>
+                <a:t>Second </a:t>
+              </a:r>
+            </a:p>
+            <a:p>
+              <a:r>
+                <a:rPr lang="de-DE" sz="2400" b="1" spc="50" dirty="0" err="1" smtClean="0">
+                  <a:ln w="11430"/>
+                  <a:solidFill>
+                    <a:schemeClr val="tx2"/>
+                  </a:solidFill>
+                  <a:effectLst>
+                    <a:outerShdw blurRad="76200" dist="50800" dir="5400000" algn="tl" rotWithShape="0">
+                      <a:srgbClr val="000000">
+                        <a:alpha val="65000"/>
+                      </a:srgbClr>
+                    </a:outerShdw>
+                  </a:effectLst>
+                  <a:latin typeface="Arial"/>
+                  <a:cs typeface="Arial"/>
+                </a:rPr>
+                <a:t>Galaxy</a:t>
+              </a:r>
+              <a:endParaRPr lang="de-DE" sz="2400" b="1" spc="50" dirty="0" smtClean="0">
+                <a:ln w="11430"/>
+                <a:solidFill>
+                  <a:schemeClr val="tx2"/>
+                </a:solidFill>
+                <a:effectLst>
+                  <a:outerShdw blurRad="76200" dist="50800" dir="5400000" algn="tl" rotWithShape="0">
+                    <a:srgbClr val="000000">
+                      <a:alpha val="65000"/>
+                    </a:srgbClr>
+                  </a:outerShdw>
+                </a:effectLst>
+                <a:latin typeface="Arial"/>
+                <a:cs typeface="Arial"/>
+              </a:endParaRPr>
+            </a:p>
+            <a:p>
+              <a:r>
+                <a:rPr lang="de-DE" sz="2400" b="1" spc="50" dirty="0" smtClean="0">
+                  <a:ln w="11430"/>
+                  <a:solidFill>
+                    <a:schemeClr val="tx2"/>
+                  </a:solidFill>
+                  <a:effectLst>
+                    <a:outerShdw blurRad="76200" dist="50800" dir="5400000" algn="tl" rotWithShape="0">
+                      <a:srgbClr val="000000">
+                        <a:alpha val="65000"/>
+                      </a:srgbClr>
+                    </a:outerShdw>
+                  </a:effectLst>
+                  <a:latin typeface="Arial"/>
+                  <a:cs typeface="Arial"/>
+                </a:rPr>
+                <a:t>Workshop</a:t>
+              </a:r>
+              <a:endParaRPr lang="de-DE" sz="2400" b="1" spc="50" dirty="0">
+                <a:ln w="11430"/>
+                <a:solidFill>
+                  <a:schemeClr val="tx2"/>
+                </a:solidFill>
+                <a:effectLst>
+                  <a:outerShdw blurRad="76200" dist="50800" dir="5400000" algn="tl" rotWithShape="0">
+                    <a:srgbClr val="000000">
+                      <a:alpha val="65000"/>
+                    </a:srgbClr>
+                  </a:outerShdw>
+                </a:effectLst>
+                <a:latin typeface="Arial"/>
+                <a:cs typeface="Arial"/>
+              </a:endParaRPr>
+            </a:p>
+          </p:txBody>
+        </p:sp>
+        <p:cxnSp>
+          <p:nvCxnSpPr>
+            <p:cNvPr id="56" name="Gerade Verbindung mit Pfeil 55"/>
+            <p:cNvCxnSpPr>
+              <a:stCxn id="57" idx="3"/>
+            </p:cNvCxnSpPr>
+            <p:nvPr/>
+          </p:nvCxnSpPr>
+          <p:spPr>
+            <a:xfrm>
+              <a:off x="23825200" y="36335058"/>
+              <a:ext cx="451820" cy="276135"/>
+            </a:xfrm>
+            <a:prstGeom prst="straightConnector1">
+              <a:avLst/>
+            </a:prstGeom>
+            <a:ln w="38100" cmpd="sng">
+              <a:solidFill>
+                <a:srgbClr val="1F497D"/>
+              </a:solidFill>
+              <a:tailEnd type="arrow"/>
+            </a:ln>
+          </p:spPr>
+          <p:style>
+            <a:lnRef idx="2">
+              <a:schemeClr val="accent1"/>
+            </a:lnRef>
+            <a:fillRef idx="0">
+              <a:schemeClr val="accent1"/>
+            </a:fillRef>
+            <a:effectRef idx="1">
+              <a:schemeClr val="accent1"/>
+            </a:effectRef>
+            <a:fontRef idx="minor">
+              <a:schemeClr val="tx1"/>
+            </a:fontRef>
+          </p:style>
+        </p:cxnSp>
+        <p:sp>
+          <p:nvSpPr>
+            <p:cNvPr id="57" name="Textfeld 56"/>
+            <p:cNvSpPr txBox="1"/>
+            <p:nvPr/>
+          </p:nvSpPr>
+          <p:spPr>
+            <a:xfrm>
+              <a:off x="22059900" y="35734894"/>
+              <a:ext cx="1765300" cy="1200328"/>
+            </a:xfrm>
+            <a:prstGeom prst="rect">
+              <a:avLst/>
+            </a:prstGeom>
+            <a:noFill/>
+            <a:ln w="19050" cmpd="sng">
+              <a:solidFill>
+                <a:srgbClr val="1F497D"/>
+              </a:solidFill>
+            </a:ln>
+          </p:spPr>
+          <p:txBody>
+            <a:bodyPr wrap="square" rtlCol="0">
+              <a:spAutoFit/>
+              <a:scene3d>
+                <a:camera prst="orthographicFront"/>
+                <a:lightRig rig="soft" dir="tl">
+                  <a:rot lat="0" lon="0" rev="0"/>
+                </a:lightRig>
+              </a:scene3d>
+              <a:sp3d contourW="25400" prstMaterial="matte">
+                <a:bevelT w="25400" h="55880" prst="artDeco"/>
+                <a:contourClr>
+                  <a:schemeClr val="accent2">
+                    <a:tint val="20000"/>
+                  </a:schemeClr>
+                </a:contourClr>
+              </a:sp3d>
+            </a:bodyPr>
+            <a:lstStyle/>
+            <a:p>
+              <a:r>
+                <a:rPr lang="de-DE" sz="2400" b="1" spc="50" dirty="0" smtClean="0">
+                  <a:ln w="11430"/>
+                  <a:solidFill>
+                    <a:schemeClr val="tx2"/>
+                  </a:solidFill>
+                  <a:effectLst>
+                    <a:outerShdw blurRad="76200" dist="50800" dir="5400000" algn="tl" rotWithShape="0">
+                      <a:srgbClr val="000000">
+                        <a:alpha val="65000"/>
+                      </a:srgbClr>
+                    </a:outerShdw>
+                  </a:effectLst>
+                  <a:latin typeface="Arial"/>
+                  <a:cs typeface="Arial"/>
+                </a:rPr>
+                <a:t>First</a:t>
+              </a:r>
+            </a:p>
+            <a:p>
+              <a:r>
+                <a:rPr lang="de-DE" sz="2400" b="1" spc="50" dirty="0" err="1" smtClean="0">
+                  <a:ln w="11430"/>
+                  <a:solidFill>
+                    <a:schemeClr val="tx2"/>
+                  </a:solidFill>
+                  <a:effectLst>
+                    <a:outerShdw blurRad="76200" dist="50800" dir="5400000" algn="tl" rotWithShape="0">
+                      <a:srgbClr val="000000">
+                        <a:alpha val="65000"/>
+                      </a:srgbClr>
+                    </a:outerShdw>
+                  </a:effectLst>
+                  <a:latin typeface="Arial"/>
+                  <a:cs typeface="Arial"/>
+                </a:rPr>
+                <a:t>Galaxy</a:t>
+              </a:r>
+              <a:endParaRPr lang="de-DE" sz="2400" b="1" spc="50" dirty="0" smtClean="0">
+                <a:ln w="11430"/>
+                <a:solidFill>
+                  <a:schemeClr val="tx2"/>
+                </a:solidFill>
+                <a:effectLst>
+                  <a:outerShdw blurRad="76200" dist="50800" dir="5400000" algn="tl" rotWithShape="0">
+                    <a:srgbClr val="000000">
+                      <a:alpha val="65000"/>
+                    </a:srgbClr>
+                  </a:outerShdw>
+                </a:effectLst>
+                <a:latin typeface="Arial"/>
+                <a:cs typeface="Arial"/>
+              </a:endParaRPr>
+            </a:p>
+            <a:p>
+              <a:r>
+                <a:rPr lang="de-DE" sz="2400" b="1" spc="50" dirty="0" smtClean="0">
+                  <a:ln w="11430"/>
+                  <a:solidFill>
+                    <a:schemeClr val="tx2"/>
+                  </a:solidFill>
+                  <a:effectLst>
+                    <a:outerShdw blurRad="76200" dist="50800" dir="5400000" algn="tl" rotWithShape="0">
+                      <a:srgbClr val="000000">
+                        <a:alpha val="65000"/>
+                      </a:srgbClr>
+                    </a:outerShdw>
+                  </a:effectLst>
+                  <a:latin typeface="Arial"/>
+                  <a:cs typeface="Arial"/>
+                </a:rPr>
+                <a:t>Workshop</a:t>
+              </a:r>
+              <a:endParaRPr lang="de-DE" sz="2400" b="1" spc="50" dirty="0">
+                <a:ln w="11430"/>
+                <a:solidFill>
+                  <a:schemeClr val="tx2"/>
+                </a:solidFill>
+                <a:effectLst>
+                  <a:outerShdw blurRad="76200" dist="50800" dir="5400000" algn="tl" rotWithShape="0">
+                    <a:srgbClr val="000000">
+                      <a:alpha val="65000"/>
+                    </a:srgbClr>
+                  </a:outerShdw>
+                </a:effectLst>
+                <a:latin typeface="Arial"/>
+                <a:cs typeface="Arial"/>
+              </a:endParaRPr>
+            </a:p>
+          </p:txBody>
+        </p:sp>
+      </p:grpSp>
       <p:pic>
         <p:nvPicPr>
           <p:cNvPr id="16" name="Bild 15" descr="logo_28185.png"/>
@@ -6455,416 +6880,6 @@
               <a:ea typeface="Calibri"/>
               <a:cs typeface="Arial"/>
               <a:sym typeface="Calibri"/>
-            </a:endParaRPr>
-          </a:p>
-        </p:txBody>
-      </p:sp>
-      <p:cxnSp>
-        <p:nvCxnSpPr>
-          <p:cNvPr id="23" name="Gerade Verbindung 22"/>
-          <p:cNvCxnSpPr/>
-          <p:nvPr/>
-        </p:nvCxnSpPr>
-        <p:spPr>
-          <a:xfrm flipV="1">
-            <a:off x="23825200" y="35128201"/>
-            <a:ext cx="337817" cy="1612899"/>
-          </a:xfrm>
-          <a:prstGeom prst="line">
-            <a:avLst/>
-          </a:prstGeom>
-          <a:ln w="57150" cmpd="sng">
-            <a:solidFill>
-              <a:schemeClr val="tx2"/>
-            </a:solidFill>
-          </a:ln>
-        </p:spPr>
-        <p:style>
-          <a:lnRef idx="2">
-            <a:schemeClr val="accent1"/>
-          </a:lnRef>
-          <a:fillRef idx="0">
-            <a:schemeClr val="accent1"/>
-          </a:fillRef>
-          <a:effectRef idx="1">
-            <a:schemeClr val="accent1"/>
-          </a:effectRef>
-          <a:fontRef idx="minor">
-            <a:schemeClr val="tx1"/>
-          </a:fontRef>
-        </p:style>
-      </p:cxnSp>
-      <p:cxnSp>
-        <p:nvCxnSpPr>
-          <p:cNvPr id="45" name="Gerade Verbindung 44"/>
-          <p:cNvCxnSpPr/>
-          <p:nvPr/>
-        </p:nvCxnSpPr>
-        <p:spPr>
-          <a:xfrm flipV="1">
-            <a:off x="25044400" y="32759534"/>
-            <a:ext cx="337817" cy="1612900"/>
-          </a:xfrm>
-          <a:prstGeom prst="line">
-            <a:avLst/>
-          </a:prstGeom>
-          <a:ln w="57150" cmpd="sng">
-            <a:solidFill>
-              <a:schemeClr val="tx2"/>
-            </a:solidFill>
-          </a:ln>
-        </p:spPr>
-        <p:style>
-          <a:lnRef idx="2">
-            <a:schemeClr val="accent1"/>
-          </a:lnRef>
-          <a:fillRef idx="0">
-            <a:schemeClr val="accent1"/>
-          </a:fillRef>
-          <a:effectRef idx="1">
-            <a:schemeClr val="accent1"/>
-          </a:effectRef>
-          <a:fontRef idx="minor">
-            <a:schemeClr val="tx1"/>
-          </a:fontRef>
-        </p:style>
-      </p:cxnSp>
-      <p:cxnSp>
-        <p:nvCxnSpPr>
-          <p:cNvPr id="51" name="Gerade Verbindung mit Pfeil 50"/>
-          <p:cNvCxnSpPr>
-            <a:stCxn id="46" idx="3"/>
-          </p:cNvCxnSpPr>
-          <p:nvPr/>
-        </p:nvCxnSpPr>
-        <p:spPr>
-          <a:xfrm>
-            <a:off x="24707850" y="33340826"/>
-            <a:ext cx="450850" cy="257202"/>
-          </a:xfrm>
-          <a:prstGeom prst="straightConnector1">
-            <a:avLst/>
-          </a:prstGeom>
-          <a:ln w="38100" cmpd="sng">
-            <a:solidFill>
-              <a:srgbClr val="1F497D"/>
-            </a:solidFill>
-            <a:tailEnd type="arrow"/>
-          </a:ln>
-        </p:spPr>
-        <p:style>
-          <a:lnRef idx="2">
-            <a:schemeClr val="accent1"/>
-          </a:lnRef>
-          <a:fillRef idx="0">
-            <a:schemeClr val="accent1"/>
-          </a:fillRef>
-          <a:effectRef idx="1">
-            <a:schemeClr val="accent1"/>
-          </a:effectRef>
-          <a:fontRef idx="minor">
-            <a:schemeClr val="tx1"/>
-          </a:fontRef>
-        </p:style>
-      </p:cxnSp>
-      <p:sp>
-        <p:nvSpPr>
-          <p:cNvPr id="46" name="Textfeld 45"/>
-          <p:cNvSpPr txBox="1"/>
-          <p:nvPr/>
-        </p:nvSpPr>
-        <p:spPr>
-          <a:xfrm>
-            <a:off x="22942550" y="32740662"/>
-            <a:ext cx="1765300" cy="1200328"/>
-          </a:xfrm>
-          <a:prstGeom prst="rect">
-            <a:avLst/>
-          </a:prstGeom>
-          <a:noFill/>
-          <a:ln w="19050" cmpd="sng">
-            <a:solidFill>
-              <a:srgbClr val="1F497D"/>
-            </a:solidFill>
-          </a:ln>
-        </p:spPr>
-        <p:txBody>
-          <a:bodyPr wrap="square" rtlCol="0">
-            <a:spAutoFit/>
-            <a:scene3d>
-              <a:camera prst="orthographicFront"/>
-              <a:lightRig rig="soft" dir="tl">
-                <a:rot lat="0" lon="0" rev="0"/>
-              </a:lightRig>
-            </a:scene3d>
-            <a:sp3d contourW="25400" prstMaterial="matte">
-              <a:bevelT w="25400" h="55880" prst="artDeco"/>
-              <a:contourClr>
-                <a:schemeClr val="accent2">
-                  <a:tint val="20000"/>
-                </a:schemeClr>
-              </a:contourClr>
-            </a:sp3d>
-          </a:bodyPr>
-          <a:lstStyle/>
-          <a:p>
-            <a:r>
-              <a:rPr lang="de-DE" sz="2400" b="1" spc="50" dirty="0" smtClean="0">
-                <a:ln w="11430"/>
-                <a:solidFill>
-                  <a:schemeClr val="tx2"/>
-                </a:solidFill>
-                <a:effectLst>
-                  <a:outerShdw blurRad="76200" dist="50800" dir="5400000" algn="tl" rotWithShape="0">
-                    <a:srgbClr val="000000">
-                      <a:alpha val="65000"/>
-                    </a:srgbClr>
-                  </a:outerShdw>
-                </a:effectLst>
-                <a:latin typeface="Arial"/>
-                <a:cs typeface="Arial"/>
-              </a:rPr>
-              <a:t>Second </a:t>
-            </a:r>
-          </a:p>
-          <a:p>
-            <a:r>
-              <a:rPr lang="de-DE" sz="2400" b="1" spc="50" dirty="0" err="1" smtClean="0">
-                <a:ln w="11430"/>
-                <a:solidFill>
-                  <a:schemeClr val="tx2"/>
-                </a:solidFill>
-                <a:effectLst>
-                  <a:outerShdw blurRad="76200" dist="50800" dir="5400000" algn="tl" rotWithShape="0">
-                    <a:srgbClr val="000000">
-                      <a:alpha val="65000"/>
-                    </a:srgbClr>
-                  </a:outerShdw>
-                </a:effectLst>
-                <a:latin typeface="Arial"/>
-                <a:cs typeface="Arial"/>
-              </a:rPr>
-              <a:t>Galaxy</a:t>
-            </a:r>
-            <a:endParaRPr lang="de-DE" sz="2400" b="1" spc="50" dirty="0" smtClean="0">
-              <a:ln w="11430"/>
-              <a:solidFill>
-                <a:schemeClr val="tx2"/>
-              </a:solidFill>
-              <a:effectLst>
-                <a:outerShdw blurRad="76200" dist="50800" dir="5400000" algn="tl" rotWithShape="0">
-                  <a:srgbClr val="000000">
-                    <a:alpha val="65000"/>
-                  </a:srgbClr>
-                </a:outerShdw>
-              </a:effectLst>
-              <a:latin typeface="Arial"/>
-              <a:cs typeface="Arial"/>
-            </a:endParaRPr>
-          </a:p>
-          <a:p>
-            <a:r>
-              <a:rPr lang="de-DE" sz="2400" b="1" spc="50" dirty="0" smtClean="0">
-                <a:ln w="11430"/>
-                <a:solidFill>
-                  <a:schemeClr val="tx2"/>
-                </a:solidFill>
-                <a:effectLst>
-                  <a:outerShdw blurRad="76200" dist="50800" dir="5400000" algn="tl" rotWithShape="0">
-                    <a:srgbClr val="000000">
-                      <a:alpha val="65000"/>
-                    </a:srgbClr>
-                  </a:outerShdw>
-                </a:effectLst>
-                <a:latin typeface="Arial"/>
-                <a:cs typeface="Arial"/>
-              </a:rPr>
-              <a:t>Workshop</a:t>
-            </a:r>
-            <a:endParaRPr lang="de-DE" sz="2400" b="1" spc="50" dirty="0">
-              <a:ln w="11430"/>
-              <a:solidFill>
-                <a:schemeClr val="tx2"/>
-              </a:solidFill>
-              <a:effectLst>
-                <a:outerShdw blurRad="76200" dist="50800" dir="5400000" algn="tl" rotWithShape="0">
-                  <a:srgbClr val="000000">
-                    <a:alpha val="65000"/>
-                  </a:srgbClr>
-                </a:outerShdw>
-              </a:effectLst>
-              <a:latin typeface="Arial"/>
-              <a:cs typeface="Arial"/>
-            </a:endParaRPr>
-          </a:p>
-        </p:txBody>
-      </p:sp>
-      <p:cxnSp>
-        <p:nvCxnSpPr>
-          <p:cNvPr id="56" name="Gerade Verbindung mit Pfeil 55"/>
-          <p:cNvCxnSpPr>
-            <a:stCxn id="57" idx="3"/>
-          </p:cNvCxnSpPr>
-          <p:nvPr/>
-        </p:nvCxnSpPr>
-        <p:spPr>
-          <a:xfrm>
-            <a:off x="23462280" y="35728365"/>
-            <a:ext cx="451820" cy="276135"/>
-          </a:xfrm>
-          <a:prstGeom prst="straightConnector1">
-            <a:avLst/>
-          </a:prstGeom>
-          <a:ln w="38100" cmpd="sng">
-            <a:solidFill>
-              <a:srgbClr val="1F497D"/>
-            </a:solidFill>
-            <a:tailEnd type="arrow"/>
-          </a:ln>
-        </p:spPr>
-        <p:style>
-          <a:lnRef idx="2">
-            <a:schemeClr val="accent1"/>
-          </a:lnRef>
-          <a:fillRef idx="0">
-            <a:schemeClr val="accent1"/>
-          </a:fillRef>
-          <a:effectRef idx="1">
-            <a:schemeClr val="accent1"/>
-          </a:effectRef>
-          <a:fontRef idx="minor">
-            <a:schemeClr val="tx1"/>
-          </a:fontRef>
-        </p:style>
-      </p:cxnSp>
-      <p:sp>
-        <p:nvSpPr>
-          <p:cNvPr id="57" name="Textfeld 56"/>
-          <p:cNvSpPr txBox="1"/>
-          <p:nvPr/>
-        </p:nvSpPr>
-        <p:spPr>
-          <a:xfrm>
-            <a:off x="21696980" y="35128201"/>
-            <a:ext cx="1765300" cy="1200328"/>
-          </a:xfrm>
-          <a:prstGeom prst="rect">
-            <a:avLst/>
-          </a:prstGeom>
-          <a:noFill/>
-          <a:ln w="19050" cmpd="sng">
-            <a:solidFill>
-              <a:srgbClr val="1F497D"/>
-            </a:solidFill>
-          </a:ln>
-        </p:spPr>
-        <p:txBody>
-          <a:bodyPr wrap="square" rtlCol="0">
-            <a:spAutoFit/>
-            <a:scene3d>
-              <a:camera prst="orthographicFront"/>
-              <a:lightRig rig="soft" dir="tl">
-                <a:rot lat="0" lon="0" rev="0"/>
-              </a:lightRig>
-            </a:scene3d>
-            <a:sp3d contourW="25400" prstMaterial="matte">
-              <a:bevelT w="25400" h="55880" prst="artDeco"/>
-              <a:contourClr>
-                <a:schemeClr val="accent2">
-                  <a:tint val="20000"/>
-                </a:schemeClr>
-              </a:contourClr>
-            </a:sp3d>
-          </a:bodyPr>
-          <a:lstStyle/>
-          <a:p>
-            <a:r>
-              <a:rPr lang="de-DE" sz="2400" b="1" spc="50" dirty="0" smtClean="0">
-                <a:ln w="11430"/>
-                <a:solidFill>
-                  <a:schemeClr val="tx2"/>
-                </a:solidFill>
-                <a:effectLst>
-                  <a:outerShdw blurRad="76200" dist="50800" dir="5400000" algn="tl" rotWithShape="0">
-                    <a:srgbClr val="000000">
-                      <a:alpha val="65000"/>
-                    </a:srgbClr>
-                  </a:outerShdw>
-                </a:effectLst>
-                <a:latin typeface="Arial"/>
-                <a:cs typeface="Arial"/>
-              </a:rPr>
-              <a:t>First</a:t>
-            </a:r>
-          </a:p>
-          <a:p>
-            <a:r>
-              <a:rPr lang="de-DE" sz="2400" b="1" spc="50" dirty="0" err="1" smtClean="0">
-                <a:ln w="11430"/>
-                <a:solidFill>
-                  <a:schemeClr val="tx2"/>
-                </a:solidFill>
-                <a:effectLst>
-                  <a:outerShdw blurRad="76200" dist="50800" dir="5400000" algn="tl" rotWithShape="0">
-                    <a:srgbClr val="000000">
-                      <a:alpha val="65000"/>
-                    </a:srgbClr>
-                  </a:outerShdw>
-                </a:effectLst>
-                <a:latin typeface="Arial"/>
-                <a:cs typeface="Arial"/>
-              </a:rPr>
-              <a:t>Galaxy</a:t>
-            </a:r>
-            <a:endParaRPr lang="de-DE" sz="2400" b="1" spc="50" dirty="0" smtClean="0">
-              <a:ln w="11430"/>
-              <a:solidFill>
-                <a:schemeClr val="tx2"/>
-              </a:solidFill>
-              <a:effectLst>
-                <a:outerShdw blurRad="76200" dist="50800" dir="5400000" algn="tl" rotWithShape="0">
-                  <a:srgbClr val="000000">
-                    <a:alpha val="65000"/>
-                  </a:srgbClr>
-                </a:outerShdw>
-              </a:effectLst>
-              <a:latin typeface="Arial"/>
-              <a:cs typeface="Arial"/>
-            </a:endParaRPr>
-          </a:p>
-          <a:p>
-            <a:r>
-              <a:rPr lang="de-DE" sz="2400" b="1" spc="50" dirty="0" smtClean="0">
-                <a:ln w="11430"/>
-                <a:solidFill>
-                  <a:schemeClr val="tx2"/>
-                </a:solidFill>
-                <a:effectLst>
-                  <a:outerShdw blurRad="76200" dist="50800" dir="5400000" algn="tl" rotWithShape="0">
-                    <a:srgbClr val="000000">
-                      <a:alpha val="65000"/>
-                    </a:srgbClr>
-                  </a:outerShdw>
-                </a:effectLst>
-                <a:latin typeface="Arial"/>
-                <a:cs typeface="Arial"/>
-              </a:rPr>
-              <a:t>Workshop</a:t>
-            </a:r>
-            <a:endParaRPr lang="de-DE" sz="2400" b="1" spc="50" dirty="0">
-              <a:ln w="11430"/>
-              <a:solidFill>
-                <a:schemeClr val="tx2"/>
-              </a:solidFill>
-              <a:effectLst>
-                <a:outerShdw blurRad="76200" dist="50800" dir="5400000" algn="tl" rotWithShape="0">
-                  <a:srgbClr val="000000">
-                    <a:alpha val="65000"/>
-                  </a:srgbClr>
-                </a:outerShdw>
-              </a:effectLst>
-              <a:latin typeface="Arial"/>
-              <a:cs typeface="Arial"/>
             </a:endParaRPr>
           </a:p>
         </p:txBody>

</xml_diff>

<commit_message>
BIMSB_SAB2016_poster.pptx: add summer school, update layout
</commit_message>
<xml_diff>
--- a/rbc_bimsb/sab-berlin-2016/poster/BIMSB_SAB2016_poster.pptx
+++ b/rbc_bimsb/sab-berlin-2016/poster/BIMSB_SAB2016_poster.pptx
@@ -10147,7 +10147,7 @@
         </p:nvGrpSpPr>
         <p:grpSpPr>
           <a:xfrm>
-            <a:off x="17776739" y="31574059"/>
+            <a:off x="16633739" y="30964459"/>
             <a:ext cx="12274722" cy="9638649"/>
             <a:chOff x="17776739" y="31574059"/>
             <a:chExt cx="12274722" cy="9638649"/>
@@ -10749,89 +10749,16 @@
           </a:p>
         </p:txBody>
       </p:sp>
-      <p:sp>
-        <p:nvSpPr>
-          <p:cNvPr id="97" name="Shape 97"/>
-          <p:cNvSpPr txBox="1"/>
-          <p:nvPr/>
-        </p:nvSpPr>
-        <p:spPr>
-          <a:xfrm>
-            <a:off x="-19888200" y="3548910"/>
-            <a:ext cx="184730" cy="1354217"/>
-          </a:xfrm>
-          <a:prstGeom prst="rect">
-            <a:avLst/>
-          </a:prstGeom>
-          <a:noFill/>
-          <a:ln>
-            <a:noFill/>
-          </a:ln>
-        </p:spPr>
-        <p:txBody>
-          <a:bodyPr anchorCtr="0" anchor="t" bIns="45700" lIns="91425" rIns="91425" tIns="45700">
-            <a:noAutofit/>
-          </a:bodyPr>
-          <a:lstStyle/>
-          <a:p>
-            <a:pPr indent="0" lvl="0" marL="0" marR="0" rtl="0" algn="l">
-              <a:spcBef>
-                <a:spcPts val="0"/>
-              </a:spcBef>
-              <a:buNone/>
-            </a:pPr>
-            <a:r>
-              <a:t/>
-            </a:r>
-            <a:endParaRPr sz="8200">
-              <a:solidFill>
-                <a:schemeClr val="dk1"/>
-              </a:solidFill>
-              <a:latin typeface="Calibri"/>
-              <a:ea typeface="Calibri"/>
-              <a:cs typeface="Calibri"/>
-              <a:sym typeface="Calibri"/>
-            </a:endParaRPr>
-          </a:p>
-        </p:txBody>
-      </p:sp>
-      <p:pic>
-        <p:nvPicPr>
-          <p:cNvPr id="98" name="Shape 98"/>
-          <p:cNvPicPr preferRelativeResize="0"/>
-          <p:nvPr/>
-        </p:nvPicPr>
-        <p:blipFill rotWithShape="1">
-          <a:blip r:embed="rId6">
-            <a:alphaModFix/>
-          </a:blip>
-          <a:srcRect b="0" l="0" r="0" t="0"/>
-          <a:stretch/>
-        </p:blipFill>
-        <p:spPr>
-          <a:xfrm>
-            <a:off x="15382932" y="22181529"/>
-            <a:ext cx="1609347" cy="548640"/>
-          </a:xfrm>
-          <a:prstGeom prst="rect">
-            <a:avLst/>
-          </a:prstGeom>
-          <a:noFill/>
-          <a:ln>
-            <a:noFill/>
-          </a:ln>
-        </p:spPr>
-      </p:pic>
       <p:cxnSp>
         <p:nvCxnSpPr>
-          <p:cNvPr id="99" name="Shape 99"/>
+          <p:cNvPr id="97" name="Shape 97"/>
           <p:cNvCxnSpPr/>
           <p:nvPr/>
         </p:nvCxnSpPr>
         <p:spPr>
           <a:xfrm>
-            <a:off x="7056000" y="4019280"/>
-            <a:ext cx="22137265" cy="0"/>
+            <a:off x="7056000" y="4324080"/>
+            <a:ext cx="22137300" cy="0"/>
           </a:xfrm>
           <a:prstGeom prst="straightConnector1">
             <a:avLst/>
@@ -10857,13 +10784,13 @@
       </p:cxnSp>
       <p:sp>
         <p:nvSpPr>
-          <p:cNvPr id="100" name="Shape 100"/>
+          <p:cNvPr id="98" name="Shape 98"/>
           <p:cNvSpPr txBox="1"/>
           <p:nvPr/>
         </p:nvSpPr>
         <p:spPr>
           <a:xfrm>
-            <a:off x="7400485" y="3814227"/>
+            <a:off x="7400485" y="3433227"/>
             <a:ext cx="22075800" cy="1015800"/>
           </a:xfrm>
           <a:prstGeom prst="rect">
@@ -10904,13 +10831,13 @@
       </p:sp>
       <p:sp>
         <p:nvSpPr>
-          <p:cNvPr id="101" name="Shape 101"/>
+          <p:cNvPr id="99" name="Shape 99"/>
           <p:cNvSpPr txBox="1"/>
           <p:nvPr/>
         </p:nvSpPr>
         <p:spPr>
           <a:xfrm>
-            <a:off x="7326070" y="5151850"/>
+            <a:off x="7326070" y="4694650"/>
             <a:ext cx="22075800" cy="2511600"/>
           </a:xfrm>
           <a:prstGeom prst="rect">
@@ -10978,14 +10905,14 @@
       </p:sp>
       <p:sp>
         <p:nvSpPr>
-          <p:cNvPr id="102" name="Shape 102"/>
+          <p:cNvPr id="100" name="Shape 100"/>
           <p:cNvSpPr txBox="1"/>
           <p:nvPr/>
         </p:nvSpPr>
         <p:spPr>
           <a:xfrm>
-            <a:off x="2131950" y="7893284"/>
-            <a:ext cx="28468500" cy="1323300"/>
+            <a:off x="2131950" y="7588475"/>
+            <a:ext cx="27919500" cy="1323300"/>
           </a:xfrm>
           <a:prstGeom prst="rect">
             <a:avLst/>
@@ -11039,20 +10966,32 @@
                 <a:cs typeface="Arial"/>
                 <a:sym typeface="Arial"/>
               </a:rPr>
-              <a:t>The Berlin Institute for Medical Systems Biology, Max-Delbrueck Center for Molecular Medicine, Berlin, Germany</a:t>
+              <a:t>The Ber</a:t>
+            </a:r>
+            <a:r>
+              <a:rPr lang="de-DE" sz="4000">
+                <a:solidFill>
+                  <a:schemeClr val="lt1"/>
+                </a:solidFill>
+                <a:latin typeface="Arial"/>
+                <a:ea typeface="Arial"/>
+                <a:cs typeface="Arial"/>
+                <a:sym typeface="Arial"/>
+              </a:rPr>
+              <a:t>lin Institute for Medical Systems Biology, Max-Delbrueck Center for Molecular Medicine, Berlin, Germany</a:t>
             </a:r>
           </a:p>
         </p:txBody>
       </p:sp>
       <p:sp>
         <p:nvSpPr>
-          <p:cNvPr id="103" name="Shape 103"/>
+          <p:cNvPr id="101" name="Shape 101"/>
           <p:cNvSpPr txBox="1"/>
           <p:nvPr/>
         </p:nvSpPr>
         <p:spPr>
           <a:xfrm>
-            <a:off x="1976774" y="4010741"/>
+            <a:off x="1976774" y="3858341"/>
             <a:ext cx="4728600" cy="3170100"/>
           </a:xfrm>
           <a:prstGeom prst="rect">
@@ -11086,7 +11025,15 @@
                 <a:cs typeface="Arial"/>
                 <a:sym typeface="Arial"/>
               </a:rPr>
-              <a:t>RBC:</a:t>
+              <a:t>RBC</a:t>
+            </a:r>
+            <a:r>
+              <a:rPr b="1" lang="de-DE" sz="10000">
+                <a:solidFill>
+                  <a:schemeClr val="lt1"/>
+                </a:solidFill>
+              </a:rPr>
+              <a:t> -</a:t>
             </a:r>
           </a:p>
           <a:p>
@@ -11114,12 +11061,12 @@
       </p:sp>
       <p:pic>
         <p:nvPicPr>
-          <p:cNvPr descr="bmbf-sponsored.jpg" id="104" name="Shape 104"/>
+          <p:cNvPr descr="bmbf-sponsored.jpg" id="102" name="Shape 102"/>
           <p:cNvPicPr preferRelativeResize="0"/>
           <p:nvPr/>
         </p:nvPicPr>
         <p:blipFill rotWithShape="1">
-          <a:blip r:embed="rId7">
+          <a:blip r:embed="rId6">
             <a:alphaModFix/>
           </a:blip>
           <a:srcRect b="0" l="0" r="0" t="0"/>
@@ -11141,7 +11088,7 @@
       </p:pic>
       <p:sp>
         <p:nvSpPr>
-          <p:cNvPr id="105" name="Shape 105"/>
+          <p:cNvPr id="103" name="Shape 103"/>
           <p:cNvSpPr txBox="1"/>
           <p:nvPr/>
         </p:nvSpPr>
@@ -11184,7 +11131,7 @@
       </p:sp>
       <p:sp>
         <p:nvSpPr>
-          <p:cNvPr id="106" name="Shape 106"/>
+          <p:cNvPr id="104" name="Shape 104"/>
           <p:cNvSpPr txBox="1"/>
           <p:nvPr/>
         </p:nvSpPr>
@@ -11233,14 +11180,14 @@
       </p:sp>
       <p:sp>
         <p:nvSpPr>
-          <p:cNvPr id="107" name="Shape 107"/>
+          <p:cNvPr id="105" name="Shape 105"/>
           <p:cNvSpPr txBox="1"/>
           <p:nvPr/>
         </p:nvSpPr>
         <p:spPr>
           <a:xfrm>
-            <a:off x="16642550" y="25152859"/>
-            <a:ext cx="12599999" cy="1015662"/>
+            <a:off x="16642550" y="23476459"/>
+            <a:ext cx="12600000" cy="1015800"/>
           </a:xfrm>
           <a:prstGeom prst="rect">
             <a:avLst/>
@@ -11282,7 +11229,7 @@
       </p:sp>
       <p:sp>
         <p:nvSpPr>
-          <p:cNvPr id="108" name="Shape 108"/>
+          <p:cNvPr id="106" name="Shape 106"/>
           <p:cNvSpPr txBox="1"/>
           <p:nvPr/>
         </p:nvSpPr>
@@ -11331,13 +11278,13 @@
       </p:sp>
       <p:sp>
         <p:nvSpPr>
-          <p:cNvPr id="109" name="Shape 109"/>
+          <p:cNvPr id="107" name="Shape 107"/>
           <p:cNvSpPr txBox="1"/>
           <p:nvPr/>
         </p:nvSpPr>
         <p:spPr>
           <a:xfrm>
-            <a:off x="1214774" y="35360406"/>
+            <a:off x="1214774" y="36274806"/>
             <a:ext cx="12599999" cy="1015800"/>
           </a:xfrm>
           <a:prstGeom prst="rect">
@@ -11373,21 +11320,21 @@
                 <a:cs typeface="Arial"/>
                 <a:sym typeface="Arial"/>
               </a:rPr>
-              <a:t>Publications </a:t>
+              <a:t>Publication </a:t>
             </a:r>
           </a:p>
         </p:txBody>
       </p:sp>
       <p:sp>
         <p:nvSpPr>
-          <p:cNvPr id="110" name="Shape 110"/>
+          <p:cNvPr id="108" name="Shape 108"/>
           <p:cNvSpPr txBox="1"/>
           <p:nvPr/>
         </p:nvSpPr>
         <p:spPr>
           <a:xfrm>
-            <a:off x="1217550" y="17432262"/>
-            <a:ext cx="14165382" cy="18651257"/>
+            <a:off x="1217550" y="17279862"/>
+            <a:ext cx="14165400" cy="18651300"/>
           </a:xfrm>
           <a:prstGeom prst="rect">
             <a:avLst/>
@@ -11411,7 +11358,7 @@
               <a:buNone/>
             </a:pPr>
             <a:r>
-              <a:rPr b="1" lang="de-DE" sz="6600" u="sng">
+              <a:rPr b="1" lang="de-DE" sz="6600">
                 <a:solidFill>
                   <a:schemeClr val="dk1"/>
                 </a:solidFill>
@@ -11549,30 +11496,6 @@
             </a:r>
           </a:p>
           <a:p>
-            <a:pPr indent="-862620" lvl="1" marL="2945420" marR="0" rtl="0" algn="l">
-              <a:spcBef>
-                <a:spcPts val="0"/>
-              </a:spcBef>
-              <a:buClr>
-                <a:schemeClr val="dk1"/>
-              </a:buClr>
-              <a:buFont typeface="Calibri"/>
-              <a:buNone/>
-            </a:pPr>
-            <a:r>
-              <a:t/>
-            </a:r>
-            <a:endParaRPr b="0" i="0" sz="6600" u="none" cap="none" strike="noStrike">
-              <a:solidFill>
-                <a:schemeClr val="dk1"/>
-              </a:solidFill>
-              <a:latin typeface="Arial"/>
-              <a:ea typeface="Arial"/>
-              <a:cs typeface="Arial"/>
-              <a:sym typeface="Arial"/>
-            </a:endParaRPr>
-          </a:p>
-          <a:p>
             <a:pPr indent="-857250" lvl="0" marL="857250" marR="0" rtl="0" algn="l">
               <a:spcBef>
                 <a:spcPts val="0"/>
@@ -11701,13 +11624,13 @@
                 <a:ea typeface="Arial"/>
                 <a:cs typeface="Arial"/>
                 <a:sym typeface="Arial"/>
-                <a:hlinkClick r:id="rId8"/>
+                <a:hlinkClick r:id="rId7"/>
               </a:rPr>
               <a:t>http://rcas.mdc-berlin.de/</a:t>
             </a:r>
           </a:p>
           <a:p>
-            <a:pPr indent="-5370" lvl="1" marL="2088170" marR="0" rtl="0" algn="l">
+            <a:pPr indent="-5369" lvl="1" marL="2088169" marR="0" rtl="0" algn="l">
               <a:spcBef>
                 <a:spcPts val="0"/>
               </a:spcBef>
@@ -11716,14 +11639,26 @@
             <a:r>
               <a:t/>
             </a:r>
-            <a:endParaRPr b="0" i="0" sz="4000" u="none" cap="none" strike="noStrike">
+            <a:endParaRPr sz="4000">
               <a:solidFill>
                 <a:schemeClr val="dk1"/>
               </a:solidFill>
-              <a:latin typeface="Arial"/>
-              <a:ea typeface="Arial"/>
-              <a:cs typeface="Arial"/>
-              <a:sym typeface="Arial"/>
+            </a:endParaRPr>
+          </a:p>
+          <a:p>
+            <a:pPr indent="-5370" lvl="1" marL="2088170" marR="0" rtl="0" algn="l">
+              <a:spcBef>
+                <a:spcPts val="0"/>
+              </a:spcBef>
+              <a:buNone/>
+            </a:pPr>
+            <a:r>
+              <a:t/>
+            </a:r>
+            <a:endParaRPr sz="4000">
+              <a:solidFill>
+                <a:schemeClr val="dk1"/>
+              </a:solidFill>
             </a:endParaRPr>
           </a:p>
           <a:p>
@@ -11731,11 +11666,27 @@
               <a:spcBef>
                 <a:spcPts val="0"/>
               </a:spcBef>
-              <a:buSzPct val="25000"/>
               <a:buNone/>
             </a:pPr>
             <a:r>
-              <a:rPr b="1" lang="de-DE" sz="6600" u="sng">
+              <a:t/>
+            </a:r>
+            <a:endParaRPr b="1" sz="6600" u="sng">
+              <a:solidFill>
+                <a:schemeClr val="dk1"/>
+              </a:solidFill>
+            </a:endParaRPr>
+          </a:p>
+          <a:p>
+            <a:pPr indent="0" lvl="0" marL="0" marR="0" rtl="0" algn="l">
+              <a:spcBef>
+                <a:spcPts val="0"/>
+              </a:spcBef>
+              <a:buSzPct val="25000"/>
+              <a:buNone/>
+            </a:pPr>
+            <a:r>
+              <a:rPr b="1" lang="de-DE" sz="6600">
                 <a:solidFill>
                   <a:schemeClr val="dk1"/>
                 </a:solidFill>
@@ -11823,6 +11774,27 @@
             </a:r>
           </a:p>
           <a:p>
+            <a:pPr indent="-806450" lvl="0" marL="857250" marR="0" rtl="0" algn="l">
+              <a:spcBef>
+                <a:spcPts val="0"/>
+              </a:spcBef>
+              <a:buClr>
+                <a:schemeClr val="dk1"/>
+              </a:buClr>
+              <a:buSzPct val="83333"/>
+              <a:buFont typeface="Arial"/>
+              <a:buChar char="-"/>
+            </a:pPr>
+            <a:r>
+              <a:rPr b="1" lang="de-DE" sz="4800">
+                <a:solidFill>
+                  <a:schemeClr val="dk1"/>
+                </a:solidFill>
+              </a:rPr>
+              <a:t>RBC summer school</a:t>
+            </a:r>
+          </a:p>
+          <a:p>
             <a:pPr indent="-857250" lvl="0" marL="857250" marR="0" rtl="0" algn="l">
               <a:spcBef>
                 <a:spcPts val="0"/>
@@ -11893,7 +11865,7 @@
             </a:r>
           </a:p>
           <a:p>
-            <a:pPr indent="-862620" lvl="1" marL="2945420" marR="0" rtl="0" algn="l">
+            <a:pPr indent="-862619" lvl="1" marL="2945419" marR="0" rtl="0" algn="l">
               <a:spcBef>
                 <a:spcPts val="0"/>
               </a:spcBef>
@@ -11995,13 +11967,13 @@
       </p:sp>
       <p:sp>
         <p:nvSpPr>
-          <p:cNvPr id="111" name="Shape 111"/>
+          <p:cNvPr id="109" name="Shape 109"/>
           <p:cNvSpPr txBox="1"/>
           <p:nvPr/>
         </p:nvSpPr>
         <p:spPr>
           <a:xfrm>
-            <a:off x="1109136" y="36545187"/>
+            <a:off x="1109136" y="37383387"/>
             <a:ext cx="15489000" cy="1938900"/>
           </a:xfrm>
           <a:prstGeom prst="rect">
@@ -12066,12 +12038,12 @@
       </p:sp>
       <p:pic>
         <p:nvPicPr>
-          <p:cNvPr id="112" name="Shape 112"/>
+          <p:cNvPr id="110" name="Shape 110"/>
           <p:cNvPicPr preferRelativeResize="0"/>
           <p:nvPr/>
         </p:nvPicPr>
         <p:blipFill rotWithShape="1">
-          <a:blip r:embed="rId9">
+          <a:blip r:embed="rId8">
             <a:alphaModFix/>
           </a:blip>
           <a:srcRect b="0" l="0" r="0" t="0"/>
@@ -12095,7 +12067,7 @@
       </p:pic>
       <p:sp>
         <p:nvSpPr>
-          <p:cNvPr id="113" name="Shape 113"/>
+          <p:cNvPr id="111" name="Shape 111"/>
           <p:cNvSpPr txBox="1"/>
           <p:nvPr/>
         </p:nvSpPr>
@@ -12156,7 +12128,7 @@
       </p:sp>
       <p:sp>
         <p:nvSpPr>
-          <p:cNvPr id="114" name="Shape 114"/>
+          <p:cNvPr id="112" name="Shape 112"/>
           <p:cNvSpPr txBox="1"/>
           <p:nvPr/>
         </p:nvSpPr>
@@ -12257,12 +12229,12 @@
       </p:sp>
       <p:pic>
         <p:nvPicPr>
-          <p:cNvPr id="115" name="Shape 115"/>
+          <p:cNvPr id="113" name="Shape 113"/>
           <p:cNvPicPr preferRelativeResize="0"/>
           <p:nvPr/>
         </p:nvPicPr>
         <p:blipFill rotWithShape="1">
-          <a:blip r:embed="rId10">
+          <a:blip r:embed="rId9">
             <a:alphaModFix/>
           </a:blip>
           <a:srcRect b="0" l="0" r="0" t="0"/>
@@ -12284,12 +12256,12 @@
       </p:pic>
       <p:pic>
         <p:nvPicPr>
-          <p:cNvPr id="116" name="Shape 116"/>
+          <p:cNvPr id="114" name="Shape 114"/>
           <p:cNvPicPr preferRelativeResize="0"/>
           <p:nvPr/>
         </p:nvPicPr>
         <p:blipFill rotWithShape="1">
-          <a:blip r:embed="rId11">
+          <a:blip r:embed="rId10">
             <a:alphaModFix/>
           </a:blip>
           <a:srcRect b="0" l="0" r="0" t="0"/>
@@ -12311,7 +12283,7 @@
       </p:pic>
       <p:sp>
         <p:nvSpPr>
-          <p:cNvPr id="117" name="Shape 117"/>
+          <p:cNvPr id="115" name="Shape 115"/>
           <p:cNvSpPr txBox="1"/>
           <p:nvPr/>
         </p:nvSpPr>
@@ -12350,16 +12322,27 @@
                 <a:solidFill>
                   <a:schemeClr val="dk1"/>
                 </a:solidFill>
-                <a:latin typeface="Arial"/>
-                <a:ea typeface="Arial"/>
-                <a:cs typeface="Arial"/>
-                <a:sym typeface="Arial"/>
               </a:rPr>
-              <a:t>Local Galaxy Server</a:t>
+              <a:t>MDC</a:t>
+            </a:r>
+            <a:r>
+              <a:rPr b="1" lang="de-DE" sz="4800">
+                <a:solidFill>
+                  <a:schemeClr val="dk1"/>
+                </a:solidFill>
+                <a:latin typeface="Arial"/>
+                <a:ea typeface="Arial"/>
+                <a:cs typeface="Arial"/>
+                <a:sym typeface="Arial"/>
+              </a:rPr>
+              <a:t> Galaxy Server</a:t>
             </a:r>
           </a:p>
           <a:p>
-            <a:pPr indent="-685800" lvl="0" marL="685800" marR="0" rtl="0" algn="l">
+            <a:pPr indent="-857250" lvl="0" marL="857250" marR="0" rtl="0" algn="l">
+              <a:lnSpc>
+                <a:spcPct val="100000"/>
+              </a:lnSpc>
               <a:spcBef>
                 <a:spcPts val="0"/>
               </a:spcBef>
@@ -12369,25 +12352,23 @@
               <a:buClr>
                 <a:schemeClr val="dk1"/>
               </a:buClr>
-              <a:buSzPct val="25000"/>
-              <a:buFont typeface="Noto Sans Symbols"/>
-              <a:buChar char="◆"/>
+              <a:buSzPct val="100000"/>
+              <a:buChar char="-"/>
             </a:pPr>
             <a:r>
               <a:rPr lang="de-DE" sz="4800">
                 <a:solidFill>
                   <a:schemeClr val="dk1"/>
                 </a:solidFill>
-                <a:latin typeface="Arial"/>
-                <a:ea typeface="Arial"/>
-                <a:cs typeface="Arial"/>
-                <a:sym typeface="Arial"/>
               </a:rPr>
               <a:t>User support</a:t>
             </a:r>
           </a:p>
           <a:p>
-            <a:pPr indent="-685800" lvl="0" marL="685800" marR="0" rtl="0" algn="l">
+            <a:pPr indent="-857250" lvl="0" marL="857250" marR="0" rtl="0" algn="l">
+              <a:lnSpc>
+                <a:spcPct val="100000"/>
+              </a:lnSpc>
               <a:spcBef>
                 <a:spcPts val="0"/>
               </a:spcBef>
@@ -12397,58 +12378,54 @@
               <a:buClr>
                 <a:schemeClr val="dk1"/>
               </a:buClr>
-              <a:buSzPct val="25000"/>
-              <a:buFont typeface="Noto Sans Symbols"/>
-              <a:buChar char="◆"/>
+              <a:buSzPct val="100000"/>
+              <a:buChar char="-"/>
             </a:pPr>
             <a:r>
               <a:rPr lang="de-DE" sz="4800">
                 <a:solidFill>
                   <a:schemeClr val="dk1"/>
                 </a:solidFill>
-                <a:latin typeface="Arial"/>
-                <a:ea typeface="Arial"/>
-                <a:cs typeface="Arial"/>
-                <a:sym typeface="Arial"/>
               </a:rPr>
               <a:t>Tool/workflow development</a:t>
             </a:r>
           </a:p>
           <a:p>
-            <a:pPr indent="-685800" lvl="0" marL="685800" marR="0" rtl="0" algn="l">
-              <a:spcBef>
-                <a:spcPts val="0"/>
-              </a:spcBef>
-              <a:buClr>
-                <a:schemeClr val="dk1"/>
-              </a:buClr>
-              <a:buSzPct val="25000"/>
-              <a:buFont typeface="Noto Sans Symbols"/>
-              <a:buChar char="◆"/>
+            <a:pPr indent="-857250" lvl="0" marL="857250" marR="0" rtl="0" algn="l">
+              <a:lnSpc>
+                <a:spcPct val="100000"/>
+              </a:lnSpc>
+              <a:spcBef>
+                <a:spcPts val="0"/>
+              </a:spcBef>
+              <a:spcAft>
+                <a:spcPts val="0"/>
+              </a:spcAft>
+              <a:buClr>
+                <a:schemeClr val="dk1"/>
+              </a:buClr>
+              <a:buSzPct val="100000"/>
+              <a:buChar char="-"/>
             </a:pPr>
             <a:r>
               <a:rPr lang="de-DE" sz="4800">
                 <a:solidFill>
                   <a:schemeClr val="dk1"/>
                 </a:solidFill>
-                <a:latin typeface="Arial"/>
-                <a:ea typeface="Arial"/>
-                <a:cs typeface="Arial"/>
-                <a:sym typeface="Arial"/>
               </a:rPr>
-              <a:t>Server Maintenance </a:t>
+              <a:t>Server maintenance </a:t>
             </a:r>
           </a:p>
         </p:txBody>
       </p:sp>
       <p:pic>
         <p:nvPicPr>
-          <p:cNvPr descr="20160817_152109.jpg" id="118" name="Shape 118"/>
+          <p:cNvPr descr="20160817_152109.jpg" id="116" name="Shape 116"/>
           <p:cNvPicPr preferRelativeResize="0"/>
           <p:nvPr/>
         </p:nvPicPr>
         <p:blipFill rotWithShape="1">
-          <a:blip r:embed="rId12">
+          <a:blip r:embed="rId11">
             <a:alphaModFix/>
           </a:blip>
           <a:srcRect b="0" l="0" r="0" t="0"/>
@@ -12456,7 +12433,7 @@
         </p:blipFill>
         <p:spPr>
           <a:xfrm>
-            <a:off x="23206507" y="26260631"/>
+            <a:off x="23206507" y="24736631"/>
             <a:ext cx="6003600" cy="4376100"/>
           </a:xfrm>
           <a:prstGeom prst="rect">
@@ -12470,13 +12447,13 @@
       </p:pic>
       <p:sp>
         <p:nvSpPr>
-          <p:cNvPr id="119" name="Shape 119"/>
+          <p:cNvPr id="117" name="Shape 117"/>
           <p:cNvSpPr/>
           <p:nvPr/>
         </p:nvSpPr>
         <p:spPr>
           <a:xfrm>
-            <a:off x="16763679" y="26477265"/>
+            <a:off x="16763679" y="24953265"/>
             <a:ext cx="6245700" cy="3785700"/>
           </a:xfrm>
           <a:prstGeom prst="rect">
@@ -12598,14 +12575,14 @@
       </p:sp>
       <p:sp>
         <p:nvSpPr>
-          <p:cNvPr id="120" name="Shape 120"/>
+          <p:cNvPr id="118" name="Shape 118"/>
           <p:cNvSpPr/>
           <p:nvPr/>
         </p:nvSpPr>
         <p:spPr>
           <a:xfrm>
-            <a:off x="16912498" y="30769675"/>
-            <a:ext cx="13099562" cy="830996"/>
+            <a:off x="16912498" y="29550475"/>
+            <a:ext cx="13099500" cy="831000"/>
           </a:xfrm>
           <a:prstGeom prst="rect">
             <a:avLst/>
@@ -12681,12 +12658,12 @@
       </p:sp>
       <p:pic>
         <p:nvPicPr>
-          <p:cNvPr descr="galaxyLogo360.png" id="121" name="Shape 121"/>
+          <p:cNvPr descr="galaxyLogo360.png" id="119" name="Shape 119"/>
           <p:cNvPicPr preferRelativeResize="0"/>
           <p:nvPr/>
         </p:nvPicPr>
         <p:blipFill rotWithShape="1">
-          <a:blip r:embed="rId13">
+          <a:blip r:embed="rId12">
             <a:alphaModFix/>
           </a:blip>
           <a:srcRect b="0" l="0" r="0" t="0"/>
@@ -12694,8 +12671,8 @@
         </p:blipFill>
         <p:spPr>
           <a:xfrm>
-            <a:off x="25709243" y="12308811"/>
-            <a:ext cx="3624568" cy="1006825"/>
+            <a:off x="25556843" y="11927811"/>
+            <a:ext cx="3624600" cy="1006800"/>
           </a:xfrm>
           <a:prstGeom prst="rect">
             <a:avLst/>
@@ -12708,14 +12685,14 @@
       </p:pic>
       <p:sp>
         <p:nvSpPr>
-          <p:cNvPr id="122" name="Shape 122"/>
+          <p:cNvPr id="120" name="Shape 120"/>
           <p:cNvSpPr txBox="1"/>
           <p:nvPr/>
         </p:nvSpPr>
         <p:spPr>
           <a:xfrm>
-            <a:off x="16602790" y="14569109"/>
-            <a:ext cx="13612529" cy="8633148"/>
+            <a:off x="16602800" y="15026300"/>
+            <a:ext cx="12600000" cy="8161200"/>
           </a:xfrm>
           <a:prstGeom prst="rect">
             <a:avLst/>
@@ -12755,266 +12732,207 @@
             </a:r>
           </a:p>
           <a:p>
-            <a:pPr indent="-685800" lvl="0" marL="685800" marR="0" rtl="0" algn="l">
+            <a:pPr indent="-857250" lvl="0" marL="857250" marR="0" rtl="0" algn="l">
               <a:lnSpc>
-                <a:spcPct val="120000"/>
+                <a:spcPct val="100000"/>
               </a:lnSpc>
               <a:spcBef>
                 <a:spcPts val="0"/>
               </a:spcBef>
-              <a:buClr>
-                <a:schemeClr val="dk1"/>
-              </a:buClr>
-              <a:buSzPct val="25000"/>
-              <a:buFont typeface="Noto Sans Symbols"/>
-              <a:buChar char="◆"/>
+              <a:spcAft>
+                <a:spcPts val="0"/>
+              </a:spcAft>
+              <a:buClr>
+                <a:schemeClr val="dk1"/>
+              </a:buClr>
+              <a:buSzPct val="100000"/>
+              <a:buChar char="-"/>
             </a:pPr>
             <a:r>
               <a:rPr b="1" lang="de-DE" sz="4800">
                 <a:solidFill>
                   <a:schemeClr val="dk1"/>
                 </a:solidFill>
-                <a:latin typeface="Arial"/>
-                <a:ea typeface="Arial"/>
-                <a:cs typeface="Arial"/>
-                <a:sym typeface="Arial"/>
               </a:rPr>
-              <a:t>RCAS: </a:t>
+              <a:t>RCAS</a:t>
             </a:r>
             <a:r>
               <a:rPr lang="de-DE" sz="4800">
                 <a:solidFill>
                   <a:schemeClr val="dk1"/>
                 </a:solidFill>
-                <a:latin typeface="Arial"/>
-                <a:ea typeface="Arial"/>
-                <a:cs typeface="Arial"/>
-                <a:sym typeface="Arial"/>
               </a:rPr>
-              <a:t>RNA-centric annotation system</a:t>
+              <a:t>: RNA-centric annotation system</a:t>
             </a:r>
           </a:p>
           <a:p>
-            <a:pPr indent="-685800" lvl="0" marL="685800" marR="0" rtl="0" algn="l">
+            <a:pPr indent="-857250" lvl="0" marL="857250" marR="0" rtl="0" algn="l">
               <a:lnSpc>
-                <a:spcPct val="120000"/>
+                <a:spcPct val="100000"/>
               </a:lnSpc>
               <a:spcBef>
                 <a:spcPts val="0"/>
               </a:spcBef>
-              <a:buClr>
-                <a:schemeClr val="dk1"/>
-              </a:buClr>
-              <a:buSzPct val="25000"/>
-              <a:buFont typeface="Noto Sans Symbols"/>
-              <a:buChar char="◆"/>
+              <a:spcAft>
+                <a:spcPts val="0"/>
+              </a:spcAft>
+              <a:buClr>
+                <a:schemeClr val="dk1"/>
+              </a:buClr>
+              <a:buSzPct val="100000"/>
+              <a:buChar char="-"/>
             </a:pPr>
             <a:r>
               <a:rPr b="1" lang="de-DE" sz="4800">
                 <a:solidFill>
                   <a:schemeClr val="dk1"/>
                 </a:solidFill>
-                <a:latin typeface="Arial"/>
-                <a:ea typeface="Arial"/>
-                <a:cs typeface="Arial"/>
-                <a:sym typeface="Arial"/>
               </a:rPr>
-              <a:t>doRiNA:</a:t>
+              <a:t>doRiNA</a:t>
             </a:r>
             <a:r>
               <a:rPr lang="de-DE" sz="4800">
                 <a:solidFill>
                   <a:schemeClr val="dk1"/>
                 </a:solidFill>
-                <a:latin typeface="Arial"/>
-                <a:ea typeface="Arial"/>
-                <a:cs typeface="Arial"/>
-                <a:sym typeface="Arial"/>
               </a:rPr>
-              <a:t> Database for binding sites of RNA-binding proteins and miRNAs</a:t>
+              <a:t>: Database for binding sites of RNA-binding proteins and miRNAs</a:t>
             </a:r>
           </a:p>
           <a:p>
-            <a:pPr indent="-685800" lvl="0" marL="685800" marR="0" rtl="0" algn="l">
+            <a:pPr indent="-857250" lvl="0" marL="857250" marR="0" rtl="0" algn="l">
               <a:lnSpc>
-                <a:spcPct val="120000"/>
+                <a:spcPct val="100000"/>
               </a:lnSpc>
               <a:spcBef>
                 <a:spcPts val="0"/>
               </a:spcBef>
-              <a:buClr>
-                <a:schemeClr val="dk1"/>
-              </a:buClr>
-              <a:buSzPct val="25000"/>
-              <a:buFont typeface="Noto Sans Symbols"/>
-              <a:buChar char="◆"/>
+              <a:spcAft>
+                <a:spcPts val="0"/>
+              </a:spcAft>
+              <a:buClr>
+                <a:schemeClr val="dk1"/>
+              </a:buClr>
+              <a:buSzPct val="100000"/>
+              <a:buChar char="-"/>
             </a:pPr>
             <a:r>
               <a:rPr b="1" lang="de-DE" sz="4800">
                 <a:solidFill>
                   <a:schemeClr val="dk1"/>
                 </a:solidFill>
-                <a:latin typeface="Arial"/>
-                <a:ea typeface="Arial"/>
-                <a:cs typeface="Arial"/>
-                <a:sym typeface="Arial"/>
               </a:rPr>
-              <a:t>RiboTaper:</a:t>
+              <a:t>RiboTaper</a:t>
             </a:r>
             <a:r>
               <a:rPr lang="de-DE" sz="4800">
                 <a:solidFill>
                   <a:schemeClr val="dk1"/>
                 </a:solidFill>
-                <a:latin typeface="Arial"/>
-                <a:ea typeface="Arial"/>
-                <a:cs typeface="Arial"/>
-                <a:sym typeface="Arial"/>
               </a:rPr>
-              <a:t> A toolbox for analysis of </a:t>
+              <a:t>: A toolbox for analysis of Ribosome profiling data</a:t>
             </a:r>
           </a:p>
           <a:p>
-            <a:pPr indent="-685800" lvl="0" marL="685800" marR="0" rtl="0" algn="l">
+            <a:pPr indent="-857250" lvl="0" marL="857250" marR="0" rtl="0" algn="l">
               <a:lnSpc>
-                <a:spcPct val="120000"/>
+                <a:spcPct val="100000"/>
               </a:lnSpc>
               <a:spcBef>
                 <a:spcPts val="0"/>
               </a:spcBef>
-              <a:buClr>
-                <a:schemeClr val="dk1"/>
-              </a:buClr>
-              <a:buSzPct val="25000"/>
-              <a:buFont typeface="Noto Sans Symbols"/>
-              <a:buChar char="◆"/>
+              <a:spcAft>
+                <a:spcPts val="0"/>
+              </a:spcAft>
+              <a:buClr>
+                <a:schemeClr val="dk1"/>
+              </a:buClr>
+              <a:buSzPct val="100000"/>
+              <a:buChar char="-"/>
             </a:pPr>
             <a:r>
+              <a:rPr b="1" lang="de-DE" sz="4800">
+                <a:solidFill>
+                  <a:schemeClr val="dk1"/>
+                </a:solidFill>
+              </a:rPr>
+              <a:t>microMummie</a:t>
+            </a:r>
+            <a:r>
               <a:rPr lang="de-DE" sz="4800">
                 <a:solidFill>
                   <a:schemeClr val="dk1"/>
                 </a:solidFill>
-                <a:latin typeface="Arial"/>
-                <a:ea typeface="Arial"/>
-                <a:cs typeface="Arial"/>
-                <a:sym typeface="Arial"/>
               </a:rPr>
-              <a:t>Ribosome profiling data</a:t>
+              <a:t>: MicroRNA target site identification tool</a:t>
             </a:r>
           </a:p>
           <a:p>
-            <a:pPr indent="-685800" lvl="0" marL="685800" marR="0" rtl="0" algn="l">
+            <a:pPr indent="-857250" lvl="0" marL="857250" marR="0" rtl="0" algn="l">
               <a:lnSpc>
-                <a:spcPct val="120000"/>
+                <a:spcPct val="100000"/>
               </a:lnSpc>
               <a:spcBef>
                 <a:spcPts val="0"/>
               </a:spcBef>
-              <a:buClr>
-                <a:schemeClr val="dk1"/>
-              </a:buClr>
-              <a:buSzPct val="25000"/>
-              <a:buFont typeface="Noto Sans Symbols"/>
-              <a:buChar char="◆"/>
+              <a:spcAft>
+                <a:spcPts val="0"/>
+              </a:spcAft>
+              <a:buClr>
+                <a:schemeClr val="dk1"/>
+              </a:buClr>
+              <a:buSzPct val="100000"/>
+              <a:buChar char="-"/>
             </a:pPr>
             <a:r>
               <a:rPr b="1" lang="de-DE" sz="4800">
                 <a:solidFill>
                   <a:schemeClr val="dk1"/>
                 </a:solidFill>
-                <a:latin typeface="Arial"/>
-                <a:ea typeface="Arial"/>
-                <a:cs typeface="Arial"/>
-                <a:sym typeface="Arial"/>
               </a:rPr>
-              <a:t>microMummie:</a:t>
+              <a:t>PARalyzer</a:t>
             </a:r>
             <a:r>
               <a:rPr lang="de-DE" sz="4800">
                 <a:solidFill>
                   <a:schemeClr val="dk1"/>
                 </a:solidFill>
-                <a:latin typeface="Arial"/>
-                <a:ea typeface="Arial"/>
-                <a:cs typeface="Arial"/>
-                <a:sym typeface="Arial"/>
               </a:rPr>
-              <a:t> MicroRNA target site identification tool</a:t>
-            </a:r>
-          </a:p>
-          <a:p>
-            <a:pPr indent="-685800" lvl="0" marL="685800" marR="0" rtl="0" algn="l">
-              <a:lnSpc>
-                <a:spcPct val="120000"/>
-              </a:lnSpc>
-              <a:spcBef>
-                <a:spcPts val="0"/>
-              </a:spcBef>
-              <a:buClr>
-                <a:schemeClr val="dk1"/>
-              </a:buClr>
-              <a:buSzPct val="25000"/>
-              <a:buFont typeface="Noto Sans Symbols"/>
-              <a:buChar char="◆"/>
-            </a:pPr>
-            <a:r>
-              <a:rPr b="1" lang="de-DE" sz="4800">
-                <a:solidFill>
-                  <a:schemeClr val="dk1"/>
-                </a:solidFill>
-                <a:latin typeface="Arial"/>
-                <a:ea typeface="Arial"/>
-                <a:cs typeface="Arial"/>
-                <a:sym typeface="Arial"/>
-              </a:rPr>
-              <a:t>PARalyzer:</a:t>
-            </a:r>
-            <a:r>
-              <a:rPr lang="de-DE" sz="4800">
-                <a:solidFill>
-                  <a:schemeClr val="dk1"/>
-                </a:solidFill>
-                <a:latin typeface="Arial"/>
-                <a:ea typeface="Arial"/>
-                <a:cs typeface="Arial"/>
-                <a:sym typeface="Arial"/>
-              </a:rPr>
-              <a:t> RNA binding site detection </a:t>
-            </a:r>
-          </a:p>
-          <a:p>
-            <a:pPr indent="-685800" lvl="0" marL="685800" marR="0" rtl="0" algn="l">
-              <a:lnSpc>
-                <a:spcPct val="120000"/>
-              </a:lnSpc>
-              <a:spcBef>
-                <a:spcPts val="0"/>
-              </a:spcBef>
-              <a:buClr>
-                <a:schemeClr val="dk1"/>
-              </a:buClr>
-              <a:buSzPct val="25000"/>
-              <a:buFont typeface="Noto Sans Symbols"/>
-              <a:buChar char="◆"/>
-            </a:pPr>
-            <a:r>
-              <a:rPr lang="de-DE" sz="4800">
-                <a:solidFill>
-                  <a:schemeClr val="dk1"/>
-                </a:solidFill>
-                <a:latin typeface="Arial"/>
-                <a:ea typeface="Arial"/>
-                <a:cs typeface="Arial"/>
-                <a:sym typeface="Arial"/>
-              </a:rPr>
-              <a:t>from PAR-CLIP dataset</a:t>
+              <a:t>: RNA binding site detection from PAR-CLIP dataset</a:t>
             </a:r>
           </a:p>
         </p:txBody>
       </p:sp>
       <p:pic>
         <p:nvPicPr>
-          <p:cNvPr descr="bioconductor_logo_rgb.jpg" id="123" name="Shape 123"/>
+          <p:cNvPr descr="bioconductor_logo_rgb.jpg" id="121" name="Shape 121"/>
+          <p:cNvPicPr preferRelativeResize="0"/>
+          <p:nvPr/>
+        </p:nvPicPr>
+        <p:blipFill rotWithShape="1">
+          <a:blip r:embed="rId13">
+            <a:alphaModFix/>
+          </a:blip>
+          <a:srcRect b="0" l="0" r="0" t="0"/>
+          <a:stretch/>
+        </p:blipFill>
+        <p:spPr>
+          <a:xfrm>
+            <a:off x="1109117" y="26969009"/>
+            <a:ext cx="3051000" cy="878400"/>
+          </a:xfrm>
+          <a:prstGeom prst="rect">
+            <a:avLst/>
+          </a:prstGeom>
+          <a:noFill/>
+          <a:ln>
+            <a:noFill/>
+          </a:ln>
+        </p:spPr>
+      </p:pic>
+      <p:pic>
+        <p:nvPicPr>
+          <p:cNvPr descr="webservicelogo.jpg" id="122" name="Shape 122"/>
           <p:cNvPicPr preferRelativeResize="0"/>
           <p:nvPr/>
         </p:nvPicPr>
@@ -13027,8 +12945,8 @@
         </p:blipFill>
         <p:spPr>
           <a:xfrm>
-            <a:off x="16598142" y="23654909"/>
-            <a:ext cx="3050881" cy="878400"/>
+            <a:off x="4680179" y="26768018"/>
+            <a:ext cx="1527900" cy="1523700"/>
           </a:xfrm>
           <a:prstGeom prst="rect">
             <a:avLst/>
@@ -13041,7 +12959,7 @@
       </p:pic>
       <p:pic>
         <p:nvPicPr>
-          <p:cNvPr descr="webservicelogo.jpg" id="124" name="Shape 124"/>
+          <p:cNvPr descr="guixlogo.png" id="123" name="Shape 123"/>
           <p:cNvPicPr preferRelativeResize="0"/>
           <p:nvPr/>
         </p:nvPicPr>
@@ -13054,34 +12972,7 @@
         </p:blipFill>
         <p:spPr>
           <a:xfrm>
-            <a:off x="20169204" y="23377718"/>
-            <a:ext cx="1527774" cy="1523561"/>
-          </a:xfrm>
-          <a:prstGeom prst="rect">
-            <a:avLst/>
-          </a:prstGeom>
-          <a:noFill/>
-          <a:ln>
-            <a:noFill/>
-          </a:ln>
-        </p:spPr>
-      </p:pic>
-      <p:pic>
-        <p:nvPicPr>
-          <p:cNvPr descr="guixlogo.png" id="125" name="Shape 125"/>
-          <p:cNvPicPr preferRelativeResize="0"/>
-          <p:nvPr/>
-        </p:nvPicPr>
-        <p:blipFill rotWithShape="1">
-          <a:blip r:embed="rId16">
-            <a:alphaModFix/>
-          </a:blip>
-          <a:srcRect b="0" l="0" r="0" t="0"/>
-          <a:stretch/>
-        </p:blipFill>
-        <p:spPr>
-          <a:xfrm>
-            <a:off x="24051901" y="23779325"/>
+            <a:off x="9129451" y="27160950"/>
             <a:ext cx="2619900" cy="796500"/>
           </a:xfrm>
           <a:prstGeom prst="rect">
@@ -13095,12 +12986,12 @@
       </p:pic>
       <p:pic>
         <p:nvPicPr>
-          <p:cNvPr descr="docker-logo.png" id="126" name="Shape 126"/>
+          <p:cNvPr descr="docker-logo.png" id="124" name="Shape 124"/>
           <p:cNvPicPr preferRelativeResize="0"/>
           <p:nvPr/>
         </p:nvPicPr>
         <p:blipFill rotWithShape="1">
-          <a:blip r:embed="rId17">
+          <a:blip r:embed="rId16">
             <a:alphaModFix/>
           </a:blip>
           <a:srcRect b="0" l="0" r="0" t="0"/>
@@ -13108,7 +12999,7 @@
         </p:blipFill>
         <p:spPr>
           <a:xfrm>
-            <a:off x="27107046" y="22981843"/>
+            <a:off x="12065446" y="26717993"/>
             <a:ext cx="2319600" cy="1919400"/>
           </a:xfrm>
           <a:prstGeom prst="rect">
@@ -13122,12 +13013,12 @@
       </p:pic>
       <p:pic>
         <p:nvPicPr>
-          <p:cNvPr id="127" name="Shape 127"/>
+          <p:cNvPr id="125" name="Shape 125"/>
           <p:cNvPicPr preferRelativeResize="0"/>
           <p:nvPr/>
         </p:nvPicPr>
         <p:blipFill>
-          <a:blip r:embed="rId18">
+          <a:blip r:embed="rId17">
             <a:alphaModFix/>
           </a:blip>
           <a:stretch>
@@ -13136,7 +13027,7 @@
         </p:blipFill>
         <p:spPr>
           <a:xfrm>
-            <a:off x="22241187" y="23413650"/>
+            <a:off x="6980762" y="26803950"/>
             <a:ext cx="1527775" cy="1527775"/>
           </a:xfrm>
           <a:prstGeom prst="rect">
@@ -13150,13 +13041,13 @@
       </p:pic>
       <p:sp>
         <p:nvSpPr>
-          <p:cNvPr id="128" name="Shape 128"/>
+          <p:cNvPr id="126" name="Shape 126"/>
           <p:cNvSpPr txBox="1"/>
           <p:nvPr/>
         </p:nvSpPr>
         <p:spPr>
           <a:xfrm>
-            <a:off x="1214775" y="39170400"/>
+            <a:off x="1214775" y="39703800"/>
             <a:ext cx="13612500" cy="1015800"/>
           </a:xfrm>
           <a:prstGeom prst="rect">

</xml_diff>